<commit_message>
más diapositivas y cifrado cesar programado
</commit_message>
<xml_diff>
--- a/criptografía teorica.pptx
+++ b/criptografía teorica.pptx
@@ -20,6 +20,15 @@
     <p:sldId id="268" r:id="rId14"/>
     <p:sldId id="269" r:id="rId15"/>
     <p:sldId id="270" r:id="rId16"/>
+    <p:sldId id="271" r:id="rId17"/>
+    <p:sldId id="277" r:id="rId18"/>
+    <p:sldId id="278" r:id="rId19"/>
+    <p:sldId id="272" r:id="rId20"/>
+    <p:sldId id="275" r:id="rId21"/>
+    <p:sldId id="279" r:id="rId22"/>
+    <p:sldId id="273" r:id="rId23"/>
+    <p:sldId id="276" r:id="rId24"/>
+    <p:sldId id="274" r:id="rId25"/>
   </p:sldIdLst>
   <p:sldSz cx="12192000" cy="6858000"/>
   <p:notesSz cx="6858000" cy="9144000"/>
@@ -3310,6 +3319,9 @@
         <a:lstStyle/>
         <a:p>
           <a:pPr>
+            <a:lnSpc>
+              <a:spcPct val="100000"/>
+            </a:lnSpc>
             <a:defRPr cap="all"/>
           </a:pPr>
           <a:r>
@@ -3350,6 +3362,9 @@
         <a:lstStyle/>
         <a:p>
           <a:pPr>
+            <a:lnSpc>
+              <a:spcPct val="100000"/>
+            </a:lnSpc>
             <a:defRPr cap="all"/>
           </a:pPr>
           <a:r>
@@ -3390,6 +3405,9 @@
         <a:lstStyle/>
         <a:p>
           <a:pPr>
+            <a:lnSpc>
+              <a:spcPct val="100000"/>
+            </a:lnSpc>
             <a:defRPr cap="all"/>
           </a:pPr>
           <a:r>
@@ -3430,6 +3448,9 @@
         <a:lstStyle/>
         <a:p>
           <a:pPr>
+            <a:lnSpc>
+              <a:spcPct val="100000"/>
+            </a:lnSpc>
             <a:defRPr cap="all"/>
           </a:pPr>
           <a:r>
@@ -3462,6 +3483,48 @@
         </a:p>
       </dgm:t>
     </dgm:pt>
+    <dgm:pt modelId="{E95F20C6-D759-4405-A491-DEFF09F3F620}">
+      <dgm:prSet/>
+      <dgm:spPr/>
+      <dgm:t>
+        <a:bodyPr/>
+        <a:lstStyle/>
+        <a:p>
+          <a:pPr>
+            <a:lnSpc>
+              <a:spcPct val="100000"/>
+            </a:lnSpc>
+            <a:defRPr cap="all"/>
+          </a:pPr>
+          <a:r>
+            <a:rPr lang="es-ES" dirty="0"/>
+            <a:t>Funciones hash</a:t>
+          </a:r>
+        </a:p>
+      </dgm:t>
+    </dgm:pt>
+    <dgm:pt modelId="{1D4CBC59-6B45-4FA4-A910-697968CAC371}" type="parTrans" cxnId="{6C14736D-CF90-48C6-85A3-4F41E6D9DABB}">
+      <dgm:prSet/>
+      <dgm:spPr/>
+      <dgm:t>
+        <a:bodyPr/>
+        <a:lstStyle/>
+        <a:p>
+          <a:endParaRPr lang="es-ES"/>
+        </a:p>
+      </dgm:t>
+    </dgm:pt>
+    <dgm:pt modelId="{CE5F9C65-D672-4B46-88E9-C0C91DA3FAA3}" type="sibTrans" cxnId="{6C14736D-CF90-48C6-85A3-4F41E6D9DABB}">
+      <dgm:prSet/>
+      <dgm:spPr/>
+      <dgm:t>
+        <a:bodyPr/>
+        <a:lstStyle/>
+        <a:p>
+          <a:endParaRPr lang="es-ES"/>
+        </a:p>
+      </dgm:t>
+    </dgm:pt>
     <dgm:pt modelId="{33F0DC32-DB60-49E6-B84C-9764F2293FFB}" type="pres">
       <dgm:prSet presAssocID="{FA77478D-073D-487A-80E1-A4806E271B55}" presName="root" presStyleCnt="0">
         <dgm:presLayoutVars>
@@ -3476,11 +3539,11 @@
       <dgm:spPr/>
     </dgm:pt>
     <dgm:pt modelId="{39F928FD-123D-44A0-A78C-C1FEBA96DED9}" type="pres">
-      <dgm:prSet presAssocID="{6A68B4AB-3B4F-4AEE-8CD7-7E65D81AB0D1}" presName="iconBgRect" presStyleLbl="bgShp" presStyleIdx="0" presStyleCnt="4"/>
+      <dgm:prSet presAssocID="{6A68B4AB-3B4F-4AEE-8CD7-7E65D81AB0D1}" presName="iconBgRect" presStyleLbl="bgShp" presStyleIdx="0" presStyleCnt="5"/>
       <dgm:spPr/>
     </dgm:pt>
     <dgm:pt modelId="{AB321FE4-06FB-4CEB-A173-BEBA5251C48A}" type="pres">
-      <dgm:prSet presAssocID="{6A68B4AB-3B4F-4AEE-8CD7-7E65D81AB0D1}" presName="iconRect" presStyleLbl="node1" presStyleIdx="0" presStyleCnt="4"/>
+      <dgm:prSet presAssocID="{6A68B4AB-3B4F-4AEE-8CD7-7E65D81AB0D1}" presName="iconRect" presStyleLbl="node1" presStyleIdx="0" presStyleCnt="5"/>
       <dgm:spPr>
         <a:blipFill>
           <a:blip xmlns:r="http://schemas.openxmlformats.org/officeDocument/2006/relationships" r:embed="rId1">
@@ -3512,7 +3575,7 @@
       <dgm:spPr/>
     </dgm:pt>
     <dgm:pt modelId="{A5EDBE00-8505-4D40-972A-1C36E6BCA5ED}" type="pres">
-      <dgm:prSet presAssocID="{6A68B4AB-3B4F-4AEE-8CD7-7E65D81AB0D1}" presName="textRect" presStyleLbl="revTx" presStyleIdx="0" presStyleCnt="4">
+      <dgm:prSet presAssocID="{6A68B4AB-3B4F-4AEE-8CD7-7E65D81AB0D1}" presName="textRect" presStyleLbl="revTx" presStyleIdx="0" presStyleCnt="5">
         <dgm:presLayoutVars>
           <dgm:chMax val="1"/>
           <dgm:chPref val="1"/>
@@ -3529,11 +3592,11 @@
       <dgm:spPr/>
     </dgm:pt>
     <dgm:pt modelId="{2AEC9E5B-DB2F-4116-B1C5-87F4576CB5D8}" type="pres">
-      <dgm:prSet presAssocID="{55A374DE-D570-4CCC-9A78-690F9310A84B}" presName="iconBgRect" presStyleLbl="bgShp" presStyleIdx="1" presStyleCnt="4"/>
+      <dgm:prSet presAssocID="{55A374DE-D570-4CCC-9A78-690F9310A84B}" presName="iconBgRect" presStyleLbl="bgShp" presStyleIdx="1" presStyleCnt="5"/>
       <dgm:spPr/>
     </dgm:pt>
     <dgm:pt modelId="{2D843349-B2B6-4A17-8774-72FF6C30145D}" type="pres">
-      <dgm:prSet presAssocID="{55A374DE-D570-4CCC-9A78-690F9310A84B}" presName="iconRect" presStyleLbl="node1" presStyleIdx="1" presStyleCnt="4"/>
+      <dgm:prSet presAssocID="{55A374DE-D570-4CCC-9A78-690F9310A84B}" presName="iconRect" presStyleLbl="node1" presStyleIdx="1" presStyleCnt="5"/>
       <dgm:spPr>
         <a:blipFill>
           <a:blip xmlns:r="http://schemas.openxmlformats.org/officeDocument/2006/relationships" r:embed="rId3">
@@ -3565,7 +3628,7 @@
       <dgm:spPr/>
     </dgm:pt>
     <dgm:pt modelId="{14D762E4-D69B-4968-8ACE-550D49051E11}" type="pres">
-      <dgm:prSet presAssocID="{55A374DE-D570-4CCC-9A78-690F9310A84B}" presName="textRect" presStyleLbl="revTx" presStyleIdx="1" presStyleCnt="4">
+      <dgm:prSet presAssocID="{55A374DE-D570-4CCC-9A78-690F9310A84B}" presName="textRect" presStyleLbl="revTx" presStyleIdx="1" presStyleCnt="5">
         <dgm:presLayoutVars>
           <dgm:chMax val="1"/>
           <dgm:chPref val="1"/>
@@ -3582,11 +3645,11 @@
       <dgm:spPr/>
     </dgm:pt>
     <dgm:pt modelId="{A838D911-4E61-417D-9C22-EED7DCB0F7D5}" type="pres">
-      <dgm:prSet presAssocID="{D1C3EEB2-C757-48CE-8ACD-7B29DCAB67AB}" presName="iconBgRect" presStyleLbl="bgShp" presStyleIdx="2" presStyleCnt="4"/>
+      <dgm:prSet presAssocID="{D1C3EEB2-C757-48CE-8ACD-7B29DCAB67AB}" presName="iconBgRect" presStyleLbl="bgShp" presStyleIdx="2" presStyleCnt="5"/>
       <dgm:spPr/>
     </dgm:pt>
     <dgm:pt modelId="{1E52C17A-8C16-45CD-8862-970F6B3A3EA7}" type="pres">
-      <dgm:prSet presAssocID="{D1C3EEB2-C757-48CE-8ACD-7B29DCAB67AB}" presName="iconRect" presStyleLbl="node1" presStyleIdx="2" presStyleCnt="4"/>
+      <dgm:prSet presAssocID="{D1C3EEB2-C757-48CE-8ACD-7B29DCAB67AB}" presName="iconRect" presStyleLbl="node1" presStyleIdx="2" presStyleCnt="5"/>
       <dgm:spPr>
         <a:blipFill>
           <a:blip xmlns:r="http://schemas.openxmlformats.org/officeDocument/2006/relationships" r:embed="rId5">
@@ -3618,7 +3681,7 @@
       <dgm:spPr/>
     </dgm:pt>
     <dgm:pt modelId="{28F9AF60-21ED-49FE-9F43-458197BC6D2F}" type="pres">
-      <dgm:prSet presAssocID="{D1C3EEB2-C757-48CE-8ACD-7B29DCAB67AB}" presName="textRect" presStyleLbl="revTx" presStyleIdx="2" presStyleCnt="4">
+      <dgm:prSet presAssocID="{D1C3EEB2-C757-48CE-8ACD-7B29DCAB67AB}" presName="textRect" presStyleLbl="revTx" presStyleIdx="2" presStyleCnt="5">
         <dgm:presLayoutVars>
           <dgm:chMax val="1"/>
           <dgm:chPref val="1"/>
@@ -3635,11 +3698,11 @@
       <dgm:spPr/>
     </dgm:pt>
     <dgm:pt modelId="{FCEA6993-243C-44F4-A3F9-4501C0A02260}" type="pres">
-      <dgm:prSet presAssocID="{E2BC92A4-C2B1-41AB-8DEC-BC05ECC7B927}" presName="iconBgRect" presStyleLbl="bgShp" presStyleIdx="3" presStyleCnt="4"/>
+      <dgm:prSet presAssocID="{E2BC92A4-C2B1-41AB-8DEC-BC05ECC7B927}" presName="iconBgRect" presStyleLbl="bgShp" presStyleIdx="3" presStyleCnt="5"/>
       <dgm:spPr/>
     </dgm:pt>
     <dgm:pt modelId="{64C2486C-0847-4640-9FDA-664B240A3245}" type="pres">
-      <dgm:prSet presAssocID="{E2BC92A4-C2B1-41AB-8DEC-BC05ECC7B927}" presName="iconRect" presStyleLbl="node1" presStyleIdx="3" presStyleCnt="4"/>
+      <dgm:prSet presAssocID="{E2BC92A4-C2B1-41AB-8DEC-BC05ECC7B927}" presName="iconRect" presStyleLbl="node1" presStyleIdx="3" presStyleCnt="5"/>
       <dgm:spPr>
         <a:blipFill>
           <a:blip xmlns:r="http://schemas.openxmlformats.org/officeDocument/2006/relationships" r:embed="rId7">
@@ -3671,7 +3734,55 @@
       <dgm:spPr/>
     </dgm:pt>
     <dgm:pt modelId="{F6334DF1-2BE3-48FC-83FC-62F9B5AC7A41}" type="pres">
-      <dgm:prSet presAssocID="{E2BC92A4-C2B1-41AB-8DEC-BC05ECC7B927}" presName="textRect" presStyleLbl="revTx" presStyleIdx="3" presStyleCnt="4">
+      <dgm:prSet presAssocID="{E2BC92A4-C2B1-41AB-8DEC-BC05ECC7B927}" presName="textRect" presStyleLbl="revTx" presStyleIdx="3" presStyleCnt="5">
+        <dgm:presLayoutVars>
+          <dgm:chMax val="1"/>
+          <dgm:chPref val="1"/>
+        </dgm:presLayoutVars>
+      </dgm:prSet>
+      <dgm:spPr/>
+    </dgm:pt>
+    <dgm:pt modelId="{2BAA731E-DC75-416E-AC64-350B9893991F}" type="pres">
+      <dgm:prSet presAssocID="{CEFC1371-4AE7-477D-AFD0-215FD93F4F7E}" presName="sibTrans" presStyleCnt="0"/>
+      <dgm:spPr/>
+    </dgm:pt>
+    <dgm:pt modelId="{9F65B210-FBE1-42CD-B2EE-2F4787E17B52}" type="pres">
+      <dgm:prSet presAssocID="{E95F20C6-D759-4405-A491-DEFF09F3F620}" presName="compNode" presStyleCnt="0"/>
+      <dgm:spPr/>
+    </dgm:pt>
+    <dgm:pt modelId="{2CF8E5C3-B811-49DC-9062-10B1AEE31BFF}" type="pres">
+      <dgm:prSet presAssocID="{E95F20C6-D759-4405-A491-DEFF09F3F620}" presName="iconBgRect" presStyleLbl="bgShp" presStyleIdx="4" presStyleCnt="5"/>
+      <dgm:spPr/>
+    </dgm:pt>
+    <dgm:pt modelId="{A1E1D24A-CC69-42D1-A36C-2D9439521B2F}" type="pres">
+      <dgm:prSet presAssocID="{E95F20C6-D759-4405-A491-DEFF09F3F620}" presName="iconRect" presStyleLbl="node1" presStyleIdx="4" presStyleCnt="5"/>
+      <dgm:spPr>
+        <a:blipFill>
+          <a:blip xmlns:r="http://schemas.openxmlformats.org/officeDocument/2006/relationships" r:embed="rId9">
+            <a:extLst>
+              <a:ext uri="{96DAC541-7B7A-43D3-8B79-37D633B846F1}">
+                <asvg:svgBlip xmlns:asvg="http://schemas.microsoft.com/office/drawing/2016/SVG/main" r:embed="rId10"/>
+              </a:ext>
+            </a:extLst>
+          </a:blip>
+          <a:srcRect/>
+          <a:stretch>
+            <a:fillRect/>
+          </a:stretch>
+        </a:blipFill>
+      </dgm:spPr>
+      <dgm:extLst>
+        <a:ext uri="{E40237B7-FDA0-4F09-8148-C483321AD2D9}">
+          <dgm14:cNvPr xmlns:dgm14="http://schemas.microsoft.com/office/drawing/2010/diagram" id="0" name="" descr="Documento con relleno sólido"/>
+        </a:ext>
+      </dgm:extLst>
+    </dgm:pt>
+    <dgm:pt modelId="{B2F601C0-C097-4C6A-AD97-FDA3E4A15235}" type="pres">
+      <dgm:prSet presAssocID="{E95F20C6-D759-4405-A491-DEFF09F3F620}" presName="spaceRect" presStyleCnt="0"/>
+      <dgm:spPr/>
+    </dgm:pt>
+    <dgm:pt modelId="{16124192-6DA7-4C3F-A66E-D6375B54AB96}" type="pres">
+      <dgm:prSet presAssocID="{E95F20C6-D759-4405-A491-DEFF09F3F620}" presName="textRect" presStyleLbl="revTx" presStyleIdx="4" presStyleCnt="5">
         <dgm:presLayoutVars>
           <dgm:chMax val="1"/>
           <dgm:chPref val="1"/>
@@ -3683,8 +3794,10 @@
   <dgm:cxnLst>
     <dgm:cxn modelId="{824C0B09-6A61-4AC1-96F7-62E24898D388}" srcId="{FA77478D-073D-487A-80E1-A4806E271B55}" destId="{E2BC92A4-C2B1-41AB-8DEC-BC05ECC7B927}" srcOrd="3" destOrd="0" parTransId="{A1B052B6-1342-481F-81D3-1C4B12F3A971}" sibTransId="{CEFC1371-4AE7-477D-AFD0-215FD93F4F7E}"/>
     <dgm:cxn modelId="{094EF50F-2588-473B-AACA-DF3DC0B25CB7}" type="presOf" srcId="{E2BC92A4-C2B1-41AB-8DEC-BC05ECC7B927}" destId="{F6334DF1-2BE3-48FC-83FC-62F9B5AC7A41}" srcOrd="0" destOrd="0" presId="urn:microsoft.com/office/officeart/2018/5/layout/IconCircleLabelList"/>
+    <dgm:cxn modelId="{1516A613-3C04-4402-A996-FCCF17A215F7}" type="presOf" srcId="{E95F20C6-D759-4405-A491-DEFF09F3F620}" destId="{16124192-6DA7-4C3F-A66E-D6375B54AB96}" srcOrd="0" destOrd="0" presId="urn:microsoft.com/office/officeart/2018/5/layout/IconCircleLabelList"/>
     <dgm:cxn modelId="{78513720-E7D6-46D3-8227-53B947C06B7B}" srcId="{FA77478D-073D-487A-80E1-A4806E271B55}" destId="{D1C3EEB2-C757-48CE-8ACD-7B29DCAB67AB}" srcOrd="2" destOrd="0" parTransId="{52C89861-F710-427F-AEE1-2C520CCAA1A4}" sibTransId="{8611B66F-C414-4214-A052-759E1F08143D}"/>
     <dgm:cxn modelId="{37AB165D-A465-46B2-A324-40247DB394C6}" srcId="{FA77478D-073D-487A-80E1-A4806E271B55}" destId="{6A68B4AB-3B4F-4AEE-8CD7-7E65D81AB0D1}" srcOrd="0" destOrd="0" parTransId="{37024459-6817-415F-B6EA-77014B55DEAD}" sibTransId="{FA8EE61F-F33C-4DD9-8B7F-21DDAC14755D}"/>
+    <dgm:cxn modelId="{6C14736D-CF90-48C6-85A3-4F41E6D9DABB}" srcId="{FA77478D-073D-487A-80E1-A4806E271B55}" destId="{E95F20C6-D759-4405-A491-DEFF09F3F620}" srcOrd="4" destOrd="0" parTransId="{1D4CBC59-6B45-4FA4-A910-697968CAC371}" sibTransId="{CE5F9C65-D672-4B46-88E9-C0C91DA3FAA3}"/>
     <dgm:cxn modelId="{7F047F52-729C-4203-9BCD-299491286598}" type="presOf" srcId="{6A68B4AB-3B4F-4AEE-8CD7-7E65D81AB0D1}" destId="{A5EDBE00-8505-4D40-972A-1C36E6BCA5ED}" srcOrd="0" destOrd="0" presId="urn:microsoft.com/office/officeart/2018/5/layout/IconCircleLabelList"/>
     <dgm:cxn modelId="{DA5E0084-A1CF-4044-9FA5-A01CED9F4DBA}" srcId="{FA77478D-073D-487A-80E1-A4806E271B55}" destId="{55A374DE-D570-4CCC-9A78-690F9310A84B}" srcOrd="1" destOrd="0" parTransId="{9D361B9F-AB8B-4711-BB4E-E2890D5B71CD}" sibTransId="{B57B13BD-0265-4EB0-B2F6-1474BEB5E13B}"/>
     <dgm:cxn modelId="{DA1496AE-1964-445F-B6A3-D7B878863BC0}" type="presOf" srcId="{55A374DE-D570-4CCC-9A78-690F9310A84B}" destId="{14D762E4-D69B-4968-8ACE-550D49051E11}" srcOrd="0" destOrd="0" presId="urn:microsoft.com/office/officeart/2018/5/layout/IconCircleLabelList"/>
@@ -3713,6 +3826,12 @@
     <dgm:cxn modelId="{B348CF1C-0090-46F4-A930-B7EC0E182BC0}" type="presParOf" srcId="{426A933C-EB38-41AB-B461-33DD2EAC1E37}" destId="{64C2486C-0847-4640-9FDA-664B240A3245}" srcOrd="1" destOrd="0" presId="urn:microsoft.com/office/officeart/2018/5/layout/IconCircleLabelList"/>
     <dgm:cxn modelId="{31B93A8E-2789-4FAB-AB11-14F8AF6A335B}" type="presParOf" srcId="{426A933C-EB38-41AB-B461-33DD2EAC1E37}" destId="{83A98B32-F73C-42B5-BB8B-1861A9C528BF}" srcOrd="2" destOrd="0" presId="urn:microsoft.com/office/officeart/2018/5/layout/IconCircleLabelList"/>
     <dgm:cxn modelId="{FE986800-F5E6-49AE-9907-07BEB60FFF93}" type="presParOf" srcId="{426A933C-EB38-41AB-B461-33DD2EAC1E37}" destId="{F6334DF1-2BE3-48FC-83FC-62F9B5AC7A41}" srcOrd="3" destOrd="0" presId="urn:microsoft.com/office/officeart/2018/5/layout/IconCircleLabelList"/>
+    <dgm:cxn modelId="{B6C4857B-C338-4BDA-9134-A4D85BBFA7E5}" type="presParOf" srcId="{33F0DC32-DB60-49E6-B84C-9764F2293FFB}" destId="{2BAA731E-DC75-416E-AC64-350B9893991F}" srcOrd="7" destOrd="0" presId="urn:microsoft.com/office/officeart/2018/5/layout/IconCircleLabelList"/>
+    <dgm:cxn modelId="{250097CF-D01C-4E5D-96F6-38793FF12D07}" type="presParOf" srcId="{33F0DC32-DB60-49E6-B84C-9764F2293FFB}" destId="{9F65B210-FBE1-42CD-B2EE-2F4787E17B52}" srcOrd="8" destOrd="0" presId="urn:microsoft.com/office/officeart/2018/5/layout/IconCircleLabelList"/>
+    <dgm:cxn modelId="{71046966-F28B-4512-870E-42E5D72FFBDF}" type="presParOf" srcId="{9F65B210-FBE1-42CD-B2EE-2F4787E17B52}" destId="{2CF8E5C3-B811-49DC-9062-10B1AEE31BFF}" srcOrd="0" destOrd="0" presId="urn:microsoft.com/office/officeart/2018/5/layout/IconCircleLabelList"/>
+    <dgm:cxn modelId="{8CFDAD35-9561-4F3D-86A7-B8C6B3A42B20}" type="presParOf" srcId="{9F65B210-FBE1-42CD-B2EE-2F4787E17B52}" destId="{A1E1D24A-CC69-42D1-A36C-2D9439521B2F}" srcOrd="1" destOrd="0" presId="urn:microsoft.com/office/officeart/2018/5/layout/IconCircleLabelList"/>
+    <dgm:cxn modelId="{23602292-B618-4BFF-95FE-E5F8A27004BD}" type="presParOf" srcId="{9F65B210-FBE1-42CD-B2EE-2F4787E17B52}" destId="{B2F601C0-C097-4C6A-AD97-FDA3E4A15235}" srcOrd="2" destOrd="0" presId="urn:microsoft.com/office/officeart/2018/5/layout/IconCircleLabelList"/>
+    <dgm:cxn modelId="{E6F4EF38-62AA-4461-A85B-B820E50DEE87}" type="presParOf" srcId="{9F65B210-FBE1-42CD-B2EE-2F4787E17B52}" destId="{16124192-6DA7-4C3F-A66E-D6375B54AB96}" srcOrd="3" destOrd="0" presId="urn:microsoft.com/office/officeart/2018/5/layout/IconCircleLabelList"/>
   </dgm:cxnLst>
   <dgm:bg/>
   <dgm:whole/>
@@ -4443,8 +4562,8 @@
       </dsp:nvSpPr>
       <dsp:spPr>
         <a:xfrm>
-          <a:off x="647881" y="569645"/>
-          <a:ext cx="1454733" cy="1454733"/>
+          <a:off x="799474" y="803568"/>
+          <a:ext cx="1098000" cy="1098000"/>
         </a:xfrm>
         <a:prstGeom prst="ellipse">
           <a:avLst/>
@@ -4482,8 +4601,8 @@
       </dsp:nvSpPr>
       <dsp:spPr>
         <a:xfrm>
-          <a:off x="957906" y="879670"/>
-          <a:ext cx="834683" cy="834683"/>
+          <a:off x="1033474" y="1037569"/>
+          <a:ext cx="630000" cy="630000"/>
         </a:xfrm>
         <a:prstGeom prst="rect">
           <a:avLst/>
@@ -4532,8 +4651,8 @@
       </dsp:nvSpPr>
       <dsp:spPr>
         <a:xfrm>
-          <a:off x="182843" y="2477492"/>
-          <a:ext cx="2384809" cy="720000"/>
+          <a:off x="448474" y="2243569"/>
+          <a:ext cx="1800000" cy="720000"/>
         </a:xfrm>
         <a:prstGeom prst="rect">
           <a:avLst/>
@@ -4562,9 +4681,9 @@
         </a:bodyPr>
         <a:lstStyle/>
         <a:p>
-          <a:pPr marL="0" lvl="0" indent="0" algn="ctr" defTabSz="1155700">
+          <a:pPr marL="0" lvl="0" indent="0" algn="ctr" defTabSz="844550">
             <a:lnSpc>
-              <a:spcPct val="90000"/>
+              <a:spcPct val="100000"/>
             </a:lnSpc>
             <a:spcBef>
               <a:spcPct val="0"/>
@@ -4576,15 +4695,15 @@
             <a:defRPr cap="all"/>
           </a:pPr>
           <a:r>
-            <a:rPr lang="es-ES" sz="2600" kern="1200" dirty="0"/>
+            <a:rPr lang="es-ES" sz="1900" kern="1200" dirty="0"/>
             <a:t>Introducción</a:t>
           </a:r>
-          <a:endParaRPr lang="en-US" sz="2600" kern="1200" dirty="0"/>
+          <a:endParaRPr lang="en-US" sz="1900" kern="1200" dirty="0"/>
         </a:p>
       </dsp:txBody>
       <dsp:txXfrm>
-        <a:off x="182843" y="2477492"/>
-        <a:ext cx="2384809" cy="720000"/>
+        <a:off x="448474" y="2243569"/>
+        <a:ext cx="1800000" cy="720000"/>
       </dsp:txXfrm>
     </dsp:sp>
     <dsp:sp modelId="{2AEC9E5B-DB2F-4116-B1C5-87F4576CB5D8}">
@@ -4594,8 +4713,8 @@
       </dsp:nvSpPr>
       <dsp:spPr>
         <a:xfrm>
-          <a:off x="3450032" y="569645"/>
-          <a:ext cx="1454733" cy="1454733"/>
+          <a:off x="2914474" y="803568"/>
+          <a:ext cx="1098000" cy="1098000"/>
         </a:xfrm>
         <a:prstGeom prst="ellipse">
           <a:avLst/>
@@ -4633,8 +4752,8 @@
       </dsp:nvSpPr>
       <dsp:spPr>
         <a:xfrm>
-          <a:off x="3760057" y="879670"/>
-          <a:ext cx="834683" cy="834683"/>
+          <a:off x="3148474" y="1037568"/>
+          <a:ext cx="630000" cy="630000"/>
         </a:xfrm>
         <a:prstGeom prst="rect">
           <a:avLst/>
@@ -4683,8 +4802,8 @@
       </dsp:nvSpPr>
       <dsp:spPr>
         <a:xfrm>
-          <a:off x="2984994" y="2477492"/>
-          <a:ext cx="2384809" cy="720000"/>
+          <a:off x="2563474" y="2243569"/>
+          <a:ext cx="1800000" cy="720000"/>
         </a:xfrm>
         <a:prstGeom prst="rect">
           <a:avLst/>
@@ -4713,9 +4832,9 @@
         </a:bodyPr>
         <a:lstStyle/>
         <a:p>
-          <a:pPr marL="0" lvl="0" indent="0" algn="ctr" defTabSz="1155700">
+          <a:pPr marL="0" lvl="0" indent="0" algn="ctr" defTabSz="844550">
             <a:lnSpc>
-              <a:spcPct val="90000"/>
+              <a:spcPct val="100000"/>
             </a:lnSpc>
             <a:spcBef>
               <a:spcPct val="0"/>
@@ -4727,15 +4846,15 @@
             <a:defRPr cap="all"/>
           </a:pPr>
           <a:r>
-            <a:rPr lang="es-ES" sz="2600" kern="1200" dirty="0"/>
+            <a:rPr lang="es-ES" sz="1900" kern="1200" dirty="0"/>
             <a:t>Criptografía clásica</a:t>
           </a:r>
-          <a:endParaRPr lang="en-US" sz="2600" kern="1200" dirty="0"/>
+          <a:endParaRPr lang="en-US" sz="1900" kern="1200" dirty="0"/>
         </a:p>
       </dsp:txBody>
       <dsp:txXfrm>
-        <a:off x="2984994" y="2477492"/>
-        <a:ext cx="2384809" cy="720000"/>
+        <a:off x="2563474" y="2243569"/>
+        <a:ext cx="1800000" cy="720000"/>
       </dsp:txXfrm>
     </dsp:sp>
     <dsp:sp modelId="{A838D911-4E61-417D-9C22-EED7DCB0F7D5}">
@@ -4745,8 +4864,8 @@
       </dsp:nvSpPr>
       <dsp:spPr>
         <a:xfrm>
-          <a:off x="6252183" y="569645"/>
-          <a:ext cx="1454733" cy="1454733"/>
+          <a:off x="5029475" y="803568"/>
+          <a:ext cx="1098000" cy="1098000"/>
         </a:xfrm>
         <a:prstGeom prst="ellipse">
           <a:avLst/>
@@ -4784,8 +4903,8 @@
       </dsp:nvSpPr>
       <dsp:spPr>
         <a:xfrm>
-          <a:off x="6562208" y="879670"/>
-          <a:ext cx="834683" cy="834683"/>
+          <a:off x="5263475" y="1037568"/>
+          <a:ext cx="630000" cy="630000"/>
         </a:xfrm>
         <a:prstGeom prst="rect">
           <a:avLst/>
@@ -4834,8 +4953,8 @@
       </dsp:nvSpPr>
       <dsp:spPr>
         <a:xfrm>
-          <a:off x="5787145" y="2477492"/>
-          <a:ext cx="2384809" cy="720000"/>
+          <a:off x="4678475" y="2243569"/>
+          <a:ext cx="1800000" cy="720000"/>
         </a:xfrm>
         <a:prstGeom prst="rect">
           <a:avLst/>
@@ -4864,9 +4983,9 @@
         </a:bodyPr>
         <a:lstStyle/>
         <a:p>
-          <a:pPr marL="0" lvl="0" indent="0" algn="ctr" defTabSz="1155700">
+          <a:pPr marL="0" lvl="0" indent="0" algn="ctr" defTabSz="844550">
             <a:lnSpc>
-              <a:spcPct val="90000"/>
+              <a:spcPct val="100000"/>
             </a:lnSpc>
             <a:spcBef>
               <a:spcPct val="0"/>
@@ -4878,15 +4997,15 @@
             <a:defRPr cap="all"/>
           </a:pPr>
           <a:r>
-            <a:rPr lang="es-ES" sz="2600" kern="1200" dirty="0"/>
+            <a:rPr lang="es-ES" sz="1900" kern="1200" dirty="0"/>
             <a:t>Criptografía simétrica</a:t>
           </a:r>
-          <a:endParaRPr lang="en-US" sz="2600" kern="1200" dirty="0"/>
+          <a:endParaRPr lang="en-US" sz="1900" kern="1200" dirty="0"/>
         </a:p>
       </dsp:txBody>
       <dsp:txXfrm>
-        <a:off x="5787145" y="2477492"/>
-        <a:ext cx="2384809" cy="720000"/>
+        <a:off x="4678475" y="2243569"/>
+        <a:ext cx="1800000" cy="720000"/>
       </dsp:txXfrm>
     </dsp:sp>
     <dsp:sp modelId="{FCEA6993-243C-44F4-A3F9-4501C0A02260}">
@@ -4896,8 +5015,8 @@
       </dsp:nvSpPr>
       <dsp:spPr>
         <a:xfrm>
-          <a:off x="9054334" y="569645"/>
-          <a:ext cx="1454733" cy="1454733"/>
+          <a:off x="7144475" y="803568"/>
+          <a:ext cx="1098000" cy="1098000"/>
         </a:xfrm>
         <a:prstGeom prst="ellipse">
           <a:avLst/>
@@ -4935,8 +5054,8 @@
       </dsp:nvSpPr>
       <dsp:spPr>
         <a:xfrm>
-          <a:off x="9364359" y="879670"/>
-          <a:ext cx="834683" cy="834683"/>
+          <a:off x="7378475" y="1037568"/>
+          <a:ext cx="630000" cy="630000"/>
         </a:xfrm>
         <a:prstGeom prst="rect">
           <a:avLst/>
@@ -4985,8 +5104,8 @@
       </dsp:nvSpPr>
       <dsp:spPr>
         <a:xfrm>
-          <a:off x="8589296" y="2477492"/>
-          <a:ext cx="2384809" cy="720000"/>
+          <a:off x="6793475" y="2243569"/>
+          <a:ext cx="1800000" cy="720000"/>
         </a:xfrm>
         <a:prstGeom prst="rect">
           <a:avLst/>
@@ -5015,9 +5134,9 @@
         </a:bodyPr>
         <a:lstStyle/>
         <a:p>
-          <a:pPr marL="0" lvl="0" indent="0" algn="ctr" defTabSz="1155700">
+          <a:pPr marL="0" lvl="0" indent="0" algn="ctr" defTabSz="844550">
             <a:lnSpc>
-              <a:spcPct val="90000"/>
+              <a:spcPct val="100000"/>
             </a:lnSpc>
             <a:spcBef>
               <a:spcPct val="0"/>
@@ -5029,15 +5148,171 @@
             <a:defRPr cap="all"/>
           </a:pPr>
           <a:r>
-            <a:rPr lang="es-ES" sz="2600" kern="1200" dirty="0"/>
+            <a:rPr lang="es-ES" sz="1900" kern="1200" dirty="0"/>
             <a:t>Criptografía asimétrica</a:t>
           </a:r>
-          <a:endParaRPr lang="en-US" sz="2600" kern="1200" dirty="0"/>
+          <a:endParaRPr lang="en-US" sz="1900" kern="1200" dirty="0"/>
         </a:p>
       </dsp:txBody>
       <dsp:txXfrm>
-        <a:off x="8589296" y="2477492"/>
-        <a:ext cx="2384809" cy="720000"/>
+        <a:off x="6793475" y="2243569"/>
+        <a:ext cx="1800000" cy="720000"/>
+      </dsp:txXfrm>
+    </dsp:sp>
+    <dsp:sp modelId="{2CF8E5C3-B811-49DC-9062-10B1AEE31BFF}">
+      <dsp:nvSpPr>
+        <dsp:cNvPr id="0" name=""/>
+        <dsp:cNvSpPr/>
+      </dsp:nvSpPr>
+      <dsp:spPr>
+        <a:xfrm>
+          <a:off x="9259475" y="803568"/>
+          <a:ext cx="1098000" cy="1098000"/>
+        </a:xfrm>
+        <a:prstGeom prst="ellipse">
+          <a:avLst/>
+        </a:prstGeom>
+        <a:solidFill>
+          <a:schemeClr val="accent6">
+            <a:hueOff val="0"/>
+            <a:satOff val="0"/>
+            <a:lumOff val="0"/>
+            <a:alphaOff val="0"/>
+          </a:schemeClr>
+        </a:solidFill>
+        <a:ln>
+          <a:noFill/>
+        </a:ln>
+        <a:effectLst/>
+      </dsp:spPr>
+      <dsp:style>
+        <a:lnRef idx="0">
+          <a:scrgbClr r="0" g="0" b="0"/>
+        </a:lnRef>
+        <a:fillRef idx="1">
+          <a:scrgbClr r="0" g="0" b="0"/>
+        </a:fillRef>
+        <a:effectRef idx="0">
+          <a:scrgbClr r="0" g="0" b="0"/>
+        </a:effectRef>
+        <a:fontRef idx="minor"/>
+      </dsp:style>
+    </dsp:sp>
+    <dsp:sp modelId="{A1E1D24A-CC69-42D1-A36C-2D9439521B2F}">
+      <dsp:nvSpPr>
+        <dsp:cNvPr id="0" name=""/>
+        <dsp:cNvSpPr/>
+      </dsp:nvSpPr>
+      <dsp:spPr>
+        <a:xfrm>
+          <a:off x="9493475" y="1037568"/>
+          <a:ext cx="630000" cy="630000"/>
+        </a:xfrm>
+        <a:prstGeom prst="rect">
+          <a:avLst/>
+        </a:prstGeom>
+        <a:blipFill>
+          <a:blip xmlns:r="http://schemas.openxmlformats.org/officeDocument/2006/relationships" r:embed="rId9">
+            <a:extLst>
+              <a:ext uri="{96DAC541-7B7A-43D3-8B79-37D633B846F1}">
+                <asvg:svgBlip xmlns:asvg="http://schemas.microsoft.com/office/drawing/2016/SVG/main" r:embed="rId10"/>
+              </a:ext>
+            </a:extLst>
+          </a:blip>
+          <a:srcRect/>
+          <a:stretch>
+            <a:fillRect/>
+          </a:stretch>
+        </a:blipFill>
+        <a:ln w="19050" cap="flat" cmpd="sng" algn="ctr">
+          <a:solidFill>
+            <a:schemeClr val="lt1">
+              <a:alpha val="0"/>
+              <a:hueOff val="0"/>
+              <a:satOff val="0"/>
+              <a:lumOff val="0"/>
+              <a:alphaOff val="0"/>
+            </a:schemeClr>
+          </a:solidFill>
+          <a:prstDash val="solid"/>
+          <a:miter lim="800000"/>
+        </a:ln>
+        <a:effectLst/>
+      </dsp:spPr>
+      <dsp:style>
+        <a:lnRef idx="2">
+          <a:scrgbClr r="0" g="0" b="0"/>
+        </a:lnRef>
+        <a:fillRef idx="1">
+          <a:scrgbClr r="0" g="0" b="0"/>
+        </a:fillRef>
+        <a:effectRef idx="0">
+          <a:scrgbClr r="0" g="0" b="0"/>
+        </a:effectRef>
+        <a:fontRef idx="minor">
+          <a:schemeClr val="lt1"/>
+        </a:fontRef>
+      </dsp:style>
+    </dsp:sp>
+    <dsp:sp modelId="{16124192-6DA7-4C3F-A66E-D6375B54AB96}">
+      <dsp:nvSpPr>
+        <dsp:cNvPr id="0" name=""/>
+        <dsp:cNvSpPr/>
+      </dsp:nvSpPr>
+      <dsp:spPr>
+        <a:xfrm>
+          <a:off x="8908475" y="2243569"/>
+          <a:ext cx="1800000" cy="720000"/>
+        </a:xfrm>
+        <a:prstGeom prst="rect">
+          <a:avLst/>
+        </a:prstGeom>
+        <a:noFill/>
+        <a:ln>
+          <a:noFill/>
+        </a:ln>
+        <a:effectLst/>
+      </dsp:spPr>
+      <dsp:style>
+        <a:lnRef idx="0">
+          <a:scrgbClr r="0" g="0" b="0"/>
+        </a:lnRef>
+        <a:fillRef idx="0">
+          <a:scrgbClr r="0" g="0" b="0"/>
+        </a:fillRef>
+        <a:effectRef idx="0">
+          <a:scrgbClr r="0" g="0" b="0"/>
+        </a:effectRef>
+        <a:fontRef idx="minor"/>
+      </dsp:style>
+      <dsp:txBody>
+        <a:bodyPr spcFirstLastPara="0" vert="horz" wrap="square" lIns="0" tIns="0" rIns="0" bIns="0" numCol="1" spcCol="1270" anchor="t" anchorCtr="0">
+          <a:noAutofit/>
+        </a:bodyPr>
+        <a:lstStyle/>
+        <a:p>
+          <a:pPr marL="0" lvl="0" indent="0" algn="ctr" defTabSz="844550">
+            <a:lnSpc>
+              <a:spcPct val="100000"/>
+            </a:lnSpc>
+            <a:spcBef>
+              <a:spcPct val="0"/>
+            </a:spcBef>
+            <a:spcAft>
+              <a:spcPct val="35000"/>
+            </a:spcAft>
+            <a:buNone/>
+            <a:defRPr cap="all"/>
+          </a:pPr>
+          <a:r>
+            <a:rPr lang="es-ES" sz="1900" kern="1200" dirty="0"/>
+            <a:t>Funciones hash</a:t>
+          </a:r>
+        </a:p>
+      </dsp:txBody>
+      <dsp:txXfrm>
+        <a:off x="8908475" y="2243569"/>
+        <a:ext cx="1800000" cy="720000"/>
       </dsp:txXfrm>
     </dsp:sp>
   </dsp:spTree>
@@ -11319,7 +11594,7 @@
           <a:p>
             <a:fld id="{E80C50CD-E178-4744-9B35-B2F624D6C5E9}" type="datetimeFigureOut">
               <a:rPr lang="en-US" smtClean="0"/>
-              <a:t>10/8/2025</a:t>
+              <a:t>10/9/2025</a:t>
             </a:fld>
             <a:endParaRPr lang="en-US"/>
           </a:p>
@@ -11517,7 +11792,7 @@
           <a:p>
             <a:fld id="{E80C50CD-E178-4744-9B35-B2F624D6C5E9}" type="datetimeFigureOut">
               <a:rPr lang="en-US" smtClean="0"/>
-              <a:t>10/8/2025</a:t>
+              <a:t>10/9/2025</a:t>
             </a:fld>
             <a:endParaRPr lang="en-US"/>
           </a:p>
@@ -11725,7 +12000,7 @@
           <a:p>
             <a:fld id="{E80C50CD-E178-4744-9B35-B2F624D6C5E9}" type="datetimeFigureOut">
               <a:rPr lang="en-US" smtClean="0"/>
-              <a:t>10/8/2025</a:t>
+              <a:t>10/9/2025</a:t>
             </a:fld>
             <a:endParaRPr lang="en-US"/>
           </a:p>
@@ -11975,7 +12250,7 @@
           <a:p>
             <a:fld id="{E80C50CD-E178-4744-9B35-B2F624D6C5E9}" type="datetimeFigureOut">
               <a:rPr lang="en-US" smtClean="0"/>
-              <a:t>10/8/2025</a:t>
+              <a:t>10/9/2025</a:t>
             </a:fld>
             <a:endParaRPr lang="en-US"/>
           </a:p>
@@ -12254,7 +12529,7 @@
           <a:p>
             <a:fld id="{E80C50CD-E178-4744-9B35-B2F624D6C5E9}" type="datetimeFigureOut">
               <a:rPr lang="en-US" smtClean="0"/>
-              <a:t>10/8/2025</a:t>
+              <a:t>10/9/2025</a:t>
             </a:fld>
             <a:endParaRPr lang="en-US"/>
           </a:p>
@@ -12571,7 +12846,7 @@
           <a:p>
             <a:fld id="{E80C50CD-E178-4744-9B35-B2F624D6C5E9}" type="datetimeFigureOut">
               <a:rPr lang="en-US" smtClean="0"/>
-              <a:t>10/8/2025</a:t>
+              <a:t>10/9/2025</a:t>
             </a:fld>
             <a:endParaRPr lang="en-US"/>
           </a:p>
@@ -12987,7 +13262,7 @@
           <a:p>
             <a:fld id="{E80C50CD-E178-4744-9B35-B2F624D6C5E9}" type="datetimeFigureOut">
               <a:rPr lang="en-US" smtClean="0"/>
-              <a:t>10/8/2025</a:t>
+              <a:t>10/9/2025</a:t>
             </a:fld>
             <a:endParaRPr lang="en-US"/>
           </a:p>
@@ -13128,7 +13403,7 @@
           <a:p>
             <a:fld id="{E80C50CD-E178-4744-9B35-B2F624D6C5E9}" type="datetimeFigureOut">
               <a:rPr lang="en-US" smtClean="0"/>
-              <a:t>10/8/2025</a:t>
+              <a:t>10/9/2025</a:t>
             </a:fld>
             <a:endParaRPr lang="en-US"/>
           </a:p>
@@ -13241,7 +13516,7 @@
           <a:p>
             <a:fld id="{E80C50CD-E178-4744-9B35-B2F624D6C5E9}" type="datetimeFigureOut">
               <a:rPr lang="en-US" smtClean="0"/>
-              <a:t>10/8/2025</a:t>
+              <a:t>10/9/2025</a:t>
             </a:fld>
             <a:endParaRPr lang="en-US"/>
           </a:p>
@@ -13558,7 +13833,7 @@
           <a:p>
             <a:fld id="{E80C50CD-E178-4744-9B35-B2F624D6C5E9}" type="datetimeFigureOut">
               <a:rPr lang="en-US" smtClean="0"/>
-              <a:t>10/8/2025</a:t>
+              <a:t>10/9/2025</a:t>
             </a:fld>
             <a:endParaRPr lang="en-US"/>
           </a:p>
@@ -13850,7 +14125,7 @@
           <a:p>
             <a:fld id="{E80C50CD-E178-4744-9B35-B2F624D6C5E9}" type="datetimeFigureOut">
               <a:rPr lang="en-US" smtClean="0"/>
-              <a:t>10/8/2025</a:t>
+              <a:t>10/9/2025</a:t>
             </a:fld>
             <a:endParaRPr lang="en-US"/>
           </a:p>
@@ -14090,7 +14365,7 @@
             <a:fld id="{E80C50CD-E178-4744-9B35-B2F624D6C5E9}" type="datetimeFigureOut">
               <a:rPr lang="en-US" smtClean="0"/>
               <a:pPr/>
-              <a:t>10/8/2025</a:t>
+              <a:t>10/9/2025</a:t>
             </a:fld>
             <a:endParaRPr lang="en-US"/>
           </a:p>
@@ -16082,6 +16357,769 @@
 </p:sld>
 </file>
 
+<file path=ppt/slides/slide16.xml><?xml version="1.0" encoding="utf-8"?>
+<p:sld xmlns:a="http://schemas.openxmlformats.org/drawingml/2006/main" xmlns:r="http://schemas.openxmlformats.org/officeDocument/2006/relationships" xmlns:p="http://schemas.openxmlformats.org/presentationml/2006/main">
+  <p:cSld>
+    <p:spTree>
+      <p:nvGrpSpPr>
+        <p:cNvPr id="1" name=""/>
+        <p:cNvGrpSpPr/>
+        <p:nvPr/>
+      </p:nvGrpSpPr>
+      <p:grpSpPr>
+        <a:xfrm>
+          <a:off x="0" y="0"/>
+          <a:ext cx="0" cy="0"/>
+          <a:chOff x="0" y="0"/>
+          <a:chExt cx="0" cy="0"/>
+        </a:xfrm>
+      </p:grpSpPr>
+      <p:sp>
+        <p:nvSpPr>
+          <p:cNvPr id="2" name="Título 1">
+            <a:extLst>
+              <a:ext uri="{FF2B5EF4-FFF2-40B4-BE49-F238E27FC236}">
+                <a16:creationId xmlns:a16="http://schemas.microsoft.com/office/drawing/2014/main" id="{82CB18FA-F17B-A709-71AD-D919227A625B}"/>
+              </a:ext>
+            </a:extLst>
+          </p:cNvPr>
+          <p:cNvSpPr>
+            <a:spLocks noGrp="1"/>
+          </p:cNvSpPr>
+          <p:nvPr>
+            <p:ph type="title"/>
+          </p:nvPr>
+        </p:nvSpPr>
+        <p:spPr/>
+        <p:txBody>
+          <a:bodyPr/>
+          <a:lstStyle/>
+          <a:p>
+            <a:r>
+              <a:rPr lang="es-ES" dirty="0"/>
+              <a:t>3. Criptografía simétrica</a:t>
+            </a:r>
+          </a:p>
+        </p:txBody>
+      </p:sp>
+      <p:pic>
+        <p:nvPicPr>
+          <p:cNvPr id="5" name="Marcador de contenido 4" descr="Diagrama&#10;&#10;El contenido generado por IA puede ser incorrecto.">
+            <a:extLst>
+              <a:ext uri="{FF2B5EF4-FFF2-40B4-BE49-F238E27FC236}">
+                <a16:creationId xmlns:a16="http://schemas.microsoft.com/office/drawing/2014/main" id="{1D7FC0D3-F7C2-A49D-5940-D5D40BD68CBF}"/>
+              </a:ext>
+            </a:extLst>
+          </p:cNvPr>
+          <p:cNvPicPr>
+            <a:picLocks noGrp="1" noChangeAspect="1"/>
+          </p:cNvPicPr>
+          <p:nvPr>
+            <p:ph idx="1"/>
+          </p:nvPr>
+        </p:nvPicPr>
+        <p:blipFill>
+          <a:blip r:embed="rId2">
+            <a:extLst>
+              <a:ext uri="{28A0092B-C50C-407E-A947-70E740481C1C}">
+                <a14:useLocalDpi xmlns:a14="http://schemas.microsoft.com/office/drawing/2010/main" val="0"/>
+              </a:ext>
+            </a:extLst>
+          </a:blip>
+          <a:stretch>
+            <a:fillRect/>
+          </a:stretch>
+        </p:blipFill>
+        <p:spPr>
+          <a:xfrm>
+            <a:off x="740228" y="2578100"/>
+            <a:ext cx="10717894" cy="3767138"/>
+          </a:xfrm>
+        </p:spPr>
+      </p:pic>
+    </p:spTree>
+    <p:extLst>
+      <p:ext uri="{BB962C8B-B14F-4D97-AF65-F5344CB8AC3E}">
+        <p14:creationId xmlns:p14="http://schemas.microsoft.com/office/powerpoint/2010/main" val="3957486977"/>
+      </p:ext>
+    </p:extLst>
+  </p:cSld>
+  <p:clrMapOvr>
+    <a:masterClrMapping/>
+  </p:clrMapOvr>
+</p:sld>
+</file>
+
+<file path=ppt/slides/slide17.xml><?xml version="1.0" encoding="utf-8"?>
+<p:sld xmlns:a="http://schemas.openxmlformats.org/drawingml/2006/main" xmlns:r="http://schemas.openxmlformats.org/officeDocument/2006/relationships" xmlns:p="http://schemas.openxmlformats.org/presentationml/2006/main">
+  <p:cSld>
+    <p:spTree>
+      <p:nvGrpSpPr>
+        <p:cNvPr id="1" name=""/>
+        <p:cNvGrpSpPr/>
+        <p:nvPr/>
+      </p:nvGrpSpPr>
+      <p:grpSpPr>
+        <a:xfrm>
+          <a:off x="0" y="0"/>
+          <a:ext cx="0" cy="0"/>
+          <a:chOff x="0" y="0"/>
+          <a:chExt cx="0" cy="0"/>
+        </a:xfrm>
+      </p:grpSpPr>
+      <p:sp>
+        <p:nvSpPr>
+          <p:cNvPr id="2" name="Título 1">
+            <a:extLst>
+              <a:ext uri="{FF2B5EF4-FFF2-40B4-BE49-F238E27FC236}">
+                <a16:creationId xmlns:a16="http://schemas.microsoft.com/office/drawing/2014/main" id="{2A04DFFD-4D6B-E7DC-9BC6-76EBB54DE00E}"/>
+              </a:ext>
+            </a:extLst>
+          </p:cNvPr>
+          <p:cNvSpPr>
+            <a:spLocks noGrp="1"/>
+          </p:cNvSpPr>
+          <p:nvPr>
+            <p:ph type="title"/>
+          </p:nvPr>
+        </p:nvSpPr>
+        <p:spPr/>
+        <p:txBody>
+          <a:bodyPr/>
+          <a:lstStyle/>
+          <a:p>
+            <a:r>
+              <a:rPr lang="es-ES" dirty="0"/>
+              <a:t>DES</a:t>
+            </a:r>
+          </a:p>
+        </p:txBody>
+      </p:sp>
+      <p:sp>
+        <p:nvSpPr>
+          <p:cNvPr id="3" name="Marcador de contenido 2">
+            <a:extLst>
+              <a:ext uri="{FF2B5EF4-FFF2-40B4-BE49-F238E27FC236}">
+                <a16:creationId xmlns:a16="http://schemas.microsoft.com/office/drawing/2014/main" id="{9053EC92-AC0B-92EA-86C4-DF18AC5A0C3F}"/>
+              </a:ext>
+            </a:extLst>
+          </p:cNvPr>
+          <p:cNvSpPr>
+            <a:spLocks noGrp="1"/>
+          </p:cNvSpPr>
+          <p:nvPr>
+            <p:ph idx="1"/>
+          </p:nvPr>
+        </p:nvSpPr>
+        <p:spPr/>
+        <p:txBody>
+          <a:bodyPr/>
+          <a:lstStyle/>
+          <a:p>
+            <a:endParaRPr lang="es-ES"/>
+          </a:p>
+        </p:txBody>
+      </p:sp>
+    </p:spTree>
+    <p:extLst>
+      <p:ext uri="{BB962C8B-B14F-4D97-AF65-F5344CB8AC3E}">
+        <p14:creationId xmlns:p14="http://schemas.microsoft.com/office/powerpoint/2010/main" val="2522583108"/>
+      </p:ext>
+    </p:extLst>
+  </p:cSld>
+  <p:clrMapOvr>
+    <a:masterClrMapping/>
+  </p:clrMapOvr>
+</p:sld>
+</file>
+
+<file path=ppt/slides/slide18.xml><?xml version="1.0" encoding="utf-8"?>
+<p:sld xmlns:a="http://schemas.openxmlformats.org/drawingml/2006/main" xmlns:r="http://schemas.openxmlformats.org/officeDocument/2006/relationships" xmlns:p="http://schemas.openxmlformats.org/presentationml/2006/main">
+  <p:cSld>
+    <p:spTree>
+      <p:nvGrpSpPr>
+        <p:cNvPr id="1" name=""/>
+        <p:cNvGrpSpPr/>
+        <p:nvPr/>
+      </p:nvGrpSpPr>
+      <p:grpSpPr>
+        <a:xfrm>
+          <a:off x="0" y="0"/>
+          <a:ext cx="0" cy="0"/>
+          <a:chOff x="0" y="0"/>
+          <a:chExt cx="0" cy="0"/>
+        </a:xfrm>
+      </p:grpSpPr>
+      <p:sp>
+        <p:nvSpPr>
+          <p:cNvPr id="2" name="Título 1">
+            <a:extLst>
+              <a:ext uri="{FF2B5EF4-FFF2-40B4-BE49-F238E27FC236}">
+                <a16:creationId xmlns:a16="http://schemas.microsoft.com/office/drawing/2014/main" id="{27DF6771-FB6C-56D4-4CED-AABD7FA99AB4}"/>
+              </a:ext>
+            </a:extLst>
+          </p:cNvPr>
+          <p:cNvSpPr>
+            <a:spLocks noGrp="1"/>
+          </p:cNvSpPr>
+          <p:nvPr>
+            <p:ph type="title"/>
+          </p:nvPr>
+        </p:nvSpPr>
+        <p:spPr/>
+        <p:txBody>
+          <a:bodyPr/>
+          <a:lstStyle/>
+          <a:p>
+            <a:r>
+              <a:rPr lang="es-ES" dirty="0"/>
+              <a:t>AES</a:t>
+            </a:r>
+          </a:p>
+        </p:txBody>
+      </p:sp>
+      <p:sp>
+        <p:nvSpPr>
+          <p:cNvPr id="3" name="Marcador de contenido 2">
+            <a:extLst>
+              <a:ext uri="{FF2B5EF4-FFF2-40B4-BE49-F238E27FC236}">
+                <a16:creationId xmlns:a16="http://schemas.microsoft.com/office/drawing/2014/main" id="{2A046998-FEFA-FFAB-8180-9ECCF44E5695}"/>
+              </a:ext>
+            </a:extLst>
+          </p:cNvPr>
+          <p:cNvSpPr>
+            <a:spLocks noGrp="1"/>
+          </p:cNvSpPr>
+          <p:nvPr>
+            <p:ph idx="1"/>
+          </p:nvPr>
+        </p:nvSpPr>
+        <p:spPr/>
+        <p:txBody>
+          <a:bodyPr/>
+          <a:lstStyle/>
+          <a:p>
+            <a:endParaRPr lang="es-ES"/>
+          </a:p>
+        </p:txBody>
+      </p:sp>
+    </p:spTree>
+    <p:extLst>
+      <p:ext uri="{BB962C8B-B14F-4D97-AF65-F5344CB8AC3E}">
+        <p14:creationId xmlns:p14="http://schemas.microsoft.com/office/powerpoint/2010/main" val="1697912325"/>
+      </p:ext>
+    </p:extLst>
+  </p:cSld>
+  <p:clrMapOvr>
+    <a:masterClrMapping/>
+  </p:clrMapOvr>
+</p:sld>
+</file>
+
+<file path=ppt/slides/slide19.xml><?xml version="1.0" encoding="utf-8"?>
+<p:sld xmlns:a="http://schemas.openxmlformats.org/drawingml/2006/main" xmlns:r="http://schemas.openxmlformats.org/officeDocument/2006/relationships" xmlns:p="http://schemas.openxmlformats.org/presentationml/2006/main">
+  <p:cSld>
+    <p:bg>
+      <p:bgPr>
+        <a:solidFill>
+          <a:schemeClr val="bg1"/>
+        </a:solidFill>
+        <a:effectLst/>
+      </p:bgPr>
+    </p:bg>
+    <p:spTree>
+      <p:nvGrpSpPr>
+        <p:cNvPr id="1" name=""/>
+        <p:cNvGrpSpPr/>
+        <p:nvPr/>
+      </p:nvGrpSpPr>
+      <p:grpSpPr>
+        <a:xfrm>
+          <a:off x="0" y="0"/>
+          <a:ext cx="0" cy="0"/>
+          <a:chOff x="0" y="0"/>
+          <a:chExt cx="0" cy="0"/>
+        </a:xfrm>
+      </p:grpSpPr>
+      <p:sp>
+        <p:nvSpPr>
+          <p:cNvPr id="10" name="Freeform: Shape 9">
+            <a:extLst>
+              <a:ext uri="{FF2B5EF4-FFF2-40B4-BE49-F238E27FC236}">
+                <a16:creationId xmlns:a16="http://schemas.microsoft.com/office/drawing/2014/main" id="{774A975B-A886-5202-0489-6965514A0D14}"/>
+              </a:ext>
+              <a:ext uri="{C183D7F6-B498-43B3-948B-1728B52AA6E4}">
+                <adec:decorative xmlns:adec="http://schemas.microsoft.com/office/drawing/2017/decorative" val="1"/>
+              </a:ext>
+            </a:extLst>
+          </p:cNvPr>
+          <p:cNvSpPr>
+            <a:spLocks noGrp="1" noRot="1" noChangeAspect="1" noMove="1" noResize="1" noEditPoints="1" noAdjustHandles="1" noChangeArrowheads="1" noChangeShapeType="1" noTextEdit="1"/>
+          </p:cNvSpPr>
+          <p:nvPr>
+            <p:extLst>
+              <p:ext uri="{386F3935-93C4-4BCD-93E2-E3B085C9AB24}">
+                <p16:designElem xmlns:p16="http://schemas.microsoft.com/office/powerpoint/2015/main" val="1"/>
+              </p:ext>
+            </p:extLst>
+          </p:nvPr>
+        </p:nvSpPr>
+        <p:spPr>
+          <a:xfrm>
+            <a:off x="517869" y="508090"/>
+            <a:ext cx="11153214" cy="149279"/>
+          </a:xfrm>
+          <a:custGeom>
+            <a:avLst/>
+            <a:gdLst>
+              <a:gd name="connsiteX0" fmla="*/ 0 w 8085002"/>
+              <a:gd name="connsiteY0" fmla="*/ 0 h 149279"/>
+              <a:gd name="connsiteX1" fmla="*/ 8085002 w 8085002"/>
+              <a:gd name="connsiteY1" fmla="*/ 0 h 149279"/>
+              <a:gd name="connsiteX2" fmla="*/ 8085002 w 8085002"/>
+              <a:gd name="connsiteY2" fmla="*/ 149279 h 149279"/>
+              <a:gd name="connsiteX3" fmla="*/ 0 w 8085002"/>
+              <a:gd name="connsiteY3" fmla="*/ 149279 h 149279"/>
+            </a:gdLst>
+            <a:ahLst/>
+            <a:cxnLst>
+              <a:cxn ang="0">
+                <a:pos x="connsiteX0" y="connsiteY0"/>
+              </a:cxn>
+              <a:cxn ang="0">
+                <a:pos x="connsiteX1" y="connsiteY1"/>
+              </a:cxn>
+              <a:cxn ang="0">
+                <a:pos x="connsiteX2" y="connsiteY2"/>
+              </a:cxn>
+              <a:cxn ang="0">
+                <a:pos x="connsiteX3" y="connsiteY3"/>
+              </a:cxn>
+            </a:cxnLst>
+            <a:rect l="l" t="t" r="r" b="b"/>
+            <a:pathLst>
+              <a:path w="8085002" h="149279">
+                <a:moveTo>
+                  <a:pt x="0" y="0"/>
+                </a:moveTo>
+                <a:lnTo>
+                  <a:pt x="8085002" y="0"/>
+                </a:lnTo>
+                <a:lnTo>
+                  <a:pt x="8085002" y="149279"/>
+                </a:lnTo>
+                <a:lnTo>
+                  <a:pt x="0" y="149279"/>
+                </a:lnTo>
+                <a:close/>
+              </a:path>
+            </a:pathLst>
+          </a:custGeom>
+          <a:solidFill>
+            <a:schemeClr val="tx1"/>
+          </a:solidFill>
+          <a:ln>
+            <a:noFill/>
+          </a:ln>
+        </p:spPr>
+        <p:style>
+          <a:lnRef idx="2">
+            <a:schemeClr val="accent1">
+              <a:shade val="50000"/>
+            </a:schemeClr>
+          </a:lnRef>
+          <a:fillRef idx="1">
+            <a:schemeClr val="accent1"/>
+          </a:fillRef>
+          <a:effectRef idx="0">
+            <a:schemeClr val="accent1"/>
+          </a:effectRef>
+          <a:fontRef idx="minor">
+            <a:schemeClr val="lt1"/>
+          </a:fontRef>
+        </p:style>
+        <p:txBody>
+          <a:bodyPr wrap="square" rtlCol="0" anchor="ctr">
+            <a:noAutofit/>
+          </a:bodyPr>
+          <a:lstStyle/>
+          <a:p>
+            <a:pPr algn="ctr"/>
+            <a:endParaRPr lang="en-US"/>
+          </a:p>
+        </p:txBody>
+      </p:sp>
+      <p:sp>
+        <p:nvSpPr>
+          <p:cNvPr id="12" name="Freeform: Shape 11">
+            <a:extLst>
+              <a:ext uri="{FF2B5EF4-FFF2-40B4-BE49-F238E27FC236}">
+                <a16:creationId xmlns:a16="http://schemas.microsoft.com/office/drawing/2014/main" id="{EA67E988-5919-57BB-C7DE-D3EAD38A3045}"/>
+              </a:ext>
+              <a:ext uri="{C183D7F6-B498-43B3-948B-1728B52AA6E4}">
+                <adec:decorative xmlns:adec="http://schemas.microsoft.com/office/drawing/2017/decorative" val="1"/>
+              </a:ext>
+            </a:extLst>
+          </p:cNvPr>
+          <p:cNvSpPr>
+            <a:spLocks noGrp="1" noRot="1" noChangeAspect="1" noMove="1" noResize="1" noEditPoints="1" noAdjustHandles="1" noChangeArrowheads="1" noChangeShapeType="1" noTextEdit="1"/>
+          </p:cNvSpPr>
+          <p:nvPr>
+            <p:extLst>
+              <p:ext uri="{386F3935-93C4-4BCD-93E2-E3B085C9AB24}">
+                <p16:designElem xmlns:p16="http://schemas.microsoft.com/office/powerpoint/2015/main" val="1"/>
+              </p:ext>
+            </p:extLst>
+          </p:nvPr>
+        </p:nvSpPr>
+        <p:spPr>
+          <a:xfrm>
+            <a:off x="517870" y="6209925"/>
+            <a:ext cx="11155680" cy="45719"/>
+          </a:xfrm>
+          <a:custGeom>
+            <a:avLst/>
+            <a:gdLst/>
+            <a:ahLst/>
+            <a:cxnLst/>
+            <a:rect l="l" t="t" r="r" b="b"/>
+            <a:pathLst>
+              <a:path w="8715708" h="45719">
+                <a:moveTo>
+                  <a:pt x="0" y="0"/>
+                </a:moveTo>
+                <a:lnTo>
+                  <a:pt x="3694525" y="0"/>
+                </a:lnTo>
+                <a:lnTo>
+                  <a:pt x="5021183" y="0"/>
+                </a:lnTo>
+                <a:lnTo>
+                  <a:pt x="8715708" y="0"/>
+                </a:lnTo>
+                <a:lnTo>
+                  <a:pt x="8715708" y="45719"/>
+                </a:lnTo>
+                <a:lnTo>
+                  <a:pt x="5021183" y="45719"/>
+                </a:lnTo>
+                <a:lnTo>
+                  <a:pt x="3694525" y="45719"/>
+                </a:lnTo>
+                <a:lnTo>
+                  <a:pt x="0" y="45719"/>
+                </a:lnTo>
+                <a:close/>
+              </a:path>
+            </a:pathLst>
+          </a:custGeom>
+          <a:solidFill>
+            <a:schemeClr val="tx1"/>
+          </a:solidFill>
+          <a:ln>
+            <a:noFill/>
+          </a:ln>
+        </p:spPr>
+        <p:style>
+          <a:lnRef idx="2">
+            <a:schemeClr val="accent1">
+              <a:shade val="50000"/>
+            </a:schemeClr>
+          </a:lnRef>
+          <a:fillRef idx="1">
+            <a:schemeClr val="accent1"/>
+          </a:fillRef>
+          <a:effectRef idx="0">
+            <a:schemeClr val="accent1"/>
+          </a:effectRef>
+          <a:fontRef idx="minor">
+            <a:schemeClr val="lt1"/>
+          </a:fontRef>
+        </p:style>
+        <p:txBody>
+          <a:bodyPr wrap="square" rtlCol="0" anchor="ctr">
+            <a:noAutofit/>
+          </a:bodyPr>
+          <a:lstStyle/>
+          <a:p>
+            <a:pPr algn="ctr"/>
+            <a:endParaRPr lang="en-US"/>
+          </a:p>
+        </p:txBody>
+      </p:sp>
+      <p:sp>
+        <p:nvSpPr>
+          <p:cNvPr id="14" name="Rectangle 13">
+            <a:extLst>
+              <a:ext uri="{FF2B5EF4-FFF2-40B4-BE49-F238E27FC236}">
+                <a16:creationId xmlns:a16="http://schemas.microsoft.com/office/drawing/2014/main" id="{5820888B-4EA5-E0E8-6D52-7733E1E77451}"/>
+              </a:ext>
+              <a:ext uri="{C183D7F6-B498-43B3-948B-1728B52AA6E4}">
+                <adec:decorative xmlns:adec="http://schemas.microsoft.com/office/drawing/2017/decorative" val="1"/>
+              </a:ext>
+            </a:extLst>
+          </p:cNvPr>
+          <p:cNvSpPr>
+            <a:spLocks noGrp="1" noRot="1" noChangeAspect="1" noMove="1" noResize="1" noEditPoints="1" noAdjustHandles="1" noChangeArrowheads="1" noChangeShapeType="1" noTextEdit="1"/>
+          </p:cNvSpPr>
+          <p:nvPr>
+            <p:extLst>
+              <p:ext uri="{386F3935-93C4-4BCD-93E2-E3B085C9AB24}">
+                <p16:designElem xmlns:p16="http://schemas.microsoft.com/office/powerpoint/2015/main" val="1"/>
+              </p:ext>
+            </p:extLst>
+          </p:nvPr>
+        </p:nvSpPr>
+        <p:spPr>
+          <a:xfrm>
+            <a:off x="0" y="0"/>
+            <a:ext cx="12192000" cy="6858000"/>
+          </a:xfrm>
+          <a:prstGeom prst="rect">
+            <a:avLst/>
+          </a:prstGeom>
+          <a:solidFill>
+            <a:srgbClr val="FFFFFF"/>
+          </a:solidFill>
+          <a:ln w="12700" cap="flat" cmpd="sng" algn="ctr">
+            <a:noFill/>
+            <a:prstDash val="solid"/>
+            <a:miter lim="800000"/>
+          </a:ln>
+          <a:effectLst/>
+          <a:extLst>
+            <a:ext uri="{91240B29-F687-4F45-9708-019B960494DF}">
+              <a14:hiddenLine xmlns:a14="http://schemas.microsoft.com/office/drawing/2010/main" w="12700" cap="flat" cmpd="sng" algn="ctr">
+                <a:solidFill>
+                  <a:schemeClr val="accent1">
+                    <a:shade val="15000"/>
+                  </a:schemeClr>
+                </a:solidFill>
+                <a:prstDash val="solid"/>
+                <a:miter lim="800000"/>
+              </a14:hiddenLine>
+            </a:ext>
+          </a:extLst>
+        </p:spPr>
+        <p:style>
+          <a:lnRef idx="2">
+            <a:schemeClr val="accent1">
+              <a:shade val="15000"/>
+            </a:schemeClr>
+          </a:lnRef>
+          <a:fillRef idx="1">
+            <a:schemeClr val="accent1"/>
+          </a:fillRef>
+          <a:effectRef idx="0">
+            <a:schemeClr val="accent1"/>
+          </a:effectRef>
+          <a:fontRef idx="minor">
+            <a:schemeClr val="lt1"/>
+          </a:fontRef>
+        </p:style>
+        <p:txBody>
+          <a:bodyPr rtlCol="0" anchor="ctr"/>
+          <a:lstStyle/>
+          <a:p>
+            <a:pPr algn="ctr"/>
+            <a:endParaRPr lang="en-US"/>
+          </a:p>
+        </p:txBody>
+      </p:sp>
+      <p:sp>
+        <p:nvSpPr>
+          <p:cNvPr id="2" name="Título 1">
+            <a:extLst>
+              <a:ext uri="{FF2B5EF4-FFF2-40B4-BE49-F238E27FC236}">
+                <a16:creationId xmlns:a16="http://schemas.microsoft.com/office/drawing/2014/main" id="{408BDC72-16CF-5964-BBB2-99E4F28A1D4A}"/>
+              </a:ext>
+            </a:extLst>
+          </p:cNvPr>
+          <p:cNvSpPr>
+            <a:spLocks noGrp="1"/>
+          </p:cNvSpPr>
+          <p:nvPr>
+            <p:ph type="title"/>
+          </p:nvPr>
+        </p:nvSpPr>
+        <p:spPr>
+          <a:xfrm>
+            <a:off x="521208" y="978408"/>
+            <a:ext cx="3397649" cy="3303764"/>
+          </a:xfrm>
+        </p:spPr>
+        <p:txBody>
+          <a:bodyPr vert="horz" lIns="91440" tIns="45720" rIns="91440" bIns="45720" rtlCol="0" anchor="t">
+            <a:normAutofit/>
+          </a:bodyPr>
+          <a:lstStyle/>
+          <a:p>
+            <a:r>
+              <a:rPr lang="en-US"/>
+              <a:t>4. Criptografía asimétrica</a:t>
+            </a:r>
+          </a:p>
+        </p:txBody>
+      </p:sp>
+      <p:sp>
+        <p:nvSpPr>
+          <p:cNvPr id="16" name="Freeform: Shape 15">
+            <a:extLst>
+              <a:ext uri="{FF2B5EF4-FFF2-40B4-BE49-F238E27FC236}">
+                <a16:creationId xmlns:a16="http://schemas.microsoft.com/office/drawing/2014/main" id="{06B5A8BF-0680-F9A7-27B1-3971EC934783}"/>
+              </a:ext>
+              <a:ext uri="{C183D7F6-B498-43B3-948B-1728B52AA6E4}">
+                <adec:decorative xmlns:adec="http://schemas.microsoft.com/office/drawing/2017/decorative" val="1"/>
+              </a:ext>
+            </a:extLst>
+          </p:cNvPr>
+          <p:cNvSpPr>
+            <a:spLocks noGrp="1" noRot="1" noChangeAspect="1" noMove="1" noResize="1" noEditPoints="1" noAdjustHandles="1" noChangeArrowheads="1" noChangeShapeType="1" noTextEdit="1"/>
+          </p:cNvSpPr>
+          <p:nvPr>
+            <p:extLst>
+              <p:ext uri="{386F3935-93C4-4BCD-93E2-E3B085C9AB24}">
+                <p16:designElem xmlns:p16="http://schemas.microsoft.com/office/powerpoint/2015/main" val="1"/>
+              </p:ext>
+            </p:extLst>
+          </p:nvPr>
+        </p:nvSpPr>
+        <p:spPr>
+          <a:xfrm>
+            <a:off x="517869" y="508090"/>
+            <a:ext cx="11153214" cy="149279"/>
+          </a:xfrm>
+          <a:custGeom>
+            <a:avLst/>
+            <a:gdLst>
+              <a:gd name="connsiteX0" fmla="*/ 0 w 8085002"/>
+              <a:gd name="connsiteY0" fmla="*/ 0 h 149279"/>
+              <a:gd name="connsiteX1" fmla="*/ 8085002 w 8085002"/>
+              <a:gd name="connsiteY1" fmla="*/ 0 h 149279"/>
+              <a:gd name="connsiteX2" fmla="*/ 8085002 w 8085002"/>
+              <a:gd name="connsiteY2" fmla="*/ 149279 h 149279"/>
+              <a:gd name="connsiteX3" fmla="*/ 0 w 8085002"/>
+              <a:gd name="connsiteY3" fmla="*/ 149279 h 149279"/>
+            </a:gdLst>
+            <a:ahLst/>
+            <a:cxnLst>
+              <a:cxn ang="0">
+                <a:pos x="connsiteX0" y="connsiteY0"/>
+              </a:cxn>
+              <a:cxn ang="0">
+                <a:pos x="connsiteX1" y="connsiteY1"/>
+              </a:cxn>
+              <a:cxn ang="0">
+                <a:pos x="connsiteX2" y="connsiteY2"/>
+              </a:cxn>
+              <a:cxn ang="0">
+                <a:pos x="connsiteX3" y="connsiteY3"/>
+              </a:cxn>
+            </a:cxnLst>
+            <a:rect l="l" t="t" r="r" b="b"/>
+            <a:pathLst>
+              <a:path w="8085002" h="149279">
+                <a:moveTo>
+                  <a:pt x="0" y="0"/>
+                </a:moveTo>
+                <a:lnTo>
+                  <a:pt x="8085002" y="0"/>
+                </a:lnTo>
+                <a:lnTo>
+                  <a:pt x="8085002" y="149279"/>
+                </a:lnTo>
+                <a:lnTo>
+                  <a:pt x="0" y="149279"/>
+                </a:lnTo>
+                <a:close/>
+              </a:path>
+            </a:pathLst>
+          </a:custGeom>
+          <a:solidFill>
+            <a:schemeClr val="tx1"/>
+          </a:solidFill>
+          <a:ln>
+            <a:noFill/>
+          </a:ln>
+        </p:spPr>
+        <p:style>
+          <a:lnRef idx="2">
+            <a:schemeClr val="accent1">
+              <a:shade val="50000"/>
+            </a:schemeClr>
+          </a:lnRef>
+          <a:fillRef idx="1">
+            <a:schemeClr val="accent1"/>
+          </a:fillRef>
+          <a:effectRef idx="0">
+            <a:schemeClr val="accent1"/>
+          </a:effectRef>
+          <a:fontRef idx="minor">
+            <a:schemeClr val="lt1"/>
+          </a:fontRef>
+        </p:style>
+        <p:txBody>
+          <a:bodyPr wrap="square" rtlCol="0" anchor="ctr">
+            <a:noAutofit/>
+          </a:bodyPr>
+          <a:lstStyle/>
+          <a:p>
+            <a:pPr algn="ctr"/>
+            <a:endParaRPr lang="en-US"/>
+          </a:p>
+        </p:txBody>
+      </p:sp>
+      <p:pic>
+        <p:nvPicPr>
+          <p:cNvPr id="5" name="Marcador de contenido 4" descr="Diagrama&#10;&#10;El contenido generado por IA puede ser incorrecto.">
+            <a:extLst>
+              <a:ext uri="{FF2B5EF4-FFF2-40B4-BE49-F238E27FC236}">
+                <a16:creationId xmlns:a16="http://schemas.microsoft.com/office/drawing/2014/main" id="{CF561025-F0FA-E4BE-6E2F-96A29B57B04C}"/>
+              </a:ext>
+            </a:extLst>
+          </p:cNvPr>
+          <p:cNvPicPr>
+            <a:picLocks noGrp="1" noChangeAspect="1"/>
+          </p:cNvPicPr>
+          <p:nvPr>
+            <p:ph idx="1"/>
+          </p:nvPr>
+        </p:nvPicPr>
+        <p:blipFill>
+          <a:blip r:embed="rId2">
+            <a:extLst>
+              <a:ext uri="{28A0092B-C50C-407E-A947-70E740481C1C}">
+                <a14:useLocalDpi xmlns:a14="http://schemas.microsoft.com/office/drawing/2010/main" val="0"/>
+              </a:ext>
+            </a:extLst>
+          </a:blip>
+          <a:stretch>
+            <a:fillRect/>
+          </a:stretch>
+        </p:blipFill>
+        <p:spPr>
+          <a:xfrm>
+            <a:off x="4119154" y="965741"/>
+            <a:ext cx="7551931" cy="4719956"/>
+          </a:xfrm>
+          <a:prstGeom prst="rect">
+            <a:avLst/>
+          </a:prstGeom>
+        </p:spPr>
+      </p:pic>
+    </p:spTree>
+    <p:extLst>
+      <p:ext uri="{BB962C8B-B14F-4D97-AF65-F5344CB8AC3E}">
+        <p14:creationId xmlns:p14="http://schemas.microsoft.com/office/powerpoint/2010/main" val="1096385977"/>
+      </p:ext>
+    </p:extLst>
+  </p:cSld>
+  <p:clrMapOvr>
+    <a:masterClrMapping/>
+  </p:clrMapOvr>
+</p:sld>
+</file>
+
 <file path=ppt/slides/slide2.xml><?xml version="1.0" encoding="utf-8"?>
 <p:sld xmlns:a="http://schemas.openxmlformats.org/drawingml/2006/main" xmlns:r="http://schemas.openxmlformats.org/officeDocument/2006/relationships" xmlns:p="http://schemas.openxmlformats.org/presentationml/2006/main">
   <p:cSld>
@@ -16195,6 +17233,469 @@
     <p:extLst>
       <p:ext uri="{BB962C8B-B14F-4D97-AF65-F5344CB8AC3E}">
         <p14:creationId xmlns:p14="http://schemas.microsoft.com/office/powerpoint/2010/main" val="1012258035"/>
+      </p:ext>
+    </p:extLst>
+  </p:cSld>
+  <p:clrMapOvr>
+    <a:masterClrMapping/>
+  </p:clrMapOvr>
+</p:sld>
+</file>
+
+<file path=ppt/slides/slide20.xml><?xml version="1.0" encoding="utf-8"?>
+<p:sld xmlns:a="http://schemas.openxmlformats.org/drawingml/2006/main" xmlns:r="http://schemas.openxmlformats.org/officeDocument/2006/relationships" xmlns:p="http://schemas.openxmlformats.org/presentationml/2006/main">
+  <p:cSld>
+    <p:spTree>
+      <p:nvGrpSpPr>
+        <p:cNvPr id="1" name=""/>
+        <p:cNvGrpSpPr/>
+        <p:nvPr/>
+      </p:nvGrpSpPr>
+      <p:grpSpPr>
+        <a:xfrm>
+          <a:off x="0" y="0"/>
+          <a:ext cx="0" cy="0"/>
+          <a:chOff x="0" y="0"/>
+          <a:chExt cx="0" cy="0"/>
+        </a:xfrm>
+      </p:grpSpPr>
+      <p:sp>
+        <p:nvSpPr>
+          <p:cNvPr id="2" name="Título 1">
+            <a:extLst>
+              <a:ext uri="{FF2B5EF4-FFF2-40B4-BE49-F238E27FC236}">
+                <a16:creationId xmlns:a16="http://schemas.microsoft.com/office/drawing/2014/main" id="{34916425-0CA4-FD8E-9CDC-87FF8D49B844}"/>
+              </a:ext>
+            </a:extLst>
+          </p:cNvPr>
+          <p:cNvSpPr>
+            <a:spLocks noGrp="1"/>
+          </p:cNvSpPr>
+          <p:nvPr>
+            <p:ph type="title"/>
+          </p:nvPr>
+        </p:nvSpPr>
+        <p:spPr/>
+        <p:txBody>
+          <a:bodyPr/>
+          <a:lstStyle/>
+          <a:p>
+            <a:r>
+              <a:rPr lang="es-ES" dirty="0"/>
+              <a:t>Conceptos clave</a:t>
+            </a:r>
+          </a:p>
+        </p:txBody>
+      </p:sp>
+      <p:sp>
+        <p:nvSpPr>
+          <p:cNvPr id="3" name="Marcador de contenido 2">
+            <a:extLst>
+              <a:ext uri="{FF2B5EF4-FFF2-40B4-BE49-F238E27FC236}">
+                <a16:creationId xmlns:a16="http://schemas.microsoft.com/office/drawing/2014/main" id="{1AEAAC0F-922E-FA03-5AC0-89151D2855CB}"/>
+              </a:ext>
+            </a:extLst>
+          </p:cNvPr>
+          <p:cNvSpPr>
+            <a:spLocks noGrp="1"/>
+          </p:cNvSpPr>
+          <p:nvPr>
+            <p:ph idx="1"/>
+          </p:nvPr>
+        </p:nvSpPr>
+        <p:spPr/>
+        <p:txBody>
+          <a:bodyPr/>
+          <a:lstStyle/>
+          <a:p>
+            <a:r>
+              <a:rPr lang="es-ES" dirty="0"/>
+              <a:t>Llave publica</a:t>
+            </a:r>
+          </a:p>
+          <a:p>
+            <a:r>
+              <a:rPr lang="es-ES" dirty="0"/>
+              <a:t>Llave privada</a:t>
+            </a:r>
+          </a:p>
+          <a:p>
+            <a:r>
+              <a:rPr lang="es-ES" dirty="0"/>
+              <a:t>Función de no retorno</a:t>
+            </a:r>
+          </a:p>
+        </p:txBody>
+      </p:sp>
+    </p:spTree>
+    <p:extLst>
+      <p:ext uri="{BB962C8B-B14F-4D97-AF65-F5344CB8AC3E}">
+        <p14:creationId xmlns:p14="http://schemas.microsoft.com/office/powerpoint/2010/main" val="480308092"/>
+      </p:ext>
+    </p:extLst>
+  </p:cSld>
+  <p:clrMapOvr>
+    <a:masterClrMapping/>
+  </p:clrMapOvr>
+</p:sld>
+</file>
+
+<file path=ppt/slides/slide21.xml><?xml version="1.0" encoding="utf-8"?>
+<p:sld xmlns:a="http://schemas.openxmlformats.org/drawingml/2006/main" xmlns:r="http://schemas.openxmlformats.org/officeDocument/2006/relationships" xmlns:p="http://schemas.openxmlformats.org/presentationml/2006/main">
+  <p:cSld>
+    <p:spTree>
+      <p:nvGrpSpPr>
+        <p:cNvPr id="1" name=""/>
+        <p:cNvGrpSpPr/>
+        <p:nvPr/>
+      </p:nvGrpSpPr>
+      <p:grpSpPr>
+        <a:xfrm>
+          <a:off x="0" y="0"/>
+          <a:ext cx="0" cy="0"/>
+          <a:chOff x="0" y="0"/>
+          <a:chExt cx="0" cy="0"/>
+        </a:xfrm>
+      </p:grpSpPr>
+      <p:sp>
+        <p:nvSpPr>
+          <p:cNvPr id="2" name="Título 1">
+            <a:extLst>
+              <a:ext uri="{FF2B5EF4-FFF2-40B4-BE49-F238E27FC236}">
+                <a16:creationId xmlns:a16="http://schemas.microsoft.com/office/drawing/2014/main" id="{3C818EA2-A9B8-6137-C8AD-0A9FAA5C3666}"/>
+              </a:ext>
+            </a:extLst>
+          </p:cNvPr>
+          <p:cNvSpPr>
+            <a:spLocks noGrp="1"/>
+          </p:cNvSpPr>
+          <p:nvPr>
+            <p:ph type="title"/>
+          </p:nvPr>
+        </p:nvSpPr>
+        <p:spPr/>
+        <p:txBody>
+          <a:bodyPr/>
+          <a:lstStyle/>
+          <a:p>
+            <a:r>
+              <a:rPr lang="es-ES" dirty="0"/>
+              <a:t>4.1 Criptografía hibrida</a:t>
+            </a:r>
+          </a:p>
+        </p:txBody>
+      </p:sp>
+      <p:sp>
+        <p:nvSpPr>
+          <p:cNvPr id="3" name="Marcador de contenido 2">
+            <a:extLst>
+              <a:ext uri="{FF2B5EF4-FFF2-40B4-BE49-F238E27FC236}">
+                <a16:creationId xmlns:a16="http://schemas.microsoft.com/office/drawing/2014/main" id="{DB70AA01-C20A-5260-48DE-382B6FB9A985}"/>
+              </a:ext>
+            </a:extLst>
+          </p:cNvPr>
+          <p:cNvSpPr>
+            <a:spLocks noGrp="1"/>
+          </p:cNvSpPr>
+          <p:nvPr>
+            <p:ph idx="1"/>
+          </p:nvPr>
+        </p:nvSpPr>
+        <p:spPr/>
+        <p:txBody>
+          <a:bodyPr/>
+          <a:lstStyle/>
+          <a:p>
+            <a:endParaRPr lang="es-ES"/>
+          </a:p>
+        </p:txBody>
+      </p:sp>
+    </p:spTree>
+    <p:extLst>
+      <p:ext uri="{BB962C8B-B14F-4D97-AF65-F5344CB8AC3E}">
+        <p14:creationId xmlns:p14="http://schemas.microsoft.com/office/powerpoint/2010/main" val="3297381322"/>
+      </p:ext>
+    </p:extLst>
+  </p:cSld>
+  <p:clrMapOvr>
+    <a:masterClrMapping/>
+  </p:clrMapOvr>
+</p:sld>
+</file>
+
+<file path=ppt/slides/slide22.xml><?xml version="1.0" encoding="utf-8"?>
+<p:sld xmlns:a="http://schemas.openxmlformats.org/drawingml/2006/main" xmlns:r="http://schemas.openxmlformats.org/officeDocument/2006/relationships" xmlns:p="http://schemas.openxmlformats.org/presentationml/2006/main">
+  <p:cSld>
+    <p:spTree>
+      <p:nvGrpSpPr>
+        <p:cNvPr id="1" name=""/>
+        <p:cNvGrpSpPr/>
+        <p:nvPr/>
+      </p:nvGrpSpPr>
+      <p:grpSpPr>
+        <a:xfrm>
+          <a:off x="0" y="0"/>
+          <a:ext cx="0" cy="0"/>
+          <a:chOff x="0" y="0"/>
+          <a:chExt cx="0" cy="0"/>
+        </a:xfrm>
+      </p:grpSpPr>
+      <p:sp>
+        <p:nvSpPr>
+          <p:cNvPr id="2" name="Título 1">
+            <a:extLst>
+              <a:ext uri="{FF2B5EF4-FFF2-40B4-BE49-F238E27FC236}">
+                <a16:creationId xmlns:a16="http://schemas.microsoft.com/office/drawing/2014/main" id="{6A7CE37F-D143-4557-1D40-019CAD4AC509}"/>
+              </a:ext>
+            </a:extLst>
+          </p:cNvPr>
+          <p:cNvSpPr>
+            <a:spLocks noGrp="1"/>
+          </p:cNvSpPr>
+          <p:nvPr>
+            <p:ph type="title"/>
+          </p:nvPr>
+        </p:nvSpPr>
+        <p:spPr/>
+        <p:txBody>
+          <a:bodyPr/>
+          <a:lstStyle/>
+          <a:p>
+            <a:r>
+              <a:rPr lang="es-ES"/>
+              <a:t>5. Funciones Hash</a:t>
+            </a:r>
+            <a:endParaRPr lang="es-ES" dirty="0"/>
+          </a:p>
+        </p:txBody>
+      </p:sp>
+      <p:pic>
+        <p:nvPicPr>
+          <p:cNvPr id="5" name="Marcador de contenido 4">
+            <a:extLst>
+              <a:ext uri="{FF2B5EF4-FFF2-40B4-BE49-F238E27FC236}">
+                <a16:creationId xmlns:a16="http://schemas.microsoft.com/office/drawing/2014/main" id="{BC5B614C-B32F-5167-B5A2-98CA79A5742E}"/>
+              </a:ext>
+            </a:extLst>
+          </p:cNvPr>
+          <p:cNvPicPr>
+            <a:picLocks noGrp="1" noChangeAspect="1"/>
+          </p:cNvPicPr>
+          <p:nvPr>
+            <p:ph idx="1"/>
+          </p:nvPr>
+        </p:nvPicPr>
+        <p:blipFill>
+          <a:blip r:embed="rId2">
+            <a:extLst>
+              <a:ext uri="{28A0092B-C50C-407E-A947-70E740481C1C}">
+                <a14:useLocalDpi xmlns:a14="http://schemas.microsoft.com/office/drawing/2010/main" val="0"/>
+              </a:ext>
+            </a:extLst>
+          </a:blip>
+          <a:stretch>
+            <a:fillRect/>
+          </a:stretch>
+        </p:blipFill>
+        <p:spPr>
+          <a:xfrm>
+            <a:off x="2100090" y="2578100"/>
+            <a:ext cx="7998169" cy="3767138"/>
+          </a:xfrm>
+        </p:spPr>
+      </p:pic>
+    </p:spTree>
+    <p:extLst>
+      <p:ext uri="{BB962C8B-B14F-4D97-AF65-F5344CB8AC3E}">
+        <p14:creationId xmlns:p14="http://schemas.microsoft.com/office/powerpoint/2010/main" val="2855155637"/>
+      </p:ext>
+    </p:extLst>
+  </p:cSld>
+  <p:clrMapOvr>
+    <a:masterClrMapping/>
+  </p:clrMapOvr>
+</p:sld>
+</file>
+
+<file path=ppt/slides/slide23.xml><?xml version="1.0" encoding="utf-8"?>
+<p:sld xmlns:a="http://schemas.openxmlformats.org/drawingml/2006/main" xmlns:r="http://schemas.openxmlformats.org/officeDocument/2006/relationships" xmlns:p="http://schemas.openxmlformats.org/presentationml/2006/main">
+  <p:cSld>
+    <p:spTree>
+      <p:nvGrpSpPr>
+        <p:cNvPr id="1" name=""/>
+        <p:cNvGrpSpPr/>
+        <p:nvPr/>
+      </p:nvGrpSpPr>
+      <p:grpSpPr>
+        <a:xfrm>
+          <a:off x="0" y="0"/>
+          <a:ext cx="0" cy="0"/>
+          <a:chOff x="0" y="0"/>
+          <a:chExt cx="0" cy="0"/>
+        </a:xfrm>
+      </p:grpSpPr>
+      <p:sp>
+        <p:nvSpPr>
+          <p:cNvPr id="2" name="Título 1">
+            <a:extLst>
+              <a:ext uri="{FF2B5EF4-FFF2-40B4-BE49-F238E27FC236}">
+                <a16:creationId xmlns:a16="http://schemas.microsoft.com/office/drawing/2014/main" id="{F3AE1AF7-49C7-F432-E1E4-7BA587AC4339}"/>
+              </a:ext>
+            </a:extLst>
+          </p:cNvPr>
+          <p:cNvSpPr>
+            <a:spLocks noGrp="1"/>
+          </p:cNvSpPr>
+          <p:nvPr>
+            <p:ph type="title"/>
+          </p:nvPr>
+        </p:nvSpPr>
+        <p:spPr/>
+        <p:txBody>
+          <a:bodyPr/>
+          <a:lstStyle/>
+          <a:p>
+            <a:r>
+              <a:rPr lang="es-ES" dirty="0"/>
+              <a:t>Conceptos clave</a:t>
+            </a:r>
+          </a:p>
+        </p:txBody>
+      </p:sp>
+      <p:sp>
+        <p:nvSpPr>
+          <p:cNvPr id="3" name="Marcador de contenido 2">
+            <a:extLst>
+              <a:ext uri="{FF2B5EF4-FFF2-40B4-BE49-F238E27FC236}">
+                <a16:creationId xmlns:a16="http://schemas.microsoft.com/office/drawing/2014/main" id="{E854A13A-6D50-FBB5-0B6D-E0A213B949A7}"/>
+              </a:ext>
+            </a:extLst>
+          </p:cNvPr>
+          <p:cNvSpPr>
+            <a:spLocks noGrp="1"/>
+          </p:cNvSpPr>
+          <p:nvPr>
+            <p:ph idx="1"/>
+          </p:nvPr>
+        </p:nvSpPr>
+        <p:spPr/>
+        <p:txBody>
+          <a:bodyPr/>
+          <a:lstStyle/>
+          <a:p>
+            <a:r>
+              <a:rPr lang="es-ES" dirty="0"/>
+              <a:t>Función hash no biyectiva (en la mayoría de las ocasiones)</a:t>
+            </a:r>
+          </a:p>
+          <a:p>
+            <a:endParaRPr lang="es-ES" dirty="0"/>
+          </a:p>
+        </p:txBody>
+      </p:sp>
+    </p:spTree>
+    <p:extLst>
+      <p:ext uri="{BB962C8B-B14F-4D97-AF65-F5344CB8AC3E}">
+        <p14:creationId xmlns:p14="http://schemas.microsoft.com/office/powerpoint/2010/main" val="3376416270"/>
+      </p:ext>
+    </p:extLst>
+  </p:cSld>
+  <p:clrMapOvr>
+    <a:masterClrMapping/>
+  </p:clrMapOvr>
+</p:sld>
+</file>
+
+<file path=ppt/slides/slide24.xml><?xml version="1.0" encoding="utf-8"?>
+<p:sld xmlns:a="http://schemas.openxmlformats.org/drawingml/2006/main" xmlns:r="http://schemas.openxmlformats.org/officeDocument/2006/relationships" xmlns:p="http://schemas.openxmlformats.org/presentationml/2006/main">
+  <p:cSld>
+    <p:spTree>
+      <p:nvGrpSpPr>
+        <p:cNvPr id="1" name=""/>
+        <p:cNvGrpSpPr/>
+        <p:nvPr/>
+      </p:nvGrpSpPr>
+      <p:grpSpPr>
+        <a:xfrm>
+          <a:off x="0" y="0"/>
+          <a:ext cx="0" cy="0"/>
+          <a:chOff x="0" y="0"/>
+          <a:chExt cx="0" cy="0"/>
+        </a:xfrm>
+      </p:grpSpPr>
+      <p:sp>
+        <p:nvSpPr>
+          <p:cNvPr id="2" name="Título 1">
+            <a:extLst>
+              <a:ext uri="{FF2B5EF4-FFF2-40B4-BE49-F238E27FC236}">
+                <a16:creationId xmlns:a16="http://schemas.microsoft.com/office/drawing/2014/main" id="{772F64A6-0F84-75CD-D234-6A309D9C46D8}"/>
+              </a:ext>
+            </a:extLst>
+          </p:cNvPr>
+          <p:cNvSpPr>
+            <a:spLocks noGrp="1"/>
+          </p:cNvSpPr>
+          <p:nvPr>
+            <p:ph type="title"/>
+          </p:nvPr>
+        </p:nvSpPr>
+        <p:spPr/>
+        <p:txBody>
+          <a:bodyPr/>
+          <a:lstStyle/>
+          <a:p>
+            <a:r>
+              <a:rPr lang="es-ES" dirty="0"/>
+              <a:t>Bibliografía</a:t>
+            </a:r>
+          </a:p>
+        </p:txBody>
+      </p:sp>
+      <p:sp>
+        <p:nvSpPr>
+          <p:cNvPr id="3" name="Marcador de contenido 2">
+            <a:extLst>
+              <a:ext uri="{FF2B5EF4-FFF2-40B4-BE49-F238E27FC236}">
+                <a16:creationId xmlns:a16="http://schemas.microsoft.com/office/drawing/2014/main" id="{787D0E37-8282-B03C-A434-746100E017BB}"/>
+              </a:ext>
+            </a:extLst>
+          </p:cNvPr>
+          <p:cNvSpPr>
+            <a:spLocks noGrp="1"/>
+          </p:cNvSpPr>
+          <p:nvPr>
+            <p:ph idx="1"/>
+          </p:nvPr>
+        </p:nvSpPr>
+        <p:spPr/>
+        <p:txBody>
+          <a:bodyPr/>
+          <a:lstStyle/>
+          <a:p>
+            <a:r>
+              <a:rPr lang="es-ES" dirty="0"/>
+              <a:t>Funciones hash: </a:t>
+            </a:r>
+            <a:r>
+              <a:rPr lang="es-ES" dirty="0">
+                <a:hlinkClick r:id="rId2"/>
+              </a:rPr>
+              <a:t>https://www.dongee.com/tutoriales/cuales-son-las-dos-funciones-de-hash-comunes/</a:t>
+            </a:r>
+            <a:r>
+              <a:rPr lang="es-ES" dirty="0"/>
+              <a:t> </a:t>
+            </a:r>
+          </a:p>
+          <a:p>
+            <a:endParaRPr lang="es-ES" dirty="0"/>
+          </a:p>
+        </p:txBody>
+      </p:sp>
+    </p:spTree>
+    <p:extLst>
+      <p:ext uri="{BB962C8B-B14F-4D97-AF65-F5344CB8AC3E}">
+        <p14:creationId xmlns:p14="http://schemas.microsoft.com/office/powerpoint/2010/main" val="3361505128"/>
       </p:ext>
     </p:extLst>
   </p:cSld>
@@ -16403,7 +17904,7 @@
             <p:ph idx="1"/>
             <p:extLst>
               <p:ext uri="{D42A27DB-BD31-4B8C-83A1-F6EECF244321}">
-                <p14:modId xmlns:p14="http://schemas.microsoft.com/office/powerpoint/2010/main" val="2533648708"/>
+                <p14:modId xmlns:p14="http://schemas.microsoft.com/office/powerpoint/2010/main" val="3773741086"/>
               </p:ext>
             </p:extLst>
           </p:nvPr>

</xml_diff>

<commit_message>
version para trabajar en clase
</commit_message>
<xml_diff>
--- a/criptografía teorica.pptx
+++ b/criptografía teorica.pptx
@@ -2,7 +2,7 @@
 <file path=ppt/presentation.xml><?xml version="1.0" encoding="utf-8"?>
 <p:presentation xmlns:a="http://schemas.openxmlformats.org/drawingml/2006/main" xmlns:r="http://schemas.openxmlformats.org/officeDocument/2006/relationships" xmlns:p="http://schemas.openxmlformats.org/presentationml/2006/main" saveSubsetFonts="1">
   <p:sldMasterIdLst>
-    <p:sldMasterId id="2147483686" r:id="rId1"/>
+    <p:sldMasterId id="2147483699" r:id="rId1"/>
   </p:sldMasterIdLst>
   <p:sldIdLst>
     <p:sldId id="256" r:id="rId2"/>
@@ -36,10 +36,11 @@
     <p:sldId id="284" r:id="rId30"/>
     <p:sldId id="279" r:id="rId31"/>
     <p:sldId id="273" r:id="rId32"/>
-    <p:sldId id="290" r:id="rId33"/>
-    <p:sldId id="291" r:id="rId34"/>
-    <p:sldId id="276" r:id="rId35"/>
-    <p:sldId id="274" r:id="rId36"/>
+    <p:sldId id="276" r:id="rId33"/>
+    <p:sldId id="290" r:id="rId34"/>
+    <p:sldId id="291" r:id="rId35"/>
+    <p:sldId id="293" r:id="rId36"/>
+    <p:sldId id="274" r:id="rId37"/>
   </p:sldIdLst>
   <p:sldSz cx="12192000" cy="6858000"/>
   <p:notesSz cx="6858000" cy="9144000"/>
@@ -3134,7 +3135,7 @@
             </a:lnSpc>
           </a:pPr>
           <a:r>
-            <a:rPr lang="es-ES" dirty="0"/>
+            <a:rPr lang="es-ES"/>
             <a:t>Criptografía: se encargada de diseñar métodos de proteger información.</a:t>
           </a:r>
           <a:endParaRPr lang="en-US" dirty="0"/>
@@ -3176,7 +3177,7 @@
             </a:lnSpc>
           </a:pPr>
           <a:r>
-            <a:rPr lang="es-ES" dirty="0"/>
+            <a:rPr lang="es-ES"/>
             <a:t>Criptoanálisis: se encarga de romper los métodos criptográficos.</a:t>
           </a:r>
           <a:endParaRPr lang="en-US" dirty="0"/>
@@ -3218,7 +3219,7 @@
             </a:lnSpc>
           </a:pPr>
           <a:r>
-            <a:rPr lang="es-ES" dirty="0"/>
+            <a:rPr lang="es-ES"/>
             <a:t>Criptología: Es la combinación de la criptografía y el criptoanálisis.</a:t>
           </a:r>
           <a:endParaRPr lang="en-US" dirty="0"/>
@@ -3400,30 +3401,30 @@
     </dgm:pt>
   </dgm:ptLst>
   <dgm:cxnLst>
-    <dgm:cxn modelId="{DD993B67-B540-48C9-AABE-846C21DDAC7C}" type="presOf" srcId="{B52B834A-C645-4CB4-ADEC-974753BAF28A}" destId="{A67F11BA-1796-4316-98C3-724AD5471026}" srcOrd="0" destOrd="0" presId="urn:microsoft.com/office/officeart/2018/2/layout/IconVerticalSolidList"/>
-    <dgm:cxn modelId="{4F1A0B57-405D-443D-A21D-A6D5572DFCEC}" type="presOf" srcId="{224F3E83-F8DE-430C-80E5-E7D5D8F28CE8}" destId="{545CC187-B9C9-4AE4-AE57-7E5B3F46457A}" srcOrd="0" destOrd="0" presId="urn:microsoft.com/office/officeart/2018/2/layout/IconVerticalSolidList"/>
+    <dgm:cxn modelId="{7DA56B47-EBB4-4AD9-9DF7-7CDDCEAAA44B}" type="presOf" srcId="{B52B834A-C645-4CB4-ADEC-974753BAF28A}" destId="{A67F11BA-1796-4316-98C3-724AD5471026}" srcOrd="0" destOrd="0" presId="urn:microsoft.com/office/officeart/2018/2/layout/IconVerticalSolidList"/>
+    <dgm:cxn modelId="{9120406C-1F63-48AD-BB9E-6EED5C703AE9}" type="presOf" srcId="{034D43D0-4238-426B-8E1A-6CB5933FB4E4}" destId="{3DA01918-BB0B-46A2-8119-8A98EE7CE572}" srcOrd="0" destOrd="0" presId="urn:microsoft.com/office/officeart/2018/2/layout/IconVerticalSolidList"/>
     <dgm:cxn modelId="{D01A9B77-E380-40E5-81B5-180415826003}" srcId="{224F3E83-F8DE-430C-80E5-E7D5D8F28CE8}" destId="{607301D3-A943-45B1-B135-A655F66DD96E}" srcOrd="1" destOrd="0" parTransId="{8F3E6F09-0F73-4829-B6AA-F2588C1D964D}" sibTransId="{0258BE01-6D64-4A75-A53D-04C3CCA7260E}"/>
-    <dgm:cxn modelId="{42B77798-586F-4A1B-A377-49FF591CFC9A}" type="presOf" srcId="{034D43D0-4238-426B-8E1A-6CB5933FB4E4}" destId="{3DA01918-BB0B-46A2-8119-8A98EE7CE572}" srcOrd="0" destOrd="0" presId="urn:microsoft.com/office/officeart/2018/2/layout/IconVerticalSolidList"/>
     <dgm:cxn modelId="{B4B30BA0-A99B-4407-95E8-2319801BBB22}" srcId="{224F3E83-F8DE-430C-80E5-E7D5D8F28CE8}" destId="{B52B834A-C645-4CB4-ADEC-974753BAF28A}" srcOrd="2" destOrd="0" parTransId="{C6D30C94-0F59-4BFD-BACB-C7267C4BD550}" sibTransId="{090191FA-B5DA-40B9-8EA6-354F6A083AE5}"/>
     <dgm:cxn modelId="{172790B9-AC5E-4B40-B6F0-2D20121B85D6}" srcId="{224F3E83-F8DE-430C-80E5-E7D5D8F28CE8}" destId="{034D43D0-4238-426B-8E1A-6CB5933FB4E4}" srcOrd="0" destOrd="0" parTransId="{573C4C09-95B4-4EAA-BF4F-E34F7CADC400}" sibTransId="{F8224D1E-6A85-4DFA-9989-8C6320828142}"/>
-    <dgm:cxn modelId="{2EFED5DC-B342-43CA-BA55-11678BF3250C}" type="presOf" srcId="{607301D3-A943-45B1-B135-A655F66DD96E}" destId="{DA0506CA-A687-40BD-B2C1-C7C957EDB38E}" srcOrd="0" destOrd="0" presId="urn:microsoft.com/office/officeart/2018/2/layout/IconVerticalSolidList"/>
-    <dgm:cxn modelId="{7511C23E-13A8-4110-9518-51CA2347D7BB}" type="presParOf" srcId="{545CC187-B9C9-4AE4-AE57-7E5B3F46457A}" destId="{1E06D0C2-9071-4EBD-9848-0F2668FDA991}" srcOrd="0" destOrd="0" presId="urn:microsoft.com/office/officeart/2018/2/layout/IconVerticalSolidList"/>
-    <dgm:cxn modelId="{CE8EA887-546A-4445-9831-6D9630AEFA11}" type="presParOf" srcId="{1E06D0C2-9071-4EBD-9848-0F2668FDA991}" destId="{C98B24A0-8585-4B6C-8CB4-DE6C09CB7557}" srcOrd="0" destOrd="0" presId="urn:microsoft.com/office/officeart/2018/2/layout/IconVerticalSolidList"/>
-    <dgm:cxn modelId="{74FA488A-6E1C-44CB-A505-9FB2EA874D80}" type="presParOf" srcId="{1E06D0C2-9071-4EBD-9848-0F2668FDA991}" destId="{F76BB03D-0314-4E66-8DFD-6175354527B3}" srcOrd="1" destOrd="0" presId="urn:microsoft.com/office/officeart/2018/2/layout/IconVerticalSolidList"/>
-    <dgm:cxn modelId="{A29CE7FD-F406-48DE-AB7D-BDF05A2A033E}" type="presParOf" srcId="{1E06D0C2-9071-4EBD-9848-0F2668FDA991}" destId="{AAA5EE3A-43D5-48D3-AFD1-7438C38DA3D7}" srcOrd="2" destOrd="0" presId="urn:microsoft.com/office/officeart/2018/2/layout/IconVerticalSolidList"/>
-    <dgm:cxn modelId="{29A18877-292B-407C-ABC8-485EF87473E3}" type="presParOf" srcId="{1E06D0C2-9071-4EBD-9848-0F2668FDA991}" destId="{3DA01918-BB0B-46A2-8119-8A98EE7CE572}" srcOrd="3" destOrd="0" presId="urn:microsoft.com/office/officeart/2018/2/layout/IconVerticalSolidList"/>
-    <dgm:cxn modelId="{E1D5E792-7A0B-483B-A206-314F76D26A25}" type="presParOf" srcId="{545CC187-B9C9-4AE4-AE57-7E5B3F46457A}" destId="{2E4DFBDB-F17A-44D8-BD72-15E1105BF85C}" srcOrd="1" destOrd="0" presId="urn:microsoft.com/office/officeart/2018/2/layout/IconVerticalSolidList"/>
-    <dgm:cxn modelId="{417D3FB2-2643-4FDA-9E5F-4FF72C86A28E}" type="presParOf" srcId="{545CC187-B9C9-4AE4-AE57-7E5B3F46457A}" destId="{6B8BD792-1A64-4A42-BC02-F1D28EEA1E90}" srcOrd="2" destOrd="0" presId="urn:microsoft.com/office/officeart/2018/2/layout/IconVerticalSolidList"/>
-    <dgm:cxn modelId="{0D891C03-E2B6-4C58-A1F3-EC80C71917C3}" type="presParOf" srcId="{6B8BD792-1A64-4A42-BC02-F1D28EEA1E90}" destId="{6A6CC891-D06F-4590-A4A6-99FEAA95F274}" srcOrd="0" destOrd="0" presId="urn:microsoft.com/office/officeart/2018/2/layout/IconVerticalSolidList"/>
-    <dgm:cxn modelId="{254422D8-4A56-420F-B552-8F6283596670}" type="presParOf" srcId="{6B8BD792-1A64-4A42-BC02-F1D28EEA1E90}" destId="{D0A11E2A-EA85-4EF4-B7A5-FF13665C72A1}" srcOrd="1" destOrd="0" presId="urn:microsoft.com/office/officeart/2018/2/layout/IconVerticalSolidList"/>
-    <dgm:cxn modelId="{74D96357-D9FE-4B20-A316-30185A23F7AF}" type="presParOf" srcId="{6B8BD792-1A64-4A42-BC02-F1D28EEA1E90}" destId="{3B3C17F8-8F98-4658-8982-CE8BFF8F1F17}" srcOrd="2" destOrd="0" presId="urn:microsoft.com/office/officeart/2018/2/layout/IconVerticalSolidList"/>
-    <dgm:cxn modelId="{CAE248BF-8099-4D02-93A4-DEBAFC002511}" type="presParOf" srcId="{6B8BD792-1A64-4A42-BC02-F1D28EEA1E90}" destId="{DA0506CA-A687-40BD-B2C1-C7C957EDB38E}" srcOrd="3" destOrd="0" presId="urn:microsoft.com/office/officeart/2018/2/layout/IconVerticalSolidList"/>
-    <dgm:cxn modelId="{606BBBBF-8D0E-4041-BE80-E45FC5843BD5}" type="presParOf" srcId="{545CC187-B9C9-4AE4-AE57-7E5B3F46457A}" destId="{69766A47-6702-4436-9AAD-5284ABF9C117}" srcOrd="3" destOrd="0" presId="urn:microsoft.com/office/officeart/2018/2/layout/IconVerticalSolidList"/>
-    <dgm:cxn modelId="{2EDFA435-4FA2-45FB-87F1-2B3FCE732A9D}" type="presParOf" srcId="{545CC187-B9C9-4AE4-AE57-7E5B3F46457A}" destId="{8C836CE9-B0E9-4C93-B51D-8E3473404483}" srcOrd="4" destOrd="0" presId="urn:microsoft.com/office/officeart/2018/2/layout/IconVerticalSolidList"/>
-    <dgm:cxn modelId="{81063168-2909-4A48-A25E-BE269CDC1930}" type="presParOf" srcId="{8C836CE9-B0E9-4C93-B51D-8E3473404483}" destId="{E4C30A4B-8722-4AAC-91B5-217193B4B05F}" srcOrd="0" destOrd="0" presId="urn:microsoft.com/office/officeart/2018/2/layout/IconVerticalSolidList"/>
-    <dgm:cxn modelId="{B2FB05C2-1AE3-4A9E-9A72-4694CD504430}" type="presParOf" srcId="{8C836CE9-B0E9-4C93-B51D-8E3473404483}" destId="{1522CA61-73E4-4050-9AAE-81C929CB1834}" srcOrd="1" destOrd="0" presId="urn:microsoft.com/office/officeart/2018/2/layout/IconVerticalSolidList"/>
-    <dgm:cxn modelId="{25054112-F786-493F-8E7F-3E17305DF539}" type="presParOf" srcId="{8C836CE9-B0E9-4C93-B51D-8E3473404483}" destId="{B1011C1F-B283-4DBE-B153-E9FCAEA803D8}" srcOrd="2" destOrd="0" presId="urn:microsoft.com/office/officeart/2018/2/layout/IconVerticalSolidList"/>
-    <dgm:cxn modelId="{9A3EF968-E103-442F-85F5-AA6F4502F7E2}" type="presParOf" srcId="{8C836CE9-B0E9-4C93-B51D-8E3473404483}" destId="{A67F11BA-1796-4316-98C3-724AD5471026}" srcOrd="3" destOrd="0" presId="urn:microsoft.com/office/officeart/2018/2/layout/IconVerticalSolidList"/>
+    <dgm:cxn modelId="{3F493CD4-463C-46D2-86BD-FFB06DB9CA78}" type="presOf" srcId="{607301D3-A943-45B1-B135-A655F66DD96E}" destId="{DA0506CA-A687-40BD-B2C1-C7C957EDB38E}" srcOrd="0" destOrd="0" presId="urn:microsoft.com/office/officeart/2018/2/layout/IconVerticalSolidList"/>
+    <dgm:cxn modelId="{137491EE-DA71-4821-87EC-642EA8204EDF}" type="presOf" srcId="{224F3E83-F8DE-430C-80E5-E7D5D8F28CE8}" destId="{545CC187-B9C9-4AE4-AE57-7E5B3F46457A}" srcOrd="0" destOrd="0" presId="urn:microsoft.com/office/officeart/2018/2/layout/IconVerticalSolidList"/>
+    <dgm:cxn modelId="{1B12F80C-26CB-4AAE-ADF8-037B23F91BF5}" type="presParOf" srcId="{545CC187-B9C9-4AE4-AE57-7E5B3F46457A}" destId="{1E06D0C2-9071-4EBD-9848-0F2668FDA991}" srcOrd="0" destOrd="0" presId="urn:microsoft.com/office/officeart/2018/2/layout/IconVerticalSolidList"/>
+    <dgm:cxn modelId="{3670E18A-EAC3-4C8B-9770-CD338E6DBA4D}" type="presParOf" srcId="{1E06D0C2-9071-4EBD-9848-0F2668FDA991}" destId="{C98B24A0-8585-4B6C-8CB4-DE6C09CB7557}" srcOrd="0" destOrd="0" presId="urn:microsoft.com/office/officeart/2018/2/layout/IconVerticalSolidList"/>
+    <dgm:cxn modelId="{C164122C-9CFE-4A63-826B-645CE0CFD590}" type="presParOf" srcId="{1E06D0C2-9071-4EBD-9848-0F2668FDA991}" destId="{F76BB03D-0314-4E66-8DFD-6175354527B3}" srcOrd="1" destOrd="0" presId="urn:microsoft.com/office/officeart/2018/2/layout/IconVerticalSolidList"/>
+    <dgm:cxn modelId="{E35996FD-CB19-4731-A8F6-5B61CF70DE95}" type="presParOf" srcId="{1E06D0C2-9071-4EBD-9848-0F2668FDA991}" destId="{AAA5EE3A-43D5-48D3-AFD1-7438C38DA3D7}" srcOrd="2" destOrd="0" presId="urn:microsoft.com/office/officeart/2018/2/layout/IconVerticalSolidList"/>
+    <dgm:cxn modelId="{E9147397-CE95-46C8-8AB6-3920064F3305}" type="presParOf" srcId="{1E06D0C2-9071-4EBD-9848-0F2668FDA991}" destId="{3DA01918-BB0B-46A2-8119-8A98EE7CE572}" srcOrd="3" destOrd="0" presId="urn:microsoft.com/office/officeart/2018/2/layout/IconVerticalSolidList"/>
+    <dgm:cxn modelId="{BF614804-1273-4036-B97C-11D777188B6C}" type="presParOf" srcId="{545CC187-B9C9-4AE4-AE57-7E5B3F46457A}" destId="{2E4DFBDB-F17A-44D8-BD72-15E1105BF85C}" srcOrd="1" destOrd="0" presId="urn:microsoft.com/office/officeart/2018/2/layout/IconVerticalSolidList"/>
+    <dgm:cxn modelId="{1EB9916B-E745-4AFA-9E35-178961BB620A}" type="presParOf" srcId="{545CC187-B9C9-4AE4-AE57-7E5B3F46457A}" destId="{6B8BD792-1A64-4A42-BC02-F1D28EEA1E90}" srcOrd="2" destOrd="0" presId="urn:microsoft.com/office/officeart/2018/2/layout/IconVerticalSolidList"/>
+    <dgm:cxn modelId="{DB3B7A21-75B4-40D2-9F5F-D539043BDAC6}" type="presParOf" srcId="{6B8BD792-1A64-4A42-BC02-F1D28EEA1E90}" destId="{6A6CC891-D06F-4590-A4A6-99FEAA95F274}" srcOrd="0" destOrd="0" presId="urn:microsoft.com/office/officeart/2018/2/layout/IconVerticalSolidList"/>
+    <dgm:cxn modelId="{02322F0C-AE84-43F6-89D2-268078D158B0}" type="presParOf" srcId="{6B8BD792-1A64-4A42-BC02-F1D28EEA1E90}" destId="{D0A11E2A-EA85-4EF4-B7A5-FF13665C72A1}" srcOrd="1" destOrd="0" presId="urn:microsoft.com/office/officeart/2018/2/layout/IconVerticalSolidList"/>
+    <dgm:cxn modelId="{D88A83EE-C7D3-4BF6-8539-34270B9955F0}" type="presParOf" srcId="{6B8BD792-1A64-4A42-BC02-F1D28EEA1E90}" destId="{3B3C17F8-8F98-4658-8982-CE8BFF8F1F17}" srcOrd="2" destOrd="0" presId="urn:microsoft.com/office/officeart/2018/2/layout/IconVerticalSolidList"/>
+    <dgm:cxn modelId="{9ADA1945-BF83-459C-9B90-D2452995A7AD}" type="presParOf" srcId="{6B8BD792-1A64-4A42-BC02-F1D28EEA1E90}" destId="{DA0506CA-A687-40BD-B2C1-C7C957EDB38E}" srcOrd="3" destOrd="0" presId="urn:microsoft.com/office/officeart/2018/2/layout/IconVerticalSolidList"/>
+    <dgm:cxn modelId="{9BED8DF2-A3B7-4F3B-810C-B417CE14C26D}" type="presParOf" srcId="{545CC187-B9C9-4AE4-AE57-7E5B3F46457A}" destId="{69766A47-6702-4436-9AAD-5284ABF9C117}" srcOrd="3" destOrd="0" presId="urn:microsoft.com/office/officeart/2018/2/layout/IconVerticalSolidList"/>
+    <dgm:cxn modelId="{9A2CE6D4-2F96-4DED-89AF-414B3902B2CE}" type="presParOf" srcId="{545CC187-B9C9-4AE4-AE57-7E5B3F46457A}" destId="{8C836CE9-B0E9-4C93-B51D-8E3473404483}" srcOrd="4" destOrd="0" presId="urn:microsoft.com/office/officeart/2018/2/layout/IconVerticalSolidList"/>
+    <dgm:cxn modelId="{F2A8BB36-CB13-460F-AE6F-EEB4263D67BA}" type="presParOf" srcId="{8C836CE9-B0E9-4C93-B51D-8E3473404483}" destId="{E4C30A4B-8722-4AAC-91B5-217193B4B05F}" srcOrd="0" destOrd="0" presId="urn:microsoft.com/office/officeart/2018/2/layout/IconVerticalSolidList"/>
+    <dgm:cxn modelId="{143719AE-7219-46BE-A90B-F5DC4BABC966}" type="presParOf" srcId="{8C836CE9-B0E9-4C93-B51D-8E3473404483}" destId="{1522CA61-73E4-4050-9AAE-81C929CB1834}" srcOrd="1" destOrd="0" presId="urn:microsoft.com/office/officeart/2018/2/layout/IconVerticalSolidList"/>
+    <dgm:cxn modelId="{F44FE26D-1F33-4702-88D6-0F8A6BE7401E}" type="presParOf" srcId="{8C836CE9-B0E9-4C93-B51D-8E3473404483}" destId="{B1011C1F-B283-4DBE-B153-E9FCAEA803D8}" srcOrd="2" destOrd="0" presId="urn:microsoft.com/office/officeart/2018/2/layout/IconVerticalSolidList"/>
+    <dgm:cxn modelId="{80BDF5A3-6251-4777-932E-AA82D479239D}" type="presParOf" srcId="{8C836CE9-B0E9-4C93-B51D-8E3473404483}" destId="{A67F11BA-1796-4316-98C3-724AD5471026}" srcOrd="3" destOrd="0" presId="urn:microsoft.com/office/officeart/2018/2/layout/IconVerticalSolidList"/>
   </dgm:cxnLst>
   <dgm:bg/>
   <dgm:whole/>
@@ -4602,7 +4603,7 @@
             <a:buNone/>
           </a:pPr>
           <a:r>
-            <a:rPr lang="es-ES" sz="2500" kern="1200" dirty="0"/>
+            <a:rPr lang="es-ES" sz="2500" kern="1200"/>
             <a:t>Criptografía: se encargada de diseñar métodos de proteger información.</a:t>
           </a:r>
           <a:endParaRPr lang="en-US" sz="2500" kern="1200" dirty="0"/>
@@ -4762,7 +4763,7 @@
             <a:buNone/>
           </a:pPr>
           <a:r>
-            <a:rPr lang="es-ES" sz="2500" kern="1200" dirty="0"/>
+            <a:rPr lang="es-ES" sz="2500" kern="1200"/>
             <a:t>Criptoanálisis: se encarga de romper los métodos criptográficos.</a:t>
           </a:r>
           <a:endParaRPr lang="en-US" sz="2500" kern="1200" dirty="0"/>
@@ -4920,7 +4921,7 @@
             <a:buNone/>
           </a:pPr>
           <a:r>
-            <a:rPr lang="es-ES" sz="2500" kern="1200" dirty="0"/>
+            <a:rPr lang="es-ES" sz="2500" kern="1200"/>
             <a:t>Criptología: Es la combinación de la criptografía y el criptoanálisis.</a:t>
           </a:r>
           <a:endParaRPr lang="en-US" sz="2500" kern="1200" dirty="0"/>
@@ -9019,7 +9020,7 @@
 
 <file path=ppt/slideLayouts/slideLayout1.xml><?xml version="1.0" encoding="utf-8"?>
 <p:sldLayout xmlns:a="http://schemas.openxmlformats.org/drawingml/2006/main" xmlns:r="http://schemas.openxmlformats.org/officeDocument/2006/relationships" xmlns:p="http://schemas.openxmlformats.org/presentationml/2006/main" type="title" preserve="1">
-  <p:cSld name="Title Slide">
+  <p:cSld name="Diapositiva de título">
     <p:spTree>
       <p:nvGrpSpPr>
         <p:cNvPr id="1" name=""/>
@@ -9199,9 +9200,10 @@
           </a:lstStyle>
           <a:p>
             <a:r>
-              <a:rPr lang="en-US" dirty="0"/>
-              <a:t>Click to edit Master title style</a:t>
-            </a:r>
+              <a:rPr lang="es-ES"/>
+              <a:t>Haga clic para modificar el estilo de título del patrón</a:t>
+            </a:r>
+            <a:endParaRPr lang="en-US" dirty="0"/>
           </a:p>
         </p:txBody>
       </p:sp>
@@ -9271,9 +9273,10 @@
           </a:lstStyle>
           <a:p>
             <a:r>
-              <a:rPr lang="en-US"/>
-              <a:t>Click to edit Master subtitle style</a:t>
-            </a:r>
+              <a:rPr lang="es-ES"/>
+              <a:t>Haga clic para modificar el estilo de subtítulo del patrón</a:t>
+            </a:r>
+            <a:endParaRPr lang="en-US"/>
           </a:p>
         </p:txBody>
       </p:sp>
@@ -9300,6 +9303,7 @@
           <a:p>
             <a:fld id="{E80C50CD-E178-4744-9B35-B2F624D6C5E9}" type="datetimeFigureOut">
               <a:rPr lang="en-US" smtClean="0"/>
+              <a:pPr/>
               <a:t>10/19/2025</a:t>
             </a:fld>
             <a:endParaRPr lang="en-US"/>
@@ -9327,7 +9331,7 @@
           <a:bodyPr/>
           <a:lstStyle/>
           <a:p>
-            <a:endParaRPr lang="en-US"/>
+            <a:endParaRPr lang="en-US" dirty="0"/>
           </a:p>
         </p:txBody>
       </p:sp>
@@ -9354,6 +9358,7 @@
           <a:p>
             <a:fld id="{148CC95F-0247-41B6-91CF-DC97C76A7088}" type="slidenum">
               <a:rPr lang="en-US" smtClean="0"/>
+              <a:pPr/>
               <a:t>‹Nº›</a:t>
             </a:fld>
             <a:endParaRPr lang="en-US"/>
@@ -9363,7 +9368,7 @@
     </p:spTree>
     <p:extLst>
       <p:ext uri="{BB962C8B-B14F-4D97-AF65-F5344CB8AC3E}">
-        <p14:creationId xmlns:p14="http://schemas.microsoft.com/office/powerpoint/2010/main" val="2863922448"/>
+        <p14:creationId xmlns:p14="http://schemas.microsoft.com/office/powerpoint/2010/main" val="4173007915"/>
       </p:ext>
     </p:extLst>
   </p:cSld>
@@ -9375,7 +9380,7 @@
 
 <file path=ppt/slideLayouts/slideLayout10.xml><?xml version="1.0" encoding="utf-8"?>
 <p:sldLayout xmlns:a="http://schemas.openxmlformats.org/drawingml/2006/main" xmlns:r="http://schemas.openxmlformats.org/officeDocument/2006/relationships" xmlns:p="http://schemas.openxmlformats.org/presentationml/2006/main" type="vertTx" preserve="1">
-  <p:cSld name="Title and Vertical Text">
+  <p:cSld name="Título y texto vertical">
     <p:spTree>
       <p:nvGrpSpPr>
         <p:cNvPr id="1" name=""/>
@@ -9412,9 +9417,10 @@
           <a:lstStyle/>
           <a:p>
             <a:r>
-              <a:rPr lang="en-US"/>
-              <a:t>Click to edit Master title style</a:t>
-            </a:r>
+              <a:rPr lang="es-ES"/>
+              <a:t>Haga clic para modificar el estilo de título del patrón</a:t>
+            </a:r>
+            <a:endParaRPr lang="en-US"/>
           </a:p>
         </p:txBody>
       </p:sp>
@@ -9441,37 +9447,38 @@
           <a:p>
             <a:pPr lvl="0"/>
             <a:r>
-              <a:rPr lang="en-US"/>
-              <a:t>Click to edit Master text styles</a:t>
+              <a:rPr lang="es-ES"/>
+              <a:t>Haga clic para modificar los estilos de texto del patrón</a:t>
             </a:r>
           </a:p>
           <a:p>
             <a:pPr lvl="1"/>
             <a:r>
-              <a:rPr lang="en-US"/>
-              <a:t>Second level</a:t>
+              <a:rPr lang="es-ES"/>
+              <a:t>Segundo nivel</a:t>
             </a:r>
           </a:p>
           <a:p>
             <a:pPr lvl="2"/>
             <a:r>
-              <a:rPr lang="en-US"/>
-              <a:t>Third level</a:t>
+              <a:rPr lang="es-ES"/>
+              <a:t>Tercer nivel</a:t>
             </a:r>
           </a:p>
           <a:p>
             <a:pPr lvl="3"/>
             <a:r>
-              <a:rPr lang="en-US"/>
-              <a:t>Fourth level</a:t>
+              <a:rPr lang="es-ES"/>
+              <a:t>Cuarto nivel</a:t>
             </a:r>
           </a:p>
           <a:p>
             <a:pPr lvl="4"/>
             <a:r>
-              <a:rPr lang="en-US"/>
-              <a:t>Fifth level</a:t>
-            </a:r>
+              <a:rPr lang="es-ES"/>
+              <a:t>Quinto nivel</a:t>
+            </a:r>
+            <a:endParaRPr lang="en-US"/>
           </a:p>
         </p:txBody>
       </p:sp>
@@ -9498,6 +9505,7 @@
           <a:p>
             <a:fld id="{E80C50CD-E178-4744-9B35-B2F624D6C5E9}" type="datetimeFigureOut">
               <a:rPr lang="en-US" smtClean="0"/>
+              <a:pPr/>
               <a:t>10/19/2025</a:t>
             </a:fld>
             <a:endParaRPr lang="en-US"/>
@@ -9525,7 +9533,7 @@
           <a:bodyPr/>
           <a:lstStyle/>
           <a:p>
-            <a:endParaRPr lang="en-US"/>
+            <a:endParaRPr lang="en-US" dirty="0"/>
           </a:p>
         </p:txBody>
       </p:sp>
@@ -9552,6 +9560,7 @@
           <a:p>
             <a:fld id="{148CC95F-0247-41B6-91CF-DC97C76A7088}" type="slidenum">
               <a:rPr lang="en-US" smtClean="0"/>
+              <a:pPr/>
               <a:t>‹Nº›</a:t>
             </a:fld>
             <a:endParaRPr lang="en-US"/>
@@ -9561,7 +9570,7 @@
     </p:spTree>
     <p:extLst>
       <p:ext uri="{BB962C8B-B14F-4D97-AF65-F5344CB8AC3E}">
-        <p14:creationId xmlns:p14="http://schemas.microsoft.com/office/powerpoint/2010/main" val="2193259572"/>
+        <p14:creationId xmlns:p14="http://schemas.microsoft.com/office/powerpoint/2010/main" val="1817974443"/>
       </p:ext>
     </p:extLst>
   </p:cSld>
@@ -9573,7 +9582,7 @@
 
 <file path=ppt/slideLayouts/slideLayout11.xml><?xml version="1.0" encoding="utf-8"?>
 <p:sldLayout xmlns:a="http://schemas.openxmlformats.org/drawingml/2006/main" xmlns:r="http://schemas.openxmlformats.org/officeDocument/2006/relationships" xmlns:p="http://schemas.openxmlformats.org/presentationml/2006/main" showMasterSp="0" type="vertTitleAndTx" preserve="1">
-  <p:cSld name="Vertical Title and Text">
+  <p:cSld name="Título vertical y texto">
     <p:spTree>
       <p:nvGrpSpPr>
         <p:cNvPr id="1" name=""/>
@@ -9615,9 +9624,10 @@
           <a:lstStyle/>
           <a:p>
             <a:r>
-              <a:rPr lang="en-US" dirty="0"/>
-              <a:t>Click to edit Master title style</a:t>
-            </a:r>
+              <a:rPr lang="es-ES"/>
+              <a:t>Haga clic para modificar el estilo de título del patrón</a:t>
+            </a:r>
+            <a:endParaRPr lang="en-US" dirty="0"/>
           </a:p>
         </p:txBody>
       </p:sp>
@@ -9649,37 +9659,38 @@
           <a:p>
             <a:pPr lvl="0"/>
             <a:r>
-              <a:rPr lang="en-US" dirty="0"/>
-              <a:t>Click to edit Master text styles</a:t>
+              <a:rPr lang="es-ES"/>
+              <a:t>Haga clic para modificar los estilos de texto del patrón</a:t>
             </a:r>
           </a:p>
           <a:p>
             <a:pPr lvl="1"/>
             <a:r>
-              <a:rPr lang="en-US" dirty="0"/>
-              <a:t>Second level</a:t>
+              <a:rPr lang="es-ES"/>
+              <a:t>Segundo nivel</a:t>
             </a:r>
           </a:p>
           <a:p>
             <a:pPr lvl="2"/>
             <a:r>
-              <a:rPr lang="en-US" dirty="0"/>
-              <a:t>Third level</a:t>
+              <a:rPr lang="es-ES"/>
+              <a:t>Tercer nivel</a:t>
             </a:r>
           </a:p>
           <a:p>
             <a:pPr lvl="3"/>
             <a:r>
-              <a:rPr lang="en-US" dirty="0"/>
-              <a:t>Fourth level</a:t>
+              <a:rPr lang="es-ES"/>
+              <a:t>Cuarto nivel</a:t>
             </a:r>
           </a:p>
           <a:p>
             <a:pPr lvl="4"/>
             <a:r>
-              <a:rPr lang="en-US" dirty="0"/>
-              <a:t>Fifth level</a:t>
-            </a:r>
+              <a:rPr lang="es-ES"/>
+              <a:t>Quinto nivel</a:t>
+            </a:r>
+            <a:endParaRPr lang="en-US" dirty="0"/>
           </a:p>
         </p:txBody>
       </p:sp>
@@ -9706,6 +9717,7 @@
           <a:p>
             <a:fld id="{E80C50CD-E178-4744-9B35-B2F624D6C5E9}" type="datetimeFigureOut">
               <a:rPr lang="en-US" smtClean="0"/>
+              <a:pPr/>
               <a:t>10/19/2025</a:t>
             </a:fld>
             <a:endParaRPr lang="en-US"/>
@@ -9733,7 +9745,7 @@
           <a:bodyPr/>
           <a:lstStyle/>
           <a:p>
-            <a:endParaRPr lang="en-US"/>
+            <a:endParaRPr lang="en-US" dirty="0"/>
           </a:p>
         </p:txBody>
       </p:sp>
@@ -9760,6 +9772,7 @@
           <a:p>
             <a:fld id="{148CC95F-0247-41B6-91CF-DC97C76A7088}" type="slidenum">
               <a:rPr lang="en-US" smtClean="0"/>
+              <a:pPr/>
               <a:t>‹Nº›</a:t>
             </a:fld>
             <a:endParaRPr lang="en-US"/>
@@ -9821,7 +9834,7 @@
     </p:spTree>
     <p:extLst>
       <p:ext uri="{BB962C8B-B14F-4D97-AF65-F5344CB8AC3E}">
-        <p14:creationId xmlns:p14="http://schemas.microsoft.com/office/powerpoint/2010/main" val="3477237025"/>
+        <p14:creationId xmlns:p14="http://schemas.microsoft.com/office/powerpoint/2010/main" val="634612127"/>
       </p:ext>
     </p:extLst>
   </p:cSld>
@@ -9833,7 +9846,7 @@
 
 <file path=ppt/slideLayouts/slideLayout2.xml><?xml version="1.0" encoding="utf-8"?>
 <p:sldLayout xmlns:a="http://schemas.openxmlformats.org/drawingml/2006/main" xmlns:r="http://schemas.openxmlformats.org/officeDocument/2006/relationships" xmlns:p="http://schemas.openxmlformats.org/presentationml/2006/main" type="obj" preserve="1">
-  <p:cSld name="Title and Content">
+  <p:cSld name="Título y objetos">
     <p:spTree>
       <p:nvGrpSpPr>
         <p:cNvPr id="1" name=""/>
@@ -9870,9 +9883,10 @@
           <a:lstStyle/>
           <a:p>
             <a:r>
-              <a:rPr lang="en-US"/>
-              <a:t>Click to edit Master title style</a:t>
-            </a:r>
+              <a:rPr lang="es-ES"/>
+              <a:t>Haga clic para modificar el estilo de título del patrón</a:t>
+            </a:r>
+            <a:endParaRPr lang="en-US"/>
           </a:p>
         </p:txBody>
       </p:sp>
@@ -9899,37 +9913,38 @@
           <a:p>
             <a:pPr lvl="0"/>
             <a:r>
-              <a:rPr lang="en-US"/>
-              <a:t>Click to edit Master text styles</a:t>
+              <a:rPr lang="es-ES"/>
+              <a:t>Haga clic para modificar los estilos de texto del patrón</a:t>
             </a:r>
           </a:p>
           <a:p>
             <a:pPr lvl="1"/>
             <a:r>
-              <a:rPr lang="en-US"/>
-              <a:t>Second level</a:t>
+              <a:rPr lang="es-ES"/>
+              <a:t>Segundo nivel</a:t>
             </a:r>
           </a:p>
           <a:p>
             <a:pPr lvl="2"/>
             <a:r>
-              <a:rPr lang="en-US"/>
-              <a:t>Third level</a:t>
+              <a:rPr lang="es-ES"/>
+              <a:t>Tercer nivel</a:t>
             </a:r>
           </a:p>
           <a:p>
             <a:pPr lvl="3"/>
             <a:r>
-              <a:rPr lang="en-US"/>
-              <a:t>Fourth level</a:t>
+              <a:rPr lang="es-ES"/>
+              <a:t>Cuarto nivel</a:t>
             </a:r>
           </a:p>
           <a:p>
             <a:pPr lvl="4"/>
             <a:r>
-              <a:rPr lang="en-US"/>
-              <a:t>Fifth level</a:t>
-            </a:r>
+              <a:rPr lang="es-ES"/>
+              <a:t>Quinto nivel</a:t>
+            </a:r>
+            <a:endParaRPr lang="en-US"/>
           </a:p>
         </p:txBody>
       </p:sp>
@@ -9956,6 +9971,7 @@
           <a:p>
             <a:fld id="{E80C50CD-E178-4744-9B35-B2F624D6C5E9}" type="datetimeFigureOut">
               <a:rPr lang="en-US" smtClean="0"/>
+              <a:pPr/>
               <a:t>10/19/2025</a:t>
             </a:fld>
             <a:endParaRPr lang="en-US"/>
@@ -9983,7 +9999,7 @@
           <a:bodyPr/>
           <a:lstStyle/>
           <a:p>
-            <a:endParaRPr lang="en-US"/>
+            <a:endParaRPr lang="en-US" dirty="0"/>
           </a:p>
         </p:txBody>
       </p:sp>
@@ -10010,6 +10026,7 @@
           <a:p>
             <a:fld id="{148CC95F-0247-41B6-91CF-DC97C76A7088}" type="slidenum">
               <a:rPr lang="en-US" smtClean="0"/>
+              <a:pPr/>
               <a:t>‹Nº›</a:t>
             </a:fld>
             <a:endParaRPr lang="en-US"/>
@@ -10019,7 +10036,7 @@
     </p:spTree>
     <p:extLst>
       <p:ext uri="{BB962C8B-B14F-4D97-AF65-F5344CB8AC3E}">
-        <p14:creationId xmlns:p14="http://schemas.microsoft.com/office/powerpoint/2010/main" val="3195633357"/>
+        <p14:creationId xmlns:p14="http://schemas.microsoft.com/office/powerpoint/2010/main" val="449784713"/>
       </p:ext>
     </p:extLst>
   </p:cSld>
@@ -10031,7 +10048,7 @@
 
 <file path=ppt/slideLayouts/slideLayout3.xml><?xml version="1.0" encoding="utf-8"?>
 <p:sldLayout xmlns:a="http://schemas.openxmlformats.org/drawingml/2006/main" xmlns:r="http://schemas.openxmlformats.org/officeDocument/2006/relationships" xmlns:p="http://schemas.openxmlformats.org/presentationml/2006/main" showMasterSp="0" type="secHead" preserve="1">
-  <p:cSld name="Section Header">
+  <p:cSld name="Encabezado de sección">
     <p:spTree>
       <p:nvGrpSpPr>
         <p:cNvPr id="1" name=""/>
@@ -10079,9 +10096,10 @@
           </a:lstStyle>
           <a:p>
             <a:r>
-              <a:rPr lang="en-US" dirty="0"/>
-              <a:t>Click to edit Master title style</a:t>
-            </a:r>
+              <a:rPr lang="es-ES"/>
+              <a:t>Haga clic para modificar el estilo de título del patrón</a:t>
+            </a:r>
+            <a:endParaRPr lang="en-US" dirty="0"/>
           </a:p>
         </p:txBody>
       </p:sp>
@@ -10206,8 +10224,8 @@
           <a:p>
             <a:pPr lvl="0"/>
             <a:r>
-              <a:rPr lang="en-US" dirty="0"/>
-              <a:t>Click to edit Master text styles</a:t>
+              <a:rPr lang="es-ES"/>
+              <a:t>Haga clic para modificar los estilos de texto del patrón</a:t>
             </a:r>
           </a:p>
         </p:txBody>
@@ -10235,6 +10253,7 @@
           <a:p>
             <a:fld id="{E80C50CD-E178-4744-9B35-B2F624D6C5E9}" type="datetimeFigureOut">
               <a:rPr lang="en-US" smtClean="0"/>
+              <a:pPr/>
               <a:t>10/19/2025</a:t>
             </a:fld>
             <a:endParaRPr lang="en-US"/>
@@ -10262,7 +10281,7 @@
           <a:bodyPr/>
           <a:lstStyle/>
           <a:p>
-            <a:endParaRPr lang="en-US"/>
+            <a:endParaRPr lang="en-US" dirty="0"/>
           </a:p>
         </p:txBody>
       </p:sp>
@@ -10289,6 +10308,7 @@
           <a:p>
             <a:fld id="{148CC95F-0247-41B6-91CF-DC97C76A7088}" type="slidenum">
               <a:rPr lang="en-US" smtClean="0"/>
+              <a:pPr/>
               <a:t>‹Nº›</a:t>
             </a:fld>
             <a:endParaRPr lang="en-US"/>
@@ -10350,7 +10370,7 @@
     </p:spTree>
     <p:extLst>
       <p:ext uri="{BB962C8B-B14F-4D97-AF65-F5344CB8AC3E}">
-        <p14:creationId xmlns:p14="http://schemas.microsoft.com/office/powerpoint/2010/main" val="687142623"/>
+        <p14:creationId xmlns:p14="http://schemas.microsoft.com/office/powerpoint/2010/main" val="632904683"/>
       </p:ext>
     </p:extLst>
   </p:cSld>
@@ -10362,7 +10382,7 @@
 
 <file path=ppt/slideLayouts/slideLayout4.xml><?xml version="1.0" encoding="utf-8"?>
 <p:sldLayout xmlns:a="http://schemas.openxmlformats.org/drawingml/2006/main" xmlns:r="http://schemas.openxmlformats.org/officeDocument/2006/relationships" xmlns:p="http://schemas.openxmlformats.org/presentationml/2006/main" type="twoObj" preserve="1">
-  <p:cSld name="Two Content">
+  <p:cSld name="Dos objetos">
     <p:spTree>
       <p:nvGrpSpPr>
         <p:cNvPr id="1" name=""/>
@@ -10399,9 +10419,10 @@
           <a:lstStyle/>
           <a:p>
             <a:r>
-              <a:rPr lang="en-US" dirty="0"/>
-              <a:t>Click to edit Master title style</a:t>
-            </a:r>
+              <a:rPr lang="es-ES"/>
+              <a:t>Haga clic para modificar el estilo de título del patrón</a:t>
+            </a:r>
+            <a:endParaRPr lang="en-US" dirty="0"/>
           </a:p>
         </p:txBody>
       </p:sp>
@@ -10433,37 +10454,38 @@
           <a:p>
             <a:pPr lvl="0"/>
             <a:r>
-              <a:rPr lang="en-US"/>
-              <a:t>Click to edit Master text styles</a:t>
+              <a:rPr lang="es-ES"/>
+              <a:t>Haga clic para modificar los estilos de texto del patrón</a:t>
             </a:r>
           </a:p>
           <a:p>
             <a:pPr lvl="1"/>
             <a:r>
-              <a:rPr lang="en-US"/>
-              <a:t>Second level</a:t>
+              <a:rPr lang="es-ES"/>
+              <a:t>Segundo nivel</a:t>
             </a:r>
           </a:p>
           <a:p>
             <a:pPr lvl="2"/>
             <a:r>
-              <a:rPr lang="en-US"/>
-              <a:t>Third level</a:t>
+              <a:rPr lang="es-ES"/>
+              <a:t>Tercer nivel</a:t>
             </a:r>
           </a:p>
           <a:p>
             <a:pPr lvl="3"/>
             <a:r>
-              <a:rPr lang="en-US"/>
-              <a:t>Fourth level</a:t>
+              <a:rPr lang="es-ES"/>
+              <a:t>Cuarto nivel</a:t>
             </a:r>
           </a:p>
           <a:p>
             <a:pPr lvl="4"/>
             <a:r>
-              <a:rPr lang="en-US"/>
-              <a:t>Fifth level</a:t>
-            </a:r>
+              <a:rPr lang="es-ES"/>
+              <a:t>Quinto nivel</a:t>
+            </a:r>
+            <a:endParaRPr lang="en-US"/>
           </a:p>
         </p:txBody>
       </p:sp>
@@ -10495,37 +10517,38 @@
           <a:p>
             <a:pPr lvl="0"/>
             <a:r>
-              <a:rPr lang="en-US"/>
-              <a:t>Click to edit Master text styles</a:t>
+              <a:rPr lang="es-ES"/>
+              <a:t>Haga clic para modificar los estilos de texto del patrón</a:t>
             </a:r>
           </a:p>
           <a:p>
             <a:pPr lvl="1"/>
             <a:r>
-              <a:rPr lang="en-US"/>
-              <a:t>Second level</a:t>
+              <a:rPr lang="es-ES"/>
+              <a:t>Segundo nivel</a:t>
             </a:r>
           </a:p>
           <a:p>
             <a:pPr lvl="2"/>
             <a:r>
-              <a:rPr lang="en-US"/>
-              <a:t>Third level</a:t>
+              <a:rPr lang="es-ES"/>
+              <a:t>Tercer nivel</a:t>
             </a:r>
           </a:p>
           <a:p>
             <a:pPr lvl="3"/>
             <a:r>
-              <a:rPr lang="en-US"/>
-              <a:t>Fourth level</a:t>
+              <a:rPr lang="es-ES"/>
+              <a:t>Cuarto nivel</a:t>
             </a:r>
           </a:p>
           <a:p>
             <a:pPr lvl="4"/>
             <a:r>
-              <a:rPr lang="en-US"/>
-              <a:t>Fifth level</a:t>
-            </a:r>
+              <a:rPr lang="es-ES"/>
+              <a:t>Quinto nivel</a:t>
+            </a:r>
+            <a:endParaRPr lang="en-US"/>
           </a:p>
         </p:txBody>
       </p:sp>
@@ -10552,6 +10575,7 @@
           <a:p>
             <a:fld id="{E80C50CD-E178-4744-9B35-B2F624D6C5E9}" type="datetimeFigureOut">
               <a:rPr lang="en-US" smtClean="0"/>
+              <a:pPr/>
               <a:t>10/19/2025</a:t>
             </a:fld>
             <a:endParaRPr lang="en-US"/>
@@ -10579,7 +10603,7 @@
           <a:bodyPr/>
           <a:lstStyle/>
           <a:p>
-            <a:endParaRPr lang="en-US"/>
+            <a:endParaRPr lang="en-US" dirty="0"/>
           </a:p>
         </p:txBody>
       </p:sp>
@@ -10606,6 +10630,7 @@
           <a:p>
             <a:fld id="{148CC95F-0247-41B6-91CF-DC97C76A7088}" type="slidenum">
               <a:rPr lang="en-US" smtClean="0"/>
+              <a:pPr/>
               <a:t>‹Nº›</a:t>
             </a:fld>
             <a:endParaRPr lang="en-US"/>
@@ -10615,7 +10640,7 @@
     </p:spTree>
     <p:extLst>
       <p:ext uri="{BB962C8B-B14F-4D97-AF65-F5344CB8AC3E}">
-        <p14:creationId xmlns:p14="http://schemas.microsoft.com/office/powerpoint/2010/main" val="1853533644"/>
+        <p14:creationId xmlns:p14="http://schemas.microsoft.com/office/powerpoint/2010/main" val="1201580576"/>
       </p:ext>
     </p:extLst>
   </p:cSld>
@@ -10627,7 +10652,7 @@
 
 <file path=ppt/slideLayouts/slideLayout5.xml><?xml version="1.0" encoding="utf-8"?>
 <p:sldLayout xmlns:a="http://schemas.openxmlformats.org/drawingml/2006/main" xmlns:r="http://schemas.openxmlformats.org/officeDocument/2006/relationships" xmlns:p="http://schemas.openxmlformats.org/presentationml/2006/main" type="twoTxTwoObj" preserve="1">
-  <p:cSld name="Comparison">
+  <p:cSld name="Comparación">
     <p:spTree>
       <p:nvGrpSpPr>
         <p:cNvPr id="1" name=""/>
@@ -10669,9 +10694,10 @@
           <a:lstStyle/>
           <a:p>
             <a:r>
-              <a:rPr lang="en-US"/>
-              <a:t>Click to edit Master title style</a:t>
-            </a:r>
+              <a:rPr lang="es-ES"/>
+              <a:t>Haga clic para modificar el estilo de título del patrón</a:t>
+            </a:r>
+            <a:endParaRPr lang="en-US"/>
           </a:p>
         </p:txBody>
       </p:sp>
@@ -10742,8 +10768,8 @@
           <a:p>
             <a:pPr lvl="0"/>
             <a:r>
-              <a:rPr lang="en-US" dirty="0"/>
-              <a:t>Click to edit Master text styles</a:t>
+              <a:rPr lang="es-ES"/>
+              <a:t>Haga clic para modificar los estilos de texto del patrón</a:t>
             </a:r>
           </a:p>
         </p:txBody>
@@ -10776,37 +10802,38 @@
           <a:p>
             <a:pPr lvl="0"/>
             <a:r>
-              <a:rPr lang="en-US" dirty="0"/>
-              <a:t>Click to edit Master text styles</a:t>
+              <a:rPr lang="es-ES"/>
+              <a:t>Haga clic para modificar los estilos de texto del patrón</a:t>
             </a:r>
           </a:p>
           <a:p>
             <a:pPr lvl="1"/>
             <a:r>
-              <a:rPr lang="en-US" dirty="0"/>
-              <a:t>Second level</a:t>
+              <a:rPr lang="es-ES"/>
+              <a:t>Segundo nivel</a:t>
             </a:r>
           </a:p>
           <a:p>
             <a:pPr lvl="2"/>
             <a:r>
-              <a:rPr lang="en-US" dirty="0"/>
-              <a:t>Third level</a:t>
+              <a:rPr lang="es-ES"/>
+              <a:t>Tercer nivel</a:t>
             </a:r>
           </a:p>
           <a:p>
             <a:pPr lvl="3"/>
             <a:r>
-              <a:rPr lang="en-US" dirty="0"/>
-              <a:t>Fourth level</a:t>
+              <a:rPr lang="es-ES"/>
+              <a:t>Cuarto nivel</a:t>
             </a:r>
           </a:p>
           <a:p>
             <a:pPr lvl="4"/>
             <a:r>
-              <a:rPr lang="en-US" dirty="0"/>
-              <a:t>Fifth level</a:t>
-            </a:r>
+              <a:rPr lang="es-ES"/>
+              <a:t>Quinto nivel</a:t>
+            </a:r>
+            <a:endParaRPr lang="en-US" dirty="0"/>
           </a:p>
         </p:txBody>
       </p:sp>
@@ -10877,8 +10904,8 @@
           <a:p>
             <a:pPr lvl="0"/>
             <a:r>
-              <a:rPr lang="en-US" dirty="0"/>
-              <a:t>Click to edit Master text styles</a:t>
+              <a:rPr lang="es-ES"/>
+              <a:t>Haga clic para modificar los estilos de texto del patrón</a:t>
             </a:r>
           </a:p>
         </p:txBody>
@@ -10911,37 +10938,38 @@
           <a:p>
             <a:pPr lvl="0"/>
             <a:r>
-              <a:rPr lang="en-US" dirty="0"/>
-              <a:t>Click to edit Master text styles</a:t>
+              <a:rPr lang="es-ES"/>
+              <a:t>Haga clic para modificar los estilos de texto del patrón</a:t>
             </a:r>
           </a:p>
           <a:p>
             <a:pPr lvl="1"/>
             <a:r>
-              <a:rPr lang="en-US" dirty="0"/>
-              <a:t>Second level</a:t>
+              <a:rPr lang="es-ES"/>
+              <a:t>Segundo nivel</a:t>
             </a:r>
           </a:p>
           <a:p>
             <a:pPr lvl="2"/>
             <a:r>
-              <a:rPr lang="en-US" dirty="0"/>
-              <a:t>Third level</a:t>
+              <a:rPr lang="es-ES"/>
+              <a:t>Tercer nivel</a:t>
             </a:r>
           </a:p>
           <a:p>
             <a:pPr lvl="3"/>
             <a:r>
-              <a:rPr lang="en-US" dirty="0"/>
-              <a:t>Fourth level</a:t>
+              <a:rPr lang="es-ES"/>
+              <a:t>Cuarto nivel</a:t>
             </a:r>
           </a:p>
           <a:p>
             <a:pPr lvl="4"/>
             <a:r>
-              <a:rPr lang="en-US" dirty="0"/>
-              <a:t>Fifth level</a:t>
-            </a:r>
+              <a:rPr lang="es-ES"/>
+              <a:t>Quinto nivel</a:t>
+            </a:r>
+            <a:endParaRPr lang="en-US" dirty="0"/>
           </a:p>
         </p:txBody>
       </p:sp>
@@ -10968,6 +10996,7 @@
           <a:p>
             <a:fld id="{E80C50CD-E178-4744-9B35-B2F624D6C5E9}" type="datetimeFigureOut">
               <a:rPr lang="en-US" smtClean="0"/>
+              <a:pPr/>
               <a:t>10/19/2025</a:t>
             </a:fld>
             <a:endParaRPr lang="en-US"/>
@@ -10995,7 +11024,7 @@
           <a:bodyPr/>
           <a:lstStyle/>
           <a:p>
-            <a:endParaRPr lang="en-US"/>
+            <a:endParaRPr lang="en-US" dirty="0"/>
           </a:p>
         </p:txBody>
       </p:sp>
@@ -11022,6 +11051,7 @@
           <a:p>
             <a:fld id="{148CC95F-0247-41B6-91CF-DC97C76A7088}" type="slidenum">
               <a:rPr lang="en-US" smtClean="0"/>
+              <a:pPr/>
               <a:t>‹Nº›</a:t>
             </a:fld>
             <a:endParaRPr lang="en-US"/>
@@ -11031,7 +11061,7 @@
     </p:spTree>
     <p:extLst>
       <p:ext uri="{BB962C8B-B14F-4D97-AF65-F5344CB8AC3E}">
-        <p14:creationId xmlns:p14="http://schemas.microsoft.com/office/powerpoint/2010/main" val="613996277"/>
+        <p14:creationId xmlns:p14="http://schemas.microsoft.com/office/powerpoint/2010/main" val="1431307687"/>
       </p:ext>
     </p:extLst>
   </p:cSld>
@@ -11043,7 +11073,7 @@
 
 <file path=ppt/slideLayouts/slideLayout6.xml><?xml version="1.0" encoding="utf-8"?>
 <p:sldLayout xmlns:a="http://schemas.openxmlformats.org/drawingml/2006/main" xmlns:r="http://schemas.openxmlformats.org/officeDocument/2006/relationships" xmlns:p="http://schemas.openxmlformats.org/presentationml/2006/main" type="titleOnly" preserve="1">
-  <p:cSld name="Title Only">
+  <p:cSld name="Solo el título">
     <p:spTree>
       <p:nvGrpSpPr>
         <p:cNvPr id="1" name=""/>
@@ -11080,9 +11110,10 @@
           <a:lstStyle/>
           <a:p>
             <a:r>
-              <a:rPr lang="en-US" dirty="0"/>
-              <a:t>Click to edit Master title style</a:t>
-            </a:r>
+              <a:rPr lang="es-ES"/>
+              <a:t>Haga clic para modificar el estilo de título del patrón</a:t>
+            </a:r>
+            <a:endParaRPr lang="en-US" dirty="0"/>
           </a:p>
         </p:txBody>
       </p:sp>
@@ -11109,6 +11140,7 @@
           <a:p>
             <a:fld id="{E80C50CD-E178-4744-9B35-B2F624D6C5E9}" type="datetimeFigureOut">
               <a:rPr lang="en-US" smtClean="0"/>
+              <a:pPr/>
               <a:t>10/19/2025</a:t>
             </a:fld>
             <a:endParaRPr lang="en-US"/>
@@ -11136,7 +11168,7 @@
           <a:bodyPr/>
           <a:lstStyle/>
           <a:p>
-            <a:endParaRPr lang="en-US"/>
+            <a:endParaRPr lang="en-US" dirty="0"/>
           </a:p>
         </p:txBody>
       </p:sp>
@@ -11163,6 +11195,7 @@
           <a:p>
             <a:fld id="{148CC95F-0247-41B6-91CF-DC97C76A7088}" type="slidenum">
               <a:rPr lang="en-US" smtClean="0"/>
+              <a:pPr/>
               <a:t>‹Nº›</a:t>
             </a:fld>
             <a:endParaRPr lang="en-US"/>
@@ -11172,7 +11205,7 @@
     </p:spTree>
     <p:extLst>
       <p:ext uri="{BB962C8B-B14F-4D97-AF65-F5344CB8AC3E}">
-        <p14:creationId xmlns:p14="http://schemas.microsoft.com/office/powerpoint/2010/main" val="1970903511"/>
+        <p14:creationId xmlns:p14="http://schemas.microsoft.com/office/powerpoint/2010/main" val="1964938202"/>
       </p:ext>
     </p:extLst>
   </p:cSld>
@@ -11184,7 +11217,7 @@
 
 <file path=ppt/slideLayouts/slideLayout7.xml><?xml version="1.0" encoding="utf-8"?>
 <p:sldLayout xmlns:a="http://schemas.openxmlformats.org/drawingml/2006/main" xmlns:r="http://schemas.openxmlformats.org/officeDocument/2006/relationships" xmlns:p="http://schemas.openxmlformats.org/presentationml/2006/main" showMasterSp="0" type="blank" preserve="1">
-  <p:cSld name="Blank">
+  <p:cSld name="En blanco">
     <p:spTree>
       <p:nvGrpSpPr>
         <p:cNvPr id="1" name=""/>
@@ -11222,6 +11255,7 @@
           <a:p>
             <a:fld id="{E80C50CD-E178-4744-9B35-B2F624D6C5E9}" type="datetimeFigureOut">
               <a:rPr lang="en-US" smtClean="0"/>
+              <a:pPr/>
               <a:t>10/19/2025</a:t>
             </a:fld>
             <a:endParaRPr lang="en-US"/>
@@ -11249,7 +11283,7 @@
           <a:bodyPr/>
           <a:lstStyle/>
           <a:p>
-            <a:endParaRPr lang="en-US"/>
+            <a:endParaRPr lang="en-US" dirty="0"/>
           </a:p>
         </p:txBody>
       </p:sp>
@@ -11276,6 +11310,7 @@
           <a:p>
             <a:fld id="{148CC95F-0247-41B6-91CF-DC97C76A7088}" type="slidenum">
               <a:rPr lang="en-US" smtClean="0"/>
+              <a:pPr/>
               <a:t>‹Nº›</a:t>
             </a:fld>
             <a:endParaRPr lang="en-US"/>
@@ -11285,7 +11320,7 @@
     </p:spTree>
     <p:extLst>
       <p:ext uri="{BB962C8B-B14F-4D97-AF65-F5344CB8AC3E}">
-        <p14:creationId xmlns:p14="http://schemas.microsoft.com/office/powerpoint/2010/main" val="474989519"/>
+        <p14:creationId xmlns:p14="http://schemas.microsoft.com/office/powerpoint/2010/main" val="3848504201"/>
       </p:ext>
     </p:extLst>
   </p:cSld>
@@ -11297,7 +11332,7 @@
 
 <file path=ppt/slideLayouts/slideLayout8.xml><?xml version="1.0" encoding="utf-8"?>
 <p:sldLayout xmlns:a="http://schemas.openxmlformats.org/drawingml/2006/main" xmlns:r="http://schemas.openxmlformats.org/officeDocument/2006/relationships" xmlns:p="http://schemas.openxmlformats.org/presentationml/2006/main" type="objTx" preserve="1">
-  <p:cSld name="Content with Caption">
+  <p:cSld name="Contenido con título">
     <p:spTree>
       <p:nvGrpSpPr>
         <p:cNvPr id="1" name=""/>
@@ -11345,9 +11380,10 @@
           </a:lstStyle>
           <a:p>
             <a:r>
-              <a:rPr lang="en-US" dirty="0"/>
-              <a:t>Click to edit Master title style</a:t>
-            </a:r>
+              <a:rPr lang="es-ES"/>
+              <a:t>Haga clic para modificar el estilo de título del patrón</a:t>
+            </a:r>
+            <a:endParaRPr lang="en-US" dirty="0"/>
           </a:p>
         </p:txBody>
       </p:sp>
@@ -11409,37 +11445,38 @@
           <a:p>
             <a:pPr lvl="0"/>
             <a:r>
-              <a:rPr lang="en-US" dirty="0"/>
-              <a:t>Click to edit Master text styles</a:t>
+              <a:rPr lang="es-ES"/>
+              <a:t>Haga clic para modificar los estilos de texto del patrón</a:t>
             </a:r>
           </a:p>
           <a:p>
             <a:pPr lvl="1"/>
             <a:r>
-              <a:rPr lang="en-US" dirty="0"/>
-              <a:t>Second level</a:t>
+              <a:rPr lang="es-ES"/>
+              <a:t>Segundo nivel</a:t>
             </a:r>
           </a:p>
           <a:p>
             <a:pPr lvl="2"/>
             <a:r>
-              <a:rPr lang="en-US" dirty="0"/>
-              <a:t>Third level</a:t>
+              <a:rPr lang="es-ES"/>
+              <a:t>Tercer nivel</a:t>
             </a:r>
           </a:p>
           <a:p>
             <a:pPr lvl="3"/>
             <a:r>
-              <a:rPr lang="en-US" dirty="0"/>
-              <a:t>Fourth level</a:t>
+              <a:rPr lang="es-ES"/>
+              <a:t>Cuarto nivel</a:t>
             </a:r>
           </a:p>
           <a:p>
             <a:pPr lvl="4"/>
             <a:r>
-              <a:rPr lang="en-US" dirty="0"/>
-              <a:t>Fifth level</a:t>
-            </a:r>
+              <a:rPr lang="es-ES"/>
+              <a:t>Quinto nivel</a:t>
+            </a:r>
+            <a:endParaRPr lang="en-US" dirty="0"/>
           </a:p>
         </p:txBody>
       </p:sp>
@@ -11510,8 +11547,8 @@
           <a:p>
             <a:pPr lvl="0"/>
             <a:r>
-              <a:rPr lang="en-US"/>
-              <a:t>Click to edit Master text styles</a:t>
+              <a:rPr lang="es-ES"/>
+              <a:t>Haga clic para modificar los estilos de texto del patrón</a:t>
             </a:r>
           </a:p>
         </p:txBody>
@@ -11539,6 +11576,7 @@
           <a:p>
             <a:fld id="{E80C50CD-E178-4744-9B35-B2F624D6C5E9}" type="datetimeFigureOut">
               <a:rPr lang="en-US" smtClean="0"/>
+              <a:pPr/>
               <a:t>10/19/2025</a:t>
             </a:fld>
             <a:endParaRPr lang="en-US"/>
@@ -11566,7 +11604,7 @@
           <a:bodyPr/>
           <a:lstStyle/>
           <a:p>
-            <a:endParaRPr lang="en-US"/>
+            <a:endParaRPr lang="en-US" dirty="0"/>
           </a:p>
         </p:txBody>
       </p:sp>
@@ -11593,6 +11631,7 @@
           <a:p>
             <a:fld id="{148CC95F-0247-41B6-91CF-DC97C76A7088}" type="slidenum">
               <a:rPr lang="en-US" smtClean="0"/>
+              <a:pPr/>
               <a:t>‹Nº›</a:t>
             </a:fld>
             <a:endParaRPr lang="en-US"/>
@@ -11602,7 +11641,7 @@
     </p:spTree>
     <p:extLst>
       <p:ext uri="{BB962C8B-B14F-4D97-AF65-F5344CB8AC3E}">
-        <p14:creationId xmlns:p14="http://schemas.microsoft.com/office/powerpoint/2010/main" val="2532447387"/>
+        <p14:creationId xmlns:p14="http://schemas.microsoft.com/office/powerpoint/2010/main" val="1423605171"/>
       </p:ext>
     </p:extLst>
   </p:cSld>
@@ -11614,7 +11653,7 @@
 
 <file path=ppt/slideLayouts/slideLayout9.xml><?xml version="1.0" encoding="utf-8"?>
 <p:sldLayout xmlns:a="http://schemas.openxmlformats.org/drawingml/2006/main" xmlns:r="http://schemas.openxmlformats.org/officeDocument/2006/relationships" xmlns:p="http://schemas.openxmlformats.org/presentationml/2006/main" type="picTx" preserve="1">
-  <p:cSld name="Picture with Caption">
+  <p:cSld name="Imagen con título">
     <p:spTree>
       <p:nvGrpSpPr>
         <p:cNvPr id="1" name=""/>
@@ -11662,9 +11701,10 @@
           </a:lstStyle>
           <a:p>
             <a:r>
-              <a:rPr lang="en-US" dirty="0"/>
-              <a:t>Click to edit Master title style</a:t>
-            </a:r>
+              <a:rPr lang="es-ES"/>
+              <a:t>Haga clic para modificar el estilo de título del patrón</a:t>
+            </a:r>
+            <a:endParaRPr lang="en-US" dirty="0"/>
           </a:p>
         </p:txBody>
       </p:sp>
@@ -11731,6 +11771,10 @@
             </a:lvl9pPr>
           </a:lstStyle>
           <a:p>
+            <a:r>
+              <a:rPr lang="es-ES"/>
+              <a:t>Haga clic en el icono para agregar una imagen</a:t>
+            </a:r>
             <a:endParaRPr lang="en-US"/>
           </a:p>
         </p:txBody>
@@ -11802,8 +11846,8 @@
           <a:p>
             <a:pPr lvl="0"/>
             <a:r>
-              <a:rPr lang="en-US"/>
-              <a:t>Click to edit Master text styles</a:t>
+              <a:rPr lang="es-ES"/>
+              <a:t>Haga clic para modificar los estilos de texto del patrón</a:t>
             </a:r>
           </a:p>
         </p:txBody>
@@ -11831,6 +11875,7 @@
           <a:p>
             <a:fld id="{E80C50CD-E178-4744-9B35-B2F624D6C5E9}" type="datetimeFigureOut">
               <a:rPr lang="en-US" smtClean="0"/>
+              <a:pPr/>
               <a:t>10/19/2025</a:t>
             </a:fld>
             <a:endParaRPr lang="en-US"/>
@@ -11858,7 +11903,7 @@
           <a:bodyPr/>
           <a:lstStyle/>
           <a:p>
-            <a:endParaRPr lang="en-US"/>
+            <a:endParaRPr lang="en-US" dirty="0"/>
           </a:p>
         </p:txBody>
       </p:sp>
@@ -11885,6 +11930,7 @@
           <a:p>
             <a:fld id="{148CC95F-0247-41B6-91CF-DC97C76A7088}" type="slidenum">
               <a:rPr lang="en-US" smtClean="0"/>
+              <a:pPr/>
               <a:t>‹Nº›</a:t>
             </a:fld>
             <a:endParaRPr lang="en-US"/>
@@ -11894,7 +11940,7 @@
     </p:spTree>
     <p:extLst>
       <p:ext uri="{BB962C8B-B14F-4D97-AF65-F5344CB8AC3E}">
-        <p14:creationId xmlns:p14="http://schemas.microsoft.com/office/powerpoint/2010/main" val="3377561151"/>
+        <p14:creationId xmlns:p14="http://schemas.microsoft.com/office/powerpoint/2010/main" val="171454980"/>
       </p:ext>
     </p:extLst>
   </p:cSld>
@@ -11958,9 +12004,10 @@
           <a:lstStyle/>
           <a:p>
             <a:r>
-              <a:rPr lang="en-US" dirty="0"/>
-              <a:t>Click to edit Master title style</a:t>
-            </a:r>
+              <a:rPr lang="es-ES"/>
+              <a:t>Haga clic para modificar el estilo de título del patrón</a:t>
+            </a:r>
+            <a:endParaRPr lang="en-US" dirty="0"/>
           </a:p>
         </p:txBody>
       </p:sp>
@@ -11997,37 +12044,38 @@
           <a:p>
             <a:pPr lvl="0"/>
             <a:r>
-              <a:rPr lang="en-US" dirty="0"/>
-              <a:t>Click to edit Master text styles</a:t>
+              <a:rPr lang="es-ES"/>
+              <a:t>Haga clic para modificar los estilos de texto del patrón</a:t>
             </a:r>
           </a:p>
           <a:p>
             <a:pPr lvl="1"/>
             <a:r>
-              <a:rPr lang="en-US" dirty="0"/>
-              <a:t>Second level</a:t>
+              <a:rPr lang="es-ES"/>
+              <a:t>Segundo nivel</a:t>
             </a:r>
           </a:p>
           <a:p>
             <a:pPr lvl="2"/>
             <a:r>
-              <a:rPr lang="en-US" dirty="0"/>
-              <a:t>Third level</a:t>
+              <a:rPr lang="es-ES"/>
+              <a:t>Tercer nivel</a:t>
             </a:r>
           </a:p>
           <a:p>
             <a:pPr lvl="3"/>
             <a:r>
-              <a:rPr lang="en-US" dirty="0"/>
-              <a:t>Fourth level</a:t>
+              <a:rPr lang="es-ES"/>
+              <a:t>Cuarto nivel</a:t>
             </a:r>
           </a:p>
           <a:p>
             <a:pPr lvl="4"/>
             <a:r>
-              <a:rPr lang="en-US" dirty="0"/>
-              <a:t>Fifth level</a:t>
-            </a:r>
+              <a:rPr lang="es-ES"/>
+              <a:t>Quinto nivel</a:t>
+            </a:r>
+            <a:endParaRPr lang="en-US" dirty="0"/>
           </a:p>
         </p:txBody>
       </p:sp>
@@ -12267,23 +12315,23 @@
     </p:spTree>
     <p:extLst>
       <p:ext uri="{BB962C8B-B14F-4D97-AF65-F5344CB8AC3E}">
-        <p14:creationId xmlns:p14="http://schemas.microsoft.com/office/powerpoint/2010/main" val="3940889402"/>
+        <p14:creationId xmlns:p14="http://schemas.microsoft.com/office/powerpoint/2010/main" val="3466768452"/>
       </p:ext>
     </p:extLst>
   </p:cSld>
   <p:clrMap bg1="lt1" tx1="dk1" bg2="lt2" tx2="dk2" accent1="accent1" accent2="accent2" accent3="accent3" accent4="accent4" accent5="accent5" accent6="accent6" hlink="hlink" folHlink="folHlink"/>
   <p:sldLayoutIdLst>
-    <p:sldLayoutId id="2147483681" r:id="rId1"/>
-    <p:sldLayoutId id="2147483682" r:id="rId2"/>
-    <p:sldLayoutId id="2147483683" r:id="rId3"/>
-    <p:sldLayoutId id="2147483684" r:id="rId4"/>
-    <p:sldLayoutId id="2147483685" r:id="rId5"/>
-    <p:sldLayoutId id="2147483679" r:id="rId6"/>
-    <p:sldLayoutId id="2147483675" r:id="rId7"/>
-    <p:sldLayoutId id="2147483676" r:id="rId8"/>
-    <p:sldLayoutId id="2147483677" r:id="rId9"/>
-    <p:sldLayoutId id="2147483678" r:id="rId10"/>
-    <p:sldLayoutId id="2147483680" r:id="rId11"/>
+    <p:sldLayoutId id="2147483700" r:id="rId1"/>
+    <p:sldLayoutId id="2147483701" r:id="rId2"/>
+    <p:sldLayoutId id="2147483702" r:id="rId3"/>
+    <p:sldLayoutId id="2147483703" r:id="rId4"/>
+    <p:sldLayoutId id="2147483704" r:id="rId5"/>
+    <p:sldLayoutId id="2147483705" r:id="rId6"/>
+    <p:sldLayoutId id="2147483706" r:id="rId7"/>
+    <p:sldLayoutId id="2147483707" r:id="rId8"/>
+    <p:sldLayoutId id="2147483708" r:id="rId9"/>
+    <p:sldLayoutId id="2147483709" r:id="rId10"/>
+    <p:sldLayoutId id="2147483710" r:id="rId11"/>
   </p:sldLayoutIdLst>
   <p:txStyles>
     <p:titleStyle>
@@ -13796,7 +13844,7 @@
         </p:spPr>
         <p:txBody>
           <a:bodyPr>
-            <a:normAutofit lnSpcReduction="10000"/>
+            <a:normAutofit fontScale="92500" lnSpcReduction="10000"/>
           </a:bodyPr>
           <a:lstStyle/>
           <a:p>
@@ -14541,7 +14589,7 @@
         </p:blipFill>
         <p:spPr>
           <a:xfrm>
-            <a:off x="7489368" y="508090"/>
+            <a:off x="7546518" y="793840"/>
             <a:ext cx="4013060" cy="5843016"/>
           </a:xfrm>
           <a:prstGeom prst="rect">
@@ -15273,14 +15321,6 @@
 <file path=ppt/slides/slide24.xml><?xml version="1.0" encoding="utf-8"?>
 <p:sld xmlns:a="http://schemas.openxmlformats.org/drawingml/2006/main" xmlns:r="http://schemas.openxmlformats.org/officeDocument/2006/relationships" xmlns:p="http://schemas.openxmlformats.org/presentationml/2006/main">
   <p:cSld>
-    <p:bg>
-      <p:bgPr>
-        <a:solidFill>
-          <a:schemeClr val="bg1"/>
-        </a:solidFill>
-        <a:effectLst/>
-      </p:bgPr>
-    </p:bg>
     <p:spTree>
       <p:nvGrpSpPr>
         <p:cNvPr id="1" name=""/>
@@ -15324,12 +15364,13 @@
         </p:blipFill>
         <p:spPr>
           <a:xfrm>
-            <a:off x="517871" y="839336"/>
-            <a:ext cx="8740538" cy="5508615"/>
+            <a:off x="1284871" y="725488"/>
+            <a:ext cx="9622258" cy="6064250"/>
           </a:xfrm>
           <a:prstGeom prst="rect">
             <a:avLst/>
           </a:prstGeom>
+          <a:noFill/>
         </p:spPr>
       </p:pic>
     </p:spTree>
@@ -16535,7 +16576,7 @@
           <p:cNvPr id="2" name="Título 1">
             <a:extLst>
               <a:ext uri="{FF2B5EF4-FFF2-40B4-BE49-F238E27FC236}">
-                <a16:creationId xmlns:a16="http://schemas.microsoft.com/office/drawing/2014/main" id="{A133AA1B-A1F8-30E1-13A5-E1F2BACA9AFE}"/>
+                <a16:creationId xmlns:a16="http://schemas.microsoft.com/office/drawing/2014/main" id="{F3AE1AF7-49C7-F432-E1E4-7BA587AC4339}"/>
               </a:ext>
             </a:extLst>
           </p:cNvPr>
@@ -16553,7 +16594,7 @@
           <a:p>
             <a:r>
               <a:rPr lang="es-ES" dirty="0"/>
-              <a:t>SHA</a:t>
+              <a:t>Conceptos clave</a:t>
             </a:r>
           </a:p>
         </p:txBody>
@@ -16563,7 +16604,7 @@
           <p:cNvPr id="3" name="Marcador de contenido 2">
             <a:extLst>
               <a:ext uri="{FF2B5EF4-FFF2-40B4-BE49-F238E27FC236}">
-                <a16:creationId xmlns:a16="http://schemas.microsoft.com/office/drawing/2014/main" id="{2D1A6F61-7CB9-5858-40B2-C63981F33C44}"/>
+                <a16:creationId xmlns:a16="http://schemas.microsoft.com/office/drawing/2014/main" id="{E854A13A-6D50-FBB5-0B6D-E0A213B949A7}"/>
               </a:ext>
             </a:extLst>
           </p:cNvPr>
@@ -16581,23 +16622,33 @@
           <a:p>
             <a:r>
               <a:rPr lang="es-ES" dirty="0"/>
-              <a:t>SHA es una familia de funciones de </a:t>
-            </a:r>
-            <a:r>
-              <a:rPr lang="es-ES" dirty="0" err="1"/>
-              <a:t>haseo</a:t>
-            </a:r>
+              <a:t>Función hash no biyectiva (en la mayoría de las ocasiones).</a:t>
+            </a:r>
+          </a:p>
+          <a:p>
             <a:r>
               <a:rPr lang="es-ES" dirty="0"/>
-              <a:t> de las cuales la más empleada es la SHA-256</a:t>
-            </a:r>
+              <a:t>Identificación de información.</a:t>
+            </a:r>
+          </a:p>
+          <a:p>
+            <a:r>
+              <a:rPr lang="es-ES" dirty="0"/>
+              <a:t>Colisiones de HASH.</a:t>
+            </a:r>
+          </a:p>
+          <a:p>
+            <a:endParaRPr lang="es-ES" dirty="0"/>
+          </a:p>
+          <a:p>
+            <a:endParaRPr lang="es-ES" dirty="0"/>
           </a:p>
         </p:txBody>
       </p:sp>
     </p:spTree>
     <p:extLst>
       <p:ext uri="{BB962C8B-B14F-4D97-AF65-F5344CB8AC3E}">
-        <p14:creationId xmlns:p14="http://schemas.microsoft.com/office/powerpoint/2010/main" val="221936402"/>
+        <p14:creationId xmlns:p14="http://schemas.microsoft.com/office/powerpoint/2010/main" val="3376416270"/>
       </p:ext>
     </p:extLst>
   </p:cSld>
@@ -16629,7 +16680,7 @@
           <p:cNvPr id="2" name="Título 1">
             <a:extLst>
               <a:ext uri="{FF2B5EF4-FFF2-40B4-BE49-F238E27FC236}">
-                <a16:creationId xmlns:a16="http://schemas.microsoft.com/office/drawing/2014/main" id="{4125E6C8-2BE8-A94D-0535-840497F45B4A}"/>
+                <a16:creationId xmlns:a16="http://schemas.microsoft.com/office/drawing/2014/main" id="{A133AA1B-A1F8-30E1-13A5-E1F2BACA9AFE}"/>
               </a:ext>
             </a:extLst>
           </p:cNvPr>
@@ -16647,7 +16698,7 @@
           <a:p>
             <a:r>
               <a:rPr lang="es-ES" dirty="0"/>
-              <a:t>¿Por qué es buena práctica cifrar la base de datos?</a:t>
+              <a:t>SHA</a:t>
             </a:r>
           </a:p>
         </p:txBody>
@@ -16657,7 +16708,7 @@
           <p:cNvPr id="3" name="Marcador de contenido 2">
             <a:extLst>
               <a:ext uri="{FF2B5EF4-FFF2-40B4-BE49-F238E27FC236}">
-                <a16:creationId xmlns:a16="http://schemas.microsoft.com/office/drawing/2014/main" id="{556492AC-E569-1328-D2E5-DF8AA192DB1F}"/>
+                <a16:creationId xmlns:a16="http://schemas.microsoft.com/office/drawing/2014/main" id="{2D1A6F61-7CB9-5858-40B2-C63981F33C44}"/>
               </a:ext>
             </a:extLst>
           </p:cNvPr>
@@ -16673,14 +16724,25 @@
           <a:bodyPr/>
           <a:lstStyle/>
           <a:p>
-            <a:endParaRPr lang="es-ES"/>
+            <a:r>
+              <a:rPr lang="es-ES" dirty="0"/>
+              <a:t>SHA es una familia de funciones de </a:t>
+            </a:r>
+            <a:r>
+              <a:rPr lang="es-ES" dirty="0" err="1"/>
+              <a:t>haseo</a:t>
+            </a:r>
+            <a:r>
+              <a:rPr lang="es-ES" dirty="0"/>
+              <a:t> de las cuales la más empleada es la SHA-256</a:t>
+            </a:r>
           </a:p>
         </p:txBody>
       </p:sp>
     </p:spTree>
     <p:extLst>
       <p:ext uri="{BB962C8B-B14F-4D97-AF65-F5344CB8AC3E}">
-        <p14:creationId xmlns:p14="http://schemas.microsoft.com/office/powerpoint/2010/main" val="1940121297"/>
+        <p14:creationId xmlns:p14="http://schemas.microsoft.com/office/powerpoint/2010/main" val="221936402"/>
       </p:ext>
     </p:extLst>
   </p:cSld>
@@ -16712,7 +16774,7 @@
           <p:cNvPr id="2" name="Título 1">
             <a:extLst>
               <a:ext uri="{FF2B5EF4-FFF2-40B4-BE49-F238E27FC236}">
-                <a16:creationId xmlns:a16="http://schemas.microsoft.com/office/drawing/2014/main" id="{F3AE1AF7-49C7-F432-E1E4-7BA587AC4339}"/>
+                <a16:creationId xmlns:a16="http://schemas.microsoft.com/office/drawing/2014/main" id="{4125E6C8-2BE8-A94D-0535-840497F45B4A}"/>
               </a:ext>
             </a:extLst>
           </p:cNvPr>
@@ -16730,7 +16792,7 @@
           <a:p>
             <a:r>
               <a:rPr lang="es-ES" dirty="0"/>
-              <a:t>Conceptos clave</a:t>
+              <a:t>¿Por qué es buena práctica cifrar la base de datos?</a:t>
             </a:r>
           </a:p>
         </p:txBody>
@@ -16740,7 +16802,7 @@
           <p:cNvPr id="3" name="Marcador de contenido 2">
             <a:extLst>
               <a:ext uri="{FF2B5EF4-FFF2-40B4-BE49-F238E27FC236}">
-                <a16:creationId xmlns:a16="http://schemas.microsoft.com/office/drawing/2014/main" id="{E854A13A-6D50-FBB5-0B6D-E0A213B949A7}"/>
+                <a16:creationId xmlns:a16="http://schemas.microsoft.com/office/drawing/2014/main" id="{556492AC-E569-1328-D2E5-DF8AA192DB1F}"/>
               </a:ext>
             </a:extLst>
           </p:cNvPr>
@@ -16758,18 +16820,29 @@
           <a:p>
             <a:r>
               <a:rPr lang="es-ES" dirty="0"/>
-              <a:t>Función hash no biyectiva (en la mayoría de las ocasiones)</a:t>
-            </a:r>
-          </a:p>
-          <a:p>
-            <a:endParaRPr lang="es-ES" dirty="0"/>
+              <a:t>Si hay una filtración los datos sensibles no quedan expuestos como texto en claro, pero sigue siendo un problema grave.</a:t>
+            </a:r>
+          </a:p>
+          <a:p>
+            <a:r>
+              <a:rPr lang="es-ES" dirty="0"/>
+              <a:t>También se pueden poner </a:t>
+            </a:r>
+            <a:r>
+              <a:rPr lang="es-ES" dirty="0" err="1"/>
+              <a:t>honeypots</a:t>
+            </a:r>
+            <a:r>
+              <a:rPr lang="es-ES" dirty="0"/>
+              <a:t> con cuentas inexistentes para que si hay un inicio de sesión salte una alerta.</a:t>
+            </a:r>
           </a:p>
         </p:txBody>
       </p:sp>
     </p:spTree>
     <p:extLst>
       <p:ext uri="{BB962C8B-B14F-4D97-AF65-F5344CB8AC3E}">
-        <p14:creationId xmlns:p14="http://schemas.microsoft.com/office/powerpoint/2010/main" val="3376416270"/>
+        <p14:creationId xmlns:p14="http://schemas.microsoft.com/office/powerpoint/2010/main" val="1940121297"/>
       </p:ext>
     </p:extLst>
   </p:cSld>
@@ -16780,6 +16853,107 @@
 </file>
 
 <file path=ppt/slides/slide35.xml><?xml version="1.0" encoding="utf-8"?>
+<p:sld xmlns:a="http://schemas.openxmlformats.org/drawingml/2006/main" xmlns:r="http://schemas.openxmlformats.org/officeDocument/2006/relationships" xmlns:p="http://schemas.openxmlformats.org/presentationml/2006/main">
+  <p:cSld>
+    <p:spTree>
+      <p:nvGrpSpPr>
+        <p:cNvPr id="1" name=""/>
+        <p:cNvGrpSpPr/>
+        <p:nvPr/>
+      </p:nvGrpSpPr>
+      <p:grpSpPr>
+        <a:xfrm>
+          <a:off x="0" y="0"/>
+          <a:ext cx="0" cy="0"/>
+          <a:chOff x="0" y="0"/>
+          <a:chExt cx="0" cy="0"/>
+        </a:xfrm>
+      </p:grpSpPr>
+      <p:sp>
+        <p:nvSpPr>
+          <p:cNvPr id="2" name="Título 1">
+            <a:extLst>
+              <a:ext uri="{FF2B5EF4-FFF2-40B4-BE49-F238E27FC236}">
+                <a16:creationId xmlns:a16="http://schemas.microsoft.com/office/drawing/2014/main" id="{79DAF768-BBCE-1406-F840-23F40FDFC11A}"/>
+              </a:ext>
+            </a:extLst>
+          </p:cNvPr>
+          <p:cNvSpPr>
+            <a:spLocks noGrp="1"/>
+          </p:cNvSpPr>
+          <p:nvPr>
+            <p:ph type="title"/>
+          </p:nvPr>
+        </p:nvSpPr>
+        <p:spPr/>
+        <p:txBody>
+          <a:bodyPr/>
+          <a:lstStyle/>
+          <a:p>
+            <a:r>
+              <a:rPr lang="es-ES" dirty="0"/>
+              <a:t>Problemas con el prompt </a:t>
+            </a:r>
+            <a:r>
+              <a:rPr lang="es-ES" dirty="0" err="1"/>
+              <a:t>inyection</a:t>
+            </a:r>
+            <a:r>
+              <a:rPr lang="es-ES" dirty="0"/>
+              <a:t>.</a:t>
+            </a:r>
+          </a:p>
+        </p:txBody>
+      </p:sp>
+      <p:pic>
+        <p:nvPicPr>
+          <p:cNvPr id="5" name="Marcador de contenido 4">
+            <a:extLst>
+              <a:ext uri="{FF2B5EF4-FFF2-40B4-BE49-F238E27FC236}">
+                <a16:creationId xmlns:a16="http://schemas.microsoft.com/office/drawing/2014/main" id="{D206F3AA-E36F-0493-4B69-4144E4B3F9E5}"/>
+              </a:ext>
+            </a:extLst>
+          </p:cNvPr>
+          <p:cNvPicPr>
+            <a:picLocks noGrp="1" noChangeAspect="1"/>
+          </p:cNvPicPr>
+          <p:nvPr>
+            <p:ph idx="1"/>
+          </p:nvPr>
+        </p:nvPicPr>
+        <p:blipFill>
+          <a:blip r:embed="rId2">
+            <a:extLst>
+              <a:ext uri="{28A0092B-C50C-407E-A947-70E740481C1C}">
+                <a14:useLocalDpi xmlns:a14="http://schemas.microsoft.com/office/drawing/2010/main" val="0"/>
+              </a:ext>
+            </a:extLst>
+          </a:blip>
+          <a:stretch>
+            <a:fillRect/>
+          </a:stretch>
+        </p:blipFill>
+        <p:spPr>
+          <a:xfrm>
+            <a:off x="1113618" y="1789756"/>
+            <a:ext cx="9964764" cy="4552652"/>
+          </a:xfrm>
+        </p:spPr>
+      </p:pic>
+    </p:spTree>
+    <p:extLst>
+      <p:ext uri="{BB962C8B-B14F-4D97-AF65-F5344CB8AC3E}">
+        <p14:creationId xmlns:p14="http://schemas.microsoft.com/office/powerpoint/2010/main" val="3787784854"/>
+      </p:ext>
+    </p:extLst>
+  </p:cSld>
+  <p:clrMapOvr>
+    <a:masterClrMapping/>
+  </p:clrMapOvr>
+</p:sld>
+</file>
+
+<file path=ppt/slides/slide36.xml><?xml version="1.0" encoding="utf-8"?>
 <p:sld xmlns:a="http://schemas.openxmlformats.org/drawingml/2006/main" xmlns:r="http://schemas.openxmlformats.org/officeDocument/2006/relationships" xmlns:p="http://schemas.openxmlformats.org/presentationml/2006/main">
   <p:cSld>
     <p:spTree>
@@ -17611,9 +17785,10 @@
           <a:lstStyle/>
           <a:p>
             <a:r>
-              <a:rPr lang="es-ES" dirty="0"/>
+              <a:rPr lang="es-ES"/>
               <a:t>División de disciplinas</a:t>
             </a:r>
+            <a:endParaRPr lang="es-ES" dirty="0"/>
           </a:p>
         </p:txBody>
       </p:sp>
@@ -17633,7 +17808,7 @@
             <p:ph idx="1"/>
             <p:extLst>
               <p:ext uri="{D42A27DB-BD31-4B8C-83A1-F6EECF244321}">
-                <p14:modId xmlns:p14="http://schemas.microsoft.com/office/powerpoint/2010/main" val="2815773381"/>
+                <p14:modId xmlns:p14="http://schemas.microsoft.com/office/powerpoint/2010/main" val="3254059988"/>
               </p:ext>
             </p:extLst>
           </p:nvPr>
@@ -17662,7 +17837,7 @@
 </file>
 
 <file path=ppt/theme/theme1.xml><?xml version="1.0" encoding="utf-8"?>
-<a:theme xmlns:a="http://schemas.openxmlformats.org/drawingml/2006/main" name="GestaltVTI">
+<a:theme xmlns:a="http://schemas.openxmlformats.org/drawingml/2006/main" name="Tema2">
   <a:themeElements>
     <a:clrScheme name="Gestalt">
       <a:dk1>
@@ -17876,7 +18051,7 @@
   <a:extraClrSchemeLst/>
   <a:extLst>
     <a:ext uri="{05A4C25C-085E-4340-85A3-A5531E510DB2}">
-      <thm15:themeFamily xmlns:thm15="http://schemas.microsoft.com/office/thememl/2012/main" name="GestaltVTI" id="{4F87C71D-53D1-4B71-BF97-FD0EA4B25665}" vid="{A110AFC4-8D8A-4C02-8885-7BA370B379B5}"/>
+      <thm15:themeFamily xmlns:thm15="http://schemas.microsoft.com/office/thememl/2012/main" name="Tema2" id="{C27C5EA2-A0D4-4A7D-9948-A5D4483D91AA}" vid="{C792E98A-C0F2-4F11-8D07-235B91C50798}"/>
     </a:ext>
   </a:extLst>
 </a:theme>

</xml_diff>

<commit_message>
modificaciones en el powerpoint
</commit_message>
<xml_diff>
--- a/criptografía teorica.pptx
+++ b/criptografía teorica.pptx
@@ -2,7 +2,7 @@
 <file path=ppt/presentation.xml><?xml version="1.0" encoding="utf-8"?>
 <p:presentation xmlns:a="http://schemas.openxmlformats.org/drawingml/2006/main" xmlns:r="http://schemas.openxmlformats.org/officeDocument/2006/relationships" xmlns:p="http://schemas.openxmlformats.org/presentationml/2006/main" saveSubsetFonts="1">
   <p:sldMasterIdLst>
-    <p:sldMasterId id="2147483699" r:id="rId1"/>
+    <p:sldMasterId id="2147483723" r:id="rId1"/>
   </p:sldMasterIdLst>
   <p:sldIdLst>
     <p:sldId id="256" r:id="rId2"/>
@@ -33,14 +33,16 @@
     <p:sldId id="272" r:id="rId27"/>
     <p:sldId id="275" r:id="rId28"/>
     <p:sldId id="283" r:id="rId29"/>
-    <p:sldId id="284" r:id="rId30"/>
-    <p:sldId id="279" r:id="rId31"/>
-    <p:sldId id="273" r:id="rId32"/>
-    <p:sldId id="276" r:id="rId33"/>
-    <p:sldId id="290" r:id="rId34"/>
-    <p:sldId id="291" r:id="rId35"/>
-    <p:sldId id="293" r:id="rId36"/>
-    <p:sldId id="274" r:id="rId37"/>
+    <p:sldId id="295" r:id="rId30"/>
+    <p:sldId id="284" r:id="rId31"/>
+    <p:sldId id="294" r:id="rId32"/>
+    <p:sldId id="279" r:id="rId33"/>
+    <p:sldId id="273" r:id="rId34"/>
+    <p:sldId id="276" r:id="rId35"/>
+    <p:sldId id="290" r:id="rId36"/>
+    <p:sldId id="291" r:id="rId37"/>
+    <p:sldId id="293" r:id="rId38"/>
+    <p:sldId id="274" r:id="rId39"/>
   </p:sldIdLst>
   <p:sldSz cx="12192000" cy="6858000"/>
   <p:notesSz cx="6858000" cy="9144000"/>
@@ -2528,6 +2530,753 @@
   <dgm:styleLbl name="fgShp">
     <dgm:fillClrLst meth="repeat">
       <a:schemeClr val="accent1">
+        <a:tint val="60000"/>
+      </a:schemeClr>
+    </dgm:fillClrLst>
+    <dgm:linClrLst meth="repeat">
+      <a:schemeClr val="lt1"/>
+    </dgm:linClrLst>
+    <dgm:effectClrLst/>
+    <dgm:txLinClrLst/>
+    <dgm:txFillClrLst meth="repeat">
+      <a:schemeClr val="dk1"/>
+    </dgm:txFillClrLst>
+    <dgm:txEffectClrLst/>
+  </dgm:styleLbl>
+  <dgm:styleLbl name="revTx">
+    <dgm:fillClrLst meth="repeat">
+      <a:schemeClr val="lt1">
+        <a:alpha val="0"/>
+      </a:schemeClr>
+    </dgm:fillClrLst>
+    <dgm:linClrLst meth="repeat">
+      <a:schemeClr val="dk1">
+        <a:alpha val="0"/>
+      </a:schemeClr>
+    </dgm:linClrLst>
+    <dgm:effectClrLst/>
+    <dgm:txLinClrLst/>
+    <dgm:txFillClrLst meth="repeat">
+      <a:schemeClr val="tx1"/>
+    </dgm:txFillClrLst>
+    <dgm:txEffectClrLst/>
+  </dgm:styleLbl>
+</dgm:colorsDef>
+</file>
+
+<file path=ppt/diagrams/colors4.xml><?xml version="1.0" encoding="utf-8"?>
+<dgm:colorsDef xmlns:dgm="http://schemas.openxmlformats.org/drawingml/2006/diagram" xmlns:a="http://schemas.openxmlformats.org/drawingml/2006/main" uniqueId="urn:microsoft.com/office/officeart/2005/8/colors/accent2_2">
+  <dgm:title val=""/>
+  <dgm:desc val=""/>
+  <dgm:catLst>
+    <dgm:cat type="accent2" pri="11200"/>
+  </dgm:catLst>
+  <dgm:styleLbl name="node0">
+    <dgm:fillClrLst meth="repeat">
+      <a:schemeClr val="accent2"/>
+    </dgm:fillClrLst>
+    <dgm:linClrLst meth="repeat">
+      <a:schemeClr val="lt1"/>
+    </dgm:linClrLst>
+    <dgm:effectClrLst/>
+    <dgm:txLinClrLst/>
+    <dgm:txFillClrLst/>
+    <dgm:txEffectClrLst/>
+  </dgm:styleLbl>
+  <dgm:styleLbl name="node1">
+    <dgm:fillClrLst meth="repeat">
+      <a:schemeClr val="accent2"/>
+    </dgm:fillClrLst>
+    <dgm:linClrLst meth="repeat">
+      <a:schemeClr val="lt1"/>
+    </dgm:linClrLst>
+    <dgm:effectClrLst/>
+    <dgm:txLinClrLst/>
+    <dgm:txFillClrLst/>
+    <dgm:txEffectClrLst/>
+  </dgm:styleLbl>
+  <dgm:styleLbl name="alignNode1">
+    <dgm:fillClrLst meth="repeat">
+      <a:schemeClr val="accent2"/>
+    </dgm:fillClrLst>
+    <dgm:linClrLst meth="repeat">
+      <a:schemeClr val="accent2"/>
+    </dgm:linClrLst>
+    <dgm:effectClrLst/>
+    <dgm:txLinClrLst/>
+    <dgm:txFillClrLst/>
+    <dgm:txEffectClrLst/>
+  </dgm:styleLbl>
+  <dgm:styleLbl name="lnNode1">
+    <dgm:fillClrLst meth="repeat">
+      <a:schemeClr val="accent2"/>
+    </dgm:fillClrLst>
+    <dgm:linClrLst meth="repeat">
+      <a:schemeClr val="lt1"/>
+    </dgm:linClrLst>
+    <dgm:effectClrLst/>
+    <dgm:txLinClrLst/>
+    <dgm:txFillClrLst/>
+    <dgm:txEffectClrLst/>
+  </dgm:styleLbl>
+  <dgm:styleLbl name="vennNode1">
+    <dgm:fillClrLst meth="repeat">
+      <a:schemeClr val="accent2">
+        <a:alpha val="50000"/>
+      </a:schemeClr>
+    </dgm:fillClrLst>
+    <dgm:linClrLst meth="repeat">
+      <a:schemeClr val="lt1"/>
+    </dgm:linClrLst>
+    <dgm:effectClrLst/>
+    <dgm:txLinClrLst/>
+    <dgm:txFillClrLst/>
+    <dgm:txEffectClrLst/>
+  </dgm:styleLbl>
+  <dgm:styleLbl name="node2">
+    <dgm:fillClrLst meth="repeat">
+      <a:schemeClr val="accent2"/>
+    </dgm:fillClrLst>
+    <dgm:linClrLst meth="repeat">
+      <a:schemeClr val="lt1"/>
+    </dgm:linClrLst>
+    <dgm:effectClrLst/>
+    <dgm:txLinClrLst/>
+    <dgm:txFillClrLst/>
+    <dgm:txEffectClrLst/>
+  </dgm:styleLbl>
+  <dgm:styleLbl name="node3">
+    <dgm:fillClrLst meth="repeat">
+      <a:schemeClr val="accent2"/>
+    </dgm:fillClrLst>
+    <dgm:linClrLst meth="repeat">
+      <a:schemeClr val="lt1"/>
+    </dgm:linClrLst>
+    <dgm:effectClrLst/>
+    <dgm:txLinClrLst/>
+    <dgm:txFillClrLst/>
+    <dgm:txEffectClrLst/>
+  </dgm:styleLbl>
+  <dgm:styleLbl name="node4">
+    <dgm:fillClrLst meth="repeat">
+      <a:schemeClr val="accent2"/>
+    </dgm:fillClrLst>
+    <dgm:linClrLst meth="repeat">
+      <a:schemeClr val="lt1"/>
+    </dgm:linClrLst>
+    <dgm:effectClrLst/>
+    <dgm:txLinClrLst/>
+    <dgm:txFillClrLst/>
+    <dgm:txEffectClrLst/>
+  </dgm:styleLbl>
+  <dgm:styleLbl name="fgImgPlace1">
+    <dgm:fillClrLst meth="repeat">
+      <a:schemeClr val="accent2">
+        <a:tint val="50000"/>
+      </a:schemeClr>
+    </dgm:fillClrLst>
+    <dgm:linClrLst meth="repeat">
+      <a:schemeClr val="lt1"/>
+    </dgm:linClrLst>
+    <dgm:effectClrLst/>
+    <dgm:txLinClrLst/>
+    <dgm:txFillClrLst meth="repeat">
+      <a:schemeClr val="lt1"/>
+    </dgm:txFillClrLst>
+    <dgm:txEffectClrLst/>
+  </dgm:styleLbl>
+  <dgm:styleLbl name="alignImgPlace1">
+    <dgm:fillClrLst meth="repeat">
+      <a:schemeClr val="accent2">
+        <a:tint val="50000"/>
+      </a:schemeClr>
+    </dgm:fillClrLst>
+    <dgm:linClrLst meth="repeat">
+      <a:schemeClr val="lt1"/>
+    </dgm:linClrLst>
+    <dgm:effectClrLst/>
+    <dgm:txLinClrLst/>
+    <dgm:txFillClrLst meth="repeat">
+      <a:schemeClr val="lt1"/>
+    </dgm:txFillClrLst>
+    <dgm:txEffectClrLst/>
+  </dgm:styleLbl>
+  <dgm:styleLbl name="bgImgPlace1">
+    <dgm:fillClrLst meth="repeat">
+      <a:schemeClr val="accent2">
+        <a:tint val="50000"/>
+      </a:schemeClr>
+    </dgm:fillClrLst>
+    <dgm:linClrLst meth="repeat">
+      <a:schemeClr val="lt1"/>
+    </dgm:linClrLst>
+    <dgm:effectClrLst/>
+    <dgm:txLinClrLst/>
+    <dgm:txFillClrLst meth="repeat">
+      <a:schemeClr val="lt1"/>
+    </dgm:txFillClrLst>
+    <dgm:txEffectClrLst/>
+  </dgm:styleLbl>
+  <dgm:styleLbl name="sibTrans2D1">
+    <dgm:fillClrLst meth="repeat">
+      <a:schemeClr val="accent2">
+        <a:tint val="60000"/>
+      </a:schemeClr>
+    </dgm:fillClrLst>
+    <dgm:linClrLst meth="repeat">
+      <a:schemeClr val="accent2">
+        <a:tint val="60000"/>
+      </a:schemeClr>
+    </dgm:linClrLst>
+    <dgm:effectClrLst/>
+    <dgm:txLinClrLst/>
+    <dgm:txFillClrLst/>
+    <dgm:txEffectClrLst/>
+  </dgm:styleLbl>
+  <dgm:styleLbl name="fgSibTrans2D1">
+    <dgm:fillClrLst meth="repeat">
+      <a:schemeClr val="accent2">
+        <a:tint val="60000"/>
+      </a:schemeClr>
+    </dgm:fillClrLst>
+    <dgm:linClrLst meth="repeat">
+      <a:schemeClr val="accent2">
+        <a:tint val="60000"/>
+      </a:schemeClr>
+    </dgm:linClrLst>
+    <dgm:effectClrLst/>
+    <dgm:txLinClrLst/>
+    <dgm:txFillClrLst/>
+    <dgm:txEffectClrLst/>
+  </dgm:styleLbl>
+  <dgm:styleLbl name="bgSibTrans2D1">
+    <dgm:fillClrLst meth="repeat">
+      <a:schemeClr val="accent2">
+        <a:tint val="60000"/>
+      </a:schemeClr>
+    </dgm:fillClrLst>
+    <dgm:linClrLst meth="repeat">
+      <a:schemeClr val="accent2">
+        <a:tint val="60000"/>
+      </a:schemeClr>
+    </dgm:linClrLst>
+    <dgm:effectClrLst/>
+    <dgm:txLinClrLst/>
+    <dgm:txFillClrLst/>
+    <dgm:txEffectClrLst/>
+  </dgm:styleLbl>
+  <dgm:styleLbl name="sibTrans1D1">
+    <dgm:fillClrLst meth="repeat">
+      <a:schemeClr val="accent2"/>
+    </dgm:fillClrLst>
+    <dgm:linClrLst meth="repeat">
+      <a:schemeClr val="accent2"/>
+    </dgm:linClrLst>
+    <dgm:effectClrLst/>
+    <dgm:txLinClrLst/>
+    <dgm:txFillClrLst meth="repeat">
+      <a:schemeClr val="tx1"/>
+    </dgm:txFillClrLst>
+    <dgm:txEffectClrLst/>
+  </dgm:styleLbl>
+  <dgm:styleLbl name="callout">
+    <dgm:fillClrLst meth="repeat">
+      <a:schemeClr val="accent2"/>
+    </dgm:fillClrLst>
+    <dgm:linClrLst meth="repeat">
+      <a:schemeClr val="accent2">
+        <a:tint val="50000"/>
+      </a:schemeClr>
+    </dgm:linClrLst>
+    <dgm:effectClrLst/>
+    <dgm:txLinClrLst/>
+    <dgm:txFillClrLst meth="repeat">
+      <a:schemeClr val="tx1"/>
+    </dgm:txFillClrLst>
+    <dgm:txEffectClrLst/>
+  </dgm:styleLbl>
+  <dgm:styleLbl name="asst0">
+    <dgm:fillClrLst meth="repeat">
+      <a:schemeClr val="accent2"/>
+    </dgm:fillClrLst>
+    <dgm:linClrLst meth="repeat">
+      <a:schemeClr val="lt1"/>
+    </dgm:linClrLst>
+    <dgm:effectClrLst/>
+    <dgm:txLinClrLst/>
+    <dgm:txFillClrLst/>
+    <dgm:txEffectClrLst/>
+  </dgm:styleLbl>
+  <dgm:styleLbl name="asst1">
+    <dgm:fillClrLst meth="repeat">
+      <a:schemeClr val="accent2"/>
+    </dgm:fillClrLst>
+    <dgm:linClrLst meth="repeat">
+      <a:schemeClr val="lt1"/>
+    </dgm:linClrLst>
+    <dgm:effectClrLst/>
+    <dgm:txLinClrLst/>
+    <dgm:txFillClrLst/>
+    <dgm:txEffectClrLst/>
+  </dgm:styleLbl>
+  <dgm:styleLbl name="asst2">
+    <dgm:fillClrLst meth="repeat">
+      <a:schemeClr val="accent2"/>
+    </dgm:fillClrLst>
+    <dgm:linClrLst meth="repeat">
+      <a:schemeClr val="lt1"/>
+    </dgm:linClrLst>
+    <dgm:effectClrLst/>
+    <dgm:txLinClrLst/>
+    <dgm:txFillClrLst/>
+    <dgm:txEffectClrLst/>
+  </dgm:styleLbl>
+  <dgm:styleLbl name="asst3">
+    <dgm:fillClrLst meth="repeat">
+      <a:schemeClr val="accent2"/>
+    </dgm:fillClrLst>
+    <dgm:linClrLst meth="repeat">
+      <a:schemeClr val="lt1"/>
+    </dgm:linClrLst>
+    <dgm:effectClrLst/>
+    <dgm:txLinClrLst/>
+    <dgm:txFillClrLst/>
+    <dgm:txEffectClrLst/>
+  </dgm:styleLbl>
+  <dgm:styleLbl name="asst4">
+    <dgm:fillClrLst meth="repeat">
+      <a:schemeClr val="accent2"/>
+    </dgm:fillClrLst>
+    <dgm:linClrLst meth="repeat">
+      <a:schemeClr val="lt1"/>
+    </dgm:linClrLst>
+    <dgm:effectClrLst/>
+    <dgm:txLinClrLst/>
+    <dgm:txFillClrLst/>
+    <dgm:txEffectClrLst/>
+  </dgm:styleLbl>
+  <dgm:styleLbl name="parChTrans2D1">
+    <dgm:fillClrLst meth="repeat">
+      <a:schemeClr val="accent2">
+        <a:tint val="60000"/>
+      </a:schemeClr>
+    </dgm:fillClrLst>
+    <dgm:linClrLst meth="repeat">
+      <a:schemeClr val="accent2">
+        <a:tint val="60000"/>
+      </a:schemeClr>
+    </dgm:linClrLst>
+    <dgm:effectClrLst/>
+    <dgm:txLinClrLst/>
+    <dgm:txFillClrLst meth="repeat">
+      <a:schemeClr val="lt1"/>
+    </dgm:txFillClrLst>
+    <dgm:txEffectClrLst/>
+  </dgm:styleLbl>
+  <dgm:styleLbl name="parChTrans2D2">
+    <dgm:fillClrLst meth="repeat">
+      <a:schemeClr val="accent2"/>
+    </dgm:fillClrLst>
+    <dgm:linClrLst meth="repeat">
+      <a:schemeClr val="accent2"/>
+    </dgm:linClrLst>
+    <dgm:effectClrLst/>
+    <dgm:txLinClrLst/>
+    <dgm:txFillClrLst meth="repeat">
+      <a:schemeClr val="lt1"/>
+    </dgm:txFillClrLst>
+    <dgm:txEffectClrLst/>
+  </dgm:styleLbl>
+  <dgm:styleLbl name="parChTrans2D3">
+    <dgm:fillClrLst meth="repeat">
+      <a:schemeClr val="accent2"/>
+    </dgm:fillClrLst>
+    <dgm:linClrLst meth="repeat">
+      <a:schemeClr val="accent2"/>
+    </dgm:linClrLst>
+    <dgm:effectClrLst/>
+    <dgm:txLinClrLst/>
+    <dgm:txFillClrLst meth="repeat">
+      <a:schemeClr val="lt1"/>
+    </dgm:txFillClrLst>
+    <dgm:txEffectClrLst/>
+  </dgm:styleLbl>
+  <dgm:styleLbl name="parChTrans2D4">
+    <dgm:fillClrLst meth="repeat">
+      <a:schemeClr val="accent2"/>
+    </dgm:fillClrLst>
+    <dgm:linClrLst meth="repeat">
+      <a:schemeClr val="accent2"/>
+    </dgm:linClrLst>
+    <dgm:effectClrLst/>
+    <dgm:txLinClrLst/>
+    <dgm:txFillClrLst meth="repeat">
+      <a:schemeClr val="lt1"/>
+    </dgm:txFillClrLst>
+    <dgm:txEffectClrLst/>
+  </dgm:styleLbl>
+  <dgm:styleLbl name="parChTrans1D1">
+    <dgm:fillClrLst meth="repeat">
+      <a:schemeClr val="accent2"/>
+    </dgm:fillClrLst>
+    <dgm:linClrLst meth="repeat">
+      <a:schemeClr val="accent2">
+        <a:shade val="60000"/>
+      </a:schemeClr>
+    </dgm:linClrLst>
+    <dgm:effectClrLst/>
+    <dgm:txLinClrLst/>
+    <dgm:txFillClrLst meth="repeat">
+      <a:schemeClr val="tx1"/>
+    </dgm:txFillClrLst>
+    <dgm:txEffectClrLst/>
+  </dgm:styleLbl>
+  <dgm:styleLbl name="parChTrans1D2">
+    <dgm:fillClrLst meth="repeat">
+      <a:schemeClr val="accent2"/>
+    </dgm:fillClrLst>
+    <dgm:linClrLst meth="repeat">
+      <a:schemeClr val="accent2">
+        <a:shade val="60000"/>
+      </a:schemeClr>
+    </dgm:linClrLst>
+    <dgm:effectClrLst/>
+    <dgm:txLinClrLst/>
+    <dgm:txFillClrLst meth="repeat">
+      <a:schemeClr val="tx1"/>
+    </dgm:txFillClrLst>
+    <dgm:txEffectClrLst/>
+  </dgm:styleLbl>
+  <dgm:styleLbl name="parChTrans1D3">
+    <dgm:fillClrLst meth="repeat">
+      <a:schemeClr val="accent2"/>
+    </dgm:fillClrLst>
+    <dgm:linClrLst meth="repeat">
+      <a:schemeClr val="accent2">
+        <a:shade val="80000"/>
+      </a:schemeClr>
+    </dgm:linClrLst>
+    <dgm:effectClrLst/>
+    <dgm:txLinClrLst/>
+    <dgm:txFillClrLst meth="repeat">
+      <a:schemeClr val="tx1"/>
+    </dgm:txFillClrLst>
+    <dgm:txEffectClrLst/>
+  </dgm:styleLbl>
+  <dgm:styleLbl name="parChTrans1D4">
+    <dgm:fillClrLst meth="repeat">
+      <a:schemeClr val="accent2"/>
+    </dgm:fillClrLst>
+    <dgm:linClrLst meth="repeat">
+      <a:schemeClr val="accent2">
+        <a:shade val="80000"/>
+      </a:schemeClr>
+    </dgm:linClrLst>
+    <dgm:effectClrLst/>
+    <dgm:txLinClrLst/>
+    <dgm:txFillClrLst meth="repeat">
+      <a:schemeClr val="tx1"/>
+    </dgm:txFillClrLst>
+    <dgm:txEffectClrLst/>
+  </dgm:styleLbl>
+  <dgm:styleLbl name="fgAcc1">
+    <dgm:fillClrLst meth="repeat">
+      <a:schemeClr val="lt1">
+        <a:alpha val="90000"/>
+      </a:schemeClr>
+    </dgm:fillClrLst>
+    <dgm:linClrLst meth="repeat">
+      <a:schemeClr val="accent2"/>
+    </dgm:linClrLst>
+    <dgm:effectClrLst/>
+    <dgm:txLinClrLst/>
+    <dgm:txFillClrLst meth="repeat">
+      <a:schemeClr val="dk1"/>
+    </dgm:txFillClrLst>
+    <dgm:txEffectClrLst/>
+  </dgm:styleLbl>
+  <dgm:styleLbl name="conFgAcc1">
+    <dgm:fillClrLst meth="repeat">
+      <a:schemeClr val="lt1">
+        <a:alpha val="90000"/>
+      </a:schemeClr>
+    </dgm:fillClrLst>
+    <dgm:linClrLst meth="repeat">
+      <a:schemeClr val="accent2"/>
+    </dgm:linClrLst>
+    <dgm:effectClrLst/>
+    <dgm:txLinClrLst/>
+    <dgm:txFillClrLst meth="repeat">
+      <a:schemeClr val="dk1"/>
+    </dgm:txFillClrLst>
+    <dgm:txEffectClrLst/>
+  </dgm:styleLbl>
+  <dgm:styleLbl name="alignAcc1">
+    <dgm:fillClrLst meth="repeat">
+      <a:schemeClr val="lt1">
+        <a:alpha val="90000"/>
+      </a:schemeClr>
+    </dgm:fillClrLst>
+    <dgm:linClrLst meth="repeat">
+      <a:schemeClr val="accent2"/>
+    </dgm:linClrLst>
+    <dgm:effectClrLst/>
+    <dgm:txLinClrLst/>
+    <dgm:txFillClrLst meth="repeat">
+      <a:schemeClr val="dk1"/>
+    </dgm:txFillClrLst>
+    <dgm:txEffectClrLst/>
+  </dgm:styleLbl>
+  <dgm:styleLbl name="trAlignAcc1">
+    <dgm:fillClrLst meth="repeat">
+      <a:schemeClr val="lt1">
+        <a:alpha val="40000"/>
+      </a:schemeClr>
+    </dgm:fillClrLst>
+    <dgm:linClrLst meth="repeat">
+      <a:schemeClr val="accent2"/>
+    </dgm:linClrLst>
+    <dgm:effectClrLst/>
+    <dgm:txLinClrLst/>
+    <dgm:txFillClrLst meth="repeat">
+      <a:schemeClr val="dk1"/>
+    </dgm:txFillClrLst>
+    <dgm:txEffectClrLst/>
+  </dgm:styleLbl>
+  <dgm:styleLbl name="bgAcc1">
+    <dgm:fillClrLst meth="repeat">
+      <a:schemeClr val="lt1">
+        <a:alpha val="90000"/>
+      </a:schemeClr>
+    </dgm:fillClrLst>
+    <dgm:linClrLst meth="repeat">
+      <a:schemeClr val="accent2"/>
+    </dgm:linClrLst>
+    <dgm:effectClrLst/>
+    <dgm:txLinClrLst/>
+    <dgm:txFillClrLst meth="repeat">
+      <a:schemeClr val="dk1"/>
+    </dgm:txFillClrLst>
+    <dgm:txEffectClrLst/>
+  </dgm:styleLbl>
+  <dgm:styleLbl name="solidFgAcc1">
+    <dgm:fillClrLst meth="repeat">
+      <a:schemeClr val="lt1"/>
+    </dgm:fillClrLst>
+    <dgm:linClrLst meth="repeat">
+      <a:schemeClr val="accent2"/>
+    </dgm:linClrLst>
+    <dgm:effectClrLst/>
+    <dgm:txLinClrLst/>
+    <dgm:txFillClrLst meth="repeat">
+      <a:schemeClr val="dk1"/>
+    </dgm:txFillClrLst>
+    <dgm:txEffectClrLst/>
+  </dgm:styleLbl>
+  <dgm:styleLbl name="solidAlignAcc1">
+    <dgm:fillClrLst meth="repeat">
+      <a:schemeClr val="lt1"/>
+    </dgm:fillClrLst>
+    <dgm:linClrLst meth="repeat">
+      <a:schemeClr val="accent2"/>
+    </dgm:linClrLst>
+    <dgm:effectClrLst/>
+    <dgm:txLinClrLst/>
+    <dgm:txFillClrLst meth="repeat">
+      <a:schemeClr val="dk1"/>
+    </dgm:txFillClrLst>
+    <dgm:txEffectClrLst/>
+  </dgm:styleLbl>
+  <dgm:styleLbl name="solidBgAcc1">
+    <dgm:fillClrLst meth="repeat">
+      <a:schemeClr val="lt1"/>
+    </dgm:fillClrLst>
+    <dgm:linClrLst meth="repeat">
+      <a:schemeClr val="accent2"/>
+    </dgm:linClrLst>
+    <dgm:effectClrLst/>
+    <dgm:txLinClrLst/>
+    <dgm:txFillClrLst meth="repeat">
+      <a:schemeClr val="dk1"/>
+    </dgm:txFillClrLst>
+    <dgm:txEffectClrLst/>
+  </dgm:styleLbl>
+  <dgm:styleLbl name="fgAccFollowNode1">
+    <dgm:fillClrLst meth="repeat">
+      <a:schemeClr val="accent2">
+        <a:alpha val="90000"/>
+        <a:tint val="40000"/>
+      </a:schemeClr>
+    </dgm:fillClrLst>
+    <dgm:linClrLst meth="repeat">
+      <a:schemeClr val="accent2">
+        <a:alpha val="90000"/>
+        <a:tint val="40000"/>
+      </a:schemeClr>
+    </dgm:linClrLst>
+    <dgm:effectClrLst/>
+    <dgm:txLinClrLst/>
+    <dgm:txFillClrLst meth="repeat">
+      <a:schemeClr val="dk1"/>
+    </dgm:txFillClrLst>
+    <dgm:txEffectClrLst/>
+  </dgm:styleLbl>
+  <dgm:styleLbl name="alignAccFollowNode1">
+    <dgm:fillClrLst meth="repeat">
+      <a:schemeClr val="accent2">
+        <a:alpha val="90000"/>
+        <a:tint val="40000"/>
+      </a:schemeClr>
+    </dgm:fillClrLst>
+    <dgm:linClrLst meth="repeat">
+      <a:schemeClr val="accent2">
+        <a:alpha val="90000"/>
+        <a:tint val="40000"/>
+      </a:schemeClr>
+    </dgm:linClrLst>
+    <dgm:effectClrLst/>
+    <dgm:txLinClrLst/>
+    <dgm:txFillClrLst meth="repeat">
+      <a:schemeClr val="dk1"/>
+    </dgm:txFillClrLst>
+    <dgm:txEffectClrLst/>
+  </dgm:styleLbl>
+  <dgm:styleLbl name="bgAccFollowNode1">
+    <dgm:fillClrLst meth="repeat">
+      <a:schemeClr val="accent2">
+        <a:alpha val="90000"/>
+        <a:tint val="40000"/>
+      </a:schemeClr>
+    </dgm:fillClrLst>
+    <dgm:linClrLst meth="repeat">
+      <a:schemeClr val="accent2">
+        <a:alpha val="90000"/>
+        <a:tint val="40000"/>
+      </a:schemeClr>
+    </dgm:linClrLst>
+    <dgm:effectClrLst/>
+    <dgm:txLinClrLst/>
+    <dgm:txFillClrLst meth="repeat">
+      <a:schemeClr val="dk1"/>
+    </dgm:txFillClrLst>
+    <dgm:txEffectClrLst/>
+  </dgm:styleLbl>
+  <dgm:styleLbl name="fgAcc0">
+    <dgm:fillClrLst meth="repeat">
+      <a:schemeClr val="lt1">
+        <a:alpha val="90000"/>
+      </a:schemeClr>
+    </dgm:fillClrLst>
+    <dgm:linClrLst meth="repeat">
+      <a:schemeClr val="accent2"/>
+    </dgm:linClrLst>
+    <dgm:effectClrLst/>
+    <dgm:txLinClrLst/>
+    <dgm:txFillClrLst meth="repeat">
+      <a:schemeClr val="dk1"/>
+    </dgm:txFillClrLst>
+    <dgm:txEffectClrLst/>
+  </dgm:styleLbl>
+  <dgm:styleLbl name="fgAcc2">
+    <dgm:fillClrLst meth="repeat">
+      <a:schemeClr val="lt1">
+        <a:alpha val="90000"/>
+      </a:schemeClr>
+    </dgm:fillClrLst>
+    <dgm:linClrLst meth="repeat">
+      <a:schemeClr val="accent2"/>
+    </dgm:linClrLst>
+    <dgm:effectClrLst/>
+    <dgm:txLinClrLst/>
+    <dgm:txFillClrLst meth="repeat">
+      <a:schemeClr val="dk1"/>
+    </dgm:txFillClrLst>
+    <dgm:txEffectClrLst/>
+  </dgm:styleLbl>
+  <dgm:styleLbl name="fgAcc3">
+    <dgm:fillClrLst meth="repeat">
+      <a:schemeClr val="lt1">
+        <a:alpha val="90000"/>
+      </a:schemeClr>
+    </dgm:fillClrLst>
+    <dgm:linClrLst meth="repeat">
+      <a:schemeClr val="accent2"/>
+    </dgm:linClrLst>
+    <dgm:effectClrLst/>
+    <dgm:txLinClrLst/>
+    <dgm:txFillClrLst meth="repeat">
+      <a:schemeClr val="dk1"/>
+    </dgm:txFillClrLst>
+    <dgm:txEffectClrLst/>
+  </dgm:styleLbl>
+  <dgm:styleLbl name="fgAcc4">
+    <dgm:fillClrLst meth="repeat">
+      <a:schemeClr val="lt1">
+        <a:alpha val="90000"/>
+      </a:schemeClr>
+    </dgm:fillClrLst>
+    <dgm:linClrLst meth="repeat">
+      <a:schemeClr val="accent2"/>
+    </dgm:linClrLst>
+    <dgm:effectClrLst/>
+    <dgm:txLinClrLst/>
+    <dgm:txFillClrLst meth="repeat">
+      <a:schemeClr val="dk1"/>
+    </dgm:txFillClrLst>
+    <dgm:txEffectClrLst/>
+  </dgm:styleLbl>
+  <dgm:styleLbl name="bgShp">
+    <dgm:fillClrLst meth="repeat">
+      <a:schemeClr val="accent2">
+        <a:tint val="40000"/>
+      </a:schemeClr>
+    </dgm:fillClrLst>
+    <dgm:linClrLst meth="repeat">
+      <a:schemeClr val="accent2"/>
+    </dgm:linClrLst>
+    <dgm:effectClrLst/>
+    <dgm:txLinClrLst/>
+    <dgm:txFillClrLst meth="repeat">
+      <a:schemeClr val="dk1"/>
+    </dgm:txFillClrLst>
+    <dgm:txEffectClrLst/>
+  </dgm:styleLbl>
+  <dgm:styleLbl name="dkBgShp">
+    <dgm:fillClrLst meth="repeat">
+      <a:schemeClr val="accent2">
+        <a:shade val="80000"/>
+      </a:schemeClr>
+    </dgm:fillClrLst>
+    <dgm:linClrLst meth="repeat">
+      <a:schemeClr val="accent2"/>
+    </dgm:linClrLst>
+    <dgm:effectClrLst/>
+    <dgm:txLinClrLst/>
+    <dgm:txFillClrLst meth="repeat">
+      <a:schemeClr val="lt1"/>
+    </dgm:txFillClrLst>
+    <dgm:txEffectClrLst/>
+  </dgm:styleLbl>
+  <dgm:styleLbl name="trBgShp">
+    <dgm:fillClrLst meth="repeat">
+      <a:schemeClr val="accent2">
+        <a:tint val="50000"/>
+        <a:alpha val="40000"/>
+      </a:schemeClr>
+    </dgm:fillClrLst>
+    <dgm:linClrLst meth="repeat">
+      <a:schemeClr val="accent2"/>
+    </dgm:linClrLst>
+    <dgm:effectClrLst/>
+    <dgm:txLinClrLst/>
+    <dgm:txFillClrLst meth="repeat">
+      <a:schemeClr val="lt1"/>
+    </dgm:txFillClrLst>
+    <dgm:txEffectClrLst/>
+  </dgm:styleLbl>
+  <dgm:styleLbl name="fgShp">
+    <dgm:fillClrLst meth="repeat">
+      <a:schemeClr val="accent2">
         <a:tint val="60000"/>
       </a:schemeClr>
     </dgm:fillClrLst>
@@ -3665,6 +4414,332 @@
     <dgm:cxn modelId="{453B1680-E29C-4BA2-B738-7B557D69B21D}" type="presParOf" srcId="{3F07C48D-4CF5-44B4-886C-E6CA73F9205E}" destId="{3194247F-7CC7-416F-A24E-75AFEE7C784E}" srcOrd="4" destOrd="0" presId="urn:microsoft.com/office/officeart/2005/8/layout/default"/>
     <dgm:cxn modelId="{717C94ED-79D0-4039-B5DA-CCFCA195E400}" type="presParOf" srcId="{3F07C48D-4CF5-44B4-886C-E6CA73F9205E}" destId="{AD5E2901-E744-49AA-A29E-EFDF81F8CDFB}" srcOrd="5" destOrd="0" presId="urn:microsoft.com/office/officeart/2005/8/layout/default"/>
     <dgm:cxn modelId="{2154FE37-4587-4EC9-B36A-E444218F6B90}" type="presParOf" srcId="{3F07C48D-4CF5-44B4-886C-E6CA73F9205E}" destId="{D2058179-AF5F-4701-8FDF-155F3F835898}" srcOrd="6" destOrd="0" presId="urn:microsoft.com/office/officeart/2005/8/layout/default"/>
+  </dgm:cxnLst>
+  <dgm:bg/>
+  <dgm:whole/>
+  <dgm:extLst>
+    <a:ext uri="http://schemas.microsoft.com/office/drawing/2008/diagram">
+      <dsp:dataModelExt xmlns:dsp="http://schemas.microsoft.com/office/drawing/2008/diagram" relId="rId6" minVer="http://schemas.openxmlformats.org/drawingml/2006/diagram"/>
+    </a:ext>
+  </dgm:extLst>
+</dgm:dataModel>
+</file>
+
+<file path=ppt/diagrams/data4.xml><?xml version="1.0" encoding="utf-8"?>
+<dgm:dataModel xmlns:dgm="http://schemas.openxmlformats.org/drawingml/2006/diagram" xmlns:a="http://schemas.openxmlformats.org/drawingml/2006/main">
+  <dgm:ptLst>
+    <dgm:pt modelId="{14653475-6666-40B3-855F-6038B8845506}" type="doc">
+      <dgm:prSet loTypeId="urn:microsoft.com/office/officeart/2018/5/layout/CenteredIconLabelDescriptionList" loCatId="icon" qsTypeId="urn:microsoft.com/office/officeart/2005/8/quickstyle/simple1" qsCatId="simple" csTypeId="urn:microsoft.com/office/officeart/2005/8/colors/accent2_2" csCatId="accent2" phldr="1"/>
+      <dgm:spPr/>
+      <dgm:t>
+        <a:bodyPr/>
+        <a:lstStyle/>
+        <a:p>
+          <a:endParaRPr lang="en-US"/>
+        </a:p>
+      </dgm:t>
+    </dgm:pt>
+    <dgm:pt modelId="{A99A6EE9-E12A-416F-B804-AE7C792C2E8D}">
+      <dgm:prSet/>
+      <dgm:spPr/>
+      <dgm:t>
+        <a:bodyPr/>
+        <a:lstStyle/>
+        <a:p>
+          <a:pPr>
+            <a:defRPr b="1"/>
+          </a:pPr>
+          <a:r>
+            <a:rPr lang="es-ES" dirty="0"/>
+            <a:t>Cifrar</a:t>
+          </a:r>
+          <a:endParaRPr lang="en-US" dirty="0"/>
+        </a:p>
+      </dgm:t>
+    </dgm:pt>
+    <dgm:pt modelId="{B4698B80-BDEF-44B8-A851-7A8832A1A5CE}" type="parTrans" cxnId="{11CAF680-ADB6-4F38-9FDE-FD09530F5DAA}">
+      <dgm:prSet/>
+      <dgm:spPr/>
+      <dgm:t>
+        <a:bodyPr/>
+        <a:lstStyle/>
+        <a:p>
+          <a:endParaRPr lang="en-US"/>
+        </a:p>
+      </dgm:t>
+    </dgm:pt>
+    <dgm:pt modelId="{BB336DEF-0A41-4C50-830B-051E70ABAF0C}" type="sibTrans" cxnId="{11CAF680-ADB6-4F38-9FDE-FD09530F5DAA}">
+      <dgm:prSet/>
+      <dgm:spPr/>
+      <dgm:t>
+        <a:bodyPr/>
+        <a:lstStyle/>
+        <a:p>
+          <a:endParaRPr lang="en-US"/>
+        </a:p>
+      </dgm:t>
+    </dgm:pt>
+    <dgm:pt modelId="{ADCC4749-6A00-41BD-AE27-0819DD3303AB}">
+      <dgm:prSet/>
+      <dgm:spPr/>
+      <dgm:t>
+        <a:bodyPr/>
+        <a:lstStyle/>
+        <a:p>
+          <a:r>
+            <a:rPr lang="es-ES" dirty="0"/>
+            <a:t>RSA sirve para cifrar y descifrar información.</a:t>
+          </a:r>
+          <a:endParaRPr lang="en-US" dirty="0"/>
+        </a:p>
+      </dgm:t>
+    </dgm:pt>
+    <dgm:pt modelId="{1697DCD0-4999-4DF5-B392-0D7D7FF68A8F}" type="parTrans" cxnId="{67499677-8CF2-46B4-A333-31089C9F0AAC}">
+      <dgm:prSet/>
+      <dgm:spPr/>
+      <dgm:t>
+        <a:bodyPr/>
+        <a:lstStyle/>
+        <a:p>
+          <a:endParaRPr lang="en-US"/>
+        </a:p>
+      </dgm:t>
+    </dgm:pt>
+    <dgm:pt modelId="{91B5DDED-2D5F-4077-BF82-EFD9301F16DA}" type="sibTrans" cxnId="{67499677-8CF2-46B4-A333-31089C9F0AAC}">
+      <dgm:prSet/>
+      <dgm:spPr/>
+      <dgm:t>
+        <a:bodyPr/>
+        <a:lstStyle/>
+        <a:p>
+          <a:endParaRPr lang="en-US"/>
+        </a:p>
+      </dgm:t>
+    </dgm:pt>
+    <dgm:pt modelId="{36FC2824-DBDD-4C45-B540-5D9332BA13B4}">
+      <dgm:prSet/>
+      <dgm:spPr/>
+      <dgm:t>
+        <a:bodyPr/>
+        <a:lstStyle/>
+        <a:p>
+          <a:pPr>
+            <a:defRPr b="1"/>
+          </a:pPr>
+          <a:r>
+            <a:rPr lang="es-ES" dirty="0"/>
+            <a:t>Firmar</a:t>
+          </a:r>
+          <a:endParaRPr lang="en-US" dirty="0"/>
+        </a:p>
+      </dgm:t>
+    </dgm:pt>
+    <dgm:pt modelId="{363012B8-3C70-473E-896D-E33407BBD2CE}" type="parTrans" cxnId="{77797227-E27F-439C-ACB8-4242E5B3D66A}">
+      <dgm:prSet/>
+      <dgm:spPr/>
+      <dgm:t>
+        <a:bodyPr/>
+        <a:lstStyle/>
+        <a:p>
+          <a:endParaRPr lang="en-US"/>
+        </a:p>
+      </dgm:t>
+    </dgm:pt>
+    <dgm:pt modelId="{601CCBDA-9773-4AF4-B6A2-347DB10D22E5}" type="sibTrans" cxnId="{77797227-E27F-439C-ACB8-4242E5B3D66A}">
+      <dgm:prSet/>
+      <dgm:spPr/>
+      <dgm:t>
+        <a:bodyPr/>
+        <a:lstStyle/>
+        <a:p>
+          <a:endParaRPr lang="en-US"/>
+        </a:p>
+      </dgm:t>
+    </dgm:pt>
+    <dgm:pt modelId="{F0B42E0D-40C2-4F00-AF36-B354FAFED658}">
+      <dgm:prSet/>
+      <dgm:spPr/>
+      <dgm:t>
+        <a:bodyPr/>
+        <a:lstStyle/>
+        <a:p>
+          <a:r>
+            <a:rPr lang="es-ES" dirty="0"/>
+            <a:t>También si aplicamos la función con clave privada lo que hacemos es firmar la información para decir que nosotros hemos sido quien la ha emitido. </a:t>
+          </a:r>
+          <a:endParaRPr lang="en-US" dirty="0"/>
+        </a:p>
+      </dgm:t>
+    </dgm:pt>
+    <dgm:pt modelId="{C2ED0F3C-5EFC-4549-A9A4-BCC1FF7CE709}" type="parTrans" cxnId="{EB67282F-F4D4-4CA0-9BE3-5D932EFABE81}">
+      <dgm:prSet/>
+      <dgm:spPr/>
+      <dgm:t>
+        <a:bodyPr/>
+        <a:lstStyle/>
+        <a:p>
+          <a:endParaRPr lang="en-US"/>
+        </a:p>
+      </dgm:t>
+    </dgm:pt>
+    <dgm:pt modelId="{E633F85F-2A00-4D1D-A4A3-B13718869D34}" type="sibTrans" cxnId="{EB67282F-F4D4-4CA0-9BE3-5D932EFABE81}">
+      <dgm:prSet/>
+      <dgm:spPr/>
+      <dgm:t>
+        <a:bodyPr/>
+        <a:lstStyle/>
+        <a:p>
+          <a:endParaRPr lang="en-US"/>
+        </a:p>
+      </dgm:t>
+    </dgm:pt>
+    <dgm:pt modelId="{A36FF52E-1AF5-4499-94D0-EEAC5CB383CA}" type="pres">
+      <dgm:prSet presAssocID="{14653475-6666-40B3-855F-6038B8845506}" presName="root" presStyleCnt="0">
+        <dgm:presLayoutVars>
+          <dgm:dir/>
+          <dgm:resizeHandles val="exact"/>
+        </dgm:presLayoutVars>
+      </dgm:prSet>
+      <dgm:spPr/>
+    </dgm:pt>
+    <dgm:pt modelId="{DAE42939-73A3-42C8-91EB-F37D4453D29D}" type="pres">
+      <dgm:prSet presAssocID="{A99A6EE9-E12A-416F-B804-AE7C792C2E8D}" presName="compNode" presStyleCnt="0"/>
+      <dgm:spPr/>
+    </dgm:pt>
+    <dgm:pt modelId="{BE41307F-4609-4DA1-92E6-F1CD60E16F64}" type="pres">
+      <dgm:prSet presAssocID="{A99A6EE9-E12A-416F-B804-AE7C792C2E8D}" presName="iconRect" presStyleLbl="node1" presStyleIdx="0" presStyleCnt="2"/>
+      <dgm:spPr>
+        <a:blipFill>
+          <a:blip xmlns:r="http://schemas.openxmlformats.org/officeDocument/2006/relationships" r:embed="rId1">
+            <a:extLst>
+              <a:ext uri="{28A0092B-C50C-407E-A947-70E740481C1C}">
+                <a14:useLocalDpi xmlns:a14="http://schemas.microsoft.com/office/drawing/2010/main" val="0"/>
+              </a:ext>
+              <a:ext uri="{96DAC541-7B7A-43D3-8B79-37D633B846F1}">
+                <asvg:svgBlip xmlns:asvg="http://schemas.microsoft.com/office/drawing/2016/SVG/main" r:embed="rId2"/>
+              </a:ext>
+            </a:extLst>
+          </a:blip>
+          <a:stretch>
+            <a:fillRect/>
+          </a:stretch>
+        </a:blipFill>
+        <a:ln>
+          <a:noFill/>
+        </a:ln>
+      </dgm:spPr>
+      <dgm:extLst>
+        <a:ext uri="{E40237B7-FDA0-4F09-8148-C483321AD2D9}">
+          <dgm14:cNvPr xmlns:dgm14="http://schemas.microsoft.com/office/drawing/2010/diagram" id="0" name="" descr="Clave"/>
+        </a:ext>
+      </dgm:extLst>
+    </dgm:pt>
+    <dgm:pt modelId="{E22AC201-640A-40AC-88F0-57B65A4D4C0D}" type="pres">
+      <dgm:prSet presAssocID="{A99A6EE9-E12A-416F-B804-AE7C792C2E8D}" presName="iconSpace" presStyleCnt="0"/>
+      <dgm:spPr/>
+    </dgm:pt>
+    <dgm:pt modelId="{F8034362-D833-4994-9A93-0DFE286E66E4}" type="pres">
+      <dgm:prSet presAssocID="{A99A6EE9-E12A-416F-B804-AE7C792C2E8D}" presName="parTx" presStyleLbl="revTx" presStyleIdx="0" presStyleCnt="4">
+        <dgm:presLayoutVars>
+          <dgm:chMax val="0"/>
+          <dgm:chPref val="0"/>
+        </dgm:presLayoutVars>
+      </dgm:prSet>
+      <dgm:spPr/>
+    </dgm:pt>
+    <dgm:pt modelId="{9C93133B-197D-4C30-8617-B0B80B4BB8CB}" type="pres">
+      <dgm:prSet presAssocID="{A99A6EE9-E12A-416F-B804-AE7C792C2E8D}" presName="txSpace" presStyleCnt="0"/>
+      <dgm:spPr/>
+    </dgm:pt>
+    <dgm:pt modelId="{8F90CF00-E32C-47AD-82BA-2A1E06B29D64}" type="pres">
+      <dgm:prSet presAssocID="{A99A6EE9-E12A-416F-B804-AE7C792C2E8D}" presName="desTx" presStyleLbl="revTx" presStyleIdx="1" presStyleCnt="4">
+        <dgm:presLayoutVars/>
+      </dgm:prSet>
+      <dgm:spPr/>
+    </dgm:pt>
+    <dgm:pt modelId="{5F624C8A-AEF1-4019-9C7A-16A1878DB061}" type="pres">
+      <dgm:prSet presAssocID="{BB336DEF-0A41-4C50-830B-051E70ABAF0C}" presName="sibTrans" presStyleCnt="0"/>
+      <dgm:spPr/>
+    </dgm:pt>
+    <dgm:pt modelId="{1E25E05F-1E27-40D0-B9C4-391C204BC306}" type="pres">
+      <dgm:prSet presAssocID="{36FC2824-DBDD-4C45-B540-5D9332BA13B4}" presName="compNode" presStyleCnt="0"/>
+      <dgm:spPr/>
+    </dgm:pt>
+    <dgm:pt modelId="{40186866-01A9-4EC4-9412-6FAD4537D0B5}" type="pres">
+      <dgm:prSet presAssocID="{36FC2824-DBDD-4C45-B540-5D9332BA13B4}" presName="iconRect" presStyleLbl="node1" presStyleIdx="1" presStyleCnt="2"/>
+      <dgm:spPr>
+        <a:blipFill>
+          <a:blip xmlns:r="http://schemas.openxmlformats.org/officeDocument/2006/relationships" r:embed="rId3">
+            <a:extLst>
+              <a:ext uri="{28A0092B-C50C-407E-A947-70E740481C1C}">
+                <a14:useLocalDpi xmlns:a14="http://schemas.microsoft.com/office/drawing/2010/main" val="0"/>
+              </a:ext>
+              <a:ext uri="{96DAC541-7B7A-43D3-8B79-37D633B846F1}">
+                <asvg:svgBlip xmlns:asvg="http://schemas.microsoft.com/office/drawing/2016/SVG/main" r:embed="rId4"/>
+              </a:ext>
+            </a:extLst>
+          </a:blip>
+          <a:stretch>
+            <a:fillRect/>
+          </a:stretch>
+        </a:blipFill>
+        <a:ln>
+          <a:noFill/>
+        </a:ln>
+      </dgm:spPr>
+      <dgm:extLst>
+        <a:ext uri="{E40237B7-FDA0-4F09-8148-C483321AD2D9}">
+          <dgm14:cNvPr xmlns:dgm14="http://schemas.microsoft.com/office/drawing/2010/diagram" id="0" name="" descr="Marca de verificación"/>
+        </a:ext>
+      </dgm:extLst>
+    </dgm:pt>
+    <dgm:pt modelId="{CDC841D8-DF9E-4BCB-8993-0AB1B88C5521}" type="pres">
+      <dgm:prSet presAssocID="{36FC2824-DBDD-4C45-B540-5D9332BA13B4}" presName="iconSpace" presStyleCnt="0"/>
+      <dgm:spPr/>
+    </dgm:pt>
+    <dgm:pt modelId="{403A7BA3-E739-4585-A022-5AD0058551A5}" type="pres">
+      <dgm:prSet presAssocID="{36FC2824-DBDD-4C45-B540-5D9332BA13B4}" presName="parTx" presStyleLbl="revTx" presStyleIdx="2" presStyleCnt="4">
+        <dgm:presLayoutVars>
+          <dgm:chMax val="0"/>
+          <dgm:chPref val="0"/>
+        </dgm:presLayoutVars>
+      </dgm:prSet>
+      <dgm:spPr/>
+    </dgm:pt>
+    <dgm:pt modelId="{151F0506-2D47-465C-B6BA-7F4C20B8D043}" type="pres">
+      <dgm:prSet presAssocID="{36FC2824-DBDD-4C45-B540-5D9332BA13B4}" presName="txSpace" presStyleCnt="0"/>
+      <dgm:spPr/>
+    </dgm:pt>
+    <dgm:pt modelId="{84105D38-168B-4EAC-95C3-C563665F908C}" type="pres">
+      <dgm:prSet presAssocID="{36FC2824-DBDD-4C45-B540-5D9332BA13B4}" presName="desTx" presStyleLbl="revTx" presStyleIdx="3" presStyleCnt="4">
+        <dgm:presLayoutVars/>
+      </dgm:prSet>
+      <dgm:spPr/>
+    </dgm:pt>
+  </dgm:ptLst>
+  <dgm:cxnLst>
+    <dgm:cxn modelId="{77797227-E27F-439C-ACB8-4242E5B3D66A}" srcId="{14653475-6666-40B3-855F-6038B8845506}" destId="{36FC2824-DBDD-4C45-B540-5D9332BA13B4}" srcOrd="1" destOrd="0" parTransId="{363012B8-3C70-473E-896D-E33407BBD2CE}" sibTransId="{601CCBDA-9773-4AF4-B6A2-347DB10D22E5}"/>
+    <dgm:cxn modelId="{EB67282F-F4D4-4CA0-9BE3-5D932EFABE81}" srcId="{36FC2824-DBDD-4C45-B540-5D9332BA13B4}" destId="{F0B42E0D-40C2-4F00-AF36-B354FAFED658}" srcOrd="0" destOrd="0" parTransId="{C2ED0F3C-5EFC-4549-A9A4-BCC1FF7CE709}" sibTransId="{E633F85F-2A00-4D1D-A4A3-B13718869D34}"/>
+    <dgm:cxn modelId="{67499677-8CF2-46B4-A333-31089C9F0AAC}" srcId="{A99A6EE9-E12A-416F-B804-AE7C792C2E8D}" destId="{ADCC4749-6A00-41BD-AE27-0819DD3303AB}" srcOrd="0" destOrd="0" parTransId="{1697DCD0-4999-4DF5-B392-0D7D7FF68A8F}" sibTransId="{91B5DDED-2D5F-4077-BF82-EFD9301F16DA}"/>
+    <dgm:cxn modelId="{5309567A-5FF3-4A9B-A153-AEA869B37C6F}" type="presOf" srcId="{ADCC4749-6A00-41BD-AE27-0819DD3303AB}" destId="{8F90CF00-E32C-47AD-82BA-2A1E06B29D64}" srcOrd="0" destOrd="0" presId="urn:microsoft.com/office/officeart/2018/5/layout/CenteredIconLabelDescriptionList"/>
+    <dgm:cxn modelId="{BC6E1B7C-B536-4AF2-9D7A-E8D253E434F7}" type="presOf" srcId="{A99A6EE9-E12A-416F-B804-AE7C792C2E8D}" destId="{F8034362-D833-4994-9A93-0DFE286E66E4}" srcOrd="0" destOrd="0" presId="urn:microsoft.com/office/officeart/2018/5/layout/CenteredIconLabelDescriptionList"/>
+    <dgm:cxn modelId="{11CAF680-ADB6-4F38-9FDE-FD09530F5DAA}" srcId="{14653475-6666-40B3-855F-6038B8845506}" destId="{A99A6EE9-E12A-416F-B804-AE7C792C2E8D}" srcOrd="0" destOrd="0" parTransId="{B4698B80-BDEF-44B8-A851-7A8832A1A5CE}" sibTransId="{BB336DEF-0A41-4C50-830B-051E70ABAF0C}"/>
+    <dgm:cxn modelId="{178E5ABC-ED6A-4AFC-AA34-1091A1C84455}" type="presOf" srcId="{14653475-6666-40B3-855F-6038B8845506}" destId="{A36FF52E-1AF5-4499-94D0-EEAC5CB383CA}" srcOrd="0" destOrd="0" presId="urn:microsoft.com/office/officeart/2018/5/layout/CenteredIconLabelDescriptionList"/>
+    <dgm:cxn modelId="{7A6919C3-031E-40E0-B667-B73CB9345256}" type="presOf" srcId="{36FC2824-DBDD-4C45-B540-5D9332BA13B4}" destId="{403A7BA3-E739-4585-A022-5AD0058551A5}" srcOrd="0" destOrd="0" presId="urn:microsoft.com/office/officeart/2018/5/layout/CenteredIconLabelDescriptionList"/>
+    <dgm:cxn modelId="{059B47CD-0876-4A3E-9470-2BB7DE447C35}" type="presOf" srcId="{F0B42E0D-40C2-4F00-AF36-B354FAFED658}" destId="{84105D38-168B-4EAC-95C3-C563665F908C}" srcOrd="0" destOrd="0" presId="urn:microsoft.com/office/officeart/2018/5/layout/CenteredIconLabelDescriptionList"/>
+    <dgm:cxn modelId="{E4CEDE52-40FC-4DFA-B394-408615E71A4C}" type="presParOf" srcId="{A36FF52E-1AF5-4499-94D0-EEAC5CB383CA}" destId="{DAE42939-73A3-42C8-91EB-F37D4453D29D}" srcOrd="0" destOrd="0" presId="urn:microsoft.com/office/officeart/2018/5/layout/CenteredIconLabelDescriptionList"/>
+    <dgm:cxn modelId="{50946C6C-8439-4888-B327-C0683338E859}" type="presParOf" srcId="{DAE42939-73A3-42C8-91EB-F37D4453D29D}" destId="{BE41307F-4609-4DA1-92E6-F1CD60E16F64}" srcOrd="0" destOrd="0" presId="urn:microsoft.com/office/officeart/2018/5/layout/CenteredIconLabelDescriptionList"/>
+    <dgm:cxn modelId="{B6A519C6-013D-4C7A-8A32-3581D66C8886}" type="presParOf" srcId="{DAE42939-73A3-42C8-91EB-F37D4453D29D}" destId="{E22AC201-640A-40AC-88F0-57B65A4D4C0D}" srcOrd="1" destOrd="0" presId="urn:microsoft.com/office/officeart/2018/5/layout/CenteredIconLabelDescriptionList"/>
+    <dgm:cxn modelId="{99984133-25B8-43F8-82CD-6ED13DC32E60}" type="presParOf" srcId="{DAE42939-73A3-42C8-91EB-F37D4453D29D}" destId="{F8034362-D833-4994-9A93-0DFE286E66E4}" srcOrd="2" destOrd="0" presId="urn:microsoft.com/office/officeart/2018/5/layout/CenteredIconLabelDescriptionList"/>
+    <dgm:cxn modelId="{EAAFDEB9-46D6-4005-AB8E-D85682C2F5A6}" type="presParOf" srcId="{DAE42939-73A3-42C8-91EB-F37D4453D29D}" destId="{9C93133B-197D-4C30-8617-B0B80B4BB8CB}" srcOrd="3" destOrd="0" presId="urn:microsoft.com/office/officeart/2018/5/layout/CenteredIconLabelDescriptionList"/>
+    <dgm:cxn modelId="{BCBCDEE4-1D2F-4598-9AB5-D223D898E1A1}" type="presParOf" srcId="{DAE42939-73A3-42C8-91EB-F37D4453D29D}" destId="{8F90CF00-E32C-47AD-82BA-2A1E06B29D64}" srcOrd="4" destOrd="0" presId="urn:microsoft.com/office/officeart/2018/5/layout/CenteredIconLabelDescriptionList"/>
+    <dgm:cxn modelId="{45904F42-649B-4580-908D-4CBA7CF1BF01}" type="presParOf" srcId="{A36FF52E-1AF5-4499-94D0-EEAC5CB383CA}" destId="{5F624C8A-AEF1-4019-9C7A-16A1878DB061}" srcOrd="1" destOrd="0" presId="urn:microsoft.com/office/officeart/2018/5/layout/CenteredIconLabelDescriptionList"/>
+    <dgm:cxn modelId="{E84C3CF3-3B9E-4CCD-809B-E402FD0B9775}" type="presParOf" srcId="{A36FF52E-1AF5-4499-94D0-EEAC5CB383CA}" destId="{1E25E05F-1E27-40D0-B9C4-391C204BC306}" srcOrd="2" destOrd="0" presId="urn:microsoft.com/office/officeart/2018/5/layout/CenteredIconLabelDescriptionList"/>
+    <dgm:cxn modelId="{ECBF8D7A-9019-479B-B4F9-D3ED132E2730}" type="presParOf" srcId="{1E25E05F-1E27-40D0-B9C4-391C204BC306}" destId="{40186866-01A9-4EC4-9412-6FAD4537D0B5}" srcOrd="0" destOrd="0" presId="urn:microsoft.com/office/officeart/2018/5/layout/CenteredIconLabelDescriptionList"/>
+    <dgm:cxn modelId="{7385A7F5-D77C-4A50-AC0A-8923FCFD3632}" type="presParOf" srcId="{1E25E05F-1E27-40D0-B9C4-391C204BC306}" destId="{CDC841D8-DF9E-4BCB-8993-0AB1B88C5521}" srcOrd="1" destOrd="0" presId="urn:microsoft.com/office/officeart/2018/5/layout/CenteredIconLabelDescriptionList"/>
+    <dgm:cxn modelId="{C51A18D7-0C59-41B7-8FE7-7F172EF43ECA}" type="presParOf" srcId="{1E25E05F-1E27-40D0-B9C4-391C204BC306}" destId="{403A7BA3-E739-4585-A022-5AD0058551A5}" srcOrd="2" destOrd="0" presId="urn:microsoft.com/office/officeart/2018/5/layout/CenteredIconLabelDescriptionList"/>
+    <dgm:cxn modelId="{E2ED80D4-DAC0-4F4E-95EA-77FB8BDC890D}" type="presParOf" srcId="{1E25E05F-1E27-40D0-B9C4-391C204BC306}" destId="{151F0506-2D47-465C-B6BA-7F4C20B8D043}" srcOrd="3" destOrd="0" presId="urn:microsoft.com/office/officeart/2018/5/layout/CenteredIconLabelDescriptionList"/>
+    <dgm:cxn modelId="{832885E0-63B8-4DAC-A60D-E115CDA908DA}" type="presParOf" srcId="{1E25E05F-1E27-40D0-B9C4-391C204BC306}" destId="{84105D38-168B-4EAC-95C3-C563665F908C}" srcOrd="4" destOrd="0" presId="urn:microsoft.com/office/officeart/2018/5/layout/CenteredIconLabelDescriptionList"/>
   </dgm:cxnLst>
   <dgm:bg/>
   <dgm:whole/>
@@ -5254,6 +6329,364 @@
       <dsp:txXfrm>
         <a:off x="4114578" y="1818293"/>
         <a:ext cx="2596312" cy="1557787"/>
+      </dsp:txXfrm>
+    </dsp:sp>
+  </dsp:spTree>
+</dsp:drawing>
+</file>
+
+<file path=ppt/diagrams/drawing4.xml><?xml version="1.0" encoding="utf-8"?>
+<dsp:drawing xmlns:dgm="http://schemas.openxmlformats.org/drawingml/2006/diagram" xmlns:dsp="http://schemas.microsoft.com/office/drawing/2008/diagram" xmlns:a="http://schemas.openxmlformats.org/drawingml/2006/main">
+  <dsp:spTree>
+    <dsp:nvGrpSpPr>
+      <dsp:cNvPr id="0" name=""/>
+      <dsp:cNvGrpSpPr/>
+    </dsp:nvGrpSpPr>
+    <dsp:grpSpPr/>
+    <dsp:sp modelId="{BE41307F-4609-4DA1-92E6-F1CD60E16F64}">
+      <dsp:nvSpPr>
+        <dsp:cNvPr id="0" name=""/>
+        <dsp:cNvSpPr/>
+      </dsp:nvSpPr>
+      <dsp:spPr>
+        <a:xfrm>
+          <a:off x="2283840" y="225610"/>
+          <a:ext cx="1512000" cy="1512000"/>
+        </a:xfrm>
+        <a:prstGeom prst="rect">
+          <a:avLst/>
+        </a:prstGeom>
+        <a:blipFill>
+          <a:blip xmlns:r="http://schemas.openxmlformats.org/officeDocument/2006/relationships" r:embed="rId1">
+            <a:extLst>
+              <a:ext uri="{28A0092B-C50C-407E-A947-70E740481C1C}">
+                <a14:useLocalDpi xmlns:a14="http://schemas.microsoft.com/office/drawing/2010/main" val="0"/>
+              </a:ext>
+              <a:ext uri="{96DAC541-7B7A-43D3-8B79-37D633B846F1}">
+                <asvg:svgBlip xmlns:asvg="http://schemas.microsoft.com/office/drawing/2016/SVG/main" r:embed="rId2"/>
+              </a:ext>
+            </a:extLst>
+          </a:blip>
+          <a:stretch>
+            <a:fillRect/>
+          </a:stretch>
+        </a:blipFill>
+        <a:ln w="19050" cap="flat" cmpd="sng" algn="ctr">
+          <a:noFill/>
+          <a:prstDash val="solid"/>
+          <a:miter lim="800000"/>
+        </a:ln>
+        <a:effectLst/>
+      </dsp:spPr>
+      <dsp:style>
+        <a:lnRef idx="2">
+          <a:scrgbClr r="0" g="0" b="0"/>
+        </a:lnRef>
+        <a:fillRef idx="1">
+          <a:scrgbClr r="0" g="0" b="0"/>
+        </a:fillRef>
+        <a:effectRef idx="0">
+          <a:scrgbClr r="0" g="0" b="0"/>
+        </a:effectRef>
+        <a:fontRef idx="minor">
+          <a:schemeClr val="lt1"/>
+        </a:fontRef>
+      </dsp:style>
+    </dsp:sp>
+    <dsp:sp modelId="{F8034362-D833-4994-9A93-0DFE286E66E4}">
+      <dsp:nvSpPr>
+        <dsp:cNvPr id="0" name=""/>
+        <dsp:cNvSpPr/>
+      </dsp:nvSpPr>
+      <dsp:spPr>
+        <a:xfrm>
+          <a:off x="879840" y="1880202"/>
+          <a:ext cx="4320000" cy="648000"/>
+        </a:xfrm>
+        <a:prstGeom prst="rect">
+          <a:avLst/>
+        </a:prstGeom>
+        <a:noFill/>
+        <a:ln>
+          <a:noFill/>
+        </a:ln>
+        <a:effectLst/>
+      </dsp:spPr>
+      <dsp:style>
+        <a:lnRef idx="0">
+          <a:scrgbClr r="0" g="0" b="0"/>
+        </a:lnRef>
+        <a:fillRef idx="0">
+          <a:scrgbClr r="0" g="0" b="0"/>
+        </a:fillRef>
+        <a:effectRef idx="0">
+          <a:scrgbClr r="0" g="0" b="0"/>
+        </a:effectRef>
+        <a:fontRef idx="minor"/>
+      </dsp:style>
+      <dsp:txBody>
+        <a:bodyPr spcFirstLastPara="0" vert="horz" wrap="square" lIns="0" tIns="0" rIns="0" bIns="0" numCol="1" spcCol="1270" anchor="t" anchorCtr="0">
+          <a:noAutofit/>
+        </a:bodyPr>
+        <a:lstStyle/>
+        <a:p>
+          <a:pPr marL="0" lvl="0" indent="0" algn="ctr" defTabSz="1600200">
+            <a:lnSpc>
+              <a:spcPct val="90000"/>
+            </a:lnSpc>
+            <a:spcBef>
+              <a:spcPct val="0"/>
+            </a:spcBef>
+            <a:spcAft>
+              <a:spcPct val="35000"/>
+            </a:spcAft>
+            <a:buNone/>
+            <a:defRPr b="1"/>
+          </a:pPr>
+          <a:r>
+            <a:rPr lang="es-ES" sz="3600" kern="1200" dirty="0"/>
+            <a:t>Cifrar</a:t>
+          </a:r>
+          <a:endParaRPr lang="en-US" sz="3600" kern="1200" dirty="0"/>
+        </a:p>
+      </dsp:txBody>
+      <dsp:txXfrm>
+        <a:off x="879840" y="1880202"/>
+        <a:ext cx="4320000" cy="648000"/>
+      </dsp:txXfrm>
+    </dsp:sp>
+    <dsp:sp modelId="{8F90CF00-E32C-47AD-82BA-2A1E06B29D64}">
+      <dsp:nvSpPr>
+        <dsp:cNvPr id="0" name=""/>
+        <dsp:cNvSpPr/>
+      </dsp:nvSpPr>
+      <dsp:spPr>
+        <a:xfrm>
+          <a:off x="879840" y="2594524"/>
+          <a:ext cx="4320000" cy="947193"/>
+        </a:xfrm>
+        <a:prstGeom prst="rect">
+          <a:avLst/>
+        </a:prstGeom>
+        <a:noFill/>
+        <a:ln>
+          <a:noFill/>
+        </a:ln>
+        <a:effectLst/>
+      </dsp:spPr>
+      <dsp:style>
+        <a:lnRef idx="0">
+          <a:scrgbClr r="0" g="0" b="0"/>
+        </a:lnRef>
+        <a:fillRef idx="0">
+          <a:scrgbClr r="0" g="0" b="0"/>
+        </a:fillRef>
+        <a:effectRef idx="0">
+          <a:scrgbClr r="0" g="0" b="0"/>
+        </a:effectRef>
+        <a:fontRef idx="minor"/>
+      </dsp:style>
+      <dsp:txBody>
+        <a:bodyPr spcFirstLastPara="0" vert="horz" wrap="square" lIns="0" tIns="0" rIns="0" bIns="0" numCol="1" spcCol="1270" anchor="t" anchorCtr="0">
+          <a:noAutofit/>
+        </a:bodyPr>
+        <a:lstStyle/>
+        <a:p>
+          <a:pPr marL="0" lvl="0" indent="0" algn="ctr" defTabSz="755650">
+            <a:lnSpc>
+              <a:spcPct val="90000"/>
+            </a:lnSpc>
+            <a:spcBef>
+              <a:spcPct val="0"/>
+            </a:spcBef>
+            <a:spcAft>
+              <a:spcPct val="35000"/>
+            </a:spcAft>
+            <a:buNone/>
+          </a:pPr>
+          <a:r>
+            <a:rPr lang="es-ES" sz="1700" kern="1200" dirty="0"/>
+            <a:t>RSA sirve para cifrar y descifrar información.</a:t>
+          </a:r>
+          <a:endParaRPr lang="en-US" sz="1700" kern="1200" dirty="0"/>
+        </a:p>
+      </dsp:txBody>
+      <dsp:txXfrm>
+        <a:off x="879840" y="2594524"/>
+        <a:ext cx="4320000" cy="947193"/>
+      </dsp:txXfrm>
+    </dsp:sp>
+    <dsp:sp modelId="{40186866-01A9-4EC4-9412-6FAD4537D0B5}">
+      <dsp:nvSpPr>
+        <dsp:cNvPr id="0" name=""/>
+        <dsp:cNvSpPr/>
+      </dsp:nvSpPr>
+      <dsp:spPr>
+        <a:xfrm>
+          <a:off x="7359840" y="225610"/>
+          <a:ext cx="1512000" cy="1512000"/>
+        </a:xfrm>
+        <a:prstGeom prst="rect">
+          <a:avLst/>
+        </a:prstGeom>
+        <a:blipFill>
+          <a:blip xmlns:r="http://schemas.openxmlformats.org/officeDocument/2006/relationships" r:embed="rId3">
+            <a:extLst>
+              <a:ext uri="{28A0092B-C50C-407E-A947-70E740481C1C}">
+                <a14:useLocalDpi xmlns:a14="http://schemas.microsoft.com/office/drawing/2010/main" val="0"/>
+              </a:ext>
+              <a:ext uri="{96DAC541-7B7A-43D3-8B79-37D633B846F1}">
+                <asvg:svgBlip xmlns:asvg="http://schemas.microsoft.com/office/drawing/2016/SVG/main" r:embed="rId4"/>
+              </a:ext>
+            </a:extLst>
+          </a:blip>
+          <a:stretch>
+            <a:fillRect/>
+          </a:stretch>
+        </a:blipFill>
+        <a:ln w="19050" cap="flat" cmpd="sng" algn="ctr">
+          <a:noFill/>
+          <a:prstDash val="solid"/>
+          <a:miter lim="800000"/>
+        </a:ln>
+        <a:effectLst/>
+      </dsp:spPr>
+      <dsp:style>
+        <a:lnRef idx="2">
+          <a:scrgbClr r="0" g="0" b="0"/>
+        </a:lnRef>
+        <a:fillRef idx="1">
+          <a:scrgbClr r="0" g="0" b="0"/>
+        </a:fillRef>
+        <a:effectRef idx="0">
+          <a:scrgbClr r="0" g="0" b="0"/>
+        </a:effectRef>
+        <a:fontRef idx="minor">
+          <a:schemeClr val="lt1"/>
+        </a:fontRef>
+      </dsp:style>
+    </dsp:sp>
+    <dsp:sp modelId="{403A7BA3-E739-4585-A022-5AD0058551A5}">
+      <dsp:nvSpPr>
+        <dsp:cNvPr id="0" name=""/>
+        <dsp:cNvSpPr/>
+      </dsp:nvSpPr>
+      <dsp:spPr>
+        <a:xfrm>
+          <a:off x="5955840" y="1880202"/>
+          <a:ext cx="4320000" cy="648000"/>
+        </a:xfrm>
+        <a:prstGeom prst="rect">
+          <a:avLst/>
+        </a:prstGeom>
+        <a:noFill/>
+        <a:ln>
+          <a:noFill/>
+        </a:ln>
+        <a:effectLst/>
+      </dsp:spPr>
+      <dsp:style>
+        <a:lnRef idx="0">
+          <a:scrgbClr r="0" g="0" b="0"/>
+        </a:lnRef>
+        <a:fillRef idx="0">
+          <a:scrgbClr r="0" g="0" b="0"/>
+        </a:fillRef>
+        <a:effectRef idx="0">
+          <a:scrgbClr r="0" g="0" b="0"/>
+        </a:effectRef>
+        <a:fontRef idx="minor"/>
+      </dsp:style>
+      <dsp:txBody>
+        <a:bodyPr spcFirstLastPara="0" vert="horz" wrap="square" lIns="0" tIns="0" rIns="0" bIns="0" numCol="1" spcCol="1270" anchor="t" anchorCtr="0">
+          <a:noAutofit/>
+        </a:bodyPr>
+        <a:lstStyle/>
+        <a:p>
+          <a:pPr marL="0" lvl="0" indent="0" algn="ctr" defTabSz="1600200">
+            <a:lnSpc>
+              <a:spcPct val="90000"/>
+            </a:lnSpc>
+            <a:spcBef>
+              <a:spcPct val="0"/>
+            </a:spcBef>
+            <a:spcAft>
+              <a:spcPct val="35000"/>
+            </a:spcAft>
+            <a:buNone/>
+            <a:defRPr b="1"/>
+          </a:pPr>
+          <a:r>
+            <a:rPr lang="es-ES" sz="3600" kern="1200" dirty="0"/>
+            <a:t>Firmar</a:t>
+          </a:r>
+          <a:endParaRPr lang="en-US" sz="3600" kern="1200" dirty="0"/>
+        </a:p>
+      </dsp:txBody>
+      <dsp:txXfrm>
+        <a:off x="5955840" y="1880202"/>
+        <a:ext cx="4320000" cy="648000"/>
+      </dsp:txXfrm>
+    </dsp:sp>
+    <dsp:sp modelId="{84105D38-168B-4EAC-95C3-C563665F908C}">
+      <dsp:nvSpPr>
+        <dsp:cNvPr id="0" name=""/>
+        <dsp:cNvSpPr/>
+      </dsp:nvSpPr>
+      <dsp:spPr>
+        <a:xfrm>
+          <a:off x="5955840" y="2594524"/>
+          <a:ext cx="4320000" cy="947193"/>
+        </a:xfrm>
+        <a:prstGeom prst="rect">
+          <a:avLst/>
+        </a:prstGeom>
+        <a:noFill/>
+        <a:ln>
+          <a:noFill/>
+        </a:ln>
+        <a:effectLst/>
+      </dsp:spPr>
+      <dsp:style>
+        <a:lnRef idx="0">
+          <a:scrgbClr r="0" g="0" b="0"/>
+        </a:lnRef>
+        <a:fillRef idx="0">
+          <a:scrgbClr r="0" g="0" b="0"/>
+        </a:fillRef>
+        <a:effectRef idx="0">
+          <a:scrgbClr r="0" g="0" b="0"/>
+        </a:effectRef>
+        <a:fontRef idx="minor"/>
+      </dsp:style>
+      <dsp:txBody>
+        <a:bodyPr spcFirstLastPara="0" vert="horz" wrap="square" lIns="0" tIns="0" rIns="0" bIns="0" numCol="1" spcCol="1270" anchor="t" anchorCtr="0">
+          <a:noAutofit/>
+        </a:bodyPr>
+        <a:lstStyle/>
+        <a:p>
+          <a:pPr marL="0" lvl="0" indent="0" algn="ctr" defTabSz="755650">
+            <a:lnSpc>
+              <a:spcPct val="90000"/>
+            </a:lnSpc>
+            <a:spcBef>
+              <a:spcPct val="0"/>
+            </a:spcBef>
+            <a:spcAft>
+              <a:spcPct val="35000"/>
+            </a:spcAft>
+            <a:buNone/>
+          </a:pPr>
+          <a:r>
+            <a:rPr lang="es-ES" sz="1700" kern="1200" dirty="0"/>
+            <a:t>También si aplicamos la función con clave privada lo que hacemos es firmar la información para decir que nosotros hemos sido quien la ha emitido. </a:t>
+          </a:r>
+          <a:endParaRPr lang="en-US" sz="1700" kern="1200" dirty="0"/>
+        </a:p>
+      </dsp:txBody>
+      <dsp:txXfrm>
+        <a:off x="5955840" y="2594524"/>
+        <a:ext cx="4320000" cy="947193"/>
       </dsp:txXfrm>
     </dsp:sp>
   </dsp:spTree>
@@ -5916,6 +7349,207 @@
 </dgm:layoutDef>
 </file>
 
+<file path=ppt/diagrams/layout4.xml><?xml version="1.0" encoding="utf-8"?>
+<dgm:layoutDef xmlns:dgm="http://schemas.openxmlformats.org/drawingml/2006/diagram" xmlns:a="http://schemas.openxmlformats.org/drawingml/2006/main" uniqueId="urn:microsoft.com/office/officeart/2018/5/layout/CenteredIconLabelDescriptionList">
+  <dgm:title val="Centered Icon Label Description List"/>
+  <dgm:desc val="Use to show non-sequential or grouped chunks of information. The placeholder holds an icon or small picture, and corresponding text boxes show Level 1 and Level 2 text respectively. Works well for minimal Level 1 text accompanied by lengthier Level two text."/>
+  <dgm:catLst>
+    <dgm:cat type="icon" pri="500"/>
+  </dgm:catLst>
+  <dgm:sampData useDef="1">
+    <dgm:dataModel>
+      <dgm:ptLst/>
+      <dgm:bg/>
+      <dgm:whole/>
+    </dgm:dataModel>
+  </dgm:sampData>
+  <dgm:styleData useDef="1">
+    <dgm:dataModel>
+      <dgm:ptLst/>
+      <dgm:bg/>
+      <dgm:whole/>
+    </dgm:dataModel>
+  </dgm:styleData>
+  <dgm:clrData useDef="1">
+    <dgm:dataModel>
+      <dgm:ptLst/>
+      <dgm:bg/>
+      <dgm:whole/>
+    </dgm:dataModel>
+  </dgm:clrData>
+  <dgm:layoutNode name="root">
+    <dgm:varLst>
+      <dgm:dir/>
+      <dgm:resizeHandles val="exact"/>
+    </dgm:varLst>
+    <dgm:choose name="Name0">
+      <dgm:if name="Name1" axis="self" func="var" arg="dir" op="equ" val="norm">
+        <dgm:alg type="lin"/>
+      </dgm:if>
+      <dgm:else name="Name2">
+        <dgm:alg type="lin">
+          <dgm:param type="linDir" val="fromR"/>
+        </dgm:alg>
+      </dgm:else>
+    </dgm:choose>
+    <dgm:shape xmlns:r="http://schemas.openxmlformats.org/officeDocument/2006/relationships" r:blip="">
+      <dgm:adjLst/>
+    </dgm:shape>
+    <dgm:presOf/>
+    <dgm:constrLst>
+      <dgm:constr type="h" for="ch" forName="compNode" refType="h" fact="0.45"/>
+      <dgm:constr type="w" for="ch" forName="compNode" val="120"/>
+      <dgm:constr type="w" for="ch" forName="sibTrans" refType="w" refFor="ch" refForName="compNode" fact="0.175"/>
+      <dgm:constr type="primFontSz" for="des" forName="parTx" val="36"/>
+      <dgm:constr type="primFontSz" for="des" forName="desTx" refType="primFontSz" refFor="des" refForName="parTx" op="lte" fact="0.75"/>
+      <dgm:constr type="h" for="des" forName="compNode" op="equ"/>
+      <dgm:constr type="h" for="des" forName="iconRect" op="equ"/>
+      <dgm:constr type="w" for="des" forName="iconRect" op="equ"/>
+      <dgm:constr type="h" for="des" forName="iconSpace" op="equ"/>
+      <dgm:constr type="h" for="des" forName="parTx" op="equ"/>
+      <dgm:constr type="h" for="des" forName="txSpace" op="equ"/>
+      <dgm:constr type="h" for="des" forName="desTx" op="equ"/>
+    </dgm:constrLst>
+    <dgm:ruleLst>
+      <dgm:rule type="w" for="ch" forName="compNode" val="0" fact="NaN" max="NaN"/>
+    </dgm:ruleLst>
+    <dgm:forEach name="Name3" axis="ch" ptType="node">
+      <dgm:layoutNode name="compNode">
+        <dgm:alg type="composite"/>
+        <dgm:shape xmlns:r="http://schemas.openxmlformats.org/officeDocument/2006/relationships" r:blip="">
+          <dgm:adjLst/>
+        </dgm:shape>
+        <dgm:presOf axis="self"/>
+        <dgm:constrLst>
+          <dgm:constr type="w" for="ch" forName="iconRect" refType="w" fact="0.35"/>
+          <dgm:constr type="h" for="ch" forName="iconRect" refType="w" refFor="ch" refForName="iconRect"/>
+          <dgm:constr type="ctrX" for="ch" forName="iconRect" refType="w" fact="0.5"/>
+          <dgm:constr type="t" for="ch" forName="iconRect"/>
+          <dgm:constr type="w" for="ch" forName="iconSpace" refType="w"/>
+          <dgm:constr type="h" for="ch" forName="iconSpace" refType="h" fact="0.043"/>
+          <dgm:constr type="l" for="ch" forName="iconSpace"/>
+          <dgm:constr type="t" for="ch" forName="iconSpace" refType="b" refFor="ch" refForName="iconRect"/>
+          <dgm:constr type="w" for="ch" forName="parTx" refType="w"/>
+          <dgm:constr type="h" for="ch" forName="parTx" refType="w" fact="0.15"/>
+          <dgm:constr type="l" for="ch" forName="parTx"/>
+          <dgm:constr type="t" for="ch" forName="parTx" refType="b" refFor="ch" refForName="iconSpace"/>
+          <dgm:constr type="h" for="ch" forName="txSpace" refType="h" fact="0.02"/>
+          <dgm:constr type="w" for="ch" forName="txSpace" refType="w"/>
+          <dgm:constr type="l" for="ch" forName="txSpace"/>
+          <dgm:constr type="t" for="ch" forName="txSpace" refType="b" refFor="ch" refForName="parTx"/>
+          <dgm:constr type="w" for="ch" forName="desTx" refType="w"/>
+          <dgm:constr type="l" for="ch" forName="desTx"/>
+          <dgm:constr type="t" for="ch" forName="desTx" refType="b" refFor="ch" refForName="txSpace"/>
+        </dgm:constrLst>
+        <dgm:ruleLst>
+          <dgm:rule type="h" val="INF" fact="NaN" max="NaN"/>
+        </dgm:ruleLst>
+        <dgm:layoutNode name="iconRect" styleLbl="node1">
+          <dgm:alg type="sp"/>
+          <dgm:shape xmlns:r="http://schemas.openxmlformats.org/officeDocument/2006/relationships" type="rect" r:blip="" blipPhldr="1">
+            <dgm:adjLst/>
+          </dgm:shape>
+          <dgm:presOf/>
+          <dgm:constrLst/>
+          <dgm:ruleLst/>
+        </dgm:layoutNode>
+        <dgm:layoutNode name="iconSpace">
+          <dgm:alg type="sp"/>
+          <dgm:shape xmlns:r="http://schemas.openxmlformats.org/officeDocument/2006/relationships" r:blip="">
+            <dgm:adjLst/>
+          </dgm:shape>
+          <dgm:presOf/>
+          <dgm:constrLst/>
+          <dgm:ruleLst/>
+        </dgm:layoutNode>
+        <dgm:layoutNode name="parTx" styleLbl="revTx">
+          <dgm:varLst>
+            <dgm:chMax val="0"/>
+            <dgm:chPref val="0"/>
+          </dgm:varLst>
+          <dgm:alg type="tx">
+            <dgm:param type="txAnchorVert" val="t"/>
+          </dgm:alg>
+          <dgm:shape xmlns:r="http://schemas.openxmlformats.org/officeDocument/2006/relationships" type="rect" r:blip="">
+            <dgm:adjLst/>
+          </dgm:shape>
+          <dgm:presOf axis="self" ptType="node"/>
+          <dgm:constrLst>
+            <dgm:constr type="lMarg"/>
+            <dgm:constr type="rMarg"/>
+            <dgm:constr type="tMarg"/>
+            <dgm:constr type="bMarg"/>
+          </dgm:constrLst>
+          <dgm:ruleLst>
+            <dgm:rule type="primFontSz" val="14" fact="NaN" max="NaN"/>
+            <dgm:rule type="h" val="INF" fact="NaN" max="NaN"/>
+          </dgm:ruleLst>
+        </dgm:layoutNode>
+        <dgm:layoutNode name="txSpace">
+          <dgm:alg type="sp"/>
+          <dgm:shape xmlns:r="http://schemas.openxmlformats.org/officeDocument/2006/relationships" r:blip="">
+            <dgm:adjLst/>
+          </dgm:shape>
+          <dgm:presOf/>
+          <dgm:constrLst/>
+          <dgm:ruleLst/>
+        </dgm:layoutNode>
+        <dgm:layoutNode name="desTx" styleLbl="revTx">
+          <dgm:varLst/>
+          <dgm:alg type="tx">
+            <dgm:param type="stBulletLvl" val="0"/>
+            <dgm:param type="txAnchorVert" val="t"/>
+          </dgm:alg>
+          <dgm:shape xmlns:r="http://schemas.openxmlformats.org/officeDocument/2006/relationships" type="rect" r:blip="">
+            <dgm:adjLst/>
+          </dgm:shape>
+          <dgm:presOf axis="des" ptType="node"/>
+          <dgm:constrLst>
+            <dgm:constr type="secFontSz" refType="primFontSz"/>
+            <dgm:constr type="lMarg"/>
+            <dgm:constr type="rMarg"/>
+            <dgm:constr type="tMarg"/>
+            <dgm:constr type="bMarg"/>
+          </dgm:constrLst>
+          <dgm:ruleLst>
+            <dgm:rule type="primFontSz" val="NaN" fact="NaN" max="17"/>
+            <dgm:rule type="h" val="INF" fact="NaN" max="NaN"/>
+          </dgm:ruleLst>
+        </dgm:layoutNode>
+      </dgm:layoutNode>
+      <dgm:forEach name="Name4" axis="followSib" ptType="sibTrans" cnt="1">
+        <dgm:layoutNode name="sibTrans">
+          <dgm:alg type="sp"/>
+          <dgm:shape xmlns:r="http://schemas.openxmlformats.org/officeDocument/2006/relationships" r:blip="">
+            <dgm:adjLst/>
+          </dgm:shape>
+          <dgm:presOf axis="self"/>
+          <dgm:constrLst/>
+          <dgm:ruleLst/>
+        </dgm:layoutNode>
+      </dgm:forEach>
+    </dgm:forEach>
+  </dgm:layoutNode>
+  <dgm:extLst>
+    <a:ext uri="{68A01E43-0DF5-4B5B-8FA6-DAF915123BFB}">
+      <dgm1612:lstStyle xmlns:dgm1612="http://schemas.microsoft.com/office/drawing/2016/12/diagram">
+        <a:lvl1pPr>
+          <a:lnSpc>
+            <a:spcPct val="100000"/>
+          </a:lnSpc>
+          <a:defRPr b="1"/>
+        </a:lvl1pPr>
+        <a:lvl2pPr>
+          <a:lnSpc>
+            <a:spcPct val="100000"/>
+          </a:lnSpc>
+        </a:lvl2pPr>
+      </dgm1612:lstStyle>
+    </a:ext>
+  </dgm:extLst>
+</dgm:layoutDef>
+</file>
+
 <file path=ppt/diagrams/quickStyle1.xml><?xml version="1.0" encoding="utf-8"?>
 <dgm:styleDef xmlns:dgm="http://schemas.openxmlformats.org/drawingml/2006/diagram" xmlns:a="http://schemas.openxmlformats.org/drawingml/2006/main" uniqueId="urn:microsoft.com/office/officeart/2005/8/quickstyle/simple1">
   <dgm:title val=""/>
@@ -7985,6 +9619,1040 @@
 </file>
 
 <file path=ppt/diagrams/quickStyle3.xml><?xml version="1.0" encoding="utf-8"?>
+<dgm:styleDef xmlns:dgm="http://schemas.openxmlformats.org/drawingml/2006/diagram" xmlns:a="http://schemas.openxmlformats.org/drawingml/2006/main" uniqueId="urn:microsoft.com/office/officeart/2005/8/quickstyle/simple1">
+  <dgm:title val=""/>
+  <dgm:desc val=""/>
+  <dgm:catLst>
+    <dgm:cat type="simple" pri="10100"/>
+  </dgm:catLst>
+  <dgm:scene3d>
+    <a:camera prst="orthographicFront"/>
+    <a:lightRig rig="threePt" dir="t"/>
+  </dgm:scene3d>
+  <dgm:styleLbl name="node0">
+    <dgm:scene3d>
+      <a:camera prst="orthographicFront"/>
+      <a:lightRig rig="threePt" dir="t"/>
+    </dgm:scene3d>
+    <dgm:sp3d/>
+    <dgm:txPr/>
+    <dgm:style>
+      <a:lnRef idx="2">
+        <a:scrgbClr r="0" g="0" b="0"/>
+      </a:lnRef>
+      <a:fillRef idx="1">
+        <a:scrgbClr r="0" g="0" b="0"/>
+      </a:fillRef>
+      <a:effectRef idx="0">
+        <a:scrgbClr r="0" g="0" b="0"/>
+      </a:effectRef>
+      <a:fontRef idx="minor">
+        <a:schemeClr val="lt1"/>
+      </a:fontRef>
+    </dgm:style>
+  </dgm:styleLbl>
+  <dgm:styleLbl name="lnNode1">
+    <dgm:scene3d>
+      <a:camera prst="orthographicFront"/>
+      <a:lightRig rig="threePt" dir="t"/>
+    </dgm:scene3d>
+    <dgm:sp3d/>
+    <dgm:txPr/>
+    <dgm:style>
+      <a:lnRef idx="2">
+        <a:scrgbClr r="0" g="0" b="0"/>
+      </a:lnRef>
+      <a:fillRef idx="1">
+        <a:scrgbClr r="0" g="0" b="0"/>
+      </a:fillRef>
+      <a:effectRef idx="0">
+        <a:scrgbClr r="0" g="0" b="0"/>
+      </a:effectRef>
+      <a:fontRef idx="minor">
+        <a:schemeClr val="lt1"/>
+      </a:fontRef>
+    </dgm:style>
+  </dgm:styleLbl>
+  <dgm:styleLbl name="vennNode1">
+    <dgm:scene3d>
+      <a:camera prst="orthographicFront"/>
+      <a:lightRig rig="threePt" dir="t"/>
+    </dgm:scene3d>
+    <dgm:sp3d/>
+    <dgm:txPr/>
+    <dgm:style>
+      <a:lnRef idx="2">
+        <a:scrgbClr r="0" g="0" b="0"/>
+      </a:lnRef>
+      <a:fillRef idx="1">
+        <a:scrgbClr r="0" g="0" b="0"/>
+      </a:fillRef>
+      <a:effectRef idx="0">
+        <a:scrgbClr r="0" g="0" b="0"/>
+      </a:effectRef>
+      <a:fontRef idx="minor">
+        <a:schemeClr val="tx1"/>
+      </a:fontRef>
+    </dgm:style>
+  </dgm:styleLbl>
+  <dgm:styleLbl name="alignNode1">
+    <dgm:scene3d>
+      <a:camera prst="orthographicFront"/>
+      <a:lightRig rig="threePt" dir="t"/>
+    </dgm:scene3d>
+    <dgm:sp3d/>
+    <dgm:txPr/>
+    <dgm:style>
+      <a:lnRef idx="2">
+        <a:scrgbClr r="0" g="0" b="0"/>
+      </a:lnRef>
+      <a:fillRef idx="1">
+        <a:scrgbClr r="0" g="0" b="0"/>
+      </a:fillRef>
+      <a:effectRef idx="0">
+        <a:scrgbClr r="0" g="0" b="0"/>
+      </a:effectRef>
+      <a:fontRef idx="minor">
+        <a:schemeClr val="lt1"/>
+      </a:fontRef>
+    </dgm:style>
+  </dgm:styleLbl>
+  <dgm:styleLbl name="node1">
+    <dgm:scene3d>
+      <a:camera prst="orthographicFront"/>
+      <a:lightRig rig="threePt" dir="t"/>
+    </dgm:scene3d>
+    <dgm:sp3d/>
+    <dgm:txPr/>
+    <dgm:style>
+      <a:lnRef idx="2">
+        <a:scrgbClr r="0" g="0" b="0"/>
+      </a:lnRef>
+      <a:fillRef idx="1">
+        <a:scrgbClr r="0" g="0" b="0"/>
+      </a:fillRef>
+      <a:effectRef idx="0">
+        <a:scrgbClr r="0" g="0" b="0"/>
+      </a:effectRef>
+      <a:fontRef idx="minor">
+        <a:schemeClr val="lt1"/>
+      </a:fontRef>
+    </dgm:style>
+  </dgm:styleLbl>
+  <dgm:styleLbl name="node2">
+    <dgm:scene3d>
+      <a:camera prst="orthographicFront"/>
+      <a:lightRig rig="threePt" dir="t"/>
+    </dgm:scene3d>
+    <dgm:sp3d/>
+    <dgm:txPr/>
+    <dgm:style>
+      <a:lnRef idx="2">
+        <a:scrgbClr r="0" g="0" b="0"/>
+      </a:lnRef>
+      <a:fillRef idx="1">
+        <a:scrgbClr r="0" g="0" b="0"/>
+      </a:fillRef>
+      <a:effectRef idx="0">
+        <a:scrgbClr r="0" g="0" b="0"/>
+      </a:effectRef>
+      <a:fontRef idx="minor">
+        <a:schemeClr val="lt1"/>
+      </a:fontRef>
+    </dgm:style>
+  </dgm:styleLbl>
+  <dgm:styleLbl name="node3">
+    <dgm:scene3d>
+      <a:camera prst="orthographicFront"/>
+      <a:lightRig rig="threePt" dir="t"/>
+    </dgm:scene3d>
+    <dgm:sp3d/>
+    <dgm:txPr/>
+    <dgm:style>
+      <a:lnRef idx="2">
+        <a:scrgbClr r="0" g="0" b="0"/>
+      </a:lnRef>
+      <a:fillRef idx="1">
+        <a:scrgbClr r="0" g="0" b="0"/>
+      </a:fillRef>
+      <a:effectRef idx="0">
+        <a:scrgbClr r="0" g="0" b="0"/>
+      </a:effectRef>
+      <a:fontRef idx="minor">
+        <a:schemeClr val="lt1"/>
+      </a:fontRef>
+    </dgm:style>
+  </dgm:styleLbl>
+  <dgm:styleLbl name="node4">
+    <dgm:scene3d>
+      <a:camera prst="orthographicFront"/>
+      <a:lightRig rig="threePt" dir="t"/>
+    </dgm:scene3d>
+    <dgm:sp3d/>
+    <dgm:txPr/>
+    <dgm:style>
+      <a:lnRef idx="2">
+        <a:scrgbClr r="0" g="0" b="0"/>
+      </a:lnRef>
+      <a:fillRef idx="1">
+        <a:scrgbClr r="0" g="0" b="0"/>
+      </a:fillRef>
+      <a:effectRef idx="0">
+        <a:scrgbClr r="0" g="0" b="0"/>
+      </a:effectRef>
+      <a:fontRef idx="minor">
+        <a:schemeClr val="lt1"/>
+      </a:fontRef>
+    </dgm:style>
+  </dgm:styleLbl>
+  <dgm:styleLbl name="fgImgPlace1">
+    <dgm:scene3d>
+      <a:camera prst="orthographicFront"/>
+      <a:lightRig rig="threePt" dir="t"/>
+    </dgm:scene3d>
+    <dgm:sp3d/>
+    <dgm:txPr/>
+    <dgm:style>
+      <a:lnRef idx="2">
+        <a:scrgbClr r="0" g="0" b="0"/>
+      </a:lnRef>
+      <a:fillRef idx="1">
+        <a:scrgbClr r="0" g="0" b="0"/>
+      </a:fillRef>
+      <a:effectRef idx="0">
+        <a:scrgbClr r="0" g="0" b="0"/>
+      </a:effectRef>
+      <a:fontRef idx="minor"/>
+    </dgm:style>
+  </dgm:styleLbl>
+  <dgm:styleLbl name="alignImgPlace1">
+    <dgm:scene3d>
+      <a:camera prst="orthographicFront"/>
+      <a:lightRig rig="threePt" dir="t"/>
+    </dgm:scene3d>
+    <dgm:sp3d/>
+    <dgm:txPr/>
+    <dgm:style>
+      <a:lnRef idx="2">
+        <a:scrgbClr r="0" g="0" b="0"/>
+      </a:lnRef>
+      <a:fillRef idx="1">
+        <a:scrgbClr r="0" g="0" b="0"/>
+      </a:fillRef>
+      <a:effectRef idx="0">
+        <a:scrgbClr r="0" g="0" b="0"/>
+      </a:effectRef>
+      <a:fontRef idx="minor"/>
+    </dgm:style>
+  </dgm:styleLbl>
+  <dgm:styleLbl name="bgImgPlace1">
+    <dgm:scene3d>
+      <a:camera prst="orthographicFront"/>
+      <a:lightRig rig="threePt" dir="t"/>
+    </dgm:scene3d>
+    <dgm:sp3d/>
+    <dgm:txPr/>
+    <dgm:style>
+      <a:lnRef idx="2">
+        <a:scrgbClr r="0" g="0" b="0"/>
+      </a:lnRef>
+      <a:fillRef idx="1">
+        <a:scrgbClr r="0" g="0" b="0"/>
+      </a:fillRef>
+      <a:effectRef idx="0">
+        <a:scrgbClr r="0" g="0" b="0"/>
+      </a:effectRef>
+      <a:fontRef idx="minor"/>
+    </dgm:style>
+  </dgm:styleLbl>
+  <dgm:styleLbl name="sibTrans2D1">
+    <dgm:scene3d>
+      <a:camera prst="orthographicFront"/>
+      <a:lightRig rig="threePt" dir="t"/>
+    </dgm:scene3d>
+    <dgm:sp3d/>
+    <dgm:txPr/>
+    <dgm:style>
+      <a:lnRef idx="0">
+        <a:scrgbClr r="0" g="0" b="0"/>
+      </a:lnRef>
+      <a:fillRef idx="1">
+        <a:scrgbClr r="0" g="0" b="0"/>
+      </a:fillRef>
+      <a:effectRef idx="0">
+        <a:scrgbClr r="0" g="0" b="0"/>
+      </a:effectRef>
+      <a:fontRef idx="minor">
+        <a:schemeClr val="lt1"/>
+      </a:fontRef>
+    </dgm:style>
+  </dgm:styleLbl>
+  <dgm:styleLbl name="fgSibTrans2D1">
+    <dgm:scene3d>
+      <a:camera prst="orthographicFront"/>
+      <a:lightRig rig="threePt" dir="t"/>
+    </dgm:scene3d>
+    <dgm:sp3d/>
+    <dgm:txPr/>
+    <dgm:style>
+      <a:lnRef idx="0">
+        <a:scrgbClr r="0" g="0" b="0"/>
+      </a:lnRef>
+      <a:fillRef idx="1">
+        <a:scrgbClr r="0" g="0" b="0"/>
+      </a:fillRef>
+      <a:effectRef idx="0">
+        <a:scrgbClr r="0" g="0" b="0"/>
+      </a:effectRef>
+      <a:fontRef idx="minor">
+        <a:schemeClr val="lt1"/>
+      </a:fontRef>
+    </dgm:style>
+  </dgm:styleLbl>
+  <dgm:styleLbl name="bgSibTrans2D1">
+    <dgm:scene3d>
+      <a:camera prst="orthographicFront"/>
+      <a:lightRig rig="threePt" dir="t"/>
+    </dgm:scene3d>
+    <dgm:sp3d/>
+    <dgm:txPr/>
+    <dgm:style>
+      <a:lnRef idx="0">
+        <a:scrgbClr r="0" g="0" b="0"/>
+      </a:lnRef>
+      <a:fillRef idx="1">
+        <a:scrgbClr r="0" g="0" b="0"/>
+      </a:fillRef>
+      <a:effectRef idx="0">
+        <a:scrgbClr r="0" g="0" b="0"/>
+      </a:effectRef>
+      <a:fontRef idx="minor">
+        <a:schemeClr val="lt1"/>
+      </a:fontRef>
+    </dgm:style>
+  </dgm:styleLbl>
+  <dgm:styleLbl name="sibTrans1D1">
+    <dgm:scene3d>
+      <a:camera prst="orthographicFront"/>
+      <a:lightRig rig="threePt" dir="t"/>
+    </dgm:scene3d>
+    <dgm:sp3d/>
+    <dgm:txPr/>
+    <dgm:style>
+      <a:lnRef idx="1">
+        <a:scrgbClr r="0" g="0" b="0"/>
+      </a:lnRef>
+      <a:fillRef idx="0">
+        <a:scrgbClr r="0" g="0" b="0"/>
+      </a:fillRef>
+      <a:effectRef idx="0">
+        <a:scrgbClr r="0" g="0" b="0"/>
+      </a:effectRef>
+      <a:fontRef idx="minor"/>
+    </dgm:style>
+  </dgm:styleLbl>
+  <dgm:styleLbl name="callout">
+    <dgm:scene3d>
+      <a:camera prst="orthographicFront"/>
+      <a:lightRig rig="threePt" dir="t"/>
+    </dgm:scene3d>
+    <dgm:sp3d/>
+    <dgm:txPr/>
+    <dgm:style>
+      <a:lnRef idx="2">
+        <a:scrgbClr r="0" g="0" b="0"/>
+      </a:lnRef>
+      <a:fillRef idx="1">
+        <a:scrgbClr r="0" g="0" b="0"/>
+      </a:fillRef>
+      <a:effectRef idx="0">
+        <a:scrgbClr r="0" g="0" b="0"/>
+      </a:effectRef>
+      <a:fontRef idx="minor"/>
+    </dgm:style>
+  </dgm:styleLbl>
+  <dgm:styleLbl name="asst0">
+    <dgm:scene3d>
+      <a:camera prst="orthographicFront"/>
+      <a:lightRig rig="threePt" dir="t"/>
+    </dgm:scene3d>
+    <dgm:sp3d/>
+    <dgm:txPr/>
+    <dgm:style>
+      <a:lnRef idx="2">
+        <a:scrgbClr r="0" g="0" b="0"/>
+      </a:lnRef>
+      <a:fillRef idx="1">
+        <a:scrgbClr r="0" g="0" b="0"/>
+      </a:fillRef>
+      <a:effectRef idx="0">
+        <a:scrgbClr r="0" g="0" b="0"/>
+      </a:effectRef>
+      <a:fontRef idx="minor">
+        <a:schemeClr val="lt1"/>
+      </a:fontRef>
+    </dgm:style>
+  </dgm:styleLbl>
+  <dgm:styleLbl name="asst1">
+    <dgm:scene3d>
+      <a:camera prst="orthographicFront"/>
+      <a:lightRig rig="threePt" dir="t"/>
+    </dgm:scene3d>
+    <dgm:sp3d/>
+    <dgm:txPr/>
+    <dgm:style>
+      <a:lnRef idx="2">
+        <a:scrgbClr r="0" g="0" b="0"/>
+      </a:lnRef>
+      <a:fillRef idx="1">
+        <a:scrgbClr r="0" g="0" b="0"/>
+      </a:fillRef>
+      <a:effectRef idx="0">
+        <a:scrgbClr r="0" g="0" b="0"/>
+      </a:effectRef>
+      <a:fontRef idx="minor">
+        <a:schemeClr val="lt1"/>
+      </a:fontRef>
+    </dgm:style>
+  </dgm:styleLbl>
+  <dgm:styleLbl name="asst2">
+    <dgm:scene3d>
+      <a:camera prst="orthographicFront"/>
+      <a:lightRig rig="threePt" dir="t"/>
+    </dgm:scene3d>
+    <dgm:sp3d/>
+    <dgm:txPr/>
+    <dgm:style>
+      <a:lnRef idx="2">
+        <a:scrgbClr r="0" g="0" b="0"/>
+      </a:lnRef>
+      <a:fillRef idx="1">
+        <a:scrgbClr r="0" g="0" b="0"/>
+      </a:fillRef>
+      <a:effectRef idx="0">
+        <a:scrgbClr r="0" g="0" b="0"/>
+      </a:effectRef>
+      <a:fontRef idx="minor">
+        <a:schemeClr val="lt1"/>
+      </a:fontRef>
+    </dgm:style>
+  </dgm:styleLbl>
+  <dgm:styleLbl name="asst3">
+    <dgm:scene3d>
+      <a:camera prst="orthographicFront"/>
+      <a:lightRig rig="threePt" dir="t"/>
+    </dgm:scene3d>
+    <dgm:sp3d/>
+    <dgm:txPr/>
+    <dgm:style>
+      <a:lnRef idx="2">
+        <a:scrgbClr r="0" g="0" b="0"/>
+      </a:lnRef>
+      <a:fillRef idx="1">
+        <a:scrgbClr r="0" g="0" b="0"/>
+      </a:fillRef>
+      <a:effectRef idx="0">
+        <a:scrgbClr r="0" g="0" b="0"/>
+      </a:effectRef>
+      <a:fontRef idx="minor">
+        <a:schemeClr val="lt1"/>
+      </a:fontRef>
+    </dgm:style>
+  </dgm:styleLbl>
+  <dgm:styleLbl name="asst4">
+    <dgm:scene3d>
+      <a:camera prst="orthographicFront"/>
+      <a:lightRig rig="threePt" dir="t"/>
+    </dgm:scene3d>
+    <dgm:sp3d/>
+    <dgm:txPr/>
+    <dgm:style>
+      <a:lnRef idx="2">
+        <a:scrgbClr r="0" g="0" b="0"/>
+      </a:lnRef>
+      <a:fillRef idx="1">
+        <a:scrgbClr r="0" g="0" b="0"/>
+      </a:fillRef>
+      <a:effectRef idx="0">
+        <a:scrgbClr r="0" g="0" b="0"/>
+      </a:effectRef>
+      <a:fontRef idx="minor">
+        <a:schemeClr val="lt1"/>
+      </a:fontRef>
+    </dgm:style>
+  </dgm:styleLbl>
+  <dgm:styleLbl name="parChTrans2D1">
+    <dgm:scene3d>
+      <a:camera prst="orthographicFront"/>
+      <a:lightRig rig="threePt" dir="t"/>
+    </dgm:scene3d>
+    <dgm:sp3d/>
+    <dgm:txPr/>
+    <dgm:style>
+      <a:lnRef idx="2">
+        <a:scrgbClr r="0" g="0" b="0"/>
+      </a:lnRef>
+      <a:fillRef idx="1">
+        <a:scrgbClr r="0" g="0" b="0"/>
+      </a:fillRef>
+      <a:effectRef idx="0">
+        <a:scrgbClr r="0" g="0" b="0"/>
+      </a:effectRef>
+      <a:fontRef idx="minor">
+        <a:schemeClr val="lt1"/>
+      </a:fontRef>
+    </dgm:style>
+  </dgm:styleLbl>
+  <dgm:styleLbl name="parChTrans2D2">
+    <dgm:scene3d>
+      <a:camera prst="orthographicFront"/>
+      <a:lightRig rig="threePt" dir="t"/>
+    </dgm:scene3d>
+    <dgm:sp3d/>
+    <dgm:txPr/>
+    <dgm:style>
+      <a:lnRef idx="2">
+        <a:scrgbClr r="0" g="0" b="0"/>
+      </a:lnRef>
+      <a:fillRef idx="1">
+        <a:scrgbClr r="0" g="0" b="0"/>
+      </a:fillRef>
+      <a:effectRef idx="0">
+        <a:scrgbClr r="0" g="0" b="0"/>
+      </a:effectRef>
+      <a:fontRef idx="minor">
+        <a:schemeClr val="lt1"/>
+      </a:fontRef>
+    </dgm:style>
+  </dgm:styleLbl>
+  <dgm:styleLbl name="parChTrans2D3">
+    <dgm:scene3d>
+      <a:camera prst="orthographicFront"/>
+      <a:lightRig rig="threePt" dir="t"/>
+    </dgm:scene3d>
+    <dgm:sp3d/>
+    <dgm:txPr/>
+    <dgm:style>
+      <a:lnRef idx="2">
+        <a:scrgbClr r="0" g="0" b="0"/>
+      </a:lnRef>
+      <a:fillRef idx="1">
+        <a:scrgbClr r="0" g="0" b="0"/>
+      </a:fillRef>
+      <a:effectRef idx="0">
+        <a:scrgbClr r="0" g="0" b="0"/>
+      </a:effectRef>
+      <a:fontRef idx="minor">
+        <a:schemeClr val="lt1"/>
+      </a:fontRef>
+    </dgm:style>
+  </dgm:styleLbl>
+  <dgm:styleLbl name="parChTrans2D4">
+    <dgm:scene3d>
+      <a:camera prst="orthographicFront"/>
+      <a:lightRig rig="threePt" dir="t"/>
+    </dgm:scene3d>
+    <dgm:sp3d/>
+    <dgm:txPr/>
+    <dgm:style>
+      <a:lnRef idx="2">
+        <a:scrgbClr r="0" g="0" b="0"/>
+      </a:lnRef>
+      <a:fillRef idx="1">
+        <a:scrgbClr r="0" g="0" b="0"/>
+      </a:fillRef>
+      <a:effectRef idx="0">
+        <a:scrgbClr r="0" g="0" b="0"/>
+      </a:effectRef>
+      <a:fontRef idx="minor">
+        <a:schemeClr val="lt1"/>
+      </a:fontRef>
+    </dgm:style>
+  </dgm:styleLbl>
+  <dgm:styleLbl name="parChTrans1D1">
+    <dgm:scene3d>
+      <a:camera prst="orthographicFront"/>
+      <a:lightRig rig="threePt" dir="t"/>
+    </dgm:scene3d>
+    <dgm:sp3d/>
+    <dgm:txPr/>
+    <dgm:style>
+      <a:lnRef idx="2">
+        <a:scrgbClr r="0" g="0" b="0"/>
+      </a:lnRef>
+      <a:fillRef idx="0">
+        <a:scrgbClr r="0" g="0" b="0"/>
+      </a:fillRef>
+      <a:effectRef idx="0">
+        <a:scrgbClr r="0" g="0" b="0"/>
+      </a:effectRef>
+      <a:fontRef idx="minor"/>
+    </dgm:style>
+  </dgm:styleLbl>
+  <dgm:styleLbl name="parChTrans1D2">
+    <dgm:scene3d>
+      <a:camera prst="orthographicFront"/>
+      <a:lightRig rig="threePt" dir="t"/>
+    </dgm:scene3d>
+    <dgm:sp3d/>
+    <dgm:txPr/>
+    <dgm:style>
+      <a:lnRef idx="2">
+        <a:scrgbClr r="0" g="0" b="0"/>
+      </a:lnRef>
+      <a:fillRef idx="0">
+        <a:scrgbClr r="0" g="0" b="0"/>
+      </a:fillRef>
+      <a:effectRef idx="0">
+        <a:scrgbClr r="0" g="0" b="0"/>
+      </a:effectRef>
+      <a:fontRef idx="minor"/>
+    </dgm:style>
+  </dgm:styleLbl>
+  <dgm:styleLbl name="parChTrans1D3">
+    <dgm:scene3d>
+      <a:camera prst="orthographicFront"/>
+      <a:lightRig rig="threePt" dir="t"/>
+    </dgm:scene3d>
+    <dgm:sp3d/>
+    <dgm:txPr/>
+    <dgm:style>
+      <a:lnRef idx="2">
+        <a:scrgbClr r="0" g="0" b="0"/>
+      </a:lnRef>
+      <a:fillRef idx="0">
+        <a:scrgbClr r="0" g="0" b="0"/>
+      </a:fillRef>
+      <a:effectRef idx="0">
+        <a:scrgbClr r="0" g="0" b="0"/>
+      </a:effectRef>
+      <a:fontRef idx="minor"/>
+    </dgm:style>
+  </dgm:styleLbl>
+  <dgm:styleLbl name="parChTrans1D4">
+    <dgm:scene3d>
+      <a:camera prst="orthographicFront"/>
+      <a:lightRig rig="threePt" dir="t"/>
+    </dgm:scene3d>
+    <dgm:sp3d/>
+    <dgm:txPr/>
+    <dgm:style>
+      <a:lnRef idx="2">
+        <a:scrgbClr r="0" g="0" b="0"/>
+      </a:lnRef>
+      <a:fillRef idx="0">
+        <a:scrgbClr r="0" g="0" b="0"/>
+      </a:fillRef>
+      <a:effectRef idx="0">
+        <a:scrgbClr r="0" g="0" b="0"/>
+      </a:effectRef>
+      <a:fontRef idx="minor"/>
+    </dgm:style>
+  </dgm:styleLbl>
+  <dgm:styleLbl name="fgAcc1">
+    <dgm:scene3d>
+      <a:camera prst="orthographicFront"/>
+      <a:lightRig rig="threePt" dir="t"/>
+    </dgm:scene3d>
+    <dgm:sp3d/>
+    <dgm:txPr/>
+    <dgm:style>
+      <a:lnRef idx="2">
+        <a:scrgbClr r="0" g="0" b="0"/>
+      </a:lnRef>
+      <a:fillRef idx="1">
+        <a:scrgbClr r="0" g="0" b="0"/>
+      </a:fillRef>
+      <a:effectRef idx="0">
+        <a:scrgbClr r="0" g="0" b="0"/>
+      </a:effectRef>
+      <a:fontRef idx="minor"/>
+    </dgm:style>
+  </dgm:styleLbl>
+  <dgm:styleLbl name="conFgAcc1">
+    <dgm:scene3d>
+      <a:camera prst="orthographicFront"/>
+      <a:lightRig rig="threePt" dir="t"/>
+    </dgm:scene3d>
+    <dgm:sp3d/>
+    <dgm:txPr/>
+    <dgm:style>
+      <a:lnRef idx="2">
+        <a:scrgbClr r="0" g="0" b="0"/>
+      </a:lnRef>
+      <a:fillRef idx="1">
+        <a:scrgbClr r="0" g="0" b="0"/>
+      </a:fillRef>
+      <a:effectRef idx="0">
+        <a:scrgbClr r="0" g="0" b="0"/>
+      </a:effectRef>
+      <a:fontRef idx="minor"/>
+    </dgm:style>
+  </dgm:styleLbl>
+  <dgm:styleLbl name="alignAcc1">
+    <dgm:scene3d>
+      <a:camera prst="orthographicFront"/>
+      <a:lightRig rig="threePt" dir="t"/>
+    </dgm:scene3d>
+    <dgm:sp3d/>
+    <dgm:txPr/>
+    <dgm:style>
+      <a:lnRef idx="2">
+        <a:scrgbClr r="0" g="0" b="0"/>
+      </a:lnRef>
+      <a:fillRef idx="1">
+        <a:scrgbClr r="0" g="0" b="0"/>
+      </a:fillRef>
+      <a:effectRef idx="0">
+        <a:scrgbClr r="0" g="0" b="0"/>
+      </a:effectRef>
+      <a:fontRef idx="minor"/>
+    </dgm:style>
+  </dgm:styleLbl>
+  <dgm:styleLbl name="trAlignAcc1">
+    <dgm:scene3d>
+      <a:camera prst="orthographicFront"/>
+      <a:lightRig rig="threePt" dir="t"/>
+    </dgm:scene3d>
+    <dgm:sp3d/>
+    <dgm:txPr/>
+    <dgm:style>
+      <a:lnRef idx="1">
+        <a:scrgbClr r="0" g="0" b="0"/>
+      </a:lnRef>
+      <a:fillRef idx="1">
+        <a:scrgbClr r="0" g="0" b="0"/>
+      </a:fillRef>
+      <a:effectRef idx="0">
+        <a:scrgbClr r="0" g="0" b="0"/>
+      </a:effectRef>
+      <a:fontRef idx="minor"/>
+    </dgm:style>
+  </dgm:styleLbl>
+  <dgm:styleLbl name="bgAcc1">
+    <dgm:scene3d>
+      <a:camera prst="orthographicFront"/>
+      <a:lightRig rig="threePt" dir="t"/>
+    </dgm:scene3d>
+    <dgm:sp3d/>
+    <dgm:txPr/>
+    <dgm:style>
+      <a:lnRef idx="2">
+        <a:scrgbClr r="0" g="0" b="0"/>
+      </a:lnRef>
+      <a:fillRef idx="1">
+        <a:scrgbClr r="0" g="0" b="0"/>
+      </a:fillRef>
+      <a:effectRef idx="0">
+        <a:scrgbClr r="0" g="0" b="0"/>
+      </a:effectRef>
+      <a:fontRef idx="minor"/>
+    </dgm:style>
+  </dgm:styleLbl>
+  <dgm:styleLbl name="solidFgAcc1">
+    <dgm:scene3d>
+      <a:camera prst="orthographicFront"/>
+      <a:lightRig rig="threePt" dir="t"/>
+    </dgm:scene3d>
+    <dgm:sp3d/>
+    <dgm:txPr/>
+    <dgm:style>
+      <a:lnRef idx="2">
+        <a:scrgbClr r="0" g="0" b="0"/>
+      </a:lnRef>
+      <a:fillRef idx="1">
+        <a:scrgbClr r="0" g="0" b="0"/>
+      </a:fillRef>
+      <a:effectRef idx="0">
+        <a:scrgbClr r="0" g="0" b="0"/>
+      </a:effectRef>
+      <a:fontRef idx="minor"/>
+    </dgm:style>
+  </dgm:styleLbl>
+  <dgm:styleLbl name="solidAlignAcc1">
+    <dgm:scene3d>
+      <a:camera prst="orthographicFront"/>
+      <a:lightRig rig="threePt" dir="t"/>
+    </dgm:scene3d>
+    <dgm:sp3d/>
+    <dgm:txPr/>
+    <dgm:style>
+      <a:lnRef idx="2">
+        <a:scrgbClr r="0" g="0" b="0"/>
+      </a:lnRef>
+      <a:fillRef idx="1">
+        <a:scrgbClr r="0" g="0" b="0"/>
+      </a:fillRef>
+      <a:effectRef idx="0">
+        <a:scrgbClr r="0" g="0" b="0"/>
+      </a:effectRef>
+      <a:fontRef idx="minor"/>
+    </dgm:style>
+  </dgm:styleLbl>
+  <dgm:styleLbl name="solidBgAcc1">
+    <dgm:scene3d>
+      <a:camera prst="orthographicFront"/>
+      <a:lightRig rig="threePt" dir="t"/>
+    </dgm:scene3d>
+    <dgm:sp3d/>
+    <dgm:txPr/>
+    <dgm:style>
+      <a:lnRef idx="2">
+        <a:scrgbClr r="0" g="0" b="0"/>
+      </a:lnRef>
+      <a:fillRef idx="1">
+        <a:scrgbClr r="0" g="0" b="0"/>
+      </a:fillRef>
+      <a:effectRef idx="0">
+        <a:scrgbClr r="0" g="0" b="0"/>
+      </a:effectRef>
+      <a:fontRef idx="minor"/>
+    </dgm:style>
+  </dgm:styleLbl>
+  <dgm:styleLbl name="fgAccFollowNode1">
+    <dgm:scene3d>
+      <a:camera prst="orthographicFront"/>
+      <a:lightRig rig="threePt" dir="t"/>
+    </dgm:scene3d>
+    <dgm:sp3d/>
+    <dgm:txPr/>
+    <dgm:style>
+      <a:lnRef idx="2">
+        <a:scrgbClr r="0" g="0" b="0"/>
+      </a:lnRef>
+      <a:fillRef idx="1">
+        <a:scrgbClr r="0" g="0" b="0"/>
+      </a:fillRef>
+      <a:effectRef idx="0">
+        <a:scrgbClr r="0" g="0" b="0"/>
+      </a:effectRef>
+      <a:fontRef idx="minor"/>
+    </dgm:style>
+  </dgm:styleLbl>
+  <dgm:styleLbl name="alignAccFollowNode1">
+    <dgm:scene3d>
+      <a:camera prst="orthographicFront"/>
+      <a:lightRig rig="threePt" dir="t"/>
+    </dgm:scene3d>
+    <dgm:sp3d/>
+    <dgm:txPr/>
+    <dgm:style>
+      <a:lnRef idx="2">
+        <a:scrgbClr r="0" g="0" b="0"/>
+      </a:lnRef>
+      <a:fillRef idx="1">
+        <a:scrgbClr r="0" g="0" b="0"/>
+      </a:fillRef>
+      <a:effectRef idx="0">
+        <a:scrgbClr r="0" g="0" b="0"/>
+      </a:effectRef>
+      <a:fontRef idx="minor"/>
+    </dgm:style>
+  </dgm:styleLbl>
+  <dgm:styleLbl name="bgAccFollowNode1">
+    <dgm:scene3d>
+      <a:camera prst="orthographicFront"/>
+      <a:lightRig rig="threePt" dir="t"/>
+    </dgm:scene3d>
+    <dgm:sp3d/>
+    <dgm:txPr/>
+    <dgm:style>
+      <a:lnRef idx="2">
+        <a:scrgbClr r="0" g="0" b="0"/>
+      </a:lnRef>
+      <a:fillRef idx="1">
+        <a:scrgbClr r="0" g="0" b="0"/>
+      </a:fillRef>
+      <a:effectRef idx="0">
+        <a:scrgbClr r="0" g="0" b="0"/>
+      </a:effectRef>
+      <a:fontRef idx="minor"/>
+    </dgm:style>
+  </dgm:styleLbl>
+  <dgm:styleLbl name="fgAcc0">
+    <dgm:scene3d>
+      <a:camera prst="orthographicFront"/>
+      <a:lightRig rig="threePt" dir="t"/>
+    </dgm:scene3d>
+    <dgm:sp3d/>
+    <dgm:txPr/>
+    <dgm:style>
+      <a:lnRef idx="2">
+        <a:scrgbClr r="0" g="0" b="0"/>
+      </a:lnRef>
+      <a:fillRef idx="1">
+        <a:scrgbClr r="0" g="0" b="0"/>
+      </a:fillRef>
+      <a:effectRef idx="0">
+        <a:scrgbClr r="0" g="0" b="0"/>
+      </a:effectRef>
+      <a:fontRef idx="minor"/>
+    </dgm:style>
+  </dgm:styleLbl>
+  <dgm:styleLbl name="fgAcc2">
+    <dgm:scene3d>
+      <a:camera prst="orthographicFront"/>
+      <a:lightRig rig="threePt" dir="t"/>
+    </dgm:scene3d>
+    <dgm:sp3d/>
+    <dgm:txPr/>
+    <dgm:style>
+      <a:lnRef idx="2">
+        <a:scrgbClr r="0" g="0" b="0"/>
+      </a:lnRef>
+      <a:fillRef idx="1">
+        <a:scrgbClr r="0" g="0" b="0"/>
+      </a:fillRef>
+      <a:effectRef idx="0">
+        <a:scrgbClr r="0" g="0" b="0"/>
+      </a:effectRef>
+      <a:fontRef idx="minor"/>
+    </dgm:style>
+  </dgm:styleLbl>
+  <dgm:styleLbl name="fgAcc3">
+    <dgm:scene3d>
+      <a:camera prst="orthographicFront"/>
+      <a:lightRig rig="threePt" dir="t"/>
+    </dgm:scene3d>
+    <dgm:sp3d/>
+    <dgm:txPr/>
+    <dgm:style>
+      <a:lnRef idx="2">
+        <a:scrgbClr r="0" g="0" b="0"/>
+      </a:lnRef>
+      <a:fillRef idx="1">
+        <a:scrgbClr r="0" g="0" b="0"/>
+      </a:fillRef>
+      <a:effectRef idx="0">
+        <a:scrgbClr r="0" g="0" b="0"/>
+      </a:effectRef>
+      <a:fontRef idx="minor"/>
+    </dgm:style>
+  </dgm:styleLbl>
+  <dgm:styleLbl name="fgAcc4">
+    <dgm:scene3d>
+      <a:camera prst="orthographicFront"/>
+      <a:lightRig rig="threePt" dir="t"/>
+    </dgm:scene3d>
+    <dgm:sp3d/>
+    <dgm:txPr/>
+    <dgm:style>
+      <a:lnRef idx="2">
+        <a:scrgbClr r="0" g="0" b="0"/>
+      </a:lnRef>
+      <a:fillRef idx="1">
+        <a:scrgbClr r="0" g="0" b="0"/>
+      </a:fillRef>
+      <a:effectRef idx="0">
+        <a:scrgbClr r="0" g="0" b="0"/>
+      </a:effectRef>
+      <a:fontRef idx="minor"/>
+    </dgm:style>
+  </dgm:styleLbl>
+  <dgm:styleLbl name="bgShp">
+    <dgm:scene3d>
+      <a:camera prst="orthographicFront"/>
+      <a:lightRig rig="threePt" dir="t"/>
+    </dgm:scene3d>
+    <dgm:sp3d/>
+    <dgm:txPr/>
+    <dgm:style>
+      <a:lnRef idx="0">
+        <a:scrgbClr r="0" g="0" b="0"/>
+      </a:lnRef>
+      <a:fillRef idx="1">
+        <a:scrgbClr r="0" g="0" b="0"/>
+      </a:fillRef>
+      <a:effectRef idx="0">
+        <a:scrgbClr r="0" g="0" b="0"/>
+      </a:effectRef>
+      <a:fontRef idx="minor"/>
+    </dgm:style>
+  </dgm:styleLbl>
+  <dgm:styleLbl name="dkBgShp">
+    <dgm:scene3d>
+      <a:camera prst="orthographicFront"/>
+      <a:lightRig rig="threePt" dir="t"/>
+    </dgm:scene3d>
+    <dgm:sp3d/>
+    <dgm:txPr/>
+    <dgm:style>
+      <a:lnRef idx="0">
+        <a:scrgbClr r="0" g="0" b="0"/>
+      </a:lnRef>
+      <a:fillRef idx="1">
+        <a:scrgbClr r="0" g="0" b="0"/>
+      </a:fillRef>
+      <a:effectRef idx="0">
+        <a:scrgbClr r="0" g="0" b="0"/>
+      </a:effectRef>
+      <a:fontRef idx="minor"/>
+    </dgm:style>
+  </dgm:styleLbl>
+  <dgm:styleLbl name="trBgShp">
+    <dgm:scene3d>
+      <a:camera prst="orthographicFront"/>
+      <a:lightRig rig="threePt" dir="t"/>
+    </dgm:scene3d>
+    <dgm:sp3d/>
+    <dgm:txPr/>
+    <dgm:style>
+      <a:lnRef idx="0">
+        <a:scrgbClr r="0" g="0" b="0"/>
+      </a:lnRef>
+      <a:fillRef idx="1">
+        <a:scrgbClr r="0" g="0" b="0"/>
+      </a:fillRef>
+      <a:effectRef idx="0">
+        <a:scrgbClr r="0" g="0" b="0"/>
+      </a:effectRef>
+      <a:fontRef idx="minor"/>
+    </dgm:style>
+  </dgm:styleLbl>
+  <dgm:styleLbl name="fgShp">
+    <dgm:scene3d>
+      <a:camera prst="orthographicFront"/>
+      <a:lightRig rig="threePt" dir="t"/>
+    </dgm:scene3d>
+    <dgm:sp3d/>
+    <dgm:txPr/>
+    <dgm:style>
+      <a:lnRef idx="2">
+        <a:scrgbClr r="0" g="0" b="0"/>
+      </a:lnRef>
+      <a:fillRef idx="1">
+        <a:scrgbClr r="0" g="0" b="0"/>
+      </a:fillRef>
+      <a:effectRef idx="0">
+        <a:scrgbClr r="0" g="0" b="0"/>
+      </a:effectRef>
+      <a:fontRef idx="minor"/>
+    </dgm:style>
+  </dgm:styleLbl>
+  <dgm:styleLbl name="revTx">
+    <dgm:scene3d>
+      <a:camera prst="orthographicFront"/>
+      <a:lightRig rig="threePt" dir="t"/>
+    </dgm:scene3d>
+    <dgm:sp3d/>
+    <dgm:txPr/>
+    <dgm:style>
+      <a:lnRef idx="0">
+        <a:scrgbClr r="0" g="0" b="0"/>
+      </a:lnRef>
+      <a:fillRef idx="0">
+        <a:scrgbClr r="0" g="0" b="0"/>
+      </a:fillRef>
+      <a:effectRef idx="0">
+        <a:scrgbClr r="0" g="0" b="0"/>
+      </a:effectRef>
+      <a:fontRef idx="minor"/>
+    </dgm:style>
+  </dgm:styleLbl>
+</dgm:styleDef>
+</file>
+
+<file path=ppt/diagrams/quickStyle4.xml><?xml version="1.0" encoding="utf-8"?>
 <dgm:styleDef xmlns:dgm="http://schemas.openxmlformats.org/drawingml/2006/diagram" xmlns:a="http://schemas.openxmlformats.org/drawingml/2006/main" uniqueId="urn:microsoft.com/office/officeart/2005/8/quickstyle/simple1">
   <dgm:title val=""/>
   <dgm:desc val=""/>
@@ -9304,7 +11972,7 @@
             <a:fld id="{E80C50CD-E178-4744-9B35-B2F624D6C5E9}" type="datetimeFigureOut">
               <a:rPr lang="en-US" smtClean="0"/>
               <a:pPr/>
-              <a:t>10/19/2025</a:t>
+              <a:t>10/20/2025</a:t>
             </a:fld>
             <a:endParaRPr lang="en-US"/>
           </a:p>
@@ -9368,7 +12036,7 @@
     </p:spTree>
     <p:extLst>
       <p:ext uri="{BB962C8B-B14F-4D97-AF65-F5344CB8AC3E}">
-        <p14:creationId xmlns:p14="http://schemas.microsoft.com/office/powerpoint/2010/main" val="4173007915"/>
+        <p14:creationId xmlns:p14="http://schemas.microsoft.com/office/powerpoint/2010/main" val="2421307172"/>
       </p:ext>
     </p:extLst>
   </p:cSld>
@@ -9506,7 +12174,7 @@
             <a:fld id="{E80C50CD-E178-4744-9B35-B2F624D6C5E9}" type="datetimeFigureOut">
               <a:rPr lang="en-US" smtClean="0"/>
               <a:pPr/>
-              <a:t>10/19/2025</a:t>
+              <a:t>10/20/2025</a:t>
             </a:fld>
             <a:endParaRPr lang="en-US"/>
           </a:p>
@@ -9570,7 +12238,7 @@
     </p:spTree>
     <p:extLst>
       <p:ext uri="{BB962C8B-B14F-4D97-AF65-F5344CB8AC3E}">
-        <p14:creationId xmlns:p14="http://schemas.microsoft.com/office/powerpoint/2010/main" val="1817974443"/>
+        <p14:creationId xmlns:p14="http://schemas.microsoft.com/office/powerpoint/2010/main" val="134467078"/>
       </p:ext>
     </p:extLst>
   </p:cSld>
@@ -9718,7 +12386,7 @@
             <a:fld id="{E80C50CD-E178-4744-9B35-B2F624D6C5E9}" type="datetimeFigureOut">
               <a:rPr lang="en-US" smtClean="0"/>
               <a:pPr/>
-              <a:t>10/19/2025</a:t>
+              <a:t>10/20/2025</a:t>
             </a:fld>
             <a:endParaRPr lang="en-US"/>
           </a:p>
@@ -9834,7 +12502,7 @@
     </p:spTree>
     <p:extLst>
       <p:ext uri="{BB962C8B-B14F-4D97-AF65-F5344CB8AC3E}">
-        <p14:creationId xmlns:p14="http://schemas.microsoft.com/office/powerpoint/2010/main" val="634612127"/>
+        <p14:creationId xmlns:p14="http://schemas.microsoft.com/office/powerpoint/2010/main" val="538344825"/>
       </p:ext>
     </p:extLst>
   </p:cSld>
@@ -9972,7 +12640,7 @@
             <a:fld id="{E80C50CD-E178-4744-9B35-B2F624D6C5E9}" type="datetimeFigureOut">
               <a:rPr lang="en-US" smtClean="0"/>
               <a:pPr/>
-              <a:t>10/19/2025</a:t>
+              <a:t>10/20/2025</a:t>
             </a:fld>
             <a:endParaRPr lang="en-US"/>
           </a:p>
@@ -10036,7 +12704,7 @@
     </p:spTree>
     <p:extLst>
       <p:ext uri="{BB962C8B-B14F-4D97-AF65-F5344CB8AC3E}">
-        <p14:creationId xmlns:p14="http://schemas.microsoft.com/office/powerpoint/2010/main" val="449784713"/>
+        <p14:creationId xmlns:p14="http://schemas.microsoft.com/office/powerpoint/2010/main" val="1340658843"/>
       </p:ext>
     </p:extLst>
   </p:cSld>
@@ -10254,7 +12922,7 @@
             <a:fld id="{E80C50CD-E178-4744-9B35-B2F624D6C5E9}" type="datetimeFigureOut">
               <a:rPr lang="en-US" smtClean="0"/>
               <a:pPr/>
-              <a:t>10/19/2025</a:t>
+              <a:t>10/20/2025</a:t>
             </a:fld>
             <a:endParaRPr lang="en-US"/>
           </a:p>
@@ -10370,7 +13038,7 @@
     </p:spTree>
     <p:extLst>
       <p:ext uri="{BB962C8B-B14F-4D97-AF65-F5344CB8AC3E}">
-        <p14:creationId xmlns:p14="http://schemas.microsoft.com/office/powerpoint/2010/main" val="632904683"/>
+        <p14:creationId xmlns:p14="http://schemas.microsoft.com/office/powerpoint/2010/main" val="3403044641"/>
       </p:ext>
     </p:extLst>
   </p:cSld>
@@ -10576,7 +13244,7 @@
             <a:fld id="{E80C50CD-E178-4744-9B35-B2F624D6C5E9}" type="datetimeFigureOut">
               <a:rPr lang="en-US" smtClean="0"/>
               <a:pPr/>
-              <a:t>10/19/2025</a:t>
+              <a:t>10/20/2025</a:t>
             </a:fld>
             <a:endParaRPr lang="en-US"/>
           </a:p>
@@ -10640,7 +13308,7 @@
     </p:spTree>
     <p:extLst>
       <p:ext uri="{BB962C8B-B14F-4D97-AF65-F5344CB8AC3E}">
-        <p14:creationId xmlns:p14="http://schemas.microsoft.com/office/powerpoint/2010/main" val="1201580576"/>
+        <p14:creationId xmlns:p14="http://schemas.microsoft.com/office/powerpoint/2010/main" val="967427763"/>
       </p:ext>
     </p:extLst>
   </p:cSld>
@@ -10997,7 +13665,7 @@
             <a:fld id="{E80C50CD-E178-4744-9B35-B2F624D6C5E9}" type="datetimeFigureOut">
               <a:rPr lang="en-US" smtClean="0"/>
               <a:pPr/>
-              <a:t>10/19/2025</a:t>
+              <a:t>10/20/2025</a:t>
             </a:fld>
             <a:endParaRPr lang="en-US"/>
           </a:p>
@@ -11061,7 +13729,7 @@
     </p:spTree>
     <p:extLst>
       <p:ext uri="{BB962C8B-B14F-4D97-AF65-F5344CB8AC3E}">
-        <p14:creationId xmlns:p14="http://schemas.microsoft.com/office/powerpoint/2010/main" val="1431307687"/>
+        <p14:creationId xmlns:p14="http://schemas.microsoft.com/office/powerpoint/2010/main" val="1694063221"/>
       </p:ext>
     </p:extLst>
   </p:cSld>
@@ -11141,7 +13809,7 @@
             <a:fld id="{E80C50CD-E178-4744-9B35-B2F624D6C5E9}" type="datetimeFigureOut">
               <a:rPr lang="en-US" smtClean="0"/>
               <a:pPr/>
-              <a:t>10/19/2025</a:t>
+              <a:t>10/20/2025</a:t>
             </a:fld>
             <a:endParaRPr lang="en-US"/>
           </a:p>
@@ -11205,7 +13873,7 @@
     </p:spTree>
     <p:extLst>
       <p:ext uri="{BB962C8B-B14F-4D97-AF65-F5344CB8AC3E}">
-        <p14:creationId xmlns:p14="http://schemas.microsoft.com/office/powerpoint/2010/main" val="1964938202"/>
+        <p14:creationId xmlns:p14="http://schemas.microsoft.com/office/powerpoint/2010/main" val="2876615927"/>
       </p:ext>
     </p:extLst>
   </p:cSld>
@@ -11256,7 +13924,7 @@
             <a:fld id="{E80C50CD-E178-4744-9B35-B2F624D6C5E9}" type="datetimeFigureOut">
               <a:rPr lang="en-US" smtClean="0"/>
               <a:pPr/>
-              <a:t>10/19/2025</a:t>
+              <a:t>10/20/2025</a:t>
             </a:fld>
             <a:endParaRPr lang="en-US"/>
           </a:p>
@@ -11320,7 +13988,7 @@
     </p:spTree>
     <p:extLst>
       <p:ext uri="{BB962C8B-B14F-4D97-AF65-F5344CB8AC3E}">
-        <p14:creationId xmlns:p14="http://schemas.microsoft.com/office/powerpoint/2010/main" val="3848504201"/>
+        <p14:creationId xmlns:p14="http://schemas.microsoft.com/office/powerpoint/2010/main" val="3391116359"/>
       </p:ext>
     </p:extLst>
   </p:cSld>
@@ -11577,7 +14245,7 @@
             <a:fld id="{E80C50CD-E178-4744-9B35-B2F624D6C5E9}" type="datetimeFigureOut">
               <a:rPr lang="en-US" smtClean="0"/>
               <a:pPr/>
-              <a:t>10/19/2025</a:t>
+              <a:t>10/20/2025</a:t>
             </a:fld>
             <a:endParaRPr lang="en-US"/>
           </a:p>
@@ -11641,7 +14309,7 @@
     </p:spTree>
     <p:extLst>
       <p:ext uri="{BB962C8B-B14F-4D97-AF65-F5344CB8AC3E}">
-        <p14:creationId xmlns:p14="http://schemas.microsoft.com/office/powerpoint/2010/main" val="1423605171"/>
+        <p14:creationId xmlns:p14="http://schemas.microsoft.com/office/powerpoint/2010/main" val="2298272381"/>
       </p:ext>
     </p:extLst>
   </p:cSld>
@@ -11876,7 +14544,7 @@
             <a:fld id="{E80C50CD-E178-4744-9B35-B2F624D6C5E9}" type="datetimeFigureOut">
               <a:rPr lang="en-US" smtClean="0"/>
               <a:pPr/>
-              <a:t>10/19/2025</a:t>
+              <a:t>10/20/2025</a:t>
             </a:fld>
             <a:endParaRPr lang="en-US"/>
           </a:p>
@@ -11940,7 +14608,7 @@
     </p:spTree>
     <p:extLst>
       <p:ext uri="{BB962C8B-B14F-4D97-AF65-F5344CB8AC3E}">
-        <p14:creationId xmlns:p14="http://schemas.microsoft.com/office/powerpoint/2010/main" val="171454980"/>
+        <p14:creationId xmlns:p14="http://schemas.microsoft.com/office/powerpoint/2010/main" val="3359890409"/>
       </p:ext>
     </p:extLst>
   </p:cSld>
@@ -12119,7 +14787,7 @@
             <a:fld id="{E80C50CD-E178-4744-9B35-B2F624D6C5E9}" type="datetimeFigureOut">
               <a:rPr lang="en-US" smtClean="0"/>
               <a:pPr/>
-              <a:t>10/19/2025</a:t>
+              <a:t>10/20/2025</a:t>
             </a:fld>
             <a:endParaRPr lang="en-US"/>
           </a:p>
@@ -12315,23 +14983,23 @@
     </p:spTree>
     <p:extLst>
       <p:ext uri="{BB962C8B-B14F-4D97-AF65-F5344CB8AC3E}">
-        <p14:creationId xmlns:p14="http://schemas.microsoft.com/office/powerpoint/2010/main" val="3466768452"/>
+        <p14:creationId xmlns:p14="http://schemas.microsoft.com/office/powerpoint/2010/main" val="2498768267"/>
       </p:ext>
     </p:extLst>
   </p:cSld>
   <p:clrMap bg1="lt1" tx1="dk1" bg2="lt2" tx2="dk2" accent1="accent1" accent2="accent2" accent3="accent3" accent4="accent4" accent5="accent5" accent6="accent6" hlink="hlink" folHlink="folHlink"/>
   <p:sldLayoutIdLst>
-    <p:sldLayoutId id="2147483700" r:id="rId1"/>
-    <p:sldLayoutId id="2147483701" r:id="rId2"/>
-    <p:sldLayoutId id="2147483702" r:id="rId3"/>
-    <p:sldLayoutId id="2147483703" r:id="rId4"/>
-    <p:sldLayoutId id="2147483704" r:id="rId5"/>
-    <p:sldLayoutId id="2147483705" r:id="rId6"/>
-    <p:sldLayoutId id="2147483706" r:id="rId7"/>
-    <p:sldLayoutId id="2147483707" r:id="rId8"/>
-    <p:sldLayoutId id="2147483708" r:id="rId9"/>
-    <p:sldLayoutId id="2147483709" r:id="rId10"/>
-    <p:sldLayoutId id="2147483710" r:id="rId11"/>
+    <p:sldLayoutId id="2147483724" r:id="rId1"/>
+    <p:sldLayoutId id="2147483725" r:id="rId2"/>
+    <p:sldLayoutId id="2147483726" r:id="rId3"/>
+    <p:sldLayoutId id="2147483727" r:id="rId4"/>
+    <p:sldLayoutId id="2147483728" r:id="rId5"/>
+    <p:sldLayoutId id="2147483729" r:id="rId6"/>
+    <p:sldLayoutId id="2147483730" r:id="rId7"/>
+    <p:sldLayoutId id="2147483731" r:id="rId8"/>
+    <p:sldLayoutId id="2147483732" r:id="rId9"/>
+    <p:sldLayoutId id="2147483733" r:id="rId10"/>
+    <p:sldLayoutId id="2147483734" r:id="rId11"/>
   </p:sldLayoutIdLst>
   <p:txStyles>
     <p:titleStyle>
@@ -16161,7 +18829,7 @@
           <p:cNvPr id="2" name="Título 1">
             <a:extLst>
               <a:ext uri="{FF2B5EF4-FFF2-40B4-BE49-F238E27FC236}">
-                <a16:creationId xmlns:a16="http://schemas.microsoft.com/office/drawing/2014/main" id="{C2BDA93F-6E3C-DCC0-A7B9-353CD9539477}"/>
+                <a16:creationId xmlns:a16="http://schemas.microsoft.com/office/drawing/2014/main" id="{98BEAC46-11F2-726D-0E7C-35D93C06C866}"/>
               </a:ext>
             </a:extLst>
           </p:cNvPr>
@@ -16172,44 +18840,60 @@
             <p:ph type="title"/>
           </p:nvPr>
         </p:nvSpPr>
-        <p:spPr/>
+        <p:spPr>
+          <a:xfrm>
+            <a:off x="521208" y="978408"/>
+            <a:ext cx="11155680" cy="1463040"/>
+          </a:xfrm>
+        </p:spPr>
         <p:txBody>
-          <a:bodyPr/>
+          <a:bodyPr anchor="t">
+            <a:normAutofit/>
+          </a:bodyPr>
           <a:lstStyle/>
           <a:p>
-            <a:endParaRPr lang="es-ES"/>
+            <a:r>
+              <a:rPr lang="es-ES" dirty="0"/>
+              <a:t>¿Qué se puede hacer con RSA?</a:t>
+            </a:r>
           </a:p>
         </p:txBody>
       </p:sp>
-      <p:sp>
-        <p:nvSpPr>
-          <p:cNvPr id="3" name="Marcador de contenido 2">
+      <p:graphicFrame>
+        <p:nvGraphicFramePr>
+          <p:cNvPr id="5" name="Marcador de contenido 2">
             <a:extLst>
               <a:ext uri="{FF2B5EF4-FFF2-40B4-BE49-F238E27FC236}">
-                <a16:creationId xmlns:a16="http://schemas.microsoft.com/office/drawing/2014/main" id="{411B4ED5-D510-0701-6A25-729C28B8F99F}"/>
+                <a16:creationId xmlns:a16="http://schemas.microsoft.com/office/drawing/2014/main" id="{393EF80E-FE8A-389C-62B3-923F49223041}"/>
               </a:ext>
             </a:extLst>
           </p:cNvPr>
-          <p:cNvSpPr>
-            <a:spLocks noGrp="1"/>
-          </p:cNvSpPr>
+          <p:cNvGraphicFramePr>
+            <a:graphicFrameLocks noGrp="1"/>
+          </p:cNvGraphicFramePr>
           <p:nvPr>
             <p:ph idx="1"/>
+            <p:extLst>
+              <p:ext uri="{D42A27DB-BD31-4B8C-83A1-F6EECF244321}">
+                <p14:modId xmlns:p14="http://schemas.microsoft.com/office/powerpoint/2010/main" val="2459060159"/>
+              </p:ext>
+            </p:extLst>
           </p:nvPr>
-        </p:nvSpPr>
-        <p:spPr/>
-        <p:txBody>
-          <a:bodyPr/>
-          <a:lstStyle/>
-          <a:p>
-            <a:endParaRPr lang="es-ES"/>
-          </a:p>
-        </p:txBody>
-      </p:sp>
+        </p:nvGraphicFramePr>
+        <p:xfrm>
+          <a:off x="521208" y="2578608"/>
+          <a:ext cx="11155680" cy="3767328"/>
+        </p:xfrm>
+        <a:graphic>
+          <a:graphicData uri="http://schemas.openxmlformats.org/drawingml/2006/diagram">
+            <dgm:relIds xmlns:dgm="http://schemas.openxmlformats.org/drawingml/2006/diagram" xmlns:r="http://schemas.openxmlformats.org/officeDocument/2006/relationships" r:dm="rId2" r:lo="rId3" r:qs="rId4" r:cs="rId5"/>
+          </a:graphicData>
+        </a:graphic>
+      </p:graphicFrame>
     </p:spTree>
     <p:extLst>
       <p:ext uri="{BB962C8B-B14F-4D97-AF65-F5344CB8AC3E}">
-        <p14:creationId xmlns:p14="http://schemas.microsoft.com/office/powerpoint/2010/main" val="2606363543"/>
+        <p14:creationId xmlns:p14="http://schemas.microsoft.com/office/powerpoint/2010/main" val="2308232123"/>
       </p:ext>
     </p:extLst>
   </p:cSld>
@@ -16335,75 +19019,81 @@
           <a:chExt cx="0" cy="0"/>
         </a:xfrm>
       </p:grpSpPr>
-      <p:sp>
-        <p:nvSpPr>
-          <p:cNvPr id="2" name="Título 1">
+      <p:pic>
+        <p:nvPicPr>
+          <p:cNvPr id="5" name="Marcador de contenido 4" descr="Diagrama&#10;&#10;El contenido generado por IA puede ser incorrecto.">
             <a:extLst>
               <a:ext uri="{FF2B5EF4-FFF2-40B4-BE49-F238E27FC236}">
-                <a16:creationId xmlns:a16="http://schemas.microsoft.com/office/drawing/2014/main" id="{3C818EA2-A9B8-6137-C8AD-0A9FAA5C3666}"/>
+                <a16:creationId xmlns:a16="http://schemas.microsoft.com/office/drawing/2014/main" id="{43A095D5-2F90-1F50-0191-DE6C1BC947C2}"/>
               </a:ext>
             </a:extLst>
           </p:cNvPr>
-          <p:cNvSpPr>
-            <a:spLocks noGrp="1"/>
-          </p:cNvSpPr>
-          <p:nvPr>
-            <p:ph type="title"/>
-          </p:nvPr>
-        </p:nvSpPr>
-        <p:spPr/>
-        <p:txBody>
-          <a:bodyPr/>
-          <a:lstStyle/>
-          <a:p>
-            <a:r>
-              <a:rPr lang="es-ES" dirty="0"/>
-              <a:t>4.1 Criptografía hibrida</a:t>
-            </a:r>
-          </a:p>
-        </p:txBody>
-      </p:sp>
-      <p:sp>
-        <p:nvSpPr>
-          <p:cNvPr id="3" name="Marcador de contenido 2">
-            <a:extLst>
-              <a:ext uri="{FF2B5EF4-FFF2-40B4-BE49-F238E27FC236}">
-                <a16:creationId xmlns:a16="http://schemas.microsoft.com/office/drawing/2014/main" id="{DB70AA01-C20A-5260-48DE-382B6FB9A985}"/>
-              </a:ext>
-            </a:extLst>
-          </p:cNvPr>
-          <p:cNvSpPr>
-            <a:spLocks noGrp="1"/>
-          </p:cNvSpPr>
+          <p:cNvPicPr>
+            <a:picLocks noGrp="1" noChangeAspect="1"/>
+          </p:cNvPicPr>
           <p:nvPr>
             <p:ph idx="1"/>
           </p:nvPr>
+        </p:nvPicPr>
+        <p:blipFill>
+          <a:blip r:embed="rId2">
+            <a:extLst>
+              <a:ext uri="{28A0092B-C50C-407E-A947-70E740481C1C}">
+                <a14:useLocalDpi xmlns:a14="http://schemas.microsoft.com/office/drawing/2010/main" val="0"/>
+              </a:ext>
+            </a:extLst>
+          </a:blip>
+          <a:stretch>
+            <a:fillRect/>
+          </a:stretch>
+        </p:blipFill>
+        <p:spPr>
+          <a:xfrm>
+            <a:off x="2809144" y="725488"/>
+            <a:ext cx="6573712" cy="6064250"/>
+          </a:xfrm>
+          <a:noFill/>
+        </p:spPr>
+      </p:pic>
+      <p:sp>
+        <p:nvSpPr>
+          <p:cNvPr id="6" name="CuadroTexto 5">
+            <a:extLst>
+              <a:ext uri="{FF2B5EF4-FFF2-40B4-BE49-F238E27FC236}">
+                <a16:creationId xmlns:a16="http://schemas.microsoft.com/office/drawing/2014/main" id="{9504D661-B6A1-A009-A4D2-7B03969C1F13}"/>
+              </a:ext>
+            </a:extLst>
+          </p:cNvPr>
+          <p:cNvSpPr txBox="1"/>
+          <p:nvPr/>
         </p:nvSpPr>
-        <p:spPr/>
+        <p:spPr>
+          <a:xfrm flipH="1">
+            <a:off x="447653" y="68262"/>
+            <a:ext cx="6128492" cy="369332"/>
+          </a:xfrm>
+          <a:prstGeom prst="rect">
+            <a:avLst/>
+          </a:prstGeom>
+          <a:noFill/>
+        </p:spPr>
         <p:txBody>
-          <a:bodyPr/>
+          <a:bodyPr wrap="square" rtlCol="0">
+            <a:spAutoFit/>
+          </a:bodyPr>
           <a:lstStyle/>
           <a:p>
             <a:r>
               <a:rPr lang="es-ES" dirty="0"/>
-              <a:t>Consiste en mezclar tanto criptografía asimétrica como simétrica.</a:t>
-            </a:r>
-          </a:p>
-          <a:p>
-            <a:r>
-              <a:rPr lang="es-ES" dirty="0"/>
-              <a:t>Comúnmente cuando se establece la comunicación se utiliza la criptografía asimétrica para garantizar la confidencialidad, aunque el canal este comprometido. Se intercambian las claves simétricas de sesión y a partir de hay se empieza a usar criptografía simétrica.</a:t>
-            </a:r>
-          </a:p>
-          <a:p>
-            <a:endParaRPr lang="es-ES" dirty="0"/>
+              <a:t>Cálculos de RSA</a:t>
+            </a:r>
           </a:p>
         </p:txBody>
       </p:sp>
     </p:spTree>
     <p:extLst>
       <p:ext uri="{BB962C8B-B14F-4D97-AF65-F5344CB8AC3E}">
-        <p14:creationId xmlns:p14="http://schemas.microsoft.com/office/powerpoint/2010/main" val="3297381322"/>
+        <p14:creationId xmlns:p14="http://schemas.microsoft.com/office/powerpoint/2010/main" val="2606363543"/>
       </p:ext>
     </p:extLst>
   </p:cSld>
@@ -16435,7 +19125,7 @@
           <p:cNvPr id="2" name="Título 1">
             <a:extLst>
               <a:ext uri="{FF2B5EF4-FFF2-40B4-BE49-F238E27FC236}">
-                <a16:creationId xmlns:a16="http://schemas.microsoft.com/office/drawing/2014/main" id="{6A7CE37F-D143-4557-1D40-019CAD4AC509}"/>
+                <a16:creationId xmlns:a16="http://schemas.microsoft.com/office/drawing/2014/main" id="{68640731-A73E-D655-3832-F602B353ED96}"/>
               </a:ext>
             </a:extLst>
           </p:cNvPr>
@@ -16451,100 +19141,39 @@
           <a:bodyPr/>
           <a:lstStyle/>
           <a:p>
-            <a:r>
-              <a:rPr lang="es-ES"/>
-              <a:t>5. Funciones Hash</a:t>
-            </a:r>
             <a:endParaRPr lang="es-ES" dirty="0"/>
           </a:p>
         </p:txBody>
       </p:sp>
-      <p:pic>
-        <p:nvPicPr>
-          <p:cNvPr id="5" name="Marcador de contenido 4">
+      <p:sp>
+        <p:nvSpPr>
+          <p:cNvPr id="3" name="Marcador de contenido 2">
             <a:extLst>
               <a:ext uri="{FF2B5EF4-FFF2-40B4-BE49-F238E27FC236}">
-                <a16:creationId xmlns:a16="http://schemas.microsoft.com/office/drawing/2014/main" id="{BC5B614C-B32F-5167-B5A2-98CA79A5742E}"/>
+                <a16:creationId xmlns:a16="http://schemas.microsoft.com/office/drawing/2014/main" id="{97807957-D5A8-EF8C-D4A6-1C56918F59FC}"/>
               </a:ext>
             </a:extLst>
           </p:cNvPr>
-          <p:cNvPicPr>
-            <a:picLocks noGrp="1" noChangeAspect="1"/>
-          </p:cNvPicPr>
+          <p:cNvSpPr>
+            <a:spLocks noGrp="1"/>
+          </p:cNvSpPr>
           <p:nvPr>
             <p:ph idx="1"/>
           </p:nvPr>
-        </p:nvPicPr>
-        <p:blipFill>
-          <a:blip r:embed="rId2">
-            <a:extLst>
-              <a:ext uri="{28A0092B-C50C-407E-A947-70E740481C1C}">
-                <a14:useLocalDpi xmlns:a14="http://schemas.microsoft.com/office/drawing/2010/main" val="0"/>
-              </a:ext>
-            </a:extLst>
-          </a:blip>
-          <a:stretch>
-            <a:fillRect/>
-          </a:stretch>
-        </p:blipFill>
-        <p:spPr>
-          <a:xfrm>
-            <a:off x="2100090" y="2578100"/>
-            <a:ext cx="7998169" cy="3767138"/>
-          </a:xfrm>
-        </p:spPr>
-      </p:pic>
-      <p:sp>
-        <p:nvSpPr>
-          <p:cNvPr id="3" name="CuadroTexto 2">
-            <a:extLst>
-              <a:ext uri="{FF2B5EF4-FFF2-40B4-BE49-F238E27FC236}">
-                <a16:creationId xmlns:a16="http://schemas.microsoft.com/office/drawing/2014/main" id="{5B6D7FB2-2DD2-78BD-CCEA-20A2C5F3A6CC}"/>
-              </a:ext>
-            </a:extLst>
-          </p:cNvPr>
-          <p:cNvSpPr txBox="1"/>
-          <p:nvPr/>
         </p:nvSpPr>
-        <p:spPr>
-          <a:xfrm>
-            <a:off x="10849733" y="978408"/>
-            <a:ext cx="821059" cy="923330"/>
-          </a:xfrm>
-          <a:prstGeom prst="rect">
-            <a:avLst/>
-          </a:prstGeom>
-          <a:noFill/>
-        </p:spPr>
+        <p:spPr/>
         <p:txBody>
-          <a:bodyPr wrap="none" rtlCol="0">
-            <a:spAutoFit/>
-          </a:bodyPr>
+          <a:bodyPr/>
           <a:lstStyle/>
           <a:p>
-            <a:r>
-              <a:rPr lang="es-ES" dirty="0"/>
-              <a:t>MD5</a:t>
-            </a:r>
-          </a:p>
-          <a:p>
-            <a:r>
-              <a:rPr lang="es-ES" dirty="0"/>
-              <a:t>SHA-1</a:t>
-            </a:r>
-          </a:p>
-          <a:p>
-            <a:r>
-              <a:rPr lang="es-ES" dirty="0"/>
-              <a:t>DSA</a:t>
-            </a:r>
+            <a:endParaRPr lang="es-ES"/>
           </a:p>
         </p:txBody>
       </p:sp>
     </p:spTree>
     <p:extLst>
       <p:ext uri="{BB962C8B-B14F-4D97-AF65-F5344CB8AC3E}">
-        <p14:creationId xmlns:p14="http://schemas.microsoft.com/office/powerpoint/2010/main" val="2855155637"/>
+        <p14:creationId xmlns:p14="http://schemas.microsoft.com/office/powerpoint/2010/main" val="2614504279"/>
       </p:ext>
     </p:extLst>
   </p:cSld>
@@ -16576,7 +19205,7 @@
           <p:cNvPr id="2" name="Título 1">
             <a:extLst>
               <a:ext uri="{FF2B5EF4-FFF2-40B4-BE49-F238E27FC236}">
-                <a16:creationId xmlns:a16="http://schemas.microsoft.com/office/drawing/2014/main" id="{F3AE1AF7-49C7-F432-E1E4-7BA587AC4339}"/>
+                <a16:creationId xmlns:a16="http://schemas.microsoft.com/office/drawing/2014/main" id="{3C818EA2-A9B8-6137-C8AD-0A9FAA5C3666}"/>
               </a:ext>
             </a:extLst>
           </p:cNvPr>
@@ -16594,7 +19223,7 @@
           <a:p>
             <a:r>
               <a:rPr lang="es-ES" dirty="0"/>
-              <a:t>Conceptos clave</a:t>
+              <a:t>4.1 Criptografía hibrida</a:t>
             </a:r>
           </a:p>
         </p:txBody>
@@ -16604,7 +19233,7 @@
           <p:cNvPr id="3" name="Marcador de contenido 2">
             <a:extLst>
               <a:ext uri="{FF2B5EF4-FFF2-40B4-BE49-F238E27FC236}">
-                <a16:creationId xmlns:a16="http://schemas.microsoft.com/office/drawing/2014/main" id="{E854A13A-6D50-FBB5-0B6D-E0A213B949A7}"/>
+                <a16:creationId xmlns:a16="http://schemas.microsoft.com/office/drawing/2014/main" id="{DB70AA01-C20A-5260-48DE-382B6FB9A985}"/>
               </a:ext>
             </a:extLst>
           </p:cNvPr>
@@ -16622,23 +19251,14 @@
           <a:p>
             <a:r>
               <a:rPr lang="es-ES" dirty="0"/>
-              <a:t>Función hash no biyectiva (en la mayoría de las ocasiones).</a:t>
+              <a:t>Consiste en mezclar tanto criptografía asimétrica como simétrica.</a:t>
             </a:r>
           </a:p>
           <a:p>
             <a:r>
               <a:rPr lang="es-ES" dirty="0"/>
-              <a:t>Identificación de información.</a:t>
-            </a:r>
-          </a:p>
-          <a:p>
-            <a:r>
-              <a:rPr lang="es-ES" dirty="0"/>
-              <a:t>Colisiones de HASH.</a:t>
-            </a:r>
-          </a:p>
-          <a:p>
-            <a:endParaRPr lang="es-ES" dirty="0"/>
+              <a:t>Comúnmente cuando se establece la comunicación se utiliza la criptografía asimétrica para garantizar la confidencialidad, aunque el canal este comprometido. Se intercambian las claves simétricas de sesión y a partir de hay se empieza a usar criptografía simétrica.</a:t>
+            </a:r>
           </a:p>
           <a:p>
             <a:endParaRPr lang="es-ES" dirty="0"/>
@@ -16648,7 +19268,7 @@
     </p:spTree>
     <p:extLst>
       <p:ext uri="{BB962C8B-B14F-4D97-AF65-F5344CB8AC3E}">
-        <p14:creationId xmlns:p14="http://schemas.microsoft.com/office/powerpoint/2010/main" val="3376416270"/>
+        <p14:creationId xmlns:p14="http://schemas.microsoft.com/office/powerpoint/2010/main" val="3297381322"/>
       </p:ext>
     </p:extLst>
   </p:cSld>
@@ -16680,7 +19300,7 @@
           <p:cNvPr id="2" name="Título 1">
             <a:extLst>
               <a:ext uri="{FF2B5EF4-FFF2-40B4-BE49-F238E27FC236}">
-                <a16:creationId xmlns:a16="http://schemas.microsoft.com/office/drawing/2014/main" id="{A133AA1B-A1F8-30E1-13A5-E1F2BACA9AFE}"/>
+                <a16:creationId xmlns:a16="http://schemas.microsoft.com/office/drawing/2014/main" id="{6A7CE37F-D143-4557-1D40-019CAD4AC509}"/>
               </a:ext>
             </a:extLst>
           </p:cNvPr>
@@ -16697,44 +19317,91 @@
           <a:lstStyle/>
           <a:p>
             <a:r>
-              <a:rPr lang="es-ES" dirty="0"/>
-              <a:t>SHA</a:t>
-            </a:r>
+              <a:rPr lang="es-ES"/>
+              <a:t>5. Funciones Hash</a:t>
+            </a:r>
+            <a:endParaRPr lang="es-ES" dirty="0"/>
           </a:p>
         </p:txBody>
       </p:sp>
-      <p:sp>
-        <p:nvSpPr>
-          <p:cNvPr id="3" name="Marcador de contenido 2">
+      <p:pic>
+        <p:nvPicPr>
+          <p:cNvPr id="5" name="Marcador de contenido 4">
             <a:extLst>
               <a:ext uri="{FF2B5EF4-FFF2-40B4-BE49-F238E27FC236}">
-                <a16:creationId xmlns:a16="http://schemas.microsoft.com/office/drawing/2014/main" id="{2D1A6F61-7CB9-5858-40B2-C63981F33C44}"/>
+                <a16:creationId xmlns:a16="http://schemas.microsoft.com/office/drawing/2014/main" id="{BC5B614C-B32F-5167-B5A2-98CA79A5742E}"/>
               </a:ext>
             </a:extLst>
           </p:cNvPr>
-          <p:cNvSpPr>
-            <a:spLocks noGrp="1"/>
-          </p:cNvSpPr>
+          <p:cNvPicPr>
+            <a:picLocks noGrp="1" noChangeAspect="1"/>
+          </p:cNvPicPr>
           <p:nvPr>
             <p:ph idx="1"/>
           </p:nvPr>
+        </p:nvPicPr>
+        <p:blipFill>
+          <a:blip r:embed="rId2">
+            <a:extLst>
+              <a:ext uri="{28A0092B-C50C-407E-A947-70E740481C1C}">
+                <a14:useLocalDpi xmlns:a14="http://schemas.microsoft.com/office/drawing/2010/main" val="0"/>
+              </a:ext>
+            </a:extLst>
+          </a:blip>
+          <a:stretch>
+            <a:fillRect/>
+          </a:stretch>
+        </p:blipFill>
+        <p:spPr>
+          <a:xfrm>
+            <a:off x="2100090" y="2578100"/>
+            <a:ext cx="7998169" cy="3767138"/>
+          </a:xfrm>
+        </p:spPr>
+      </p:pic>
+      <p:sp>
+        <p:nvSpPr>
+          <p:cNvPr id="3" name="CuadroTexto 2">
+            <a:extLst>
+              <a:ext uri="{FF2B5EF4-FFF2-40B4-BE49-F238E27FC236}">
+                <a16:creationId xmlns:a16="http://schemas.microsoft.com/office/drawing/2014/main" id="{5B6D7FB2-2DD2-78BD-CCEA-20A2C5F3A6CC}"/>
+              </a:ext>
+            </a:extLst>
+          </p:cNvPr>
+          <p:cNvSpPr txBox="1"/>
+          <p:nvPr/>
         </p:nvSpPr>
-        <p:spPr/>
+        <p:spPr>
+          <a:xfrm>
+            <a:off x="10849733" y="978408"/>
+            <a:ext cx="821059" cy="923330"/>
+          </a:xfrm>
+          <a:prstGeom prst="rect">
+            <a:avLst/>
+          </a:prstGeom>
+          <a:noFill/>
+        </p:spPr>
         <p:txBody>
-          <a:bodyPr/>
+          <a:bodyPr wrap="none" rtlCol="0">
+            <a:spAutoFit/>
+          </a:bodyPr>
           <a:lstStyle/>
           <a:p>
             <a:r>
               <a:rPr lang="es-ES" dirty="0"/>
-              <a:t>SHA es una familia de funciones de </a:t>
-            </a:r>
-            <a:r>
-              <a:rPr lang="es-ES" dirty="0" err="1"/>
-              <a:t>haseo</a:t>
-            </a:r>
+              <a:t>MD5</a:t>
+            </a:r>
+          </a:p>
+          <a:p>
             <a:r>
               <a:rPr lang="es-ES" dirty="0"/>
-              <a:t> de las cuales la más empleada es la SHA-256</a:t>
+              <a:t>SHA-1</a:t>
+            </a:r>
+          </a:p>
+          <a:p>
+            <a:r>
+              <a:rPr lang="es-ES" dirty="0"/>
+              <a:t>DSA</a:t>
             </a:r>
           </a:p>
         </p:txBody>
@@ -16742,7 +19409,7 @@
     </p:spTree>
     <p:extLst>
       <p:ext uri="{BB962C8B-B14F-4D97-AF65-F5344CB8AC3E}">
-        <p14:creationId xmlns:p14="http://schemas.microsoft.com/office/powerpoint/2010/main" val="221936402"/>
+        <p14:creationId xmlns:p14="http://schemas.microsoft.com/office/powerpoint/2010/main" val="2855155637"/>
       </p:ext>
     </p:extLst>
   </p:cSld>
@@ -16774,7 +19441,7 @@
           <p:cNvPr id="2" name="Título 1">
             <a:extLst>
               <a:ext uri="{FF2B5EF4-FFF2-40B4-BE49-F238E27FC236}">
-                <a16:creationId xmlns:a16="http://schemas.microsoft.com/office/drawing/2014/main" id="{4125E6C8-2BE8-A94D-0535-840497F45B4A}"/>
+                <a16:creationId xmlns:a16="http://schemas.microsoft.com/office/drawing/2014/main" id="{F3AE1AF7-49C7-F432-E1E4-7BA587AC4339}"/>
               </a:ext>
             </a:extLst>
           </p:cNvPr>
@@ -16792,7 +19459,7 @@
           <a:p>
             <a:r>
               <a:rPr lang="es-ES" dirty="0"/>
-              <a:t>¿Por qué es buena práctica cifrar la base de datos?</a:t>
+              <a:t>Conceptos clave</a:t>
             </a:r>
           </a:p>
         </p:txBody>
@@ -16802,7 +19469,7 @@
           <p:cNvPr id="3" name="Marcador de contenido 2">
             <a:extLst>
               <a:ext uri="{FF2B5EF4-FFF2-40B4-BE49-F238E27FC236}">
-                <a16:creationId xmlns:a16="http://schemas.microsoft.com/office/drawing/2014/main" id="{556492AC-E569-1328-D2E5-DF8AA192DB1F}"/>
+                <a16:creationId xmlns:a16="http://schemas.microsoft.com/office/drawing/2014/main" id="{E854A13A-6D50-FBB5-0B6D-E0A213B949A7}"/>
               </a:ext>
             </a:extLst>
           </p:cNvPr>
@@ -16820,29 +19487,33 @@
           <a:p>
             <a:r>
               <a:rPr lang="es-ES" dirty="0"/>
-              <a:t>Si hay una filtración los datos sensibles no quedan expuestos como texto en claro, pero sigue siendo un problema grave.</a:t>
+              <a:t>Función hash no biyectiva (en la mayoría de las ocasiones).</a:t>
             </a:r>
           </a:p>
           <a:p>
             <a:r>
               <a:rPr lang="es-ES" dirty="0"/>
-              <a:t>También se pueden poner </a:t>
-            </a:r>
-            <a:r>
-              <a:rPr lang="es-ES" dirty="0" err="1"/>
-              <a:t>honeypots</a:t>
-            </a:r>
+              <a:t>Identificación de información.</a:t>
+            </a:r>
+          </a:p>
+          <a:p>
             <a:r>
               <a:rPr lang="es-ES" dirty="0"/>
-              <a:t> con cuentas inexistentes para que si hay un inicio de sesión salte una alerta.</a:t>
-            </a:r>
+              <a:t>Colisiones de HASH.</a:t>
+            </a:r>
+          </a:p>
+          <a:p>
+            <a:endParaRPr lang="es-ES" dirty="0"/>
+          </a:p>
+          <a:p>
+            <a:endParaRPr lang="es-ES" dirty="0"/>
           </a:p>
         </p:txBody>
       </p:sp>
     </p:spTree>
     <p:extLst>
       <p:ext uri="{BB962C8B-B14F-4D97-AF65-F5344CB8AC3E}">
-        <p14:creationId xmlns:p14="http://schemas.microsoft.com/office/powerpoint/2010/main" val="1940121297"/>
+        <p14:creationId xmlns:p14="http://schemas.microsoft.com/office/powerpoint/2010/main" val="3376416270"/>
       </p:ext>
     </p:extLst>
   </p:cSld>
@@ -16874,6 +19545,203 @@
           <p:cNvPr id="2" name="Título 1">
             <a:extLst>
               <a:ext uri="{FF2B5EF4-FFF2-40B4-BE49-F238E27FC236}">
+                <a16:creationId xmlns:a16="http://schemas.microsoft.com/office/drawing/2014/main" id="{A133AA1B-A1F8-30E1-13A5-E1F2BACA9AFE}"/>
+              </a:ext>
+            </a:extLst>
+          </p:cNvPr>
+          <p:cNvSpPr>
+            <a:spLocks noGrp="1"/>
+          </p:cNvSpPr>
+          <p:nvPr>
+            <p:ph type="title"/>
+          </p:nvPr>
+        </p:nvSpPr>
+        <p:spPr/>
+        <p:txBody>
+          <a:bodyPr/>
+          <a:lstStyle/>
+          <a:p>
+            <a:r>
+              <a:rPr lang="es-ES" dirty="0"/>
+              <a:t>SHA</a:t>
+            </a:r>
+          </a:p>
+        </p:txBody>
+      </p:sp>
+      <p:sp>
+        <p:nvSpPr>
+          <p:cNvPr id="3" name="Marcador de contenido 2">
+            <a:extLst>
+              <a:ext uri="{FF2B5EF4-FFF2-40B4-BE49-F238E27FC236}">
+                <a16:creationId xmlns:a16="http://schemas.microsoft.com/office/drawing/2014/main" id="{2D1A6F61-7CB9-5858-40B2-C63981F33C44}"/>
+              </a:ext>
+            </a:extLst>
+          </p:cNvPr>
+          <p:cNvSpPr>
+            <a:spLocks noGrp="1"/>
+          </p:cNvSpPr>
+          <p:nvPr>
+            <p:ph idx="1"/>
+          </p:nvPr>
+        </p:nvSpPr>
+        <p:spPr/>
+        <p:txBody>
+          <a:bodyPr/>
+          <a:lstStyle/>
+          <a:p>
+            <a:r>
+              <a:rPr lang="es-ES" dirty="0"/>
+              <a:t>SHA es una familia de funciones de </a:t>
+            </a:r>
+            <a:r>
+              <a:rPr lang="es-ES" dirty="0" err="1"/>
+              <a:t>haseo</a:t>
+            </a:r>
+            <a:r>
+              <a:rPr lang="es-ES" dirty="0"/>
+              <a:t> de las cuales la más empleada es la SHA-256.</a:t>
+            </a:r>
+          </a:p>
+          <a:p>
+            <a:endParaRPr lang="es-ES" dirty="0"/>
+          </a:p>
+        </p:txBody>
+      </p:sp>
+    </p:spTree>
+    <p:extLst>
+      <p:ext uri="{BB962C8B-B14F-4D97-AF65-F5344CB8AC3E}">
+        <p14:creationId xmlns:p14="http://schemas.microsoft.com/office/powerpoint/2010/main" val="221936402"/>
+      </p:ext>
+    </p:extLst>
+  </p:cSld>
+  <p:clrMapOvr>
+    <a:masterClrMapping/>
+  </p:clrMapOvr>
+</p:sld>
+</file>
+
+<file path=ppt/slides/slide36.xml><?xml version="1.0" encoding="utf-8"?>
+<p:sld xmlns:a="http://schemas.openxmlformats.org/drawingml/2006/main" xmlns:r="http://schemas.openxmlformats.org/officeDocument/2006/relationships" xmlns:p="http://schemas.openxmlformats.org/presentationml/2006/main">
+  <p:cSld>
+    <p:spTree>
+      <p:nvGrpSpPr>
+        <p:cNvPr id="1" name=""/>
+        <p:cNvGrpSpPr/>
+        <p:nvPr/>
+      </p:nvGrpSpPr>
+      <p:grpSpPr>
+        <a:xfrm>
+          <a:off x="0" y="0"/>
+          <a:ext cx="0" cy="0"/>
+          <a:chOff x="0" y="0"/>
+          <a:chExt cx="0" cy="0"/>
+        </a:xfrm>
+      </p:grpSpPr>
+      <p:sp>
+        <p:nvSpPr>
+          <p:cNvPr id="2" name="Título 1">
+            <a:extLst>
+              <a:ext uri="{FF2B5EF4-FFF2-40B4-BE49-F238E27FC236}">
+                <a16:creationId xmlns:a16="http://schemas.microsoft.com/office/drawing/2014/main" id="{4125E6C8-2BE8-A94D-0535-840497F45B4A}"/>
+              </a:ext>
+            </a:extLst>
+          </p:cNvPr>
+          <p:cNvSpPr>
+            <a:spLocks noGrp="1"/>
+          </p:cNvSpPr>
+          <p:nvPr>
+            <p:ph type="title"/>
+          </p:nvPr>
+        </p:nvSpPr>
+        <p:spPr/>
+        <p:txBody>
+          <a:bodyPr/>
+          <a:lstStyle/>
+          <a:p>
+            <a:r>
+              <a:rPr lang="es-ES" dirty="0"/>
+              <a:t>¿Por qué es buena práctica cifrar la base de datos?</a:t>
+            </a:r>
+          </a:p>
+        </p:txBody>
+      </p:sp>
+      <p:sp>
+        <p:nvSpPr>
+          <p:cNvPr id="3" name="Marcador de contenido 2">
+            <a:extLst>
+              <a:ext uri="{FF2B5EF4-FFF2-40B4-BE49-F238E27FC236}">
+                <a16:creationId xmlns:a16="http://schemas.microsoft.com/office/drawing/2014/main" id="{556492AC-E569-1328-D2E5-DF8AA192DB1F}"/>
+              </a:ext>
+            </a:extLst>
+          </p:cNvPr>
+          <p:cNvSpPr>
+            <a:spLocks noGrp="1"/>
+          </p:cNvSpPr>
+          <p:nvPr>
+            <p:ph idx="1"/>
+          </p:nvPr>
+        </p:nvSpPr>
+        <p:spPr/>
+        <p:txBody>
+          <a:bodyPr/>
+          <a:lstStyle/>
+          <a:p>
+            <a:r>
+              <a:rPr lang="es-ES" dirty="0"/>
+              <a:t>Si hay una filtración los datos sensibles no quedan expuestos como texto en claro, pero sigue siendo un problema grave.</a:t>
+            </a:r>
+          </a:p>
+          <a:p>
+            <a:r>
+              <a:rPr lang="es-ES" dirty="0"/>
+              <a:t>También se pueden poner </a:t>
+            </a:r>
+            <a:r>
+              <a:rPr lang="es-ES" dirty="0" err="1"/>
+              <a:t>honeypots</a:t>
+            </a:r>
+            <a:r>
+              <a:rPr lang="es-ES" dirty="0"/>
+              <a:t> con cuentas inexistentes para que si hay un inicio de sesión salte una alerta.</a:t>
+            </a:r>
+          </a:p>
+        </p:txBody>
+      </p:sp>
+    </p:spTree>
+    <p:extLst>
+      <p:ext uri="{BB962C8B-B14F-4D97-AF65-F5344CB8AC3E}">
+        <p14:creationId xmlns:p14="http://schemas.microsoft.com/office/powerpoint/2010/main" val="1940121297"/>
+      </p:ext>
+    </p:extLst>
+  </p:cSld>
+  <p:clrMapOvr>
+    <a:masterClrMapping/>
+  </p:clrMapOvr>
+</p:sld>
+</file>
+
+<file path=ppt/slides/slide37.xml><?xml version="1.0" encoding="utf-8"?>
+<p:sld xmlns:a="http://schemas.openxmlformats.org/drawingml/2006/main" xmlns:r="http://schemas.openxmlformats.org/officeDocument/2006/relationships" xmlns:p="http://schemas.openxmlformats.org/presentationml/2006/main">
+  <p:cSld>
+    <p:spTree>
+      <p:nvGrpSpPr>
+        <p:cNvPr id="1" name=""/>
+        <p:cNvGrpSpPr/>
+        <p:nvPr/>
+      </p:nvGrpSpPr>
+      <p:grpSpPr>
+        <a:xfrm>
+          <a:off x="0" y="0"/>
+          <a:ext cx="0" cy="0"/>
+          <a:chOff x="0" y="0"/>
+          <a:chExt cx="0" cy="0"/>
+        </a:xfrm>
+      </p:grpSpPr>
+      <p:sp>
+        <p:nvSpPr>
+          <p:cNvPr id="2" name="Título 1">
+            <a:extLst>
+              <a:ext uri="{FF2B5EF4-FFF2-40B4-BE49-F238E27FC236}">
                 <a16:creationId xmlns:a16="http://schemas.microsoft.com/office/drawing/2014/main" id="{79DAF768-BBCE-1406-F840-23F40FDFC11A}"/>
               </a:ext>
             </a:extLst>
@@ -16935,8 +19803,8 @@
         </p:blipFill>
         <p:spPr>
           <a:xfrm>
-            <a:off x="1113618" y="1789756"/>
-            <a:ext cx="9964764" cy="4552652"/>
+            <a:off x="1976452" y="2578100"/>
+            <a:ext cx="8245445" cy="3767138"/>
           </a:xfrm>
         </p:spPr>
       </p:pic>
@@ -16953,7 +19821,7 @@
 </p:sld>
 </file>
 
-<file path=ppt/slides/slide36.xml><?xml version="1.0" encoding="utf-8"?>
+<file path=ppt/slides/slide38.xml><?xml version="1.0" encoding="utf-8"?>
 <p:sld xmlns:a="http://schemas.openxmlformats.org/drawingml/2006/main" xmlns:r="http://schemas.openxmlformats.org/officeDocument/2006/relationships" xmlns:p="http://schemas.openxmlformats.org/presentationml/2006/main">
   <p:cSld>
     <p:spTree>

</xml_diff>

<commit_message>
hasheo de imagenes completado. Se ha añadido el SHA-256 entre otros metodos
</commit_message>
<xml_diff>
--- a/criptografía teorica.pptx
+++ b/criptografía teorica.pptx
@@ -37,15 +37,18 @@
     <p:sldId id="295" r:id="rId31"/>
     <p:sldId id="284" r:id="rId32"/>
     <p:sldId id="294" r:id="rId33"/>
-    <p:sldId id="279" r:id="rId34"/>
-    <p:sldId id="273" r:id="rId35"/>
-    <p:sldId id="276" r:id="rId36"/>
-    <p:sldId id="297" r:id="rId37"/>
-    <p:sldId id="298" r:id="rId38"/>
-    <p:sldId id="290" r:id="rId39"/>
-    <p:sldId id="291" r:id="rId40"/>
-    <p:sldId id="293" r:id="rId41"/>
-    <p:sldId id="274" r:id="rId42"/>
+    <p:sldId id="299" r:id="rId34"/>
+    <p:sldId id="300" r:id="rId35"/>
+    <p:sldId id="279" r:id="rId36"/>
+    <p:sldId id="273" r:id="rId37"/>
+    <p:sldId id="301" r:id="rId38"/>
+    <p:sldId id="276" r:id="rId39"/>
+    <p:sldId id="297" r:id="rId40"/>
+    <p:sldId id="298" r:id="rId41"/>
+    <p:sldId id="290" r:id="rId42"/>
+    <p:sldId id="291" r:id="rId43"/>
+    <p:sldId id="293" r:id="rId44"/>
+    <p:sldId id="274" r:id="rId45"/>
   </p:sldIdLst>
   <p:sldSz cx="12192000" cy="6858000"/>
   <p:notesSz cx="6858000" cy="9144000"/>
@@ -3280,6 +3283,753 @@
   <dgm:styleLbl name="fgShp">
     <dgm:fillClrLst meth="repeat">
       <a:schemeClr val="accent2">
+        <a:tint val="60000"/>
+      </a:schemeClr>
+    </dgm:fillClrLst>
+    <dgm:linClrLst meth="repeat">
+      <a:schemeClr val="lt1"/>
+    </dgm:linClrLst>
+    <dgm:effectClrLst/>
+    <dgm:txLinClrLst/>
+    <dgm:txFillClrLst meth="repeat">
+      <a:schemeClr val="dk1"/>
+    </dgm:txFillClrLst>
+    <dgm:txEffectClrLst/>
+  </dgm:styleLbl>
+  <dgm:styleLbl name="revTx">
+    <dgm:fillClrLst meth="repeat">
+      <a:schemeClr val="lt1">
+        <a:alpha val="0"/>
+      </a:schemeClr>
+    </dgm:fillClrLst>
+    <dgm:linClrLst meth="repeat">
+      <a:schemeClr val="dk1">
+        <a:alpha val="0"/>
+      </a:schemeClr>
+    </dgm:linClrLst>
+    <dgm:effectClrLst/>
+    <dgm:txLinClrLst/>
+    <dgm:txFillClrLst meth="repeat">
+      <a:schemeClr val="tx1"/>
+    </dgm:txFillClrLst>
+    <dgm:txEffectClrLst/>
+  </dgm:styleLbl>
+</dgm:colorsDef>
+</file>
+
+<file path=ppt/diagrams/colors5.xml><?xml version="1.0" encoding="utf-8"?>
+<dgm:colorsDef xmlns:dgm="http://schemas.openxmlformats.org/drawingml/2006/diagram" xmlns:a="http://schemas.openxmlformats.org/drawingml/2006/main" uniqueId="urn:microsoft.com/office/officeart/2005/8/colors/accent1_2">
+  <dgm:title val=""/>
+  <dgm:desc val=""/>
+  <dgm:catLst>
+    <dgm:cat type="accent1" pri="11200"/>
+  </dgm:catLst>
+  <dgm:styleLbl name="node0">
+    <dgm:fillClrLst meth="repeat">
+      <a:schemeClr val="accent1"/>
+    </dgm:fillClrLst>
+    <dgm:linClrLst meth="repeat">
+      <a:schemeClr val="lt1"/>
+    </dgm:linClrLst>
+    <dgm:effectClrLst/>
+    <dgm:txLinClrLst/>
+    <dgm:txFillClrLst/>
+    <dgm:txEffectClrLst/>
+  </dgm:styleLbl>
+  <dgm:styleLbl name="alignNode1">
+    <dgm:fillClrLst meth="repeat">
+      <a:schemeClr val="accent1"/>
+    </dgm:fillClrLst>
+    <dgm:linClrLst meth="repeat">
+      <a:schemeClr val="accent1"/>
+    </dgm:linClrLst>
+    <dgm:effectClrLst/>
+    <dgm:txLinClrLst/>
+    <dgm:txFillClrLst/>
+    <dgm:txEffectClrLst/>
+  </dgm:styleLbl>
+  <dgm:styleLbl name="node1">
+    <dgm:fillClrLst meth="repeat">
+      <a:schemeClr val="accent1"/>
+    </dgm:fillClrLst>
+    <dgm:linClrLst meth="repeat">
+      <a:schemeClr val="lt1"/>
+    </dgm:linClrLst>
+    <dgm:effectClrLst/>
+    <dgm:txLinClrLst/>
+    <dgm:txFillClrLst/>
+    <dgm:txEffectClrLst/>
+  </dgm:styleLbl>
+  <dgm:styleLbl name="lnNode1">
+    <dgm:fillClrLst meth="repeat">
+      <a:schemeClr val="accent1"/>
+    </dgm:fillClrLst>
+    <dgm:linClrLst meth="repeat">
+      <a:schemeClr val="lt1"/>
+    </dgm:linClrLst>
+    <dgm:effectClrLst/>
+    <dgm:txLinClrLst/>
+    <dgm:txFillClrLst/>
+    <dgm:txEffectClrLst/>
+  </dgm:styleLbl>
+  <dgm:styleLbl name="vennNode1">
+    <dgm:fillClrLst meth="repeat">
+      <a:schemeClr val="accent1">
+        <a:alpha val="50000"/>
+      </a:schemeClr>
+    </dgm:fillClrLst>
+    <dgm:linClrLst meth="repeat">
+      <a:schemeClr val="lt1"/>
+    </dgm:linClrLst>
+    <dgm:effectClrLst/>
+    <dgm:txLinClrLst/>
+    <dgm:txFillClrLst/>
+    <dgm:txEffectClrLst/>
+  </dgm:styleLbl>
+  <dgm:styleLbl name="node2">
+    <dgm:fillClrLst meth="repeat">
+      <a:schemeClr val="accent1"/>
+    </dgm:fillClrLst>
+    <dgm:linClrLst meth="repeat">
+      <a:schemeClr val="lt1"/>
+    </dgm:linClrLst>
+    <dgm:effectClrLst/>
+    <dgm:txLinClrLst/>
+    <dgm:txFillClrLst/>
+    <dgm:txEffectClrLst/>
+  </dgm:styleLbl>
+  <dgm:styleLbl name="node3">
+    <dgm:fillClrLst meth="repeat">
+      <a:schemeClr val="accent1"/>
+    </dgm:fillClrLst>
+    <dgm:linClrLst meth="repeat">
+      <a:schemeClr val="lt1"/>
+    </dgm:linClrLst>
+    <dgm:effectClrLst/>
+    <dgm:txLinClrLst/>
+    <dgm:txFillClrLst/>
+    <dgm:txEffectClrLst/>
+  </dgm:styleLbl>
+  <dgm:styleLbl name="node4">
+    <dgm:fillClrLst meth="repeat">
+      <a:schemeClr val="accent1"/>
+    </dgm:fillClrLst>
+    <dgm:linClrLst meth="repeat">
+      <a:schemeClr val="lt1"/>
+    </dgm:linClrLst>
+    <dgm:effectClrLst/>
+    <dgm:txLinClrLst/>
+    <dgm:txFillClrLst/>
+    <dgm:txEffectClrLst/>
+  </dgm:styleLbl>
+  <dgm:styleLbl name="fgImgPlace1">
+    <dgm:fillClrLst meth="repeat">
+      <a:schemeClr val="accent1">
+        <a:tint val="50000"/>
+      </a:schemeClr>
+    </dgm:fillClrLst>
+    <dgm:linClrLst meth="repeat">
+      <a:schemeClr val="lt1"/>
+    </dgm:linClrLst>
+    <dgm:effectClrLst/>
+    <dgm:txLinClrLst/>
+    <dgm:txFillClrLst meth="repeat">
+      <a:schemeClr val="lt1"/>
+    </dgm:txFillClrLst>
+    <dgm:txEffectClrLst/>
+  </dgm:styleLbl>
+  <dgm:styleLbl name="alignImgPlace1">
+    <dgm:fillClrLst meth="repeat">
+      <a:schemeClr val="accent1">
+        <a:tint val="50000"/>
+      </a:schemeClr>
+    </dgm:fillClrLst>
+    <dgm:linClrLst meth="repeat">
+      <a:schemeClr val="lt1"/>
+    </dgm:linClrLst>
+    <dgm:effectClrLst/>
+    <dgm:txLinClrLst/>
+    <dgm:txFillClrLst meth="repeat">
+      <a:schemeClr val="lt1"/>
+    </dgm:txFillClrLst>
+    <dgm:txEffectClrLst/>
+  </dgm:styleLbl>
+  <dgm:styleLbl name="bgImgPlace1">
+    <dgm:fillClrLst meth="repeat">
+      <a:schemeClr val="accent1">
+        <a:tint val="50000"/>
+      </a:schemeClr>
+    </dgm:fillClrLst>
+    <dgm:linClrLst meth="repeat">
+      <a:schemeClr val="lt1"/>
+    </dgm:linClrLst>
+    <dgm:effectClrLst/>
+    <dgm:txLinClrLst/>
+    <dgm:txFillClrLst meth="repeat">
+      <a:schemeClr val="lt1"/>
+    </dgm:txFillClrLst>
+    <dgm:txEffectClrLst/>
+  </dgm:styleLbl>
+  <dgm:styleLbl name="sibTrans2D1">
+    <dgm:fillClrLst meth="repeat">
+      <a:schemeClr val="accent1">
+        <a:tint val="60000"/>
+      </a:schemeClr>
+    </dgm:fillClrLst>
+    <dgm:linClrLst meth="repeat">
+      <a:schemeClr val="accent1">
+        <a:tint val="60000"/>
+      </a:schemeClr>
+    </dgm:linClrLst>
+    <dgm:effectClrLst/>
+    <dgm:txLinClrLst/>
+    <dgm:txFillClrLst/>
+    <dgm:txEffectClrLst/>
+  </dgm:styleLbl>
+  <dgm:styleLbl name="fgSibTrans2D1">
+    <dgm:fillClrLst meth="repeat">
+      <a:schemeClr val="accent1">
+        <a:tint val="60000"/>
+      </a:schemeClr>
+    </dgm:fillClrLst>
+    <dgm:linClrLst meth="repeat">
+      <a:schemeClr val="accent1">
+        <a:tint val="60000"/>
+      </a:schemeClr>
+    </dgm:linClrLst>
+    <dgm:effectClrLst/>
+    <dgm:txLinClrLst/>
+    <dgm:txFillClrLst/>
+    <dgm:txEffectClrLst/>
+  </dgm:styleLbl>
+  <dgm:styleLbl name="bgSibTrans2D1">
+    <dgm:fillClrLst meth="repeat">
+      <a:schemeClr val="accent1">
+        <a:tint val="60000"/>
+      </a:schemeClr>
+    </dgm:fillClrLst>
+    <dgm:linClrLst meth="repeat">
+      <a:schemeClr val="accent1">
+        <a:tint val="60000"/>
+      </a:schemeClr>
+    </dgm:linClrLst>
+    <dgm:effectClrLst/>
+    <dgm:txLinClrLst/>
+    <dgm:txFillClrLst/>
+    <dgm:txEffectClrLst/>
+  </dgm:styleLbl>
+  <dgm:styleLbl name="sibTrans1D1">
+    <dgm:fillClrLst meth="repeat">
+      <a:schemeClr val="accent1"/>
+    </dgm:fillClrLst>
+    <dgm:linClrLst meth="repeat">
+      <a:schemeClr val="accent1"/>
+    </dgm:linClrLst>
+    <dgm:effectClrLst/>
+    <dgm:txLinClrLst/>
+    <dgm:txFillClrLst meth="repeat">
+      <a:schemeClr val="tx1"/>
+    </dgm:txFillClrLst>
+    <dgm:txEffectClrLst/>
+  </dgm:styleLbl>
+  <dgm:styleLbl name="callout">
+    <dgm:fillClrLst meth="repeat">
+      <a:schemeClr val="accent1"/>
+    </dgm:fillClrLst>
+    <dgm:linClrLst meth="repeat">
+      <a:schemeClr val="accent1">
+        <a:tint val="50000"/>
+      </a:schemeClr>
+    </dgm:linClrLst>
+    <dgm:effectClrLst/>
+    <dgm:txLinClrLst/>
+    <dgm:txFillClrLst meth="repeat">
+      <a:schemeClr val="tx1"/>
+    </dgm:txFillClrLst>
+    <dgm:txEffectClrLst/>
+  </dgm:styleLbl>
+  <dgm:styleLbl name="asst0">
+    <dgm:fillClrLst meth="repeat">
+      <a:schemeClr val="accent1"/>
+    </dgm:fillClrLst>
+    <dgm:linClrLst meth="repeat">
+      <a:schemeClr val="lt1"/>
+    </dgm:linClrLst>
+    <dgm:effectClrLst/>
+    <dgm:txLinClrLst/>
+    <dgm:txFillClrLst/>
+    <dgm:txEffectClrLst/>
+  </dgm:styleLbl>
+  <dgm:styleLbl name="asst1">
+    <dgm:fillClrLst meth="repeat">
+      <a:schemeClr val="accent1"/>
+    </dgm:fillClrLst>
+    <dgm:linClrLst meth="repeat">
+      <a:schemeClr val="lt1"/>
+    </dgm:linClrLst>
+    <dgm:effectClrLst/>
+    <dgm:txLinClrLst/>
+    <dgm:txFillClrLst/>
+    <dgm:txEffectClrLst/>
+  </dgm:styleLbl>
+  <dgm:styleLbl name="asst2">
+    <dgm:fillClrLst meth="repeat">
+      <a:schemeClr val="accent1"/>
+    </dgm:fillClrLst>
+    <dgm:linClrLst meth="repeat">
+      <a:schemeClr val="lt1"/>
+    </dgm:linClrLst>
+    <dgm:effectClrLst/>
+    <dgm:txLinClrLst/>
+    <dgm:txFillClrLst/>
+    <dgm:txEffectClrLst/>
+  </dgm:styleLbl>
+  <dgm:styleLbl name="asst3">
+    <dgm:fillClrLst meth="repeat">
+      <a:schemeClr val="accent1"/>
+    </dgm:fillClrLst>
+    <dgm:linClrLst meth="repeat">
+      <a:schemeClr val="lt1"/>
+    </dgm:linClrLst>
+    <dgm:effectClrLst/>
+    <dgm:txLinClrLst/>
+    <dgm:txFillClrLst/>
+    <dgm:txEffectClrLst/>
+  </dgm:styleLbl>
+  <dgm:styleLbl name="asst4">
+    <dgm:fillClrLst meth="repeat">
+      <a:schemeClr val="accent1"/>
+    </dgm:fillClrLst>
+    <dgm:linClrLst meth="repeat">
+      <a:schemeClr val="lt1"/>
+    </dgm:linClrLst>
+    <dgm:effectClrLst/>
+    <dgm:txLinClrLst/>
+    <dgm:txFillClrLst/>
+    <dgm:txEffectClrLst/>
+  </dgm:styleLbl>
+  <dgm:styleLbl name="parChTrans2D1">
+    <dgm:fillClrLst meth="repeat">
+      <a:schemeClr val="accent1">
+        <a:tint val="60000"/>
+      </a:schemeClr>
+    </dgm:fillClrLst>
+    <dgm:linClrLst meth="repeat">
+      <a:schemeClr val="accent1">
+        <a:tint val="60000"/>
+      </a:schemeClr>
+    </dgm:linClrLst>
+    <dgm:effectClrLst/>
+    <dgm:txLinClrLst/>
+    <dgm:txFillClrLst meth="repeat">
+      <a:schemeClr val="lt1"/>
+    </dgm:txFillClrLst>
+    <dgm:txEffectClrLst/>
+  </dgm:styleLbl>
+  <dgm:styleLbl name="parChTrans2D2">
+    <dgm:fillClrLst meth="repeat">
+      <a:schemeClr val="accent1"/>
+    </dgm:fillClrLst>
+    <dgm:linClrLst meth="repeat">
+      <a:schemeClr val="accent1"/>
+    </dgm:linClrLst>
+    <dgm:effectClrLst/>
+    <dgm:txLinClrLst/>
+    <dgm:txFillClrLst meth="repeat">
+      <a:schemeClr val="lt1"/>
+    </dgm:txFillClrLst>
+    <dgm:txEffectClrLst/>
+  </dgm:styleLbl>
+  <dgm:styleLbl name="parChTrans2D3">
+    <dgm:fillClrLst meth="repeat">
+      <a:schemeClr val="accent1"/>
+    </dgm:fillClrLst>
+    <dgm:linClrLst meth="repeat">
+      <a:schemeClr val="accent1"/>
+    </dgm:linClrLst>
+    <dgm:effectClrLst/>
+    <dgm:txLinClrLst/>
+    <dgm:txFillClrLst meth="repeat">
+      <a:schemeClr val="lt1"/>
+    </dgm:txFillClrLst>
+    <dgm:txEffectClrLst/>
+  </dgm:styleLbl>
+  <dgm:styleLbl name="parChTrans2D4">
+    <dgm:fillClrLst meth="repeat">
+      <a:schemeClr val="accent1"/>
+    </dgm:fillClrLst>
+    <dgm:linClrLst meth="repeat">
+      <a:schemeClr val="accent1"/>
+    </dgm:linClrLst>
+    <dgm:effectClrLst/>
+    <dgm:txLinClrLst/>
+    <dgm:txFillClrLst meth="repeat">
+      <a:schemeClr val="lt1"/>
+    </dgm:txFillClrLst>
+    <dgm:txEffectClrLst/>
+  </dgm:styleLbl>
+  <dgm:styleLbl name="parChTrans1D1">
+    <dgm:fillClrLst meth="repeat">
+      <a:schemeClr val="accent1"/>
+    </dgm:fillClrLst>
+    <dgm:linClrLst meth="repeat">
+      <a:schemeClr val="accent1">
+        <a:shade val="60000"/>
+      </a:schemeClr>
+    </dgm:linClrLst>
+    <dgm:effectClrLst/>
+    <dgm:txLinClrLst/>
+    <dgm:txFillClrLst meth="repeat">
+      <a:schemeClr val="tx1"/>
+    </dgm:txFillClrLst>
+    <dgm:txEffectClrLst/>
+  </dgm:styleLbl>
+  <dgm:styleLbl name="parChTrans1D2">
+    <dgm:fillClrLst meth="repeat">
+      <a:schemeClr val="accent1"/>
+    </dgm:fillClrLst>
+    <dgm:linClrLst meth="repeat">
+      <a:schemeClr val="accent1">
+        <a:shade val="60000"/>
+      </a:schemeClr>
+    </dgm:linClrLst>
+    <dgm:effectClrLst/>
+    <dgm:txLinClrLst/>
+    <dgm:txFillClrLst meth="repeat">
+      <a:schemeClr val="tx1"/>
+    </dgm:txFillClrLst>
+    <dgm:txEffectClrLst/>
+  </dgm:styleLbl>
+  <dgm:styleLbl name="parChTrans1D3">
+    <dgm:fillClrLst meth="repeat">
+      <a:schemeClr val="accent1"/>
+    </dgm:fillClrLst>
+    <dgm:linClrLst meth="repeat">
+      <a:schemeClr val="accent1">
+        <a:shade val="80000"/>
+      </a:schemeClr>
+    </dgm:linClrLst>
+    <dgm:effectClrLst/>
+    <dgm:txLinClrLst/>
+    <dgm:txFillClrLst meth="repeat">
+      <a:schemeClr val="tx1"/>
+    </dgm:txFillClrLst>
+    <dgm:txEffectClrLst/>
+  </dgm:styleLbl>
+  <dgm:styleLbl name="parChTrans1D4">
+    <dgm:fillClrLst meth="repeat">
+      <a:schemeClr val="accent1"/>
+    </dgm:fillClrLst>
+    <dgm:linClrLst meth="repeat">
+      <a:schemeClr val="accent1">
+        <a:shade val="80000"/>
+      </a:schemeClr>
+    </dgm:linClrLst>
+    <dgm:effectClrLst/>
+    <dgm:txLinClrLst/>
+    <dgm:txFillClrLst meth="repeat">
+      <a:schemeClr val="tx1"/>
+    </dgm:txFillClrLst>
+    <dgm:txEffectClrLst/>
+  </dgm:styleLbl>
+  <dgm:styleLbl name="fgAcc1">
+    <dgm:fillClrLst meth="repeat">
+      <a:schemeClr val="lt1">
+        <a:alpha val="90000"/>
+      </a:schemeClr>
+    </dgm:fillClrLst>
+    <dgm:linClrLst meth="repeat">
+      <a:schemeClr val="accent1"/>
+    </dgm:linClrLst>
+    <dgm:effectClrLst/>
+    <dgm:txLinClrLst/>
+    <dgm:txFillClrLst meth="repeat">
+      <a:schemeClr val="dk1"/>
+    </dgm:txFillClrLst>
+    <dgm:txEffectClrLst/>
+  </dgm:styleLbl>
+  <dgm:styleLbl name="conFgAcc1">
+    <dgm:fillClrLst meth="repeat">
+      <a:schemeClr val="lt1">
+        <a:alpha val="90000"/>
+      </a:schemeClr>
+    </dgm:fillClrLst>
+    <dgm:linClrLst meth="repeat">
+      <a:schemeClr val="accent1"/>
+    </dgm:linClrLst>
+    <dgm:effectClrLst/>
+    <dgm:txLinClrLst/>
+    <dgm:txFillClrLst meth="repeat">
+      <a:schemeClr val="dk1"/>
+    </dgm:txFillClrLst>
+    <dgm:txEffectClrLst/>
+  </dgm:styleLbl>
+  <dgm:styleLbl name="alignAcc1">
+    <dgm:fillClrLst meth="repeat">
+      <a:schemeClr val="lt1">
+        <a:alpha val="90000"/>
+      </a:schemeClr>
+    </dgm:fillClrLst>
+    <dgm:linClrLst meth="repeat">
+      <a:schemeClr val="accent1"/>
+    </dgm:linClrLst>
+    <dgm:effectClrLst/>
+    <dgm:txLinClrLst/>
+    <dgm:txFillClrLst meth="repeat">
+      <a:schemeClr val="dk1"/>
+    </dgm:txFillClrLst>
+    <dgm:txEffectClrLst/>
+  </dgm:styleLbl>
+  <dgm:styleLbl name="trAlignAcc1">
+    <dgm:fillClrLst meth="repeat">
+      <a:schemeClr val="lt1">
+        <a:alpha val="40000"/>
+      </a:schemeClr>
+    </dgm:fillClrLst>
+    <dgm:linClrLst meth="repeat">
+      <a:schemeClr val="accent1"/>
+    </dgm:linClrLst>
+    <dgm:effectClrLst/>
+    <dgm:txLinClrLst/>
+    <dgm:txFillClrLst meth="repeat">
+      <a:schemeClr val="dk1"/>
+    </dgm:txFillClrLst>
+    <dgm:txEffectClrLst/>
+  </dgm:styleLbl>
+  <dgm:styleLbl name="bgAcc1">
+    <dgm:fillClrLst meth="repeat">
+      <a:schemeClr val="lt1">
+        <a:alpha val="90000"/>
+      </a:schemeClr>
+    </dgm:fillClrLst>
+    <dgm:linClrLst meth="repeat">
+      <a:schemeClr val="accent1"/>
+    </dgm:linClrLst>
+    <dgm:effectClrLst/>
+    <dgm:txLinClrLst/>
+    <dgm:txFillClrLst meth="repeat">
+      <a:schemeClr val="dk1"/>
+    </dgm:txFillClrLst>
+    <dgm:txEffectClrLst/>
+  </dgm:styleLbl>
+  <dgm:styleLbl name="solidFgAcc1">
+    <dgm:fillClrLst meth="repeat">
+      <a:schemeClr val="lt1"/>
+    </dgm:fillClrLst>
+    <dgm:linClrLst meth="repeat">
+      <a:schemeClr val="accent1"/>
+    </dgm:linClrLst>
+    <dgm:effectClrLst/>
+    <dgm:txLinClrLst/>
+    <dgm:txFillClrLst meth="repeat">
+      <a:schemeClr val="dk1"/>
+    </dgm:txFillClrLst>
+    <dgm:txEffectClrLst/>
+  </dgm:styleLbl>
+  <dgm:styleLbl name="solidAlignAcc1">
+    <dgm:fillClrLst meth="repeat">
+      <a:schemeClr val="lt1"/>
+    </dgm:fillClrLst>
+    <dgm:linClrLst meth="repeat">
+      <a:schemeClr val="accent1"/>
+    </dgm:linClrLst>
+    <dgm:effectClrLst/>
+    <dgm:txLinClrLst/>
+    <dgm:txFillClrLst meth="repeat">
+      <a:schemeClr val="dk1"/>
+    </dgm:txFillClrLst>
+    <dgm:txEffectClrLst/>
+  </dgm:styleLbl>
+  <dgm:styleLbl name="solidBgAcc1">
+    <dgm:fillClrLst meth="repeat">
+      <a:schemeClr val="lt1"/>
+    </dgm:fillClrLst>
+    <dgm:linClrLst meth="repeat">
+      <a:schemeClr val="accent1"/>
+    </dgm:linClrLst>
+    <dgm:effectClrLst/>
+    <dgm:txLinClrLst/>
+    <dgm:txFillClrLst meth="repeat">
+      <a:schemeClr val="dk1"/>
+    </dgm:txFillClrLst>
+    <dgm:txEffectClrLst/>
+  </dgm:styleLbl>
+  <dgm:styleLbl name="fgAccFollowNode1">
+    <dgm:fillClrLst meth="repeat">
+      <a:schemeClr val="accent1">
+        <a:alpha val="90000"/>
+        <a:tint val="40000"/>
+      </a:schemeClr>
+    </dgm:fillClrLst>
+    <dgm:linClrLst meth="repeat">
+      <a:schemeClr val="accent1">
+        <a:alpha val="90000"/>
+        <a:tint val="40000"/>
+      </a:schemeClr>
+    </dgm:linClrLst>
+    <dgm:effectClrLst/>
+    <dgm:txLinClrLst/>
+    <dgm:txFillClrLst meth="repeat">
+      <a:schemeClr val="dk1"/>
+    </dgm:txFillClrLst>
+    <dgm:txEffectClrLst/>
+  </dgm:styleLbl>
+  <dgm:styleLbl name="alignAccFollowNode1">
+    <dgm:fillClrLst meth="repeat">
+      <a:schemeClr val="accent1">
+        <a:alpha val="90000"/>
+        <a:tint val="40000"/>
+      </a:schemeClr>
+    </dgm:fillClrLst>
+    <dgm:linClrLst meth="repeat">
+      <a:schemeClr val="accent1">
+        <a:alpha val="90000"/>
+        <a:tint val="40000"/>
+      </a:schemeClr>
+    </dgm:linClrLst>
+    <dgm:effectClrLst/>
+    <dgm:txLinClrLst/>
+    <dgm:txFillClrLst meth="repeat">
+      <a:schemeClr val="dk1"/>
+    </dgm:txFillClrLst>
+    <dgm:txEffectClrLst/>
+  </dgm:styleLbl>
+  <dgm:styleLbl name="bgAccFollowNode1">
+    <dgm:fillClrLst meth="repeat">
+      <a:schemeClr val="accent1">
+        <a:alpha val="90000"/>
+        <a:tint val="40000"/>
+      </a:schemeClr>
+    </dgm:fillClrLst>
+    <dgm:linClrLst meth="repeat">
+      <a:schemeClr val="accent1">
+        <a:alpha val="90000"/>
+        <a:tint val="40000"/>
+      </a:schemeClr>
+    </dgm:linClrLst>
+    <dgm:effectClrLst/>
+    <dgm:txLinClrLst/>
+    <dgm:txFillClrLst meth="repeat">
+      <a:schemeClr val="dk1"/>
+    </dgm:txFillClrLst>
+    <dgm:txEffectClrLst/>
+  </dgm:styleLbl>
+  <dgm:styleLbl name="fgAcc0">
+    <dgm:fillClrLst meth="repeat">
+      <a:schemeClr val="lt1">
+        <a:alpha val="90000"/>
+      </a:schemeClr>
+    </dgm:fillClrLst>
+    <dgm:linClrLst meth="repeat">
+      <a:schemeClr val="accent1"/>
+    </dgm:linClrLst>
+    <dgm:effectClrLst/>
+    <dgm:txLinClrLst/>
+    <dgm:txFillClrLst meth="repeat">
+      <a:schemeClr val="dk1"/>
+    </dgm:txFillClrLst>
+    <dgm:txEffectClrLst/>
+  </dgm:styleLbl>
+  <dgm:styleLbl name="fgAcc2">
+    <dgm:fillClrLst meth="repeat">
+      <a:schemeClr val="lt1">
+        <a:alpha val="90000"/>
+      </a:schemeClr>
+    </dgm:fillClrLst>
+    <dgm:linClrLst meth="repeat">
+      <a:schemeClr val="accent1"/>
+    </dgm:linClrLst>
+    <dgm:effectClrLst/>
+    <dgm:txLinClrLst/>
+    <dgm:txFillClrLst meth="repeat">
+      <a:schemeClr val="dk1"/>
+    </dgm:txFillClrLst>
+    <dgm:txEffectClrLst/>
+  </dgm:styleLbl>
+  <dgm:styleLbl name="fgAcc3">
+    <dgm:fillClrLst meth="repeat">
+      <a:schemeClr val="lt1">
+        <a:alpha val="90000"/>
+      </a:schemeClr>
+    </dgm:fillClrLst>
+    <dgm:linClrLst meth="repeat">
+      <a:schemeClr val="accent1"/>
+    </dgm:linClrLst>
+    <dgm:effectClrLst/>
+    <dgm:txLinClrLst/>
+    <dgm:txFillClrLst meth="repeat">
+      <a:schemeClr val="dk1"/>
+    </dgm:txFillClrLst>
+    <dgm:txEffectClrLst/>
+  </dgm:styleLbl>
+  <dgm:styleLbl name="fgAcc4">
+    <dgm:fillClrLst meth="repeat">
+      <a:schemeClr val="lt1">
+        <a:alpha val="90000"/>
+      </a:schemeClr>
+    </dgm:fillClrLst>
+    <dgm:linClrLst meth="repeat">
+      <a:schemeClr val="accent1"/>
+    </dgm:linClrLst>
+    <dgm:effectClrLst/>
+    <dgm:txLinClrLst/>
+    <dgm:txFillClrLst meth="repeat">
+      <a:schemeClr val="dk1"/>
+    </dgm:txFillClrLst>
+    <dgm:txEffectClrLst/>
+  </dgm:styleLbl>
+  <dgm:styleLbl name="bgShp">
+    <dgm:fillClrLst meth="repeat">
+      <a:schemeClr val="accent1">
+        <a:tint val="40000"/>
+      </a:schemeClr>
+    </dgm:fillClrLst>
+    <dgm:linClrLst meth="repeat">
+      <a:schemeClr val="accent1"/>
+    </dgm:linClrLst>
+    <dgm:effectClrLst/>
+    <dgm:txLinClrLst/>
+    <dgm:txFillClrLst meth="repeat">
+      <a:schemeClr val="dk1"/>
+    </dgm:txFillClrLst>
+    <dgm:txEffectClrLst/>
+  </dgm:styleLbl>
+  <dgm:styleLbl name="dkBgShp">
+    <dgm:fillClrLst meth="repeat">
+      <a:schemeClr val="accent1">
+        <a:shade val="80000"/>
+      </a:schemeClr>
+    </dgm:fillClrLst>
+    <dgm:linClrLst meth="repeat">
+      <a:schemeClr val="accent1"/>
+    </dgm:linClrLst>
+    <dgm:effectClrLst/>
+    <dgm:txLinClrLst/>
+    <dgm:txFillClrLst meth="repeat">
+      <a:schemeClr val="lt1"/>
+    </dgm:txFillClrLst>
+    <dgm:txEffectClrLst/>
+  </dgm:styleLbl>
+  <dgm:styleLbl name="trBgShp">
+    <dgm:fillClrLst meth="repeat">
+      <a:schemeClr val="accent1">
+        <a:tint val="50000"/>
+        <a:alpha val="40000"/>
+      </a:schemeClr>
+    </dgm:fillClrLst>
+    <dgm:linClrLst meth="repeat">
+      <a:schemeClr val="accent1"/>
+    </dgm:linClrLst>
+    <dgm:effectClrLst/>
+    <dgm:txLinClrLst/>
+    <dgm:txFillClrLst meth="repeat">
+      <a:schemeClr val="lt1"/>
+    </dgm:txFillClrLst>
+    <dgm:txEffectClrLst/>
+  </dgm:styleLbl>
+  <dgm:styleLbl name="fgShp">
+    <dgm:fillClrLst meth="repeat">
+      <a:schemeClr val="accent1">
         <a:tint val="60000"/>
       </a:schemeClr>
     </dgm:fillClrLst>
@@ -4743,6 +5493,292 @@
     <dgm:cxn modelId="{C51A18D7-0C59-41B7-8FE7-7F172EF43ECA}" type="presParOf" srcId="{1E25E05F-1E27-40D0-B9C4-391C204BC306}" destId="{403A7BA3-E739-4585-A022-5AD0058551A5}" srcOrd="2" destOrd="0" presId="urn:microsoft.com/office/officeart/2018/5/layout/CenteredIconLabelDescriptionList"/>
     <dgm:cxn modelId="{E2ED80D4-DAC0-4F4E-95EA-77FB8BDC890D}" type="presParOf" srcId="{1E25E05F-1E27-40D0-B9C4-391C204BC306}" destId="{151F0506-2D47-465C-B6BA-7F4C20B8D043}" srcOrd="3" destOrd="0" presId="urn:microsoft.com/office/officeart/2018/5/layout/CenteredIconLabelDescriptionList"/>
     <dgm:cxn modelId="{832885E0-63B8-4DAC-A60D-E115CDA908DA}" type="presParOf" srcId="{1E25E05F-1E27-40D0-B9C4-391C204BC306}" destId="{84105D38-168B-4EAC-95C3-C563665F908C}" srcOrd="4" destOrd="0" presId="urn:microsoft.com/office/officeart/2018/5/layout/CenteredIconLabelDescriptionList"/>
+  </dgm:cxnLst>
+  <dgm:bg/>
+  <dgm:whole/>
+  <dgm:extLst>
+    <a:ext uri="http://schemas.microsoft.com/office/drawing/2008/diagram">
+      <dsp:dataModelExt xmlns:dsp="http://schemas.microsoft.com/office/drawing/2008/diagram" relId="rId6" minVer="http://schemas.openxmlformats.org/drawingml/2006/diagram"/>
+    </a:ext>
+  </dgm:extLst>
+</dgm:dataModel>
+</file>
+
+<file path=ppt/diagrams/data5.xml><?xml version="1.0" encoding="utf-8"?>
+<dgm:dataModel xmlns:dgm="http://schemas.openxmlformats.org/drawingml/2006/diagram" xmlns:a="http://schemas.openxmlformats.org/drawingml/2006/main">
+  <dgm:ptLst>
+    <dgm:pt modelId="{B7F7CDFF-812F-4FE4-B995-33EC749DD89C}" type="doc">
+      <dgm:prSet loTypeId="urn:microsoft.com/office/officeart/2005/8/layout/default" loCatId="list" qsTypeId="urn:microsoft.com/office/officeart/2005/8/quickstyle/simple1" qsCatId="simple" csTypeId="urn:microsoft.com/office/officeart/2005/8/colors/accent1_2" csCatId="accent1" phldr="1"/>
+      <dgm:spPr/>
+      <dgm:t>
+        <a:bodyPr/>
+        <a:lstStyle/>
+        <a:p>
+          <a:endParaRPr lang="es-ES"/>
+        </a:p>
+      </dgm:t>
+    </dgm:pt>
+    <dgm:pt modelId="{123F005F-4187-4D28-9890-021213BB3865}">
+      <dgm:prSet phldrT="[Texto]" phldr="0"/>
+      <dgm:spPr/>
+      <dgm:t>
+        <a:bodyPr/>
+        <a:lstStyle/>
+        <a:p>
+          <a:r>
+            <a:rPr lang="es-ES" dirty="0"/>
+            <a:t>Garantiza la integridad de la información.</a:t>
+          </a:r>
+        </a:p>
+      </dgm:t>
+    </dgm:pt>
+    <dgm:pt modelId="{D2D449AE-FBCA-4D43-AC5A-CE7FE8D96935}" type="parTrans" cxnId="{90ABCFAB-9615-4044-BB12-9D114F0DBCFD}">
+      <dgm:prSet/>
+      <dgm:spPr/>
+      <dgm:t>
+        <a:bodyPr/>
+        <a:lstStyle/>
+        <a:p>
+          <a:endParaRPr lang="es-ES"/>
+        </a:p>
+      </dgm:t>
+    </dgm:pt>
+    <dgm:pt modelId="{D3D08D78-935D-4773-95F6-3581E3E2DF00}" type="sibTrans" cxnId="{90ABCFAB-9615-4044-BB12-9D114F0DBCFD}">
+      <dgm:prSet/>
+      <dgm:spPr/>
+      <dgm:t>
+        <a:bodyPr/>
+        <a:lstStyle/>
+        <a:p>
+          <a:endParaRPr lang="es-ES"/>
+        </a:p>
+      </dgm:t>
+    </dgm:pt>
+    <dgm:pt modelId="{38E5C7DE-DF39-48AF-94BE-D87082B4B00B}">
+      <dgm:prSet phldrT="[Texto]" phldr="0"/>
+      <dgm:spPr/>
+      <dgm:t>
+        <a:bodyPr/>
+        <a:lstStyle/>
+        <a:p>
+          <a:r>
+            <a:rPr lang="es-ES" dirty="0"/>
+            <a:t>Crea un identificador único de la información de tamaño fijo</a:t>
+          </a:r>
+        </a:p>
+      </dgm:t>
+    </dgm:pt>
+    <dgm:pt modelId="{5ABBEF5D-E067-4699-A558-5254F76D866E}" type="parTrans" cxnId="{C02A07BD-3FC0-4C86-BB19-529C9A0BFDBF}">
+      <dgm:prSet/>
+      <dgm:spPr/>
+      <dgm:t>
+        <a:bodyPr/>
+        <a:lstStyle/>
+        <a:p>
+          <a:endParaRPr lang="es-ES"/>
+        </a:p>
+      </dgm:t>
+    </dgm:pt>
+    <dgm:pt modelId="{51DC97B4-6420-4E36-9BAE-A6F29268D870}" type="sibTrans" cxnId="{C02A07BD-3FC0-4C86-BB19-529C9A0BFDBF}">
+      <dgm:prSet/>
+      <dgm:spPr/>
+      <dgm:t>
+        <a:bodyPr/>
+        <a:lstStyle/>
+        <a:p>
+          <a:endParaRPr lang="es-ES"/>
+        </a:p>
+      </dgm:t>
+    </dgm:pt>
+    <dgm:pt modelId="{D1F8259D-3C96-471B-978A-F00CF2468EF9}">
+      <dgm:prSet phldrT="[Texto]" phldr="0"/>
+      <dgm:spPr/>
+      <dgm:t>
+        <a:bodyPr/>
+        <a:lstStyle/>
+        <a:p>
+          <a:r>
+            <a:rPr lang="es-ES" dirty="0"/>
+            <a:t>Ese identificador se usa para compararlo y de esa manera ver si dos informaciones son iguales o no</a:t>
+          </a:r>
+        </a:p>
+      </dgm:t>
+    </dgm:pt>
+    <dgm:pt modelId="{3AD8CEE6-51D9-4EAE-A085-2A706C6FF9EC}" type="parTrans" cxnId="{EBC9B6F0-E507-466B-BBE2-683802500701}">
+      <dgm:prSet/>
+      <dgm:spPr/>
+      <dgm:t>
+        <a:bodyPr/>
+        <a:lstStyle/>
+        <a:p>
+          <a:endParaRPr lang="es-ES"/>
+        </a:p>
+      </dgm:t>
+    </dgm:pt>
+    <dgm:pt modelId="{03DE2E89-0A88-4AF9-893A-5EC911E6C945}" type="sibTrans" cxnId="{EBC9B6F0-E507-466B-BBE2-683802500701}">
+      <dgm:prSet/>
+      <dgm:spPr/>
+      <dgm:t>
+        <a:bodyPr/>
+        <a:lstStyle/>
+        <a:p>
+          <a:endParaRPr lang="es-ES"/>
+        </a:p>
+      </dgm:t>
+    </dgm:pt>
+    <dgm:pt modelId="{C2756150-F5B5-46AA-9EF3-275F10D922E4}">
+      <dgm:prSet phldrT="[Texto]" phldr="1"/>
+      <dgm:spPr/>
+      <dgm:t>
+        <a:bodyPr/>
+        <a:lstStyle/>
+        <a:p>
+          <a:endParaRPr lang="es-ES"/>
+        </a:p>
+      </dgm:t>
+    </dgm:pt>
+    <dgm:pt modelId="{15E41262-660A-4CA0-A98A-C843997A314A}" type="parTrans" cxnId="{23B9D954-9711-47AC-BA94-BD437A8EC638}">
+      <dgm:prSet/>
+      <dgm:spPr/>
+      <dgm:t>
+        <a:bodyPr/>
+        <a:lstStyle/>
+        <a:p>
+          <a:endParaRPr lang="es-ES"/>
+        </a:p>
+      </dgm:t>
+    </dgm:pt>
+    <dgm:pt modelId="{EF942252-0506-4E61-8715-FDFB678865C9}" type="sibTrans" cxnId="{23B9D954-9711-47AC-BA94-BD437A8EC638}">
+      <dgm:prSet/>
+      <dgm:spPr/>
+      <dgm:t>
+        <a:bodyPr/>
+        <a:lstStyle/>
+        <a:p>
+          <a:endParaRPr lang="es-ES"/>
+        </a:p>
+      </dgm:t>
+    </dgm:pt>
+    <dgm:pt modelId="{5DB607E2-5846-4844-B34C-1ECA44CE4A20}">
+      <dgm:prSet phldrT="[Texto]" phldr="1"/>
+      <dgm:spPr/>
+      <dgm:t>
+        <a:bodyPr/>
+        <a:lstStyle/>
+        <a:p>
+          <a:endParaRPr lang="es-ES"/>
+        </a:p>
+      </dgm:t>
+    </dgm:pt>
+    <dgm:pt modelId="{EF5B9EC0-31F5-4CDF-A077-A966C7B70A08}" type="parTrans" cxnId="{08C922C7-290F-4C47-AD3E-BFC3AEA3350A}">
+      <dgm:prSet/>
+      <dgm:spPr/>
+      <dgm:t>
+        <a:bodyPr/>
+        <a:lstStyle/>
+        <a:p>
+          <a:endParaRPr lang="es-ES"/>
+        </a:p>
+      </dgm:t>
+    </dgm:pt>
+    <dgm:pt modelId="{73EA92BC-39B7-454F-B10C-E9468751178C}" type="sibTrans" cxnId="{08C922C7-290F-4C47-AD3E-BFC3AEA3350A}">
+      <dgm:prSet/>
+      <dgm:spPr/>
+      <dgm:t>
+        <a:bodyPr/>
+        <a:lstStyle/>
+        <a:p>
+          <a:endParaRPr lang="es-ES"/>
+        </a:p>
+      </dgm:t>
+    </dgm:pt>
+    <dgm:pt modelId="{A8A88069-573F-4603-89AF-61F01D4AA727}" type="pres">
+      <dgm:prSet presAssocID="{B7F7CDFF-812F-4FE4-B995-33EC749DD89C}" presName="diagram" presStyleCnt="0">
+        <dgm:presLayoutVars>
+          <dgm:dir/>
+          <dgm:resizeHandles val="exact"/>
+        </dgm:presLayoutVars>
+      </dgm:prSet>
+      <dgm:spPr/>
+    </dgm:pt>
+    <dgm:pt modelId="{D4E4C01C-E3B4-400D-A145-5EDEB37F319B}" type="pres">
+      <dgm:prSet presAssocID="{123F005F-4187-4D28-9890-021213BB3865}" presName="node" presStyleLbl="node1" presStyleIdx="0" presStyleCnt="5">
+        <dgm:presLayoutVars>
+          <dgm:bulletEnabled val="1"/>
+        </dgm:presLayoutVars>
+      </dgm:prSet>
+      <dgm:spPr/>
+    </dgm:pt>
+    <dgm:pt modelId="{D80F8220-B442-4F17-931A-A45F68EAEDC5}" type="pres">
+      <dgm:prSet presAssocID="{D3D08D78-935D-4773-95F6-3581E3E2DF00}" presName="sibTrans" presStyleCnt="0"/>
+      <dgm:spPr/>
+    </dgm:pt>
+    <dgm:pt modelId="{26F8596F-9758-4365-8319-95E9CE17B7F7}" type="pres">
+      <dgm:prSet presAssocID="{38E5C7DE-DF39-48AF-94BE-D87082B4B00B}" presName="node" presStyleLbl="node1" presStyleIdx="1" presStyleCnt="5">
+        <dgm:presLayoutVars>
+          <dgm:bulletEnabled val="1"/>
+        </dgm:presLayoutVars>
+      </dgm:prSet>
+      <dgm:spPr/>
+    </dgm:pt>
+    <dgm:pt modelId="{88A152AC-3B15-4DEC-A9B0-CF7D588E6D75}" type="pres">
+      <dgm:prSet presAssocID="{51DC97B4-6420-4E36-9BAE-A6F29268D870}" presName="sibTrans" presStyleCnt="0"/>
+      <dgm:spPr/>
+    </dgm:pt>
+    <dgm:pt modelId="{F5EFBDFB-A4F0-4611-8225-FBFF7169AC24}" type="pres">
+      <dgm:prSet presAssocID="{D1F8259D-3C96-471B-978A-F00CF2468EF9}" presName="node" presStyleLbl="node1" presStyleIdx="2" presStyleCnt="5">
+        <dgm:presLayoutVars>
+          <dgm:bulletEnabled val="1"/>
+        </dgm:presLayoutVars>
+      </dgm:prSet>
+      <dgm:spPr/>
+    </dgm:pt>
+    <dgm:pt modelId="{2D70DD6C-D1E0-4A50-AFCE-D5CFD03FBF08}" type="pres">
+      <dgm:prSet presAssocID="{03DE2E89-0A88-4AF9-893A-5EC911E6C945}" presName="sibTrans" presStyleCnt="0"/>
+      <dgm:spPr/>
+    </dgm:pt>
+    <dgm:pt modelId="{72F9417D-A97B-4255-91CB-AE82735DAD0A}" type="pres">
+      <dgm:prSet presAssocID="{C2756150-F5B5-46AA-9EF3-275F10D922E4}" presName="node" presStyleLbl="node1" presStyleIdx="3" presStyleCnt="5">
+        <dgm:presLayoutVars>
+          <dgm:bulletEnabled val="1"/>
+        </dgm:presLayoutVars>
+      </dgm:prSet>
+      <dgm:spPr/>
+    </dgm:pt>
+    <dgm:pt modelId="{A539B384-3988-4C9E-B397-618A9137128F}" type="pres">
+      <dgm:prSet presAssocID="{EF942252-0506-4E61-8715-FDFB678865C9}" presName="sibTrans" presStyleCnt="0"/>
+      <dgm:spPr/>
+    </dgm:pt>
+    <dgm:pt modelId="{D462E91F-F188-42A2-9A64-EEC810C69497}" type="pres">
+      <dgm:prSet presAssocID="{5DB607E2-5846-4844-B34C-1ECA44CE4A20}" presName="node" presStyleLbl="node1" presStyleIdx="4" presStyleCnt="5">
+        <dgm:presLayoutVars>
+          <dgm:bulletEnabled val="1"/>
+        </dgm:presLayoutVars>
+      </dgm:prSet>
+      <dgm:spPr/>
+    </dgm:pt>
+  </dgm:ptLst>
+  <dgm:cxnLst>
+    <dgm:cxn modelId="{D8C4C722-93D1-46E9-83EF-6FB4B6258225}" type="presOf" srcId="{5DB607E2-5846-4844-B34C-1ECA44CE4A20}" destId="{D462E91F-F188-42A2-9A64-EEC810C69497}" srcOrd="0" destOrd="0" presId="urn:microsoft.com/office/officeart/2005/8/layout/default"/>
+    <dgm:cxn modelId="{70540823-8E23-4B09-A6D0-402D496344CC}" type="presOf" srcId="{123F005F-4187-4D28-9890-021213BB3865}" destId="{D4E4C01C-E3B4-400D-A145-5EDEB37F319B}" srcOrd="0" destOrd="0" presId="urn:microsoft.com/office/officeart/2005/8/layout/default"/>
+    <dgm:cxn modelId="{0E2FD567-A906-4124-A5E4-F138BE92121A}" type="presOf" srcId="{C2756150-F5B5-46AA-9EF3-275F10D922E4}" destId="{72F9417D-A97B-4255-91CB-AE82735DAD0A}" srcOrd="0" destOrd="0" presId="urn:microsoft.com/office/officeart/2005/8/layout/default"/>
+    <dgm:cxn modelId="{DC0D4751-C8D5-41D3-AE8A-197F6661A59E}" type="presOf" srcId="{B7F7CDFF-812F-4FE4-B995-33EC749DD89C}" destId="{A8A88069-573F-4603-89AF-61F01D4AA727}" srcOrd="0" destOrd="0" presId="urn:microsoft.com/office/officeart/2005/8/layout/default"/>
+    <dgm:cxn modelId="{A9933E74-F651-4955-BC16-1AC027B05031}" type="presOf" srcId="{38E5C7DE-DF39-48AF-94BE-D87082B4B00B}" destId="{26F8596F-9758-4365-8319-95E9CE17B7F7}" srcOrd="0" destOrd="0" presId="urn:microsoft.com/office/officeart/2005/8/layout/default"/>
+    <dgm:cxn modelId="{23B9D954-9711-47AC-BA94-BD437A8EC638}" srcId="{B7F7CDFF-812F-4FE4-B995-33EC749DD89C}" destId="{C2756150-F5B5-46AA-9EF3-275F10D922E4}" srcOrd="3" destOrd="0" parTransId="{15E41262-660A-4CA0-A98A-C843997A314A}" sibTransId="{EF942252-0506-4E61-8715-FDFB678865C9}"/>
+    <dgm:cxn modelId="{D303E191-3B57-4B5C-8B1B-B7D93AFA7A32}" type="presOf" srcId="{D1F8259D-3C96-471B-978A-F00CF2468EF9}" destId="{F5EFBDFB-A4F0-4611-8225-FBFF7169AC24}" srcOrd="0" destOrd="0" presId="urn:microsoft.com/office/officeart/2005/8/layout/default"/>
+    <dgm:cxn modelId="{90ABCFAB-9615-4044-BB12-9D114F0DBCFD}" srcId="{B7F7CDFF-812F-4FE4-B995-33EC749DD89C}" destId="{123F005F-4187-4D28-9890-021213BB3865}" srcOrd="0" destOrd="0" parTransId="{D2D449AE-FBCA-4D43-AC5A-CE7FE8D96935}" sibTransId="{D3D08D78-935D-4773-95F6-3581E3E2DF00}"/>
+    <dgm:cxn modelId="{C02A07BD-3FC0-4C86-BB19-529C9A0BFDBF}" srcId="{B7F7CDFF-812F-4FE4-B995-33EC749DD89C}" destId="{38E5C7DE-DF39-48AF-94BE-D87082B4B00B}" srcOrd="1" destOrd="0" parTransId="{5ABBEF5D-E067-4699-A558-5254F76D866E}" sibTransId="{51DC97B4-6420-4E36-9BAE-A6F29268D870}"/>
+    <dgm:cxn modelId="{08C922C7-290F-4C47-AD3E-BFC3AEA3350A}" srcId="{B7F7CDFF-812F-4FE4-B995-33EC749DD89C}" destId="{5DB607E2-5846-4844-B34C-1ECA44CE4A20}" srcOrd="4" destOrd="0" parTransId="{EF5B9EC0-31F5-4CDF-A077-A966C7B70A08}" sibTransId="{73EA92BC-39B7-454F-B10C-E9468751178C}"/>
+    <dgm:cxn modelId="{EBC9B6F0-E507-466B-BBE2-683802500701}" srcId="{B7F7CDFF-812F-4FE4-B995-33EC749DD89C}" destId="{D1F8259D-3C96-471B-978A-F00CF2468EF9}" srcOrd="2" destOrd="0" parTransId="{3AD8CEE6-51D9-4EAE-A085-2A706C6FF9EC}" sibTransId="{03DE2E89-0A88-4AF9-893A-5EC911E6C945}"/>
+    <dgm:cxn modelId="{1F11DEE3-75E6-4DA8-B215-97F1802A71F6}" type="presParOf" srcId="{A8A88069-573F-4603-89AF-61F01D4AA727}" destId="{D4E4C01C-E3B4-400D-A145-5EDEB37F319B}" srcOrd="0" destOrd="0" presId="urn:microsoft.com/office/officeart/2005/8/layout/default"/>
+    <dgm:cxn modelId="{FA03E835-614C-4A86-A825-0F0DA1BAD512}" type="presParOf" srcId="{A8A88069-573F-4603-89AF-61F01D4AA727}" destId="{D80F8220-B442-4F17-931A-A45F68EAEDC5}" srcOrd="1" destOrd="0" presId="urn:microsoft.com/office/officeart/2005/8/layout/default"/>
+    <dgm:cxn modelId="{2428469C-DEFF-4BBA-BA50-97F7872E87FD}" type="presParOf" srcId="{A8A88069-573F-4603-89AF-61F01D4AA727}" destId="{26F8596F-9758-4365-8319-95E9CE17B7F7}" srcOrd="2" destOrd="0" presId="urn:microsoft.com/office/officeart/2005/8/layout/default"/>
+    <dgm:cxn modelId="{75F0B766-35D8-4A09-A017-B452920E52D6}" type="presParOf" srcId="{A8A88069-573F-4603-89AF-61F01D4AA727}" destId="{88A152AC-3B15-4DEC-A9B0-CF7D588E6D75}" srcOrd="3" destOrd="0" presId="urn:microsoft.com/office/officeart/2005/8/layout/default"/>
+    <dgm:cxn modelId="{904650B0-D267-4869-901D-D78FD0C2A213}" type="presParOf" srcId="{A8A88069-573F-4603-89AF-61F01D4AA727}" destId="{F5EFBDFB-A4F0-4611-8225-FBFF7169AC24}" srcOrd="4" destOrd="0" presId="urn:microsoft.com/office/officeart/2005/8/layout/default"/>
+    <dgm:cxn modelId="{7AB56EA0-D8CF-47F2-A030-197A38EF58F0}" type="presParOf" srcId="{A8A88069-573F-4603-89AF-61F01D4AA727}" destId="{2D70DD6C-D1E0-4A50-AFCE-D5CFD03FBF08}" srcOrd="5" destOrd="0" presId="urn:microsoft.com/office/officeart/2005/8/layout/default"/>
+    <dgm:cxn modelId="{71FFE230-2716-433C-A48F-273E478FCB15}" type="presParOf" srcId="{A8A88069-573F-4603-89AF-61F01D4AA727}" destId="{72F9417D-A97B-4255-91CB-AE82735DAD0A}" srcOrd="6" destOrd="0" presId="urn:microsoft.com/office/officeart/2005/8/layout/default"/>
+    <dgm:cxn modelId="{F6416297-796D-47CC-B555-70BBA45915A1}" type="presParOf" srcId="{A8A88069-573F-4603-89AF-61F01D4AA727}" destId="{A539B384-3988-4C9E-B397-618A9137128F}" srcOrd="7" destOrd="0" presId="urn:microsoft.com/office/officeart/2005/8/layout/default"/>
+    <dgm:cxn modelId="{2F17E47D-7235-46BE-9A4B-A2FEC4B603AF}" type="presParOf" srcId="{A8A88069-573F-4603-89AF-61F01D4AA727}" destId="{D462E91F-F188-42A2-9A64-EEC810C69497}" srcOrd="8" destOrd="0" presId="urn:microsoft.com/office/officeart/2005/8/layout/default"/>
   </dgm:cxnLst>
   <dgm:bg/>
   <dgm:whole/>
@@ -6696,6 +7732,402 @@
 </dsp:drawing>
 </file>
 
+<file path=ppt/diagrams/drawing5.xml><?xml version="1.0" encoding="utf-8"?>
+<dsp:drawing xmlns:dgm="http://schemas.openxmlformats.org/drawingml/2006/diagram" xmlns:dsp="http://schemas.microsoft.com/office/drawing/2008/diagram" xmlns:a="http://schemas.openxmlformats.org/drawingml/2006/main">
+  <dsp:spTree>
+    <dsp:nvGrpSpPr>
+      <dsp:cNvPr id="0" name=""/>
+      <dsp:cNvGrpSpPr/>
+    </dsp:nvGrpSpPr>
+    <dsp:grpSpPr/>
+    <dsp:sp modelId="{D4E4C01C-E3B4-400D-A145-5EDEB37F319B}">
+      <dsp:nvSpPr>
+        <dsp:cNvPr id="0" name=""/>
+        <dsp:cNvSpPr/>
+      </dsp:nvSpPr>
+      <dsp:spPr>
+        <a:xfrm>
+          <a:off x="0" y="151093"/>
+          <a:ext cx="1669350" cy="1001610"/>
+        </a:xfrm>
+        <a:prstGeom prst="rect">
+          <a:avLst/>
+        </a:prstGeom>
+        <a:solidFill>
+          <a:schemeClr val="accent1">
+            <a:hueOff val="0"/>
+            <a:satOff val="0"/>
+            <a:lumOff val="0"/>
+            <a:alphaOff val="0"/>
+          </a:schemeClr>
+        </a:solidFill>
+        <a:ln w="19050" cap="flat" cmpd="sng" algn="ctr">
+          <a:solidFill>
+            <a:schemeClr val="lt1">
+              <a:hueOff val="0"/>
+              <a:satOff val="0"/>
+              <a:lumOff val="0"/>
+              <a:alphaOff val="0"/>
+            </a:schemeClr>
+          </a:solidFill>
+          <a:prstDash val="solid"/>
+          <a:miter lim="800000"/>
+        </a:ln>
+        <a:effectLst/>
+      </dsp:spPr>
+      <dsp:style>
+        <a:lnRef idx="2">
+          <a:scrgbClr r="0" g="0" b="0"/>
+        </a:lnRef>
+        <a:fillRef idx="1">
+          <a:scrgbClr r="0" g="0" b="0"/>
+        </a:fillRef>
+        <a:effectRef idx="0">
+          <a:scrgbClr r="0" g="0" b="0"/>
+        </a:effectRef>
+        <a:fontRef idx="minor">
+          <a:schemeClr val="lt1"/>
+        </a:fontRef>
+      </dsp:style>
+      <dsp:txBody>
+        <a:bodyPr spcFirstLastPara="0" vert="horz" wrap="square" lIns="49530" tIns="49530" rIns="49530" bIns="49530" numCol="1" spcCol="1270" anchor="ctr" anchorCtr="0">
+          <a:noAutofit/>
+        </a:bodyPr>
+        <a:lstStyle/>
+        <a:p>
+          <a:pPr marL="0" lvl="0" indent="0" algn="ctr" defTabSz="577850">
+            <a:lnSpc>
+              <a:spcPct val="90000"/>
+            </a:lnSpc>
+            <a:spcBef>
+              <a:spcPct val="0"/>
+            </a:spcBef>
+            <a:spcAft>
+              <a:spcPct val="35000"/>
+            </a:spcAft>
+            <a:buNone/>
+          </a:pPr>
+          <a:r>
+            <a:rPr lang="es-ES" sz="1300" kern="1200" dirty="0"/>
+            <a:t>Garantiza la integridad de la información.</a:t>
+          </a:r>
+        </a:p>
+      </dsp:txBody>
+      <dsp:txXfrm>
+        <a:off x="0" y="151093"/>
+        <a:ext cx="1669350" cy="1001610"/>
+      </dsp:txXfrm>
+    </dsp:sp>
+    <dsp:sp modelId="{26F8596F-9758-4365-8319-95E9CE17B7F7}">
+      <dsp:nvSpPr>
+        <dsp:cNvPr id="0" name=""/>
+        <dsp:cNvSpPr/>
+      </dsp:nvSpPr>
+      <dsp:spPr>
+        <a:xfrm>
+          <a:off x="1836286" y="151093"/>
+          <a:ext cx="1669350" cy="1001610"/>
+        </a:xfrm>
+        <a:prstGeom prst="rect">
+          <a:avLst/>
+        </a:prstGeom>
+        <a:solidFill>
+          <a:schemeClr val="accent1">
+            <a:hueOff val="0"/>
+            <a:satOff val="0"/>
+            <a:lumOff val="0"/>
+            <a:alphaOff val="0"/>
+          </a:schemeClr>
+        </a:solidFill>
+        <a:ln w="19050" cap="flat" cmpd="sng" algn="ctr">
+          <a:solidFill>
+            <a:schemeClr val="lt1">
+              <a:hueOff val="0"/>
+              <a:satOff val="0"/>
+              <a:lumOff val="0"/>
+              <a:alphaOff val="0"/>
+            </a:schemeClr>
+          </a:solidFill>
+          <a:prstDash val="solid"/>
+          <a:miter lim="800000"/>
+        </a:ln>
+        <a:effectLst/>
+      </dsp:spPr>
+      <dsp:style>
+        <a:lnRef idx="2">
+          <a:scrgbClr r="0" g="0" b="0"/>
+        </a:lnRef>
+        <a:fillRef idx="1">
+          <a:scrgbClr r="0" g="0" b="0"/>
+        </a:fillRef>
+        <a:effectRef idx="0">
+          <a:scrgbClr r="0" g="0" b="0"/>
+        </a:effectRef>
+        <a:fontRef idx="minor">
+          <a:schemeClr val="lt1"/>
+        </a:fontRef>
+      </dsp:style>
+      <dsp:txBody>
+        <a:bodyPr spcFirstLastPara="0" vert="horz" wrap="square" lIns="49530" tIns="49530" rIns="49530" bIns="49530" numCol="1" spcCol="1270" anchor="ctr" anchorCtr="0">
+          <a:noAutofit/>
+        </a:bodyPr>
+        <a:lstStyle/>
+        <a:p>
+          <a:pPr marL="0" lvl="0" indent="0" algn="ctr" defTabSz="577850">
+            <a:lnSpc>
+              <a:spcPct val="90000"/>
+            </a:lnSpc>
+            <a:spcBef>
+              <a:spcPct val="0"/>
+            </a:spcBef>
+            <a:spcAft>
+              <a:spcPct val="35000"/>
+            </a:spcAft>
+            <a:buNone/>
+          </a:pPr>
+          <a:r>
+            <a:rPr lang="es-ES" sz="1300" kern="1200" dirty="0"/>
+            <a:t>Crea un identificador único de la información de tamaño fijo</a:t>
+          </a:r>
+        </a:p>
+      </dsp:txBody>
+      <dsp:txXfrm>
+        <a:off x="1836286" y="151093"/>
+        <a:ext cx="1669350" cy="1001610"/>
+      </dsp:txXfrm>
+    </dsp:sp>
+    <dsp:sp modelId="{F5EFBDFB-A4F0-4611-8225-FBFF7169AC24}">
+      <dsp:nvSpPr>
+        <dsp:cNvPr id="0" name=""/>
+        <dsp:cNvSpPr/>
+      </dsp:nvSpPr>
+      <dsp:spPr>
+        <a:xfrm>
+          <a:off x="3672572" y="151093"/>
+          <a:ext cx="1669350" cy="1001610"/>
+        </a:xfrm>
+        <a:prstGeom prst="rect">
+          <a:avLst/>
+        </a:prstGeom>
+        <a:solidFill>
+          <a:schemeClr val="accent1">
+            <a:hueOff val="0"/>
+            <a:satOff val="0"/>
+            <a:lumOff val="0"/>
+            <a:alphaOff val="0"/>
+          </a:schemeClr>
+        </a:solidFill>
+        <a:ln w="19050" cap="flat" cmpd="sng" algn="ctr">
+          <a:solidFill>
+            <a:schemeClr val="lt1">
+              <a:hueOff val="0"/>
+              <a:satOff val="0"/>
+              <a:lumOff val="0"/>
+              <a:alphaOff val="0"/>
+            </a:schemeClr>
+          </a:solidFill>
+          <a:prstDash val="solid"/>
+          <a:miter lim="800000"/>
+        </a:ln>
+        <a:effectLst/>
+      </dsp:spPr>
+      <dsp:style>
+        <a:lnRef idx="2">
+          <a:scrgbClr r="0" g="0" b="0"/>
+        </a:lnRef>
+        <a:fillRef idx="1">
+          <a:scrgbClr r="0" g="0" b="0"/>
+        </a:fillRef>
+        <a:effectRef idx="0">
+          <a:scrgbClr r="0" g="0" b="0"/>
+        </a:effectRef>
+        <a:fontRef idx="minor">
+          <a:schemeClr val="lt1"/>
+        </a:fontRef>
+      </dsp:style>
+      <dsp:txBody>
+        <a:bodyPr spcFirstLastPara="0" vert="horz" wrap="square" lIns="49530" tIns="49530" rIns="49530" bIns="49530" numCol="1" spcCol="1270" anchor="ctr" anchorCtr="0">
+          <a:noAutofit/>
+        </a:bodyPr>
+        <a:lstStyle/>
+        <a:p>
+          <a:pPr marL="0" lvl="0" indent="0" algn="ctr" defTabSz="577850">
+            <a:lnSpc>
+              <a:spcPct val="90000"/>
+            </a:lnSpc>
+            <a:spcBef>
+              <a:spcPct val="0"/>
+            </a:spcBef>
+            <a:spcAft>
+              <a:spcPct val="35000"/>
+            </a:spcAft>
+            <a:buNone/>
+          </a:pPr>
+          <a:r>
+            <a:rPr lang="es-ES" sz="1300" kern="1200" dirty="0"/>
+            <a:t>Ese identificador se usa para compararlo y de esa manera ver si dos informaciones son iguales o no</a:t>
+          </a:r>
+        </a:p>
+      </dsp:txBody>
+      <dsp:txXfrm>
+        <a:off x="3672572" y="151093"/>
+        <a:ext cx="1669350" cy="1001610"/>
+      </dsp:txXfrm>
+    </dsp:sp>
+    <dsp:sp modelId="{72F9417D-A97B-4255-91CB-AE82735DAD0A}">
+      <dsp:nvSpPr>
+        <dsp:cNvPr id="0" name=""/>
+        <dsp:cNvSpPr/>
+      </dsp:nvSpPr>
+      <dsp:spPr>
+        <a:xfrm>
+          <a:off x="918143" y="1319639"/>
+          <a:ext cx="1669350" cy="1001610"/>
+        </a:xfrm>
+        <a:prstGeom prst="rect">
+          <a:avLst/>
+        </a:prstGeom>
+        <a:solidFill>
+          <a:schemeClr val="accent1">
+            <a:hueOff val="0"/>
+            <a:satOff val="0"/>
+            <a:lumOff val="0"/>
+            <a:alphaOff val="0"/>
+          </a:schemeClr>
+        </a:solidFill>
+        <a:ln w="19050" cap="flat" cmpd="sng" algn="ctr">
+          <a:solidFill>
+            <a:schemeClr val="lt1">
+              <a:hueOff val="0"/>
+              <a:satOff val="0"/>
+              <a:lumOff val="0"/>
+              <a:alphaOff val="0"/>
+            </a:schemeClr>
+          </a:solidFill>
+          <a:prstDash val="solid"/>
+          <a:miter lim="800000"/>
+        </a:ln>
+        <a:effectLst/>
+      </dsp:spPr>
+      <dsp:style>
+        <a:lnRef idx="2">
+          <a:scrgbClr r="0" g="0" b="0"/>
+        </a:lnRef>
+        <a:fillRef idx="1">
+          <a:scrgbClr r="0" g="0" b="0"/>
+        </a:fillRef>
+        <a:effectRef idx="0">
+          <a:scrgbClr r="0" g="0" b="0"/>
+        </a:effectRef>
+        <a:fontRef idx="minor">
+          <a:schemeClr val="lt1"/>
+        </a:fontRef>
+      </dsp:style>
+      <dsp:txBody>
+        <a:bodyPr spcFirstLastPara="0" vert="horz" wrap="square" lIns="49530" tIns="49530" rIns="49530" bIns="49530" numCol="1" spcCol="1270" anchor="ctr" anchorCtr="0">
+          <a:noAutofit/>
+        </a:bodyPr>
+        <a:lstStyle/>
+        <a:p>
+          <a:pPr marL="0" lvl="0" indent="0" algn="ctr" defTabSz="577850">
+            <a:lnSpc>
+              <a:spcPct val="90000"/>
+            </a:lnSpc>
+            <a:spcBef>
+              <a:spcPct val="0"/>
+            </a:spcBef>
+            <a:spcAft>
+              <a:spcPct val="35000"/>
+            </a:spcAft>
+            <a:buNone/>
+          </a:pPr>
+          <a:endParaRPr lang="es-ES" sz="1300" kern="1200"/>
+        </a:p>
+      </dsp:txBody>
+      <dsp:txXfrm>
+        <a:off x="918143" y="1319639"/>
+        <a:ext cx="1669350" cy="1001610"/>
+      </dsp:txXfrm>
+    </dsp:sp>
+    <dsp:sp modelId="{D462E91F-F188-42A2-9A64-EEC810C69497}">
+      <dsp:nvSpPr>
+        <dsp:cNvPr id="0" name=""/>
+        <dsp:cNvSpPr/>
+      </dsp:nvSpPr>
+      <dsp:spPr>
+        <a:xfrm>
+          <a:off x="2754429" y="1319639"/>
+          <a:ext cx="1669350" cy="1001610"/>
+        </a:xfrm>
+        <a:prstGeom prst="rect">
+          <a:avLst/>
+        </a:prstGeom>
+        <a:solidFill>
+          <a:schemeClr val="accent1">
+            <a:hueOff val="0"/>
+            <a:satOff val="0"/>
+            <a:lumOff val="0"/>
+            <a:alphaOff val="0"/>
+          </a:schemeClr>
+        </a:solidFill>
+        <a:ln w="19050" cap="flat" cmpd="sng" algn="ctr">
+          <a:solidFill>
+            <a:schemeClr val="lt1">
+              <a:hueOff val="0"/>
+              <a:satOff val="0"/>
+              <a:lumOff val="0"/>
+              <a:alphaOff val="0"/>
+            </a:schemeClr>
+          </a:solidFill>
+          <a:prstDash val="solid"/>
+          <a:miter lim="800000"/>
+        </a:ln>
+        <a:effectLst/>
+      </dsp:spPr>
+      <dsp:style>
+        <a:lnRef idx="2">
+          <a:scrgbClr r="0" g="0" b="0"/>
+        </a:lnRef>
+        <a:fillRef idx="1">
+          <a:scrgbClr r="0" g="0" b="0"/>
+        </a:fillRef>
+        <a:effectRef idx="0">
+          <a:scrgbClr r="0" g="0" b="0"/>
+        </a:effectRef>
+        <a:fontRef idx="minor">
+          <a:schemeClr val="lt1"/>
+        </a:fontRef>
+      </dsp:style>
+      <dsp:txBody>
+        <a:bodyPr spcFirstLastPara="0" vert="horz" wrap="square" lIns="49530" tIns="49530" rIns="49530" bIns="49530" numCol="1" spcCol="1270" anchor="ctr" anchorCtr="0">
+          <a:noAutofit/>
+        </a:bodyPr>
+        <a:lstStyle/>
+        <a:p>
+          <a:pPr marL="0" lvl="0" indent="0" algn="ctr" defTabSz="577850">
+            <a:lnSpc>
+              <a:spcPct val="90000"/>
+            </a:lnSpc>
+            <a:spcBef>
+              <a:spcPct val="0"/>
+            </a:spcBef>
+            <a:spcAft>
+              <a:spcPct val="35000"/>
+            </a:spcAft>
+            <a:buNone/>
+          </a:pPr>
+          <a:endParaRPr lang="es-ES" sz="1300" kern="1200"/>
+        </a:p>
+      </dsp:txBody>
+      <dsp:txXfrm>
+        <a:off x="2754429" y="1319639"/>
+        <a:ext cx="1669350" cy="1001610"/>
+      </dsp:txXfrm>
+    </dsp:sp>
+  </dsp:spTree>
+</dsp:drawing>
+</file>
+
 <file path=ppt/diagrams/layout1.xml><?xml version="1.0" encoding="utf-8"?>
 <dgm:layoutDef xmlns:dgm="http://schemas.openxmlformats.org/drawingml/2006/diagram" xmlns:a="http://schemas.openxmlformats.org/drawingml/2006/main" uniqueId="urn:microsoft.com/office/officeart/2018/5/layout/IconCircleLabelList">
   <dgm:title val="Icon Circle Label List"/>
@@ -7553,6 +8985,153 @@
 </dgm:layoutDef>
 </file>
 
+<file path=ppt/diagrams/layout5.xml><?xml version="1.0" encoding="utf-8"?>
+<dgm:layoutDef xmlns:dgm="http://schemas.openxmlformats.org/drawingml/2006/diagram" xmlns:a="http://schemas.openxmlformats.org/drawingml/2006/main" uniqueId="urn:microsoft.com/office/officeart/2005/8/layout/default">
+  <dgm:title val=""/>
+  <dgm:desc val=""/>
+  <dgm:catLst>
+    <dgm:cat type="list" pri="400"/>
+  </dgm:catLst>
+  <dgm:sampData>
+    <dgm:dataModel>
+      <dgm:ptLst>
+        <dgm:pt modelId="0" type="doc"/>
+        <dgm:pt modelId="1">
+          <dgm:prSet phldr="1"/>
+        </dgm:pt>
+        <dgm:pt modelId="2">
+          <dgm:prSet phldr="1"/>
+        </dgm:pt>
+        <dgm:pt modelId="3">
+          <dgm:prSet phldr="1"/>
+        </dgm:pt>
+        <dgm:pt modelId="4">
+          <dgm:prSet phldr="1"/>
+        </dgm:pt>
+        <dgm:pt modelId="5">
+          <dgm:prSet phldr="1"/>
+        </dgm:pt>
+      </dgm:ptLst>
+      <dgm:cxnLst>
+        <dgm:cxn modelId="6" srcId="0" destId="1" srcOrd="0" destOrd="0"/>
+        <dgm:cxn modelId="7" srcId="0" destId="2" srcOrd="1" destOrd="0"/>
+        <dgm:cxn modelId="8" srcId="0" destId="3" srcOrd="2" destOrd="0"/>
+        <dgm:cxn modelId="9" srcId="0" destId="4" srcOrd="3" destOrd="0"/>
+        <dgm:cxn modelId="10" srcId="0" destId="5" srcOrd="4" destOrd="0"/>
+      </dgm:cxnLst>
+      <dgm:bg/>
+      <dgm:whole/>
+    </dgm:dataModel>
+  </dgm:sampData>
+  <dgm:styleData>
+    <dgm:dataModel>
+      <dgm:ptLst>
+        <dgm:pt modelId="0" type="doc"/>
+        <dgm:pt modelId="1"/>
+        <dgm:pt modelId="2"/>
+      </dgm:ptLst>
+      <dgm:cxnLst>
+        <dgm:cxn modelId="3" srcId="0" destId="1" srcOrd="0" destOrd="0"/>
+        <dgm:cxn modelId="4" srcId="0" destId="2" srcOrd="1" destOrd="0"/>
+      </dgm:cxnLst>
+      <dgm:bg/>
+      <dgm:whole/>
+    </dgm:dataModel>
+  </dgm:styleData>
+  <dgm:clrData>
+    <dgm:dataModel>
+      <dgm:ptLst>
+        <dgm:pt modelId="0" type="doc"/>
+        <dgm:pt modelId="1"/>
+        <dgm:pt modelId="2"/>
+        <dgm:pt modelId="3"/>
+        <dgm:pt modelId="4"/>
+        <dgm:pt modelId="5"/>
+        <dgm:pt modelId="6"/>
+      </dgm:ptLst>
+      <dgm:cxnLst>
+        <dgm:cxn modelId="7" srcId="0" destId="1" srcOrd="0" destOrd="0"/>
+        <dgm:cxn modelId="8" srcId="0" destId="2" srcOrd="1" destOrd="0"/>
+        <dgm:cxn modelId="9" srcId="0" destId="3" srcOrd="2" destOrd="0"/>
+        <dgm:cxn modelId="10" srcId="0" destId="4" srcOrd="3" destOrd="0"/>
+        <dgm:cxn modelId="11" srcId="0" destId="5" srcOrd="4" destOrd="0"/>
+        <dgm:cxn modelId="12" srcId="0" destId="6" srcOrd="5" destOrd="0"/>
+      </dgm:cxnLst>
+      <dgm:bg/>
+      <dgm:whole/>
+    </dgm:dataModel>
+  </dgm:clrData>
+  <dgm:layoutNode name="diagram">
+    <dgm:varLst>
+      <dgm:dir/>
+      <dgm:resizeHandles val="exact"/>
+    </dgm:varLst>
+    <dgm:choose name="Name0">
+      <dgm:if name="Name1" func="var" arg="dir" op="equ" val="norm">
+        <dgm:alg type="snake">
+          <dgm:param type="grDir" val="tL"/>
+          <dgm:param type="flowDir" val="row"/>
+          <dgm:param type="contDir" val="sameDir"/>
+          <dgm:param type="off" val="ctr"/>
+        </dgm:alg>
+      </dgm:if>
+      <dgm:else name="Name2">
+        <dgm:alg type="snake">
+          <dgm:param type="grDir" val="tR"/>
+          <dgm:param type="flowDir" val="row"/>
+          <dgm:param type="contDir" val="sameDir"/>
+          <dgm:param type="off" val="ctr"/>
+        </dgm:alg>
+      </dgm:else>
+    </dgm:choose>
+    <dgm:shape xmlns:r="http://schemas.openxmlformats.org/officeDocument/2006/relationships" r:blip="">
+      <dgm:adjLst/>
+    </dgm:shape>
+    <dgm:presOf/>
+    <dgm:constrLst>
+      <dgm:constr type="w" for="ch" forName="node" refType="w"/>
+      <dgm:constr type="h" for="ch" forName="node" refType="w" refFor="ch" refForName="node" fact="0.6"/>
+      <dgm:constr type="w" for="ch" forName="sibTrans" refType="w" refFor="ch" refForName="node" fact="0.1"/>
+      <dgm:constr type="sp" refType="w" refFor="ch" refForName="sibTrans"/>
+      <dgm:constr type="primFontSz" for="ch" forName="node" op="equ" val="65"/>
+    </dgm:constrLst>
+    <dgm:ruleLst/>
+    <dgm:forEach name="Name3" axis="ch" ptType="node">
+      <dgm:layoutNode name="node">
+        <dgm:varLst>
+          <dgm:bulletEnabled val="1"/>
+        </dgm:varLst>
+        <dgm:alg type="tx"/>
+        <dgm:shape xmlns:r="http://schemas.openxmlformats.org/officeDocument/2006/relationships" type="rect" r:blip="">
+          <dgm:adjLst/>
+        </dgm:shape>
+        <dgm:presOf axis="desOrSelf" ptType="node"/>
+        <dgm:constrLst>
+          <dgm:constr type="lMarg" refType="primFontSz" fact="0.3"/>
+          <dgm:constr type="rMarg" refType="primFontSz" fact="0.3"/>
+          <dgm:constr type="tMarg" refType="primFontSz" fact="0.3"/>
+          <dgm:constr type="bMarg" refType="primFontSz" fact="0.3"/>
+        </dgm:constrLst>
+        <dgm:ruleLst>
+          <dgm:rule type="primFontSz" val="5" fact="NaN" max="NaN"/>
+        </dgm:ruleLst>
+      </dgm:layoutNode>
+      <dgm:forEach name="Name4" axis="followSib" ptType="sibTrans" cnt="1">
+        <dgm:layoutNode name="sibTrans">
+          <dgm:alg type="sp"/>
+          <dgm:shape xmlns:r="http://schemas.openxmlformats.org/officeDocument/2006/relationships" r:blip="">
+            <dgm:adjLst/>
+          </dgm:shape>
+          <dgm:presOf/>
+          <dgm:constrLst/>
+          <dgm:ruleLst/>
+        </dgm:layoutNode>
+      </dgm:forEach>
+    </dgm:forEach>
+  </dgm:layoutNode>
+</dgm:layoutDef>
+</file>
+
 <file path=ppt/diagrams/quickStyle1.xml><?xml version="1.0" encoding="utf-8"?>
 <dgm:styleDef xmlns:dgm="http://schemas.openxmlformats.org/drawingml/2006/diagram" xmlns:a="http://schemas.openxmlformats.org/drawingml/2006/main" uniqueId="urn:microsoft.com/office/officeart/2005/8/quickstyle/simple1">
   <dgm:title val=""/>
@@ -10656,6 +12235,1040 @@
 </file>
 
 <file path=ppt/diagrams/quickStyle4.xml><?xml version="1.0" encoding="utf-8"?>
+<dgm:styleDef xmlns:dgm="http://schemas.openxmlformats.org/drawingml/2006/diagram" xmlns:a="http://schemas.openxmlformats.org/drawingml/2006/main" uniqueId="urn:microsoft.com/office/officeart/2005/8/quickstyle/simple1">
+  <dgm:title val=""/>
+  <dgm:desc val=""/>
+  <dgm:catLst>
+    <dgm:cat type="simple" pri="10100"/>
+  </dgm:catLst>
+  <dgm:scene3d>
+    <a:camera prst="orthographicFront"/>
+    <a:lightRig rig="threePt" dir="t"/>
+  </dgm:scene3d>
+  <dgm:styleLbl name="node0">
+    <dgm:scene3d>
+      <a:camera prst="orthographicFront"/>
+      <a:lightRig rig="threePt" dir="t"/>
+    </dgm:scene3d>
+    <dgm:sp3d/>
+    <dgm:txPr/>
+    <dgm:style>
+      <a:lnRef idx="2">
+        <a:scrgbClr r="0" g="0" b="0"/>
+      </a:lnRef>
+      <a:fillRef idx="1">
+        <a:scrgbClr r="0" g="0" b="0"/>
+      </a:fillRef>
+      <a:effectRef idx="0">
+        <a:scrgbClr r="0" g="0" b="0"/>
+      </a:effectRef>
+      <a:fontRef idx="minor">
+        <a:schemeClr val="lt1"/>
+      </a:fontRef>
+    </dgm:style>
+  </dgm:styleLbl>
+  <dgm:styleLbl name="lnNode1">
+    <dgm:scene3d>
+      <a:camera prst="orthographicFront"/>
+      <a:lightRig rig="threePt" dir="t"/>
+    </dgm:scene3d>
+    <dgm:sp3d/>
+    <dgm:txPr/>
+    <dgm:style>
+      <a:lnRef idx="2">
+        <a:scrgbClr r="0" g="0" b="0"/>
+      </a:lnRef>
+      <a:fillRef idx="1">
+        <a:scrgbClr r="0" g="0" b="0"/>
+      </a:fillRef>
+      <a:effectRef idx="0">
+        <a:scrgbClr r="0" g="0" b="0"/>
+      </a:effectRef>
+      <a:fontRef idx="minor">
+        <a:schemeClr val="lt1"/>
+      </a:fontRef>
+    </dgm:style>
+  </dgm:styleLbl>
+  <dgm:styleLbl name="vennNode1">
+    <dgm:scene3d>
+      <a:camera prst="orthographicFront"/>
+      <a:lightRig rig="threePt" dir="t"/>
+    </dgm:scene3d>
+    <dgm:sp3d/>
+    <dgm:txPr/>
+    <dgm:style>
+      <a:lnRef idx="2">
+        <a:scrgbClr r="0" g="0" b="0"/>
+      </a:lnRef>
+      <a:fillRef idx="1">
+        <a:scrgbClr r="0" g="0" b="0"/>
+      </a:fillRef>
+      <a:effectRef idx="0">
+        <a:scrgbClr r="0" g="0" b="0"/>
+      </a:effectRef>
+      <a:fontRef idx="minor">
+        <a:schemeClr val="tx1"/>
+      </a:fontRef>
+    </dgm:style>
+  </dgm:styleLbl>
+  <dgm:styleLbl name="alignNode1">
+    <dgm:scene3d>
+      <a:camera prst="orthographicFront"/>
+      <a:lightRig rig="threePt" dir="t"/>
+    </dgm:scene3d>
+    <dgm:sp3d/>
+    <dgm:txPr/>
+    <dgm:style>
+      <a:lnRef idx="2">
+        <a:scrgbClr r="0" g="0" b="0"/>
+      </a:lnRef>
+      <a:fillRef idx="1">
+        <a:scrgbClr r="0" g="0" b="0"/>
+      </a:fillRef>
+      <a:effectRef idx="0">
+        <a:scrgbClr r="0" g="0" b="0"/>
+      </a:effectRef>
+      <a:fontRef idx="minor">
+        <a:schemeClr val="lt1"/>
+      </a:fontRef>
+    </dgm:style>
+  </dgm:styleLbl>
+  <dgm:styleLbl name="node1">
+    <dgm:scene3d>
+      <a:camera prst="orthographicFront"/>
+      <a:lightRig rig="threePt" dir="t"/>
+    </dgm:scene3d>
+    <dgm:sp3d/>
+    <dgm:txPr/>
+    <dgm:style>
+      <a:lnRef idx="2">
+        <a:scrgbClr r="0" g="0" b="0"/>
+      </a:lnRef>
+      <a:fillRef idx="1">
+        <a:scrgbClr r="0" g="0" b="0"/>
+      </a:fillRef>
+      <a:effectRef idx="0">
+        <a:scrgbClr r="0" g="0" b="0"/>
+      </a:effectRef>
+      <a:fontRef idx="minor">
+        <a:schemeClr val="lt1"/>
+      </a:fontRef>
+    </dgm:style>
+  </dgm:styleLbl>
+  <dgm:styleLbl name="node2">
+    <dgm:scene3d>
+      <a:camera prst="orthographicFront"/>
+      <a:lightRig rig="threePt" dir="t"/>
+    </dgm:scene3d>
+    <dgm:sp3d/>
+    <dgm:txPr/>
+    <dgm:style>
+      <a:lnRef idx="2">
+        <a:scrgbClr r="0" g="0" b="0"/>
+      </a:lnRef>
+      <a:fillRef idx="1">
+        <a:scrgbClr r="0" g="0" b="0"/>
+      </a:fillRef>
+      <a:effectRef idx="0">
+        <a:scrgbClr r="0" g="0" b="0"/>
+      </a:effectRef>
+      <a:fontRef idx="minor">
+        <a:schemeClr val="lt1"/>
+      </a:fontRef>
+    </dgm:style>
+  </dgm:styleLbl>
+  <dgm:styleLbl name="node3">
+    <dgm:scene3d>
+      <a:camera prst="orthographicFront"/>
+      <a:lightRig rig="threePt" dir="t"/>
+    </dgm:scene3d>
+    <dgm:sp3d/>
+    <dgm:txPr/>
+    <dgm:style>
+      <a:lnRef idx="2">
+        <a:scrgbClr r="0" g="0" b="0"/>
+      </a:lnRef>
+      <a:fillRef idx="1">
+        <a:scrgbClr r="0" g="0" b="0"/>
+      </a:fillRef>
+      <a:effectRef idx="0">
+        <a:scrgbClr r="0" g="0" b="0"/>
+      </a:effectRef>
+      <a:fontRef idx="minor">
+        <a:schemeClr val="lt1"/>
+      </a:fontRef>
+    </dgm:style>
+  </dgm:styleLbl>
+  <dgm:styleLbl name="node4">
+    <dgm:scene3d>
+      <a:camera prst="orthographicFront"/>
+      <a:lightRig rig="threePt" dir="t"/>
+    </dgm:scene3d>
+    <dgm:sp3d/>
+    <dgm:txPr/>
+    <dgm:style>
+      <a:lnRef idx="2">
+        <a:scrgbClr r="0" g="0" b="0"/>
+      </a:lnRef>
+      <a:fillRef idx="1">
+        <a:scrgbClr r="0" g="0" b="0"/>
+      </a:fillRef>
+      <a:effectRef idx="0">
+        <a:scrgbClr r="0" g="0" b="0"/>
+      </a:effectRef>
+      <a:fontRef idx="minor">
+        <a:schemeClr val="lt1"/>
+      </a:fontRef>
+    </dgm:style>
+  </dgm:styleLbl>
+  <dgm:styleLbl name="fgImgPlace1">
+    <dgm:scene3d>
+      <a:camera prst="orthographicFront"/>
+      <a:lightRig rig="threePt" dir="t"/>
+    </dgm:scene3d>
+    <dgm:sp3d/>
+    <dgm:txPr/>
+    <dgm:style>
+      <a:lnRef idx="2">
+        <a:scrgbClr r="0" g="0" b="0"/>
+      </a:lnRef>
+      <a:fillRef idx="1">
+        <a:scrgbClr r="0" g="0" b="0"/>
+      </a:fillRef>
+      <a:effectRef idx="0">
+        <a:scrgbClr r="0" g="0" b="0"/>
+      </a:effectRef>
+      <a:fontRef idx="minor"/>
+    </dgm:style>
+  </dgm:styleLbl>
+  <dgm:styleLbl name="alignImgPlace1">
+    <dgm:scene3d>
+      <a:camera prst="orthographicFront"/>
+      <a:lightRig rig="threePt" dir="t"/>
+    </dgm:scene3d>
+    <dgm:sp3d/>
+    <dgm:txPr/>
+    <dgm:style>
+      <a:lnRef idx="2">
+        <a:scrgbClr r="0" g="0" b="0"/>
+      </a:lnRef>
+      <a:fillRef idx="1">
+        <a:scrgbClr r="0" g="0" b="0"/>
+      </a:fillRef>
+      <a:effectRef idx="0">
+        <a:scrgbClr r="0" g="0" b="0"/>
+      </a:effectRef>
+      <a:fontRef idx="minor"/>
+    </dgm:style>
+  </dgm:styleLbl>
+  <dgm:styleLbl name="bgImgPlace1">
+    <dgm:scene3d>
+      <a:camera prst="orthographicFront"/>
+      <a:lightRig rig="threePt" dir="t"/>
+    </dgm:scene3d>
+    <dgm:sp3d/>
+    <dgm:txPr/>
+    <dgm:style>
+      <a:lnRef idx="2">
+        <a:scrgbClr r="0" g="0" b="0"/>
+      </a:lnRef>
+      <a:fillRef idx="1">
+        <a:scrgbClr r="0" g="0" b="0"/>
+      </a:fillRef>
+      <a:effectRef idx="0">
+        <a:scrgbClr r="0" g="0" b="0"/>
+      </a:effectRef>
+      <a:fontRef idx="minor"/>
+    </dgm:style>
+  </dgm:styleLbl>
+  <dgm:styleLbl name="sibTrans2D1">
+    <dgm:scene3d>
+      <a:camera prst="orthographicFront"/>
+      <a:lightRig rig="threePt" dir="t"/>
+    </dgm:scene3d>
+    <dgm:sp3d/>
+    <dgm:txPr/>
+    <dgm:style>
+      <a:lnRef idx="0">
+        <a:scrgbClr r="0" g="0" b="0"/>
+      </a:lnRef>
+      <a:fillRef idx="1">
+        <a:scrgbClr r="0" g="0" b="0"/>
+      </a:fillRef>
+      <a:effectRef idx="0">
+        <a:scrgbClr r="0" g="0" b="0"/>
+      </a:effectRef>
+      <a:fontRef idx="minor">
+        <a:schemeClr val="lt1"/>
+      </a:fontRef>
+    </dgm:style>
+  </dgm:styleLbl>
+  <dgm:styleLbl name="fgSibTrans2D1">
+    <dgm:scene3d>
+      <a:camera prst="orthographicFront"/>
+      <a:lightRig rig="threePt" dir="t"/>
+    </dgm:scene3d>
+    <dgm:sp3d/>
+    <dgm:txPr/>
+    <dgm:style>
+      <a:lnRef idx="0">
+        <a:scrgbClr r="0" g="0" b="0"/>
+      </a:lnRef>
+      <a:fillRef idx="1">
+        <a:scrgbClr r="0" g="0" b="0"/>
+      </a:fillRef>
+      <a:effectRef idx="0">
+        <a:scrgbClr r="0" g="0" b="0"/>
+      </a:effectRef>
+      <a:fontRef idx="minor">
+        <a:schemeClr val="lt1"/>
+      </a:fontRef>
+    </dgm:style>
+  </dgm:styleLbl>
+  <dgm:styleLbl name="bgSibTrans2D1">
+    <dgm:scene3d>
+      <a:camera prst="orthographicFront"/>
+      <a:lightRig rig="threePt" dir="t"/>
+    </dgm:scene3d>
+    <dgm:sp3d/>
+    <dgm:txPr/>
+    <dgm:style>
+      <a:lnRef idx="0">
+        <a:scrgbClr r="0" g="0" b="0"/>
+      </a:lnRef>
+      <a:fillRef idx="1">
+        <a:scrgbClr r="0" g="0" b="0"/>
+      </a:fillRef>
+      <a:effectRef idx="0">
+        <a:scrgbClr r="0" g="0" b="0"/>
+      </a:effectRef>
+      <a:fontRef idx="minor">
+        <a:schemeClr val="lt1"/>
+      </a:fontRef>
+    </dgm:style>
+  </dgm:styleLbl>
+  <dgm:styleLbl name="sibTrans1D1">
+    <dgm:scene3d>
+      <a:camera prst="orthographicFront"/>
+      <a:lightRig rig="threePt" dir="t"/>
+    </dgm:scene3d>
+    <dgm:sp3d/>
+    <dgm:txPr/>
+    <dgm:style>
+      <a:lnRef idx="1">
+        <a:scrgbClr r="0" g="0" b="0"/>
+      </a:lnRef>
+      <a:fillRef idx="0">
+        <a:scrgbClr r="0" g="0" b="0"/>
+      </a:fillRef>
+      <a:effectRef idx="0">
+        <a:scrgbClr r="0" g="0" b="0"/>
+      </a:effectRef>
+      <a:fontRef idx="minor"/>
+    </dgm:style>
+  </dgm:styleLbl>
+  <dgm:styleLbl name="callout">
+    <dgm:scene3d>
+      <a:camera prst="orthographicFront"/>
+      <a:lightRig rig="threePt" dir="t"/>
+    </dgm:scene3d>
+    <dgm:sp3d/>
+    <dgm:txPr/>
+    <dgm:style>
+      <a:lnRef idx="2">
+        <a:scrgbClr r="0" g="0" b="0"/>
+      </a:lnRef>
+      <a:fillRef idx="1">
+        <a:scrgbClr r="0" g="0" b="0"/>
+      </a:fillRef>
+      <a:effectRef idx="0">
+        <a:scrgbClr r="0" g="0" b="0"/>
+      </a:effectRef>
+      <a:fontRef idx="minor"/>
+    </dgm:style>
+  </dgm:styleLbl>
+  <dgm:styleLbl name="asst0">
+    <dgm:scene3d>
+      <a:camera prst="orthographicFront"/>
+      <a:lightRig rig="threePt" dir="t"/>
+    </dgm:scene3d>
+    <dgm:sp3d/>
+    <dgm:txPr/>
+    <dgm:style>
+      <a:lnRef idx="2">
+        <a:scrgbClr r="0" g="0" b="0"/>
+      </a:lnRef>
+      <a:fillRef idx="1">
+        <a:scrgbClr r="0" g="0" b="0"/>
+      </a:fillRef>
+      <a:effectRef idx="0">
+        <a:scrgbClr r="0" g="0" b="0"/>
+      </a:effectRef>
+      <a:fontRef idx="minor">
+        <a:schemeClr val="lt1"/>
+      </a:fontRef>
+    </dgm:style>
+  </dgm:styleLbl>
+  <dgm:styleLbl name="asst1">
+    <dgm:scene3d>
+      <a:camera prst="orthographicFront"/>
+      <a:lightRig rig="threePt" dir="t"/>
+    </dgm:scene3d>
+    <dgm:sp3d/>
+    <dgm:txPr/>
+    <dgm:style>
+      <a:lnRef idx="2">
+        <a:scrgbClr r="0" g="0" b="0"/>
+      </a:lnRef>
+      <a:fillRef idx="1">
+        <a:scrgbClr r="0" g="0" b="0"/>
+      </a:fillRef>
+      <a:effectRef idx="0">
+        <a:scrgbClr r="0" g="0" b="0"/>
+      </a:effectRef>
+      <a:fontRef idx="minor">
+        <a:schemeClr val="lt1"/>
+      </a:fontRef>
+    </dgm:style>
+  </dgm:styleLbl>
+  <dgm:styleLbl name="asst2">
+    <dgm:scene3d>
+      <a:camera prst="orthographicFront"/>
+      <a:lightRig rig="threePt" dir="t"/>
+    </dgm:scene3d>
+    <dgm:sp3d/>
+    <dgm:txPr/>
+    <dgm:style>
+      <a:lnRef idx="2">
+        <a:scrgbClr r="0" g="0" b="0"/>
+      </a:lnRef>
+      <a:fillRef idx="1">
+        <a:scrgbClr r="0" g="0" b="0"/>
+      </a:fillRef>
+      <a:effectRef idx="0">
+        <a:scrgbClr r="0" g="0" b="0"/>
+      </a:effectRef>
+      <a:fontRef idx="minor">
+        <a:schemeClr val="lt1"/>
+      </a:fontRef>
+    </dgm:style>
+  </dgm:styleLbl>
+  <dgm:styleLbl name="asst3">
+    <dgm:scene3d>
+      <a:camera prst="orthographicFront"/>
+      <a:lightRig rig="threePt" dir="t"/>
+    </dgm:scene3d>
+    <dgm:sp3d/>
+    <dgm:txPr/>
+    <dgm:style>
+      <a:lnRef idx="2">
+        <a:scrgbClr r="0" g="0" b="0"/>
+      </a:lnRef>
+      <a:fillRef idx="1">
+        <a:scrgbClr r="0" g="0" b="0"/>
+      </a:fillRef>
+      <a:effectRef idx="0">
+        <a:scrgbClr r="0" g="0" b="0"/>
+      </a:effectRef>
+      <a:fontRef idx="minor">
+        <a:schemeClr val="lt1"/>
+      </a:fontRef>
+    </dgm:style>
+  </dgm:styleLbl>
+  <dgm:styleLbl name="asst4">
+    <dgm:scene3d>
+      <a:camera prst="orthographicFront"/>
+      <a:lightRig rig="threePt" dir="t"/>
+    </dgm:scene3d>
+    <dgm:sp3d/>
+    <dgm:txPr/>
+    <dgm:style>
+      <a:lnRef idx="2">
+        <a:scrgbClr r="0" g="0" b="0"/>
+      </a:lnRef>
+      <a:fillRef idx="1">
+        <a:scrgbClr r="0" g="0" b="0"/>
+      </a:fillRef>
+      <a:effectRef idx="0">
+        <a:scrgbClr r="0" g="0" b="0"/>
+      </a:effectRef>
+      <a:fontRef idx="minor">
+        <a:schemeClr val="lt1"/>
+      </a:fontRef>
+    </dgm:style>
+  </dgm:styleLbl>
+  <dgm:styleLbl name="parChTrans2D1">
+    <dgm:scene3d>
+      <a:camera prst="orthographicFront"/>
+      <a:lightRig rig="threePt" dir="t"/>
+    </dgm:scene3d>
+    <dgm:sp3d/>
+    <dgm:txPr/>
+    <dgm:style>
+      <a:lnRef idx="2">
+        <a:scrgbClr r="0" g="0" b="0"/>
+      </a:lnRef>
+      <a:fillRef idx="1">
+        <a:scrgbClr r="0" g="0" b="0"/>
+      </a:fillRef>
+      <a:effectRef idx="0">
+        <a:scrgbClr r="0" g="0" b="0"/>
+      </a:effectRef>
+      <a:fontRef idx="minor">
+        <a:schemeClr val="lt1"/>
+      </a:fontRef>
+    </dgm:style>
+  </dgm:styleLbl>
+  <dgm:styleLbl name="parChTrans2D2">
+    <dgm:scene3d>
+      <a:camera prst="orthographicFront"/>
+      <a:lightRig rig="threePt" dir="t"/>
+    </dgm:scene3d>
+    <dgm:sp3d/>
+    <dgm:txPr/>
+    <dgm:style>
+      <a:lnRef idx="2">
+        <a:scrgbClr r="0" g="0" b="0"/>
+      </a:lnRef>
+      <a:fillRef idx="1">
+        <a:scrgbClr r="0" g="0" b="0"/>
+      </a:fillRef>
+      <a:effectRef idx="0">
+        <a:scrgbClr r="0" g="0" b="0"/>
+      </a:effectRef>
+      <a:fontRef idx="minor">
+        <a:schemeClr val="lt1"/>
+      </a:fontRef>
+    </dgm:style>
+  </dgm:styleLbl>
+  <dgm:styleLbl name="parChTrans2D3">
+    <dgm:scene3d>
+      <a:camera prst="orthographicFront"/>
+      <a:lightRig rig="threePt" dir="t"/>
+    </dgm:scene3d>
+    <dgm:sp3d/>
+    <dgm:txPr/>
+    <dgm:style>
+      <a:lnRef idx="2">
+        <a:scrgbClr r="0" g="0" b="0"/>
+      </a:lnRef>
+      <a:fillRef idx="1">
+        <a:scrgbClr r="0" g="0" b="0"/>
+      </a:fillRef>
+      <a:effectRef idx="0">
+        <a:scrgbClr r="0" g="0" b="0"/>
+      </a:effectRef>
+      <a:fontRef idx="minor">
+        <a:schemeClr val="lt1"/>
+      </a:fontRef>
+    </dgm:style>
+  </dgm:styleLbl>
+  <dgm:styleLbl name="parChTrans2D4">
+    <dgm:scene3d>
+      <a:camera prst="orthographicFront"/>
+      <a:lightRig rig="threePt" dir="t"/>
+    </dgm:scene3d>
+    <dgm:sp3d/>
+    <dgm:txPr/>
+    <dgm:style>
+      <a:lnRef idx="2">
+        <a:scrgbClr r="0" g="0" b="0"/>
+      </a:lnRef>
+      <a:fillRef idx="1">
+        <a:scrgbClr r="0" g="0" b="0"/>
+      </a:fillRef>
+      <a:effectRef idx="0">
+        <a:scrgbClr r="0" g="0" b="0"/>
+      </a:effectRef>
+      <a:fontRef idx="minor">
+        <a:schemeClr val="lt1"/>
+      </a:fontRef>
+    </dgm:style>
+  </dgm:styleLbl>
+  <dgm:styleLbl name="parChTrans1D1">
+    <dgm:scene3d>
+      <a:camera prst="orthographicFront"/>
+      <a:lightRig rig="threePt" dir="t"/>
+    </dgm:scene3d>
+    <dgm:sp3d/>
+    <dgm:txPr/>
+    <dgm:style>
+      <a:lnRef idx="2">
+        <a:scrgbClr r="0" g="0" b="0"/>
+      </a:lnRef>
+      <a:fillRef idx="0">
+        <a:scrgbClr r="0" g="0" b="0"/>
+      </a:fillRef>
+      <a:effectRef idx="0">
+        <a:scrgbClr r="0" g="0" b="0"/>
+      </a:effectRef>
+      <a:fontRef idx="minor"/>
+    </dgm:style>
+  </dgm:styleLbl>
+  <dgm:styleLbl name="parChTrans1D2">
+    <dgm:scene3d>
+      <a:camera prst="orthographicFront"/>
+      <a:lightRig rig="threePt" dir="t"/>
+    </dgm:scene3d>
+    <dgm:sp3d/>
+    <dgm:txPr/>
+    <dgm:style>
+      <a:lnRef idx="2">
+        <a:scrgbClr r="0" g="0" b="0"/>
+      </a:lnRef>
+      <a:fillRef idx="0">
+        <a:scrgbClr r="0" g="0" b="0"/>
+      </a:fillRef>
+      <a:effectRef idx="0">
+        <a:scrgbClr r="0" g="0" b="0"/>
+      </a:effectRef>
+      <a:fontRef idx="minor"/>
+    </dgm:style>
+  </dgm:styleLbl>
+  <dgm:styleLbl name="parChTrans1D3">
+    <dgm:scene3d>
+      <a:camera prst="orthographicFront"/>
+      <a:lightRig rig="threePt" dir="t"/>
+    </dgm:scene3d>
+    <dgm:sp3d/>
+    <dgm:txPr/>
+    <dgm:style>
+      <a:lnRef idx="2">
+        <a:scrgbClr r="0" g="0" b="0"/>
+      </a:lnRef>
+      <a:fillRef idx="0">
+        <a:scrgbClr r="0" g="0" b="0"/>
+      </a:fillRef>
+      <a:effectRef idx="0">
+        <a:scrgbClr r="0" g="0" b="0"/>
+      </a:effectRef>
+      <a:fontRef idx="minor"/>
+    </dgm:style>
+  </dgm:styleLbl>
+  <dgm:styleLbl name="parChTrans1D4">
+    <dgm:scene3d>
+      <a:camera prst="orthographicFront"/>
+      <a:lightRig rig="threePt" dir="t"/>
+    </dgm:scene3d>
+    <dgm:sp3d/>
+    <dgm:txPr/>
+    <dgm:style>
+      <a:lnRef idx="2">
+        <a:scrgbClr r="0" g="0" b="0"/>
+      </a:lnRef>
+      <a:fillRef idx="0">
+        <a:scrgbClr r="0" g="0" b="0"/>
+      </a:fillRef>
+      <a:effectRef idx="0">
+        <a:scrgbClr r="0" g="0" b="0"/>
+      </a:effectRef>
+      <a:fontRef idx="minor"/>
+    </dgm:style>
+  </dgm:styleLbl>
+  <dgm:styleLbl name="fgAcc1">
+    <dgm:scene3d>
+      <a:camera prst="orthographicFront"/>
+      <a:lightRig rig="threePt" dir="t"/>
+    </dgm:scene3d>
+    <dgm:sp3d/>
+    <dgm:txPr/>
+    <dgm:style>
+      <a:lnRef idx="2">
+        <a:scrgbClr r="0" g="0" b="0"/>
+      </a:lnRef>
+      <a:fillRef idx="1">
+        <a:scrgbClr r="0" g="0" b="0"/>
+      </a:fillRef>
+      <a:effectRef idx="0">
+        <a:scrgbClr r="0" g="0" b="0"/>
+      </a:effectRef>
+      <a:fontRef idx="minor"/>
+    </dgm:style>
+  </dgm:styleLbl>
+  <dgm:styleLbl name="conFgAcc1">
+    <dgm:scene3d>
+      <a:camera prst="orthographicFront"/>
+      <a:lightRig rig="threePt" dir="t"/>
+    </dgm:scene3d>
+    <dgm:sp3d/>
+    <dgm:txPr/>
+    <dgm:style>
+      <a:lnRef idx="2">
+        <a:scrgbClr r="0" g="0" b="0"/>
+      </a:lnRef>
+      <a:fillRef idx="1">
+        <a:scrgbClr r="0" g="0" b="0"/>
+      </a:fillRef>
+      <a:effectRef idx="0">
+        <a:scrgbClr r="0" g="0" b="0"/>
+      </a:effectRef>
+      <a:fontRef idx="minor"/>
+    </dgm:style>
+  </dgm:styleLbl>
+  <dgm:styleLbl name="alignAcc1">
+    <dgm:scene3d>
+      <a:camera prst="orthographicFront"/>
+      <a:lightRig rig="threePt" dir="t"/>
+    </dgm:scene3d>
+    <dgm:sp3d/>
+    <dgm:txPr/>
+    <dgm:style>
+      <a:lnRef idx="2">
+        <a:scrgbClr r="0" g="0" b="0"/>
+      </a:lnRef>
+      <a:fillRef idx="1">
+        <a:scrgbClr r="0" g="0" b="0"/>
+      </a:fillRef>
+      <a:effectRef idx="0">
+        <a:scrgbClr r="0" g="0" b="0"/>
+      </a:effectRef>
+      <a:fontRef idx="minor"/>
+    </dgm:style>
+  </dgm:styleLbl>
+  <dgm:styleLbl name="trAlignAcc1">
+    <dgm:scene3d>
+      <a:camera prst="orthographicFront"/>
+      <a:lightRig rig="threePt" dir="t"/>
+    </dgm:scene3d>
+    <dgm:sp3d/>
+    <dgm:txPr/>
+    <dgm:style>
+      <a:lnRef idx="1">
+        <a:scrgbClr r="0" g="0" b="0"/>
+      </a:lnRef>
+      <a:fillRef idx="1">
+        <a:scrgbClr r="0" g="0" b="0"/>
+      </a:fillRef>
+      <a:effectRef idx="0">
+        <a:scrgbClr r="0" g="0" b="0"/>
+      </a:effectRef>
+      <a:fontRef idx="minor"/>
+    </dgm:style>
+  </dgm:styleLbl>
+  <dgm:styleLbl name="bgAcc1">
+    <dgm:scene3d>
+      <a:camera prst="orthographicFront"/>
+      <a:lightRig rig="threePt" dir="t"/>
+    </dgm:scene3d>
+    <dgm:sp3d/>
+    <dgm:txPr/>
+    <dgm:style>
+      <a:lnRef idx="2">
+        <a:scrgbClr r="0" g="0" b="0"/>
+      </a:lnRef>
+      <a:fillRef idx="1">
+        <a:scrgbClr r="0" g="0" b="0"/>
+      </a:fillRef>
+      <a:effectRef idx="0">
+        <a:scrgbClr r="0" g="0" b="0"/>
+      </a:effectRef>
+      <a:fontRef idx="minor"/>
+    </dgm:style>
+  </dgm:styleLbl>
+  <dgm:styleLbl name="solidFgAcc1">
+    <dgm:scene3d>
+      <a:camera prst="orthographicFront"/>
+      <a:lightRig rig="threePt" dir="t"/>
+    </dgm:scene3d>
+    <dgm:sp3d/>
+    <dgm:txPr/>
+    <dgm:style>
+      <a:lnRef idx="2">
+        <a:scrgbClr r="0" g="0" b="0"/>
+      </a:lnRef>
+      <a:fillRef idx="1">
+        <a:scrgbClr r="0" g="0" b="0"/>
+      </a:fillRef>
+      <a:effectRef idx="0">
+        <a:scrgbClr r="0" g="0" b="0"/>
+      </a:effectRef>
+      <a:fontRef idx="minor"/>
+    </dgm:style>
+  </dgm:styleLbl>
+  <dgm:styleLbl name="solidAlignAcc1">
+    <dgm:scene3d>
+      <a:camera prst="orthographicFront"/>
+      <a:lightRig rig="threePt" dir="t"/>
+    </dgm:scene3d>
+    <dgm:sp3d/>
+    <dgm:txPr/>
+    <dgm:style>
+      <a:lnRef idx="2">
+        <a:scrgbClr r="0" g="0" b="0"/>
+      </a:lnRef>
+      <a:fillRef idx="1">
+        <a:scrgbClr r="0" g="0" b="0"/>
+      </a:fillRef>
+      <a:effectRef idx="0">
+        <a:scrgbClr r="0" g="0" b="0"/>
+      </a:effectRef>
+      <a:fontRef idx="minor"/>
+    </dgm:style>
+  </dgm:styleLbl>
+  <dgm:styleLbl name="solidBgAcc1">
+    <dgm:scene3d>
+      <a:camera prst="orthographicFront"/>
+      <a:lightRig rig="threePt" dir="t"/>
+    </dgm:scene3d>
+    <dgm:sp3d/>
+    <dgm:txPr/>
+    <dgm:style>
+      <a:lnRef idx="2">
+        <a:scrgbClr r="0" g="0" b="0"/>
+      </a:lnRef>
+      <a:fillRef idx="1">
+        <a:scrgbClr r="0" g="0" b="0"/>
+      </a:fillRef>
+      <a:effectRef idx="0">
+        <a:scrgbClr r="0" g="0" b="0"/>
+      </a:effectRef>
+      <a:fontRef idx="minor"/>
+    </dgm:style>
+  </dgm:styleLbl>
+  <dgm:styleLbl name="fgAccFollowNode1">
+    <dgm:scene3d>
+      <a:camera prst="orthographicFront"/>
+      <a:lightRig rig="threePt" dir="t"/>
+    </dgm:scene3d>
+    <dgm:sp3d/>
+    <dgm:txPr/>
+    <dgm:style>
+      <a:lnRef idx="2">
+        <a:scrgbClr r="0" g="0" b="0"/>
+      </a:lnRef>
+      <a:fillRef idx="1">
+        <a:scrgbClr r="0" g="0" b="0"/>
+      </a:fillRef>
+      <a:effectRef idx="0">
+        <a:scrgbClr r="0" g="0" b="0"/>
+      </a:effectRef>
+      <a:fontRef idx="minor"/>
+    </dgm:style>
+  </dgm:styleLbl>
+  <dgm:styleLbl name="alignAccFollowNode1">
+    <dgm:scene3d>
+      <a:camera prst="orthographicFront"/>
+      <a:lightRig rig="threePt" dir="t"/>
+    </dgm:scene3d>
+    <dgm:sp3d/>
+    <dgm:txPr/>
+    <dgm:style>
+      <a:lnRef idx="2">
+        <a:scrgbClr r="0" g="0" b="0"/>
+      </a:lnRef>
+      <a:fillRef idx="1">
+        <a:scrgbClr r="0" g="0" b="0"/>
+      </a:fillRef>
+      <a:effectRef idx="0">
+        <a:scrgbClr r="0" g="0" b="0"/>
+      </a:effectRef>
+      <a:fontRef idx="minor"/>
+    </dgm:style>
+  </dgm:styleLbl>
+  <dgm:styleLbl name="bgAccFollowNode1">
+    <dgm:scene3d>
+      <a:camera prst="orthographicFront"/>
+      <a:lightRig rig="threePt" dir="t"/>
+    </dgm:scene3d>
+    <dgm:sp3d/>
+    <dgm:txPr/>
+    <dgm:style>
+      <a:lnRef idx="2">
+        <a:scrgbClr r="0" g="0" b="0"/>
+      </a:lnRef>
+      <a:fillRef idx="1">
+        <a:scrgbClr r="0" g="0" b="0"/>
+      </a:fillRef>
+      <a:effectRef idx="0">
+        <a:scrgbClr r="0" g="0" b="0"/>
+      </a:effectRef>
+      <a:fontRef idx="minor"/>
+    </dgm:style>
+  </dgm:styleLbl>
+  <dgm:styleLbl name="fgAcc0">
+    <dgm:scene3d>
+      <a:camera prst="orthographicFront"/>
+      <a:lightRig rig="threePt" dir="t"/>
+    </dgm:scene3d>
+    <dgm:sp3d/>
+    <dgm:txPr/>
+    <dgm:style>
+      <a:lnRef idx="2">
+        <a:scrgbClr r="0" g="0" b="0"/>
+      </a:lnRef>
+      <a:fillRef idx="1">
+        <a:scrgbClr r="0" g="0" b="0"/>
+      </a:fillRef>
+      <a:effectRef idx="0">
+        <a:scrgbClr r="0" g="0" b="0"/>
+      </a:effectRef>
+      <a:fontRef idx="minor"/>
+    </dgm:style>
+  </dgm:styleLbl>
+  <dgm:styleLbl name="fgAcc2">
+    <dgm:scene3d>
+      <a:camera prst="orthographicFront"/>
+      <a:lightRig rig="threePt" dir="t"/>
+    </dgm:scene3d>
+    <dgm:sp3d/>
+    <dgm:txPr/>
+    <dgm:style>
+      <a:lnRef idx="2">
+        <a:scrgbClr r="0" g="0" b="0"/>
+      </a:lnRef>
+      <a:fillRef idx="1">
+        <a:scrgbClr r="0" g="0" b="0"/>
+      </a:fillRef>
+      <a:effectRef idx="0">
+        <a:scrgbClr r="0" g="0" b="0"/>
+      </a:effectRef>
+      <a:fontRef idx="minor"/>
+    </dgm:style>
+  </dgm:styleLbl>
+  <dgm:styleLbl name="fgAcc3">
+    <dgm:scene3d>
+      <a:camera prst="orthographicFront"/>
+      <a:lightRig rig="threePt" dir="t"/>
+    </dgm:scene3d>
+    <dgm:sp3d/>
+    <dgm:txPr/>
+    <dgm:style>
+      <a:lnRef idx="2">
+        <a:scrgbClr r="0" g="0" b="0"/>
+      </a:lnRef>
+      <a:fillRef idx="1">
+        <a:scrgbClr r="0" g="0" b="0"/>
+      </a:fillRef>
+      <a:effectRef idx="0">
+        <a:scrgbClr r="0" g="0" b="0"/>
+      </a:effectRef>
+      <a:fontRef idx="minor"/>
+    </dgm:style>
+  </dgm:styleLbl>
+  <dgm:styleLbl name="fgAcc4">
+    <dgm:scene3d>
+      <a:camera prst="orthographicFront"/>
+      <a:lightRig rig="threePt" dir="t"/>
+    </dgm:scene3d>
+    <dgm:sp3d/>
+    <dgm:txPr/>
+    <dgm:style>
+      <a:lnRef idx="2">
+        <a:scrgbClr r="0" g="0" b="0"/>
+      </a:lnRef>
+      <a:fillRef idx="1">
+        <a:scrgbClr r="0" g="0" b="0"/>
+      </a:fillRef>
+      <a:effectRef idx="0">
+        <a:scrgbClr r="0" g="0" b="0"/>
+      </a:effectRef>
+      <a:fontRef idx="minor"/>
+    </dgm:style>
+  </dgm:styleLbl>
+  <dgm:styleLbl name="bgShp">
+    <dgm:scene3d>
+      <a:camera prst="orthographicFront"/>
+      <a:lightRig rig="threePt" dir="t"/>
+    </dgm:scene3d>
+    <dgm:sp3d/>
+    <dgm:txPr/>
+    <dgm:style>
+      <a:lnRef idx="0">
+        <a:scrgbClr r="0" g="0" b="0"/>
+      </a:lnRef>
+      <a:fillRef idx="1">
+        <a:scrgbClr r="0" g="0" b="0"/>
+      </a:fillRef>
+      <a:effectRef idx="0">
+        <a:scrgbClr r="0" g="0" b="0"/>
+      </a:effectRef>
+      <a:fontRef idx="minor"/>
+    </dgm:style>
+  </dgm:styleLbl>
+  <dgm:styleLbl name="dkBgShp">
+    <dgm:scene3d>
+      <a:camera prst="orthographicFront"/>
+      <a:lightRig rig="threePt" dir="t"/>
+    </dgm:scene3d>
+    <dgm:sp3d/>
+    <dgm:txPr/>
+    <dgm:style>
+      <a:lnRef idx="0">
+        <a:scrgbClr r="0" g="0" b="0"/>
+      </a:lnRef>
+      <a:fillRef idx="1">
+        <a:scrgbClr r="0" g="0" b="0"/>
+      </a:fillRef>
+      <a:effectRef idx="0">
+        <a:scrgbClr r="0" g="0" b="0"/>
+      </a:effectRef>
+      <a:fontRef idx="minor"/>
+    </dgm:style>
+  </dgm:styleLbl>
+  <dgm:styleLbl name="trBgShp">
+    <dgm:scene3d>
+      <a:camera prst="orthographicFront"/>
+      <a:lightRig rig="threePt" dir="t"/>
+    </dgm:scene3d>
+    <dgm:sp3d/>
+    <dgm:txPr/>
+    <dgm:style>
+      <a:lnRef idx="0">
+        <a:scrgbClr r="0" g="0" b="0"/>
+      </a:lnRef>
+      <a:fillRef idx="1">
+        <a:scrgbClr r="0" g="0" b="0"/>
+      </a:fillRef>
+      <a:effectRef idx="0">
+        <a:scrgbClr r="0" g="0" b="0"/>
+      </a:effectRef>
+      <a:fontRef idx="minor"/>
+    </dgm:style>
+  </dgm:styleLbl>
+  <dgm:styleLbl name="fgShp">
+    <dgm:scene3d>
+      <a:camera prst="orthographicFront"/>
+      <a:lightRig rig="threePt" dir="t"/>
+    </dgm:scene3d>
+    <dgm:sp3d/>
+    <dgm:txPr/>
+    <dgm:style>
+      <a:lnRef idx="2">
+        <a:scrgbClr r="0" g="0" b="0"/>
+      </a:lnRef>
+      <a:fillRef idx="1">
+        <a:scrgbClr r="0" g="0" b="0"/>
+      </a:fillRef>
+      <a:effectRef idx="0">
+        <a:scrgbClr r="0" g="0" b="0"/>
+      </a:effectRef>
+      <a:fontRef idx="minor"/>
+    </dgm:style>
+  </dgm:styleLbl>
+  <dgm:styleLbl name="revTx">
+    <dgm:scene3d>
+      <a:camera prst="orthographicFront"/>
+      <a:lightRig rig="threePt" dir="t"/>
+    </dgm:scene3d>
+    <dgm:sp3d/>
+    <dgm:txPr/>
+    <dgm:style>
+      <a:lnRef idx="0">
+        <a:scrgbClr r="0" g="0" b="0"/>
+      </a:lnRef>
+      <a:fillRef idx="0">
+        <a:scrgbClr r="0" g="0" b="0"/>
+      </a:fillRef>
+      <a:effectRef idx="0">
+        <a:scrgbClr r="0" g="0" b="0"/>
+      </a:effectRef>
+      <a:fontRef idx="minor"/>
+    </dgm:style>
+  </dgm:styleLbl>
+</dgm:styleDef>
+</file>
+
+<file path=ppt/diagrams/quickStyle5.xml><?xml version="1.0" encoding="utf-8"?>
 <dgm:styleDef xmlns:dgm="http://schemas.openxmlformats.org/drawingml/2006/diagram" xmlns:a="http://schemas.openxmlformats.org/drawingml/2006/main" uniqueId="urn:microsoft.com/office/officeart/2005/8/quickstyle/simple1">
   <dgm:title val=""/>
   <dgm:desc val=""/>
@@ -18232,7 +20845,7 @@
 </file>
 
 <file path=ppt/slides/slide26.xml><?xml version="1.0" encoding="utf-8"?>
-<p:sld xmlns:a="http://schemas.openxmlformats.org/drawingml/2006/main" xmlns:r="http://schemas.openxmlformats.org/officeDocument/2006/relationships" xmlns:p="http://schemas.openxmlformats.org/presentationml/2006/main">
+<p:sld xmlns:a="http://schemas.openxmlformats.org/drawingml/2006/main" xmlns:r="http://schemas.openxmlformats.org/officeDocument/2006/relationships" xmlns:p="http://schemas.openxmlformats.org/presentationml/2006/main" show="0">
   <p:cSld>
     <p:spTree>
       <p:nvGrpSpPr>
@@ -19297,56 +21910,69 @@
           <a:chExt cx="0" cy="0"/>
         </a:xfrm>
       </p:grpSpPr>
-      <p:sp>
-        <p:nvSpPr>
-          <p:cNvPr id="2" name="Título 1">
+      <p:pic>
+        <p:nvPicPr>
+          <p:cNvPr id="5" name="Marcador de contenido 4">
             <a:extLst>
               <a:ext uri="{FF2B5EF4-FFF2-40B4-BE49-F238E27FC236}">
-                <a16:creationId xmlns:a16="http://schemas.microsoft.com/office/drawing/2014/main" id="{68640731-A73E-D655-3832-F602B353ED96}"/>
+                <a16:creationId xmlns:a16="http://schemas.microsoft.com/office/drawing/2014/main" id="{0AE07F04-8913-B4C8-DA55-05DDB4F9AFC8}"/>
               </a:ext>
             </a:extLst>
           </p:cNvPr>
-          <p:cNvSpPr>
-            <a:spLocks noGrp="1"/>
-          </p:cNvSpPr>
+          <p:cNvPicPr>
+            <a:picLocks noGrp="1" noChangeAspect="1"/>
+          </p:cNvPicPr>
           <p:nvPr>
-            <p:ph type="title"/>
+            <p:ph idx="1"/>
           </p:nvPr>
-        </p:nvSpPr>
-        <p:spPr/>
-        <p:txBody>
-          <a:bodyPr/>
-          <a:lstStyle/>
-          <a:p>
-            <a:endParaRPr lang="es-ES" dirty="0"/>
-          </a:p>
-        </p:txBody>
-      </p:sp>
-      <p:sp>
-        <p:nvSpPr>
-          <p:cNvPr id="3" name="Marcador de contenido 2">
+        </p:nvPicPr>
+        <p:blipFill>
+          <a:blip r:embed="rId2"/>
+          <a:stretch>
+            <a:fillRect/>
+          </a:stretch>
+        </p:blipFill>
+        <p:spPr>
+          <a:xfrm>
+            <a:off x="675255" y="705390"/>
+            <a:ext cx="6520698" cy="6064250"/>
+          </a:xfrm>
+          <a:prstGeom prst="rect">
+            <a:avLst/>
+          </a:prstGeom>
+          <a:noFill/>
+        </p:spPr>
+      </p:pic>
+      <p:pic>
+        <p:nvPicPr>
+          <p:cNvPr id="7" name="Imagen 6">
             <a:extLst>
               <a:ext uri="{FF2B5EF4-FFF2-40B4-BE49-F238E27FC236}">
-                <a16:creationId xmlns:a16="http://schemas.microsoft.com/office/drawing/2014/main" id="{97807957-D5A8-EF8C-D4A6-1C56918F59FC}"/>
+                <a16:creationId xmlns:a16="http://schemas.microsoft.com/office/drawing/2014/main" id="{D3CD7F1D-07E2-3903-DA96-6A1583CBEB0D}"/>
               </a:ext>
             </a:extLst>
           </p:cNvPr>
-          <p:cNvSpPr>
-            <a:spLocks noGrp="1"/>
-          </p:cNvSpPr>
-          <p:nvPr>
-            <p:ph idx="1"/>
-          </p:nvPr>
-        </p:nvSpPr>
-        <p:spPr/>
-        <p:txBody>
-          <a:bodyPr/>
-          <a:lstStyle/>
-          <a:p>
-            <a:endParaRPr lang="es-ES"/>
-          </a:p>
-        </p:txBody>
-      </p:sp>
+          <p:cNvPicPr>
+            <a:picLocks noChangeAspect="1"/>
+          </p:cNvPicPr>
+          <p:nvPr/>
+        </p:nvPicPr>
+        <p:blipFill>
+          <a:blip r:embed="rId3"/>
+          <a:stretch>
+            <a:fillRect/>
+          </a:stretch>
+        </p:blipFill>
+        <p:spPr>
+          <a:xfrm>
+            <a:off x="6610510" y="705390"/>
+            <a:ext cx="4487697" cy="6152610"/>
+          </a:xfrm>
+          <a:prstGeom prst="rect">
+            <a:avLst/>
+          </a:prstGeom>
+        </p:spPr>
+      </p:pic>
     </p:spTree>
     <p:extLst>
       <p:ext uri="{BB962C8B-B14F-4D97-AF65-F5344CB8AC3E}">
@@ -19382,7 +22008,7 @@
           <p:cNvPr id="2" name="Título 1">
             <a:extLst>
               <a:ext uri="{FF2B5EF4-FFF2-40B4-BE49-F238E27FC236}">
-                <a16:creationId xmlns:a16="http://schemas.microsoft.com/office/drawing/2014/main" id="{3C818EA2-A9B8-6137-C8AD-0A9FAA5C3666}"/>
+                <a16:creationId xmlns:a16="http://schemas.microsoft.com/office/drawing/2014/main" id="{1F63188C-DC00-7E93-7502-BCF0E04D08D4}"/>
               </a:ext>
             </a:extLst>
           </p:cNvPr>
@@ -19393,18 +22019,157 @@
             <p:ph type="title"/>
           </p:nvPr>
         </p:nvSpPr>
-        <p:spPr/>
+        <p:spPr>
+          <a:xfrm>
+            <a:off x="518160" y="727199"/>
+            <a:ext cx="11155680" cy="1463040"/>
+          </a:xfrm>
+        </p:spPr>
         <p:txBody>
-          <a:bodyPr/>
+          <a:bodyPr anchor="t">
+            <a:normAutofit/>
+          </a:bodyPr>
           <a:lstStyle/>
           <a:p>
             <a:r>
               <a:rPr lang="es-ES" dirty="0"/>
-              <a:t>4.1 Criptografía hibrida</a:t>
+              <a:t>4.1Criptografía hibrida</a:t>
             </a:r>
           </a:p>
         </p:txBody>
       </p:sp>
+      <p:pic>
+        <p:nvPicPr>
+          <p:cNvPr id="5" name="Marcador de contenido 4" descr="Escala de tiempo&#10;&#10;El contenido generado por IA puede ser incorrecto.">
+            <a:extLst>
+              <a:ext uri="{FF2B5EF4-FFF2-40B4-BE49-F238E27FC236}">
+                <a16:creationId xmlns:a16="http://schemas.microsoft.com/office/drawing/2014/main" id="{22C875EA-5666-FA68-F422-39A771259F9B}"/>
+              </a:ext>
+            </a:extLst>
+          </p:cNvPr>
+          <p:cNvPicPr>
+            <a:picLocks noGrp="1" noChangeAspect="1"/>
+          </p:cNvPicPr>
+          <p:nvPr>
+            <p:ph idx="1"/>
+          </p:nvPr>
+        </p:nvPicPr>
+        <p:blipFill>
+          <a:blip r:embed="rId2">
+            <a:extLst>
+              <a:ext uri="{28A0092B-C50C-407E-A947-70E740481C1C}">
+                <a14:useLocalDpi xmlns:a14="http://schemas.microsoft.com/office/drawing/2010/main" val="0"/>
+              </a:ext>
+            </a:extLst>
+          </a:blip>
+          <a:stretch>
+            <a:fillRect/>
+          </a:stretch>
+        </p:blipFill>
+        <p:spPr>
+          <a:xfrm>
+            <a:off x="1237779" y="1549154"/>
+            <a:ext cx="8911055" cy="5034746"/>
+          </a:xfrm>
+          <a:noFill/>
+        </p:spPr>
+      </p:pic>
+    </p:spTree>
+    <p:extLst>
+      <p:ext uri="{BB962C8B-B14F-4D97-AF65-F5344CB8AC3E}">
+        <p14:creationId xmlns:p14="http://schemas.microsoft.com/office/powerpoint/2010/main" val="2482235075"/>
+      </p:ext>
+    </p:extLst>
+  </p:cSld>
+  <p:clrMapOvr>
+    <a:masterClrMapping/>
+  </p:clrMapOvr>
+</p:sld>
+</file>
+
+<file path=ppt/slides/slide34.xml><?xml version="1.0" encoding="utf-8"?>
+<p:sld xmlns:a="http://schemas.openxmlformats.org/drawingml/2006/main" xmlns:r="http://schemas.openxmlformats.org/officeDocument/2006/relationships" xmlns:p="http://schemas.openxmlformats.org/presentationml/2006/main">
+  <p:cSld>
+    <p:spTree>
+      <p:nvGrpSpPr>
+        <p:cNvPr id="1" name=""/>
+        <p:cNvGrpSpPr/>
+        <p:nvPr/>
+      </p:nvGrpSpPr>
+      <p:grpSpPr>
+        <a:xfrm>
+          <a:off x="0" y="0"/>
+          <a:ext cx="0" cy="0"/>
+          <a:chOff x="0" y="0"/>
+          <a:chExt cx="0" cy="0"/>
+        </a:xfrm>
+      </p:grpSpPr>
+      <p:pic>
+        <p:nvPicPr>
+          <p:cNvPr id="5" name="Marcador de contenido 4" descr="Diagrama&#10;&#10;El contenido generado por IA puede ser incorrecto.">
+            <a:extLst>
+              <a:ext uri="{FF2B5EF4-FFF2-40B4-BE49-F238E27FC236}">
+                <a16:creationId xmlns:a16="http://schemas.microsoft.com/office/drawing/2014/main" id="{F65CAF2A-CFFA-DDFA-5FA4-2799431A4A62}"/>
+              </a:ext>
+            </a:extLst>
+          </p:cNvPr>
+          <p:cNvPicPr>
+            <a:picLocks noGrp="1" noChangeAspect="1"/>
+          </p:cNvPicPr>
+          <p:nvPr>
+            <p:ph idx="1"/>
+          </p:nvPr>
+        </p:nvPicPr>
+        <p:blipFill>
+          <a:blip r:embed="rId2">
+            <a:extLst>
+              <a:ext uri="{28A0092B-C50C-407E-A947-70E740481C1C}">
+                <a14:useLocalDpi xmlns:a14="http://schemas.microsoft.com/office/drawing/2010/main" val="0"/>
+              </a:ext>
+            </a:extLst>
+          </a:blip>
+          <a:stretch>
+            <a:fillRect/>
+          </a:stretch>
+        </p:blipFill>
+        <p:spPr>
+          <a:xfrm>
+            <a:off x="1185676" y="725488"/>
+            <a:ext cx="9820647" cy="6064250"/>
+          </a:xfrm>
+          <a:noFill/>
+        </p:spPr>
+      </p:pic>
+    </p:spTree>
+    <p:extLst>
+      <p:ext uri="{BB962C8B-B14F-4D97-AF65-F5344CB8AC3E}">
+        <p14:creationId xmlns:p14="http://schemas.microsoft.com/office/powerpoint/2010/main" val="1647228482"/>
+      </p:ext>
+    </p:extLst>
+  </p:cSld>
+  <p:clrMapOvr>
+    <a:masterClrMapping/>
+  </p:clrMapOvr>
+</p:sld>
+</file>
+
+<file path=ppt/slides/slide35.xml><?xml version="1.0" encoding="utf-8"?>
+<p:sld xmlns:a="http://schemas.openxmlformats.org/drawingml/2006/main" xmlns:r="http://schemas.openxmlformats.org/officeDocument/2006/relationships" xmlns:p="http://schemas.openxmlformats.org/presentationml/2006/main">
+  <p:cSld>
+    <p:spTree>
+      <p:nvGrpSpPr>
+        <p:cNvPr id="1" name=""/>
+        <p:cNvGrpSpPr/>
+        <p:nvPr/>
+      </p:nvGrpSpPr>
+      <p:grpSpPr>
+        <a:xfrm>
+          <a:off x="0" y="0"/>
+          <a:ext cx="0" cy="0"/>
+          <a:chOff x="0" y="0"/>
+          <a:chExt cx="0" cy="0"/>
+        </a:xfrm>
+      </p:grpSpPr>
       <p:sp>
         <p:nvSpPr>
           <p:cNvPr id="3" name="Marcador de contenido 2">
@@ -19421,19 +22186,32 @@
             <p:ph idx="1"/>
           </p:nvPr>
         </p:nvSpPr>
-        <p:spPr/>
+        <p:spPr>
+          <a:xfrm>
+            <a:off x="420540" y="1009867"/>
+            <a:ext cx="11155680" cy="3767328"/>
+          </a:xfrm>
+        </p:spPr>
         <p:txBody>
           <a:bodyPr/>
           <a:lstStyle/>
           <a:p>
             <a:r>
-              <a:rPr lang="es-ES" dirty="0"/>
-              <a:t>Consiste en mezclar tanto criptografía asimétrica como simétrica.</a:t>
+              <a:rPr lang="es-ES" sz="2800" dirty="0"/>
+              <a:t>Consiste en mezclar tanto </a:t>
+            </a:r>
+            <a:r>
+              <a:rPr lang="es-ES" sz="2800" b="1" dirty="0"/>
+              <a:t>criptografía asimétrica como simétrica</a:t>
+            </a:r>
+            <a:r>
+              <a:rPr lang="es-ES" sz="2800" dirty="0"/>
+              <a:t>.</a:t>
             </a:r>
           </a:p>
           <a:p>
             <a:r>
-              <a:rPr lang="es-ES" dirty="0"/>
+              <a:rPr lang="es-ES" sz="2800" dirty="0"/>
               <a:t>Comúnmente cuando se establece la comunicación se utiliza la criptografía asimétrica para garantizar la confidencialidad, aunque el canal este comprometido. Se intercambian las claves simétricas de sesión y a partir de hay se empieza a usar criptografía simétrica.</a:t>
             </a:r>
           </a:p>
@@ -19455,7 +22233,7 @@
 </p:sld>
 </file>
 
-<file path=ppt/slides/slide34.xml><?xml version="1.0" encoding="utf-8"?>
+<file path=ppt/slides/slide36.xml><?xml version="1.0" encoding="utf-8"?>
 <p:sld xmlns:a="http://schemas.openxmlformats.org/drawingml/2006/main" xmlns:r="http://schemas.openxmlformats.org/officeDocument/2006/relationships" xmlns:p="http://schemas.openxmlformats.org/presentationml/2006/main">
   <p:cSld>
     <p:spTree>
@@ -19596,7 +22374,171 @@
 </p:sld>
 </file>
 
-<file path=ppt/slides/slide35.xml><?xml version="1.0" encoding="utf-8"?>
+<file path=ppt/slides/slide37.xml><?xml version="1.0" encoding="utf-8"?>
+<p:sld xmlns:a="http://schemas.openxmlformats.org/drawingml/2006/main" xmlns:r="http://schemas.openxmlformats.org/officeDocument/2006/relationships" xmlns:p="http://schemas.openxmlformats.org/presentationml/2006/main">
+  <p:cSld>
+    <p:spTree>
+      <p:nvGrpSpPr>
+        <p:cNvPr id="1" name=""/>
+        <p:cNvGrpSpPr/>
+        <p:nvPr/>
+      </p:nvGrpSpPr>
+      <p:grpSpPr>
+        <a:xfrm>
+          <a:off x="0" y="0"/>
+          <a:ext cx="0" cy="0"/>
+          <a:chOff x="0" y="0"/>
+          <a:chExt cx="0" cy="0"/>
+        </a:xfrm>
+      </p:grpSpPr>
+      <p:sp>
+        <p:nvSpPr>
+          <p:cNvPr id="2" name="Título 1">
+            <a:extLst>
+              <a:ext uri="{FF2B5EF4-FFF2-40B4-BE49-F238E27FC236}">
+                <a16:creationId xmlns:a16="http://schemas.microsoft.com/office/drawing/2014/main" id="{A516970C-A2C4-1FDB-0D9C-DB8568CE3C12}"/>
+              </a:ext>
+            </a:extLst>
+          </p:cNvPr>
+          <p:cNvSpPr>
+            <a:spLocks noGrp="1"/>
+          </p:cNvSpPr>
+          <p:nvPr>
+            <p:ph type="title"/>
+          </p:nvPr>
+        </p:nvSpPr>
+        <p:spPr/>
+        <p:txBody>
+          <a:bodyPr>
+            <a:normAutofit/>
+          </a:bodyPr>
+          <a:lstStyle/>
+          <a:p>
+            <a:r>
+              <a:rPr lang="es-ES" sz="3600" dirty="0"/>
+              <a:t>¿Para que sirve una función hash?</a:t>
+            </a:r>
+          </a:p>
+        </p:txBody>
+      </p:sp>
+      <p:sp>
+        <p:nvSpPr>
+          <p:cNvPr id="3" name="Marcador de contenido 2">
+            <a:extLst>
+              <a:ext uri="{FF2B5EF4-FFF2-40B4-BE49-F238E27FC236}">
+                <a16:creationId xmlns:a16="http://schemas.microsoft.com/office/drawing/2014/main" id="{D86D89BE-4F0D-A042-1E79-CA30FC8B5B74}"/>
+              </a:ext>
+            </a:extLst>
+          </p:cNvPr>
+          <p:cNvSpPr>
+            <a:spLocks noGrp="1"/>
+          </p:cNvSpPr>
+          <p:nvPr>
+            <p:ph idx="1"/>
+          </p:nvPr>
+        </p:nvSpPr>
+        <p:spPr>
+          <a:xfrm>
+            <a:off x="515112" y="1966212"/>
+            <a:ext cx="11155680" cy="3767328"/>
+          </a:xfrm>
+        </p:spPr>
+        <p:txBody>
+          <a:bodyPr/>
+          <a:lstStyle/>
+          <a:p>
+            <a:r>
+              <a:rPr lang="es-ES" dirty="0"/>
+              <a:t>Una función hash sirve para </a:t>
+            </a:r>
+            <a:r>
+              <a:rPr lang="es-ES" b="1" dirty="0"/>
+              <a:t>convertir cualquier información en una huella digital única</a:t>
+            </a:r>
+            <a:r>
+              <a:rPr lang="es-ES" dirty="0"/>
+              <a:t>, de tamaño fijo.</a:t>
+            </a:r>
+            <a:br>
+              <a:rPr lang="es-ES" dirty="0"/>
+            </a:br>
+            <a:r>
+              <a:rPr lang="es-ES" dirty="0"/>
+              <a:t>Se usa para </a:t>
+            </a:r>
+            <a:r>
+              <a:rPr lang="es-ES" b="1" dirty="0"/>
+              <a:t>verificar la integridad</a:t>
+            </a:r>
+            <a:r>
+              <a:rPr lang="es-ES" dirty="0"/>
+              <a:t> de los datos, asegurarse de que </a:t>
+            </a:r>
+            <a:r>
+              <a:rPr lang="es-ES" b="1" dirty="0"/>
+              <a:t>no fueron modificados</a:t>
+            </a:r>
+            <a:r>
+              <a:rPr lang="es-ES" dirty="0"/>
+              <a:t>.</a:t>
+            </a:r>
+          </a:p>
+          <a:p>
+            <a:r>
+              <a:rPr lang="es-ES" dirty="0"/>
+              <a:t>Su uso no es exclusivo de la criptografía, pero en esta disciplina se emplea para garantizar la integridad de los datos.</a:t>
+            </a:r>
+          </a:p>
+          <a:p>
+            <a:endParaRPr lang="es-ES" dirty="0"/>
+          </a:p>
+          <a:p>
+            <a:endParaRPr lang="es-ES" dirty="0"/>
+          </a:p>
+        </p:txBody>
+      </p:sp>
+      <p:graphicFrame>
+        <p:nvGraphicFramePr>
+          <p:cNvPr id="4" name="Diagrama 3">
+            <a:extLst>
+              <a:ext uri="{FF2B5EF4-FFF2-40B4-BE49-F238E27FC236}">
+                <a16:creationId xmlns:a16="http://schemas.microsoft.com/office/drawing/2014/main" id="{714735A8-EF4C-D679-6CA1-9205B5F60136}"/>
+              </a:ext>
+            </a:extLst>
+          </p:cNvPr>
+          <p:cNvGraphicFramePr/>
+          <p:nvPr>
+            <p:extLst>
+              <p:ext uri="{D42A27DB-BD31-4B8C-83A1-F6EECF244321}">
+                <p14:modId xmlns:p14="http://schemas.microsoft.com/office/powerpoint/2010/main" val="3182166301"/>
+              </p:ext>
+            </p:extLst>
+          </p:nvPr>
+        </p:nvGraphicFramePr>
+        <p:xfrm>
+          <a:off x="966598" y="3665989"/>
+          <a:ext cx="5341923" cy="2472344"/>
+        </p:xfrm>
+        <a:graphic>
+          <a:graphicData uri="http://schemas.openxmlformats.org/drawingml/2006/diagram">
+            <dgm:relIds xmlns:dgm="http://schemas.openxmlformats.org/drawingml/2006/diagram" xmlns:r="http://schemas.openxmlformats.org/officeDocument/2006/relationships" r:dm="rId2" r:lo="rId3" r:qs="rId4" r:cs="rId5"/>
+          </a:graphicData>
+        </a:graphic>
+      </p:graphicFrame>
+    </p:spTree>
+    <p:extLst>
+      <p:ext uri="{BB962C8B-B14F-4D97-AF65-F5344CB8AC3E}">
+        <p14:creationId xmlns:p14="http://schemas.microsoft.com/office/powerpoint/2010/main" val="1265622355"/>
+      </p:ext>
+    </p:extLst>
+  </p:cSld>
+  <p:clrMapOvr>
+    <a:masterClrMapping/>
+  </p:clrMapOvr>
+</p:sld>
+</file>
+
+<file path=ppt/slides/slide38.xml><?xml version="1.0" encoding="utf-8"?>
 <p:sld xmlns:a="http://schemas.openxmlformats.org/drawingml/2006/main" xmlns:r="http://schemas.openxmlformats.org/officeDocument/2006/relationships" xmlns:p="http://schemas.openxmlformats.org/presentationml/2006/main">
   <p:cSld>
     <p:spTree>
@@ -19700,7 +22642,7 @@
 </p:sld>
 </file>
 
-<file path=ppt/slides/slide36.xml><?xml version="1.0" encoding="utf-8"?>
+<file path=ppt/slides/slide39.xml><?xml version="1.0" encoding="utf-8"?>
 <p:sld xmlns:a="http://schemas.openxmlformats.org/drawingml/2006/main" xmlns:r="http://schemas.openxmlformats.org/officeDocument/2006/relationships" xmlns:p="http://schemas.openxmlformats.org/presentationml/2006/main">
   <p:cSld>
     <p:spTree>
@@ -19754,266 +22696,6 @@
     <p:extLst>
       <p:ext uri="{BB962C8B-B14F-4D97-AF65-F5344CB8AC3E}">
         <p14:creationId xmlns:p14="http://schemas.microsoft.com/office/powerpoint/2010/main" val="30799548"/>
-      </p:ext>
-    </p:extLst>
-  </p:cSld>
-  <p:clrMapOvr>
-    <a:masterClrMapping/>
-  </p:clrMapOvr>
-</p:sld>
-</file>
-
-<file path=ppt/slides/slide37.xml><?xml version="1.0" encoding="utf-8"?>
-<p:sld xmlns:a="http://schemas.openxmlformats.org/drawingml/2006/main" xmlns:r="http://schemas.openxmlformats.org/officeDocument/2006/relationships" xmlns:p="http://schemas.openxmlformats.org/presentationml/2006/main">
-  <p:cSld>
-    <p:spTree>
-      <p:nvGrpSpPr>
-        <p:cNvPr id="1" name=""/>
-        <p:cNvGrpSpPr/>
-        <p:nvPr/>
-      </p:nvGrpSpPr>
-      <p:grpSpPr>
-        <a:xfrm>
-          <a:off x="0" y="0"/>
-          <a:ext cx="0" cy="0"/>
-          <a:chOff x="0" y="0"/>
-          <a:chExt cx="0" cy="0"/>
-        </a:xfrm>
-      </p:grpSpPr>
-      <p:pic>
-        <p:nvPicPr>
-          <p:cNvPr id="5" name="Marcador de contenido 4">
-            <a:extLst>
-              <a:ext uri="{FF2B5EF4-FFF2-40B4-BE49-F238E27FC236}">
-                <a16:creationId xmlns:a16="http://schemas.microsoft.com/office/drawing/2014/main" id="{878D6E6C-48C7-C0EC-F19B-EB8C0EA793F3}"/>
-              </a:ext>
-            </a:extLst>
-          </p:cNvPr>
-          <p:cNvPicPr>
-            <a:picLocks noGrp="1" noChangeAspect="1"/>
-          </p:cNvPicPr>
-          <p:nvPr>
-            <p:ph idx="1"/>
-          </p:nvPr>
-        </p:nvPicPr>
-        <p:blipFill>
-          <a:blip r:embed="rId2"/>
-          <a:stretch>
-            <a:fillRect/>
-          </a:stretch>
-        </p:blipFill>
-        <p:spPr>
-          <a:xfrm>
-            <a:off x="934935" y="725488"/>
-            <a:ext cx="10322130" cy="6064250"/>
-          </a:xfrm>
-          <a:prstGeom prst="rect">
-            <a:avLst/>
-          </a:prstGeom>
-          <a:noFill/>
-        </p:spPr>
-      </p:pic>
-    </p:spTree>
-    <p:extLst>
-      <p:ext uri="{BB962C8B-B14F-4D97-AF65-F5344CB8AC3E}">
-        <p14:creationId xmlns:p14="http://schemas.microsoft.com/office/powerpoint/2010/main" val="1743728605"/>
-      </p:ext>
-    </p:extLst>
-  </p:cSld>
-  <p:clrMapOvr>
-    <a:masterClrMapping/>
-  </p:clrMapOvr>
-</p:sld>
-</file>
-
-<file path=ppt/slides/slide38.xml><?xml version="1.0" encoding="utf-8"?>
-<p:sld xmlns:a="http://schemas.openxmlformats.org/drawingml/2006/main" xmlns:r="http://schemas.openxmlformats.org/officeDocument/2006/relationships" xmlns:p="http://schemas.openxmlformats.org/presentationml/2006/main">
-  <p:cSld>
-    <p:spTree>
-      <p:nvGrpSpPr>
-        <p:cNvPr id="1" name=""/>
-        <p:cNvGrpSpPr/>
-        <p:nvPr/>
-      </p:nvGrpSpPr>
-      <p:grpSpPr>
-        <a:xfrm>
-          <a:off x="0" y="0"/>
-          <a:ext cx="0" cy="0"/>
-          <a:chOff x="0" y="0"/>
-          <a:chExt cx="0" cy="0"/>
-        </a:xfrm>
-      </p:grpSpPr>
-      <p:sp>
-        <p:nvSpPr>
-          <p:cNvPr id="2" name="Título 1">
-            <a:extLst>
-              <a:ext uri="{FF2B5EF4-FFF2-40B4-BE49-F238E27FC236}">
-                <a16:creationId xmlns:a16="http://schemas.microsoft.com/office/drawing/2014/main" id="{A133AA1B-A1F8-30E1-13A5-E1F2BACA9AFE}"/>
-              </a:ext>
-            </a:extLst>
-          </p:cNvPr>
-          <p:cNvSpPr>
-            <a:spLocks noGrp="1"/>
-          </p:cNvSpPr>
-          <p:nvPr>
-            <p:ph type="title"/>
-          </p:nvPr>
-        </p:nvSpPr>
-        <p:spPr/>
-        <p:txBody>
-          <a:bodyPr/>
-          <a:lstStyle/>
-          <a:p>
-            <a:r>
-              <a:rPr lang="es-ES" dirty="0"/>
-              <a:t>SHA</a:t>
-            </a:r>
-          </a:p>
-        </p:txBody>
-      </p:sp>
-      <p:sp>
-        <p:nvSpPr>
-          <p:cNvPr id="3" name="Marcador de contenido 2">
-            <a:extLst>
-              <a:ext uri="{FF2B5EF4-FFF2-40B4-BE49-F238E27FC236}">
-                <a16:creationId xmlns:a16="http://schemas.microsoft.com/office/drawing/2014/main" id="{2D1A6F61-7CB9-5858-40B2-C63981F33C44}"/>
-              </a:ext>
-            </a:extLst>
-          </p:cNvPr>
-          <p:cNvSpPr>
-            <a:spLocks noGrp="1"/>
-          </p:cNvSpPr>
-          <p:nvPr>
-            <p:ph idx="1"/>
-          </p:nvPr>
-        </p:nvSpPr>
-        <p:spPr/>
-        <p:txBody>
-          <a:bodyPr/>
-          <a:lstStyle/>
-          <a:p>
-            <a:r>
-              <a:rPr lang="es-ES" dirty="0"/>
-              <a:t>SHA es una familia de funciones de </a:t>
-            </a:r>
-            <a:r>
-              <a:rPr lang="es-ES" dirty="0" err="1"/>
-              <a:t>haseo</a:t>
-            </a:r>
-            <a:r>
-              <a:rPr lang="es-ES" dirty="0"/>
-              <a:t> de las cuales la más empleada es la SHA-256.</a:t>
-            </a:r>
-          </a:p>
-          <a:p>
-            <a:endParaRPr lang="es-ES" dirty="0"/>
-          </a:p>
-        </p:txBody>
-      </p:sp>
-    </p:spTree>
-    <p:extLst>
-      <p:ext uri="{BB962C8B-B14F-4D97-AF65-F5344CB8AC3E}">
-        <p14:creationId xmlns:p14="http://schemas.microsoft.com/office/powerpoint/2010/main" val="221936402"/>
-      </p:ext>
-    </p:extLst>
-  </p:cSld>
-  <p:clrMapOvr>
-    <a:masterClrMapping/>
-  </p:clrMapOvr>
-</p:sld>
-</file>
-
-<file path=ppt/slides/slide39.xml><?xml version="1.0" encoding="utf-8"?>
-<p:sld xmlns:a="http://schemas.openxmlformats.org/drawingml/2006/main" xmlns:r="http://schemas.openxmlformats.org/officeDocument/2006/relationships" xmlns:p="http://schemas.openxmlformats.org/presentationml/2006/main">
-  <p:cSld>
-    <p:spTree>
-      <p:nvGrpSpPr>
-        <p:cNvPr id="1" name=""/>
-        <p:cNvGrpSpPr/>
-        <p:nvPr/>
-      </p:nvGrpSpPr>
-      <p:grpSpPr>
-        <a:xfrm>
-          <a:off x="0" y="0"/>
-          <a:ext cx="0" cy="0"/>
-          <a:chOff x="0" y="0"/>
-          <a:chExt cx="0" cy="0"/>
-        </a:xfrm>
-      </p:grpSpPr>
-      <p:sp>
-        <p:nvSpPr>
-          <p:cNvPr id="2" name="Título 1">
-            <a:extLst>
-              <a:ext uri="{FF2B5EF4-FFF2-40B4-BE49-F238E27FC236}">
-                <a16:creationId xmlns:a16="http://schemas.microsoft.com/office/drawing/2014/main" id="{4125E6C8-2BE8-A94D-0535-840497F45B4A}"/>
-              </a:ext>
-            </a:extLst>
-          </p:cNvPr>
-          <p:cNvSpPr>
-            <a:spLocks noGrp="1"/>
-          </p:cNvSpPr>
-          <p:nvPr>
-            <p:ph type="title"/>
-          </p:nvPr>
-        </p:nvSpPr>
-        <p:spPr/>
-        <p:txBody>
-          <a:bodyPr/>
-          <a:lstStyle/>
-          <a:p>
-            <a:r>
-              <a:rPr lang="es-ES" dirty="0"/>
-              <a:t>¿Por qué es buena práctica cifrar la base de datos?</a:t>
-            </a:r>
-          </a:p>
-        </p:txBody>
-      </p:sp>
-      <p:sp>
-        <p:nvSpPr>
-          <p:cNvPr id="3" name="Marcador de contenido 2">
-            <a:extLst>
-              <a:ext uri="{FF2B5EF4-FFF2-40B4-BE49-F238E27FC236}">
-                <a16:creationId xmlns:a16="http://schemas.microsoft.com/office/drawing/2014/main" id="{556492AC-E569-1328-D2E5-DF8AA192DB1F}"/>
-              </a:ext>
-            </a:extLst>
-          </p:cNvPr>
-          <p:cNvSpPr>
-            <a:spLocks noGrp="1"/>
-          </p:cNvSpPr>
-          <p:nvPr>
-            <p:ph idx="1"/>
-          </p:nvPr>
-        </p:nvSpPr>
-        <p:spPr/>
-        <p:txBody>
-          <a:bodyPr/>
-          <a:lstStyle/>
-          <a:p>
-            <a:r>
-              <a:rPr lang="es-ES" dirty="0"/>
-              <a:t>Si hay una filtración los datos sensibles no quedan expuestos como texto en claro, pero sigue siendo un problema grave.</a:t>
-            </a:r>
-          </a:p>
-          <a:p>
-            <a:r>
-              <a:rPr lang="es-ES" dirty="0"/>
-              <a:t>También se pueden poner </a:t>
-            </a:r>
-            <a:r>
-              <a:rPr lang="es-ES" dirty="0" err="1"/>
-              <a:t>honeypots</a:t>
-            </a:r>
-            <a:r>
-              <a:rPr lang="es-ES" dirty="0"/>
-              <a:t> con cuentas inexistentes para que si hay un inicio de sesión salte una alerta.</a:t>
-            </a:r>
-          </a:p>
-        </p:txBody>
-      </p:sp>
-    </p:spTree>
-    <p:extLst>
-      <p:ext uri="{BB962C8B-B14F-4D97-AF65-F5344CB8AC3E}">
-        <p14:creationId xmlns:p14="http://schemas.microsoft.com/office/powerpoint/2010/main" val="1940121297"/>
       </p:ext>
     </p:extLst>
   </p:cSld>
@@ -20244,6 +22926,278 @@
           <a:chExt cx="0" cy="0"/>
         </a:xfrm>
       </p:grpSpPr>
+      <p:pic>
+        <p:nvPicPr>
+          <p:cNvPr id="5" name="Marcador de contenido 4">
+            <a:extLst>
+              <a:ext uri="{FF2B5EF4-FFF2-40B4-BE49-F238E27FC236}">
+                <a16:creationId xmlns:a16="http://schemas.microsoft.com/office/drawing/2014/main" id="{878D6E6C-48C7-C0EC-F19B-EB8C0EA793F3}"/>
+              </a:ext>
+            </a:extLst>
+          </p:cNvPr>
+          <p:cNvPicPr>
+            <a:picLocks noGrp="1" noChangeAspect="1"/>
+          </p:cNvPicPr>
+          <p:nvPr>
+            <p:ph idx="1"/>
+          </p:nvPr>
+        </p:nvPicPr>
+        <p:blipFill>
+          <a:blip r:embed="rId2"/>
+          <a:stretch>
+            <a:fillRect/>
+          </a:stretch>
+        </p:blipFill>
+        <p:spPr>
+          <a:xfrm>
+            <a:off x="934935" y="725488"/>
+            <a:ext cx="10322130" cy="6064250"/>
+          </a:xfrm>
+          <a:prstGeom prst="rect">
+            <a:avLst/>
+          </a:prstGeom>
+          <a:noFill/>
+        </p:spPr>
+      </p:pic>
+    </p:spTree>
+    <p:extLst>
+      <p:ext uri="{BB962C8B-B14F-4D97-AF65-F5344CB8AC3E}">
+        <p14:creationId xmlns:p14="http://schemas.microsoft.com/office/powerpoint/2010/main" val="1743728605"/>
+      </p:ext>
+    </p:extLst>
+  </p:cSld>
+  <p:clrMapOvr>
+    <a:masterClrMapping/>
+  </p:clrMapOvr>
+</p:sld>
+</file>
+
+<file path=ppt/slides/slide41.xml><?xml version="1.0" encoding="utf-8"?>
+<p:sld xmlns:a="http://schemas.openxmlformats.org/drawingml/2006/main" xmlns:r="http://schemas.openxmlformats.org/officeDocument/2006/relationships" xmlns:p="http://schemas.openxmlformats.org/presentationml/2006/main">
+  <p:cSld>
+    <p:spTree>
+      <p:nvGrpSpPr>
+        <p:cNvPr id="1" name=""/>
+        <p:cNvGrpSpPr/>
+        <p:nvPr/>
+      </p:nvGrpSpPr>
+      <p:grpSpPr>
+        <a:xfrm>
+          <a:off x="0" y="0"/>
+          <a:ext cx="0" cy="0"/>
+          <a:chOff x="0" y="0"/>
+          <a:chExt cx="0" cy="0"/>
+        </a:xfrm>
+      </p:grpSpPr>
+      <p:sp>
+        <p:nvSpPr>
+          <p:cNvPr id="2" name="Título 1">
+            <a:extLst>
+              <a:ext uri="{FF2B5EF4-FFF2-40B4-BE49-F238E27FC236}">
+                <a16:creationId xmlns:a16="http://schemas.microsoft.com/office/drawing/2014/main" id="{A133AA1B-A1F8-30E1-13A5-E1F2BACA9AFE}"/>
+              </a:ext>
+            </a:extLst>
+          </p:cNvPr>
+          <p:cNvSpPr>
+            <a:spLocks noGrp="1"/>
+          </p:cNvSpPr>
+          <p:nvPr>
+            <p:ph type="title"/>
+          </p:nvPr>
+        </p:nvSpPr>
+        <p:spPr/>
+        <p:txBody>
+          <a:bodyPr/>
+          <a:lstStyle/>
+          <a:p>
+            <a:r>
+              <a:rPr lang="es-ES" dirty="0"/>
+              <a:t>SHA</a:t>
+            </a:r>
+          </a:p>
+        </p:txBody>
+      </p:sp>
+      <p:sp>
+        <p:nvSpPr>
+          <p:cNvPr id="3" name="Marcador de contenido 2">
+            <a:extLst>
+              <a:ext uri="{FF2B5EF4-FFF2-40B4-BE49-F238E27FC236}">
+                <a16:creationId xmlns:a16="http://schemas.microsoft.com/office/drawing/2014/main" id="{2D1A6F61-7CB9-5858-40B2-C63981F33C44}"/>
+              </a:ext>
+            </a:extLst>
+          </p:cNvPr>
+          <p:cNvSpPr>
+            <a:spLocks noGrp="1"/>
+          </p:cNvSpPr>
+          <p:nvPr>
+            <p:ph idx="1"/>
+          </p:nvPr>
+        </p:nvSpPr>
+        <p:spPr/>
+        <p:txBody>
+          <a:bodyPr/>
+          <a:lstStyle/>
+          <a:p>
+            <a:r>
+              <a:rPr lang="es-ES" dirty="0"/>
+              <a:t>SHA es una familia de funciones de </a:t>
+            </a:r>
+            <a:r>
+              <a:rPr lang="es-ES" dirty="0" err="1"/>
+              <a:t>haseo</a:t>
+            </a:r>
+            <a:r>
+              <a:rPr lang="es-ES" dirty="0"/>
+              <a:t> de las cuales la más empleada es la SHA-256.</a:t>
+            </a:r>
+          </a:p>
+          <a:p>
+            <a:r>
+              <a:rPr lang="es-ES" dirty="0">
+                <a:hlinkClick r:id="rId2"/>
+              </a:rPr>
+              <a:t>https://www.youtube.com/watch?v=pG8785ZEFuM</a:t>
+            </a:r>
+            <a:r>
+              <a:rPr lang="es-ES" dirty="0"/>
+              <a:t> </a:t>
+            </a:r>
+          </a:p>
+          <a:p>
+            <a:endParaRPr lang="es-ES" dirty="0"/>
+          </a:p>
+        </p:txBody>
+      </p:sp>
+    </p:spTree>
+    <p:extLst>
+      <p:ext uri="{BB962C8B-B14F-4D97-AF65-F5344CB8AC3E}">
+        <p14:creationId xmlns:p14="http://schemas.microsoft.com/office/powerpoint/2010/main" val="221936402"/>
+      </p:ext>
+    </p:extLst>
+  </p:cSld>
+  <p:clrMapOvr>
+    <a:masterClrMapping/>
+  </p:clrMapOvr>
+</p:sld>
+</file>
+
+<file path=ppt/slides/slide42.xml><?xml version="1.0" encoding="utf-8"?>
+<p:sld xmlns:a="http://schemas.openxmlformats.org/drawingml/2006/main" xmlns:r="http://schemas.openxmlformats.org/officeDocument/2006/relationships" xmlns:p="http://schemas.openxmlformats.org/presentationml/2006/main">
+  <p:cSld>
+    <p:spTree>
+      <p:nvGrpSpPr>
+        <p:cNvPr id="1" name=""/>
+        <p:cNvGrpSpPr/>
+        <p:nvPr/>
+      </p:nvGrpSpPr>
+      <p:grpSpPr>
+        <a:xfrm>
+          <a:off x="0" y="0"/>
+          <a:ext cx="0" cy="0"/>
+          <a:chOff x="0" y="0"/>
+          <a:chExt cx="0" cy="0"/>
+        </a:xfrm>
+      </p:grpSpPr>
+      <p:sp>
+        <p:nvSpPr>
+          <p:cNvPr id="2" name="Título 1">
+            <a:extLst>
+              <a:ext uri="{FF2B5EF4-FFF2-40B4-BE49-F238E27FC236}">
+                <a16:creationId xmlns:a16="http://schemas.microsoft.com/office/drawing/2014/main" id="{4125E6C8-2BE8-A94D-0535-840497F45B4A}"/>
+              </a:ext>
+            </a:extLst>
+          </p:cNvPr>
+          <p:cNvSpPr>
+            <a:spLocks noGrp="1"/>
+          </p:cNvSpPr>
+          <p:nvPr>
+            <p:ph type="title"/>
+          </p:nvPr>
+        </p:nvSpPr>
+        <p:spPr/>
+        <p:txBody>
+          <a:bodyPr/>
+          <a:lstStyle/>
+          <a:p>
+            <a:r>
+              <a:rPr lang="es-ES" dirty="0"/>
+              <a:t>¿Por qué es buena práctica cifrar la base de datos?</a:t>
+            </a:r>
+          </a:p>
+        </p:txBody>
+      </p:sp>
+      <p:sp>
+        <p:nvSpPr>
+          <p:cNvPr id="3" name="Marcador de contenido 2">
+            <a:extLst>
+              <a:ext uri="{FF2B5EF4-FFF2-40B4-BE49-F238E27FC236}">
+                <a16:creationId xmlns:a16="http://schemas.microsoft.com/office/drawing/2014/main" id="{556492AC-E569-1328-D2E5-DF8AA192DB1F}"/>
+              </a:ext>
+            </a:extLst>
+          </p:cNvPr>
+          <p:cNvSpPr>
+            <a:spLocks noGrp="1"/>
+          </p:cNvSpPr>
+          <p:nvPr>
+            <p:ph idx="1"/>
+          </p:nvPr>
+        </p:nvSpPr>
+        <p:spPr/>
+        <p:txBody>
+          <a:bodyPr/>
+          <a:lstStyle/>
+          <a:p>
+            <a:r>
+              <a:rPr lang="es-ES" dirty="0"/>
+              <a:t>Si hay una filtración los datos sensibles no quedan expuestos como texto en claro, pero sigue siendo un problema grave.</a:t>
+            </a:r>
+          </a:p>
+          <a:p>
+            <a:r>
+              <a:rPr lang="es-ES" dirty="0"/>
+              <a:t>También se pueden poner </a:t>
+            </a:r>
+            <a:r>
+              <a:rPr lang="es-ES" dirty="0" err="1"/>
+              <a:t>honeypots</a:t>
+            </a:r>
+            <a:r>
+              <a:rPr lang="es-ES" dirty="0"/>
+              <a:t> con cuentas inexistentes para que si hay un inicio de sesión salte una alerta.</a:t>
+            </a:r>
+          </a:p>
+        </p:txBody>
+      </p:sp>
+    </p:spTree>
+    <p:extLst>
+      <p:ext uri="{BB962C8B-B14F-4D97-AF65-F5344CB8AC3E}">
+        <p14:creationId xmlns:p14="http://schemas.microsoft.com/office/powerpoint/2010/main" val="1940121297"/>
+      </p:ext>
+    </p:extLst>
+  </p:cSld>
+  <p:clrMapOvr>
+    <a:masterClrMapping/>
+  </p:clrMapOvr>
+</p:sld>
+</file>
+
+<file path=ppt/slides/slide43.xml><?xml version="1.0" encoding="utf-8"?>
+<p:sld xmlns:a="http://schemas.openxmlformats.org/drawingml/2006/main" xmlns:r="http://schemas.openxmlformats.org/officeDocument/2006/relationships" xmlns:p="http://schemas.openxmlformats.org/presentationml/2006/main">
+  <p:cSld>
+    <p:spTree>
+      <p:nvGrpSpPr>
+        <p:cNvPr id="1" name=""/>
+        <p:cNvGrpSpPr/>
+        <p:nvPr/>
+      </p:nvGrpSpPr>
+      <p:grpSpPr>
+        <a:xfrm>
+          <a:off x="0" y="0"/>
+          <a:ext cx="0" cy="0"/>
+          <a:chOff x="0" y="0"/>
+          <a:chExt cx="0" cy="0"/>
+        </a:xfrm>
+      </p:grpSpPr>
       <p:sp>
         <p:nvSpPr>
           <p:cNvPr id="2" name="Título 1">
@@ -20328,7 +23282,7 @@
 </p:sld>
 </file>
 
-<file path=ppt/slides/slide41.xml><?xml version="1.0" encoding="utf-8"?>
+<file path=ppt/slides/slide44.xml><?xml version="1.0" encoding="utf-8"?>
 <p:sld xmlns:a="http://schemas.openxmlformats.org/drawingml/2006/main" xmlns:r="http://schemas.openxmlformats.org/officeDocument/2006/relationships" xmlns:p="http://schemas.openxmlformats.org/presentationml/2006/main">
   <p:cSld>
     <p:spTree>

</xml_diff>

<commit_message>
el fin de una diapositiva
</commit_message>
<xml_diff>
--- a/criptografía teorica.pptx
+++ b/criptografía teorica.pptx
@@ -52,6 +52,7 @@
     <p:sldId id="293" r:id="rId46"/>
     <p:sldId id="304" r:id="rId47"/>
     <p:sldId id="274" r:id="rId48"/>
+    <p:sldId id="305" r:id="rId49"/>
   </p:sldIdLst>
   <p:sldSz cx="12192000" cy="6858000"/>
   <p:notesSz cx="6858000" cy="9144000"/>
@@ -14343,7 +14344,7 @@
             <a:fld id="{E80C50CD-E178-4744-9B35-B2F624D6C5E9}" type="datetimeFigureOut">
               <a:rPr lang="en-US" smtClean="0"/>
               <a:pPr/>
-              <a:t>11/9/2025</a:t>
+              <a:t>11/10/2025</a:t>
             </a:fld>
             <a:endParaRPr lang="en-US"/>
           </a:p>
@@ -14545,7 +14546,7 @@
             <a:fld id="{E80C50CD-E178-4744-9B35-B2F624D6C5E9}" type="datetimeFigureOut">
               <a:rPr lang="en-US" smtClean="0"/>
               <a:pPr/>
-              <a:t>11/9/2025</a:t>
+              <a:t>11/10/2025</a:t>
             </a:fld>
             <a:endParaRPr lang="en-US"/>
           </a:p>
@@ -14757,7 +14758,7 @@
             <a:fld id="{E80C50CD-E178-4744-9B35-B2F624D6C5E9}" type="datetimeFigureOut">
               <a:rPr lang="en-US" smtClean="0"/>
               <a:pPr/>
-              <a:t>11/9/2025</a:t>
+              <a:t>11/10/2025</a:t>
             </a:fld>
             <a:endParaRPr lang="en-US"/>
           </a:p>
@@ -15011,7 +15012,7 @@
             <a:fld id="{E80C50CD-E178-4744-9B35-B2F624D6C5E9}" type="datetimeFigureOut">
               <a:rPr lang="en-US" smtClean="0"/>
               <a:pPr/>
-              <a:t>11/9/2025</a:t>
+              <a:t>11/10/2025</a:t>
             </a:fld>
             <a:endParaRPr lang="en-US"/>
           </a:p>
@@ -15293,7 +15294,7 @@
             <a:fld id="{E80C50CD-E178-4744-9B35-B2F624D6C5E9}" type="datetimeFigureOut">
               <a:rPr lang="en-US" smtClean="0"/>
               <a:pPr/>
-              <a:t>11/9/2025</a:t>
+              <a:t>11/10/2025</a:t>
             </a:fld>
             <a:endParaRPr lang="en-US"/>
           </a:p>
@@ -15615,7 +15616,7 @@
             <a:fld id="{E80C50CD-E178-4744-9B35-B2F624D6C5E9}" type="datetimeFigureOut">
               <a:rPr lang="en-US" smtClean="0"/>
               <a:pPr/>
-              <a:t>11/9/2025</a:t>
+              <a:t>11/10/2025</a:t>
             </a:fld>
             <a:endParaRPr lang="en-US"/>
           </a:p>
@@ -16036,7 +16037,7 @@
             <a:fld id="{E80C50CD-E178-4744-9B35-B2F624D6C5E9}" type="datetimeFigureOut">
               <a:rPr lang="en-US" smtClean="0"/>
               <a:pPr/>
-              <a:t>11/9/2025</a:t>
+              <a:t>11/10/2025</a:t>
             </a:fld>
             <a:endParaRPr lang="en-US"/>
           </a:p>
@@ -16180,7 +16181,7 @@
             <a:fld id="{E80C50CD-E178-4744-9B35-B2F624D6C5E9}" type="datetimeFigureOut">
               <a:rPr lang="en-US" smtClean="0"/>
               <a:pPr/>
-              <a:t>11/9/2025</a:t>
+              <a:t>11/10/2025</a:t>
             </a:fld>
             <a:endParaRPr lang="en-US"/>
           </a:p>
@@ -16295,7 +16296,7 @@
             <a:fld id="{E80C50CD-E178-4744-9B35-B2F624D6C5E9}" type="datetimeFigureOut">
               <a:rPr lang="en-US" smtClean="0"/>
               <a:pPr/>
-              <a:t>11/9/2025</a:t>
+              <a:t>11/10/2025</a:t>
             </a:fld>
             <a:endParaRPr lang="en-US"/>
           </a:p>
@@ -16616,7 +16617,7 @@
             <a:fld id="{E80C50CD-E178-4744-9B35-B2F624D6C5E9}" type="datetimeFigureOut">
               <a:rPr lang="en-US" smtClean="0"/>
               <a:pPr/>
-              <a:t>11/9/2025</a:t>
+              <a:t>11/10/2025</a:t>
             </a:fld>
             <a:endParaRPr lang="en-US"/>
           </a:p>
@@ -16915,7 +16916,7 @@
             <a:fld id="{E80C50CD-E178-4744-9B35-B2F624D6C5E9}" type="datetimeFigureOut">
               <a:rPr lang="en-US" smtClean="0"/>
               <a:pPr/>
-              <a:t>11/9/2025</a:t>
+              <a:t>11/10/2025</a:t>
             </a:fld>
             <a:endParaRPr lang="en-US"/>
           </a:p>
@@ -17158,7 +17159,7 @@
             <a:fld id="{E80C50CD-E178-4744-9B35-B2F624D6C5E9}" type="datetimeFigureOut">
               <a:rPr lang="en-US" smtClean="0"/>
               <a:pPr/>
-              <a:t>11/9/2025</a:t>
+              <a:t>11/10/2025</a:t>
             </a:fld>
             <a:endParaRPr lang="en-US"/>
           </a:p>
@@ -23895,6 +23896,103 @@
 </p:sld>
 </file>
 
+<file path=ppt/slides/slide48.xml><?xml version="1.0" encoding="utf-8"?>
+<p:sld xmlns:a="http://schemas.openxmlformats.org/drawingml/2006/main" xmlns:r="http://schemas.openxmlformats.org/officeDocument/2006/relationships" xmlns:p="http://schemas.openxmlformats.org/presentationml/2006/main">
+  <p:cSld>
+    <p:spTree>
+      <p:nvGrpSpPr>
+        <p:cNvPr id="1" name=""/>
+        <p:cNvGrpSpPr/>
+        <p:nvPr/>
+      </p:nvGrpSpPr>
+      <p:grpSpPr>
+        <a:xfrm>
+          <a:off x="0" y="0"/>
+          <a:ext cx="0" cy="0"/>
+          <a:chOff x="0" y="0"/>
+          <a:chExt cx="0" cy="0"/>
+        </a:xfrm>
+      </p:grpSpPr>
+      <p:sp>
+        <p:nvSpPr>
+          <p:cNvPr id="2" name="Título 1">
+            <a:extLst>
+              <a:ext uri="{FF2B5EF4-FFF2-40B4-BE49-F238E27FC236}">
+                <a16:creationId xmlns:a16="http://schemas.microsoft.com/office/drawing/2014/main" id="{4B967FD3-1BF9-0175-31F2-84C9A9058935}"/>
+              </a:ext>
+            </a:extLst>
+          </p:cNvPr>
+          <p:cNvSpPr>
+            <a:spLocks noGrp="1"/>
+          </p:cNvSpPr>
+          <p:nvPr>
+            <p:ph type="title"/>
+          </p:nvPr>
+        </p:nvSpPr>
+        <p:spPr>
+          <a:xfrm>
+            <a:off x="521208" y="978408"/>
+            <a:ext cx="11155680" cy="1463040"/>
+          </a:xfrm>
+        </p:spPr>
+        <p:txBody>
+          <a:bodyPr anchor="t">
+            <a:normAutofit/>
+          </a:bodyPr>
+          <a:lstStyle/>
+          <a:p>
+            <a:r>
+              <a:rPr lang="es-ES" dirty="0"/>
+              <a:t>FIN</a:t>
+            </a:r>
+          </a:p>
+        </p:txBody>
+      </p:sp>
+      <p:pic>
+        <p:nvPicPr>
+          <p:cNvPr id="5" name="Picture 4" descr="Perro asomándose por la ventana">
+            <a:extLst>
+              <a:ext uri="{FF2B5EF4-FFF2-40B4-BE49-F238E27FC236}">
+                <a16:creationId xmlns:a16="http://schemas.microsoft.com/office/drawing/2014/main" id="{09740010-5E3A-5FCA-1475-F3AFD510927C}"/>
+              </a:ext>
+            </a:extLst>
+          </p:cNvPr>
+          <p:cNvPicPr>
+            <a:picLocks noChangeAspect="1"/>
+          </p:cNvPicPr>
+          <p:nvPr/>
+        </p:nvPicPr>
+        <p:blipFill>
+          <a:blip r:embed="rId2"/>
+          <a:srcRect t="30289" r="-1" b="19118"/>
+          <a:stretch>
+            <a:fillRect/>
+          </a:stretch>
+        </p:blipFill>
+        <p:spPr>
+          <a:xfrm>
+            <a:off x="521208" y="2578608"/>
+            <a:ext cx="11155680" cy="3767328"/>
+          </a:xfrm>
+          <a:prstGeom prst="rect">
+            <a:avLst/>
+          </a:prstGeom>
+          <a:noFill/>
+        </p:spPr>
+      </p:pic>
+    </p:spTree>
+    <p:extLst>
+      <p:ext uri="{BB962C8B-B14F-4D97-AF65-F5344CB8AC3E}">
+        <p14:creationId xmlns:p14="http://schemas.microsoft.com/office/powerpoint/2010/main" val="303455153"/>
+      </p:ext>
+    </p:extLst>
+  </p:cSld>
+  <p:clrMapOvr>
+    <a:masterClrMapping/>
+  </p:clrMapOvr>
+</p:sld>
+</file>
+
 <file path=ppt/slides/slide5.xml><?xml version="1.0" encoding="utf-8"?>
 <p:sld xmlns:a="http://schemas.openxmlformats.org/drawingml/2006/main" xmlns:r="http://schemas.openxmlformats.org/officeDocument/2006/relationships" xmlns:p="http://schemas.openxmlformats.org/presentationml/2006/main">
   <p:cSld>

</xml_diff>